<commit_message>
Minor revisions to existing content and start new pillar section
</commit_message>
<xml_diff>
--- a/src/Stories/Story illustrations.pptx
+++ b/src/Stories/Story illustrations.pptx
@@ -191,7 +191,7 @@
           <a:p>
             <a:fld id="{91095A8E-9C53-4015-AAB0-2CFFE67F5AFD}" type="datetimeFigureOut">
               <a:rPr lang="en-CA" smtClean="0"/>
-              <a:t>2017-03-01</a:t>
+              <a:t>2017-03-13</a:t>
             </a:fld>
             <a:endParaRPr lang="en-CA"/>
           </a:p>
@@ -404,7 +404,7 @@
           <a:p>
             <a:fld id="{91095A8E-9C53-4015-AAB0-2CFFE67F5AFD}" type="datetimeFigureOut">
               <a:rPr lang="en-CA" smtClean="0"/>
-              <a:t>2017-03-01</a:t>
+              <a:t>2017-03-13</a:t>
             </a:fld>
             <a:endParaRPr lang="en-CA"/>
           </a:p>
@@ -2805,7 +2805,7 @@
         </p:blipFill>
         <p:spPr>
           <a:xfrm>
-            <a:off x="3098800" y="132868"/>
+            <a:off x="1275080" y="783108"/>
             <a:ext cx="914400" cy="914400"/>
           </a:xfrm>
           <a:prstGeom prst="rect">
@@ -2838,7 +2838,7 @@
         </p:blipFill>
         <p:spPr>
           <a:xfrm rot="5400000">
-            <a:off x="3766184" y="787400"/>
+            <a:off x="1942464" y="1437640"/>
             <a:ext cx="914400" cy="914400"/>
           </a:xfrm>
           <a:prstGeom prst="rect">
@@ -2871,7 +2871,7 @@
         </p:blipFill>
         <p:spPr>
           <a:xfrm rot="16200000">
-            <a:off x="2425064" y="787400"/>
+            <a:off x="601344" y="1437640"/>
             <a:ext cx="914400" cy="914400"/>
           </a:xfrm>
           <a:prstGeom prst="rect">
@@ -2887,7 +2887,7 @@
         </p:nvSpPr>
         <p:spPr>
           <a:xfrm>
-            <a:off x="3042920" y="744220"/>
+            <a:off x="1219200" y="1394460"/>
             <a:ext cx="1026160" cy="1000760"/>
           </a:xfrm>
           <a:prstGeom prst="ellipse">
@@ -2952,7 +2952,7 @@
         </p:blipFill>
         <p:spPr>
           <a:xfrm>
-            <a:off x="7307580" y="142152"/>
+            <a:off x="7592060" y="792392"/>
             <a:ext cx="914400" cy="914400"/>
           </a:xfrm>
           <a:prstGeom prst="rect">
@@ -2985,7 +2985,7 @@
         </p:blipFill>
         <p:spPr>
           <a:xfrm rot="5400000">
-            <a:off x="7974964" y="796684"/>
+            <a:off x="8259444" y="1446924"/>
             <a:ext cx="914400" cy="914400"/>
           </a:xfrm>
           <a:prstGeom prst="rect">
@@ -3018,7 +3018,7 @@
         </p:blipFill>
         <p:spPr>
           <a:xfrm rot="16200000">
-            <a:off x="6633844" y="796684"/>
+            <a:off x="6918324" y="1446924"/>
             <a:ext cx="914400" cy="914400"/>
           </a:xfrm>
           <a:prstGeom prst="rect">
@@ -3034,7 +3034,7 @@
         </p:nvSpPr>
         <p:spPr>
           <a:xfrm>
-            <a:off x="7251700" y="753504"/>
+            <a:off x="7536180" y="1403744"/>
             <a:ext cx="1026160" cy="1000760"/>
           </a:xfrm>
           <a:prstGeom prst="ellipse">
@@ -3082,8 +3082,8 @@
         </p:nvSpPr>
         <p:spPr>
           <a:xfrm>
-            <a:off x="2484120" y="1234440"/>
-            <a:ext cx="6380480" cy="690880"/>
+            <a:off x="660400" y="1884680"/>
+            <a:ext cx="8519160" cy="690880"/>
           </a:xfrm>
           <a:prstGeom prst="rect">
             <a:avLst/>
@@ -3126,8 +3126,8 @@
         </p:nvSpPr>
         <p:spPr>
           <a:xfrm>
-            <a:off x="2484120" y="3561080"/>
-            <a:ext cx="6380480" cy="690880"/>
+            <a:off x="660400" y="4211320"/>
+            <a:ext cx="8519160" cy="690880"/>
           </a:xfrm>
           <a:prstGeom prst="rect">
             <a:avLst/>
@@ -3193,7 +3193,7 @@
         </p:nvSpPr>
         <p:spPr>
           <a:xfrm>
-            <a:off x="2626360" y="1744980"/>
+            <a:off x="802640" y="2395220"/>
             <a:ext cx="1706880" cy="1998980"/>
           </a:xfrm>
           <a:prstGeom prst="rect">
@@ -3256,7 +3256,7 @@
         </p:nvSpPr>
         <p:spPr>
           <a:xfrm>
-            <a:off x="6944360" y="1744980"/>
+            <a:off x="5120640" y="2395220"/>
             <a:ext cx="1706880" cy="1998980"/>
           </a:xfrm>
           <a:prstGeom prst="rect">
@@ -3312,7 +3312,7 @@
         </p:nvSpPr>
         <p:spPr>
           <a:xfrm>
-            <a:off x="4734560" y="1744980"/>
+            <a:off x="2910840" y="2395220"/>
             <a:ext cx="1706880" cy="1998980"/>
           </a:xfrm>
           <a:prstGeom prst="rect">
@@ -3355,6 +3355,61 @@
             <a:r>
               <a:rPr lang="en-US" dirty="0"/>
               <a:t>WITH CLEAR BOUNDARIES</a:t>
+            </a:r>
+            <a:endParaRPr lang="en-CA" dirty="0"/>
+          </a:p>
+        </p:txBody>
+      </p:sp>
+      <p:sp>
+        <p:nvSpPr>
+          <p:cNvPr id="17" name="Rectangle 16">
+            <a:extLst>
+              <a:ext uri="{FF2B5EF4-FFF2-40B4-BE49-F238E27FC236}">
+                <a16:creationId xmlns:a16="http://schemas.microsoft.com/office/drawing/2014/main" id="{2B7D6C58-6AE6-4753-A52A-0A1147CB8810}"/>
+              </a:ext>
+            </a:extLst>
+          </p:cNvPr>
+          <p:cNvSpPr/>
+          <p:nvPr/>
+        </p:nvSpPr>
+        <p:spPr>
+          <a:xfrm>
+            <a:off x="7330440" y="2409495"/>
+            <a:ext cx="1706880" cy="1998980"/>
+          </a:xfrm>
+          <a:prstGeom prst="rect">
+            <a:avLst/>
+          </a:prstGeom>
+          <a:ln w="28575">
+            <a:solidFill>
+              <a:schemeClr val="bg2"/>
+            </a:solidFill>
+          </a:ln>
+        </p:spPr>
+        <p:style>
+          <a:lnRef idx="2">
+            <a:schemeClr val="dk1">
+              <a:shade val="50000"/>
+            </a:schemeClr>
+          </a:lnRef>
+          <a:fillRef idx="1">
+            <a:schemeClr val="dk1"/>
+          </a:fillRef>
+          <a:effectRef idx="0">
+            <a:schemeClr val="dk1"/>
+          </a:effectRef>
+          <a:fontRef idx="minor">
+            <a:schemeClr val="lt1"/>
+          </a:fontRef>
+        </p:style>
+        <p:txBody>
+          <a:bodyPr rtlCol="0" anchor="ctr"/>
+          <a:lstStyle/>
+          <a:p>
+            <a:pPr algn="ctr"/>
+            <a:r>
+              <a:rPr lang="en-US" dirty="0"/>
+              <a:t>REFLECTION</a:t>
             </a:r>
             <a:endParaRPr lang="en-CA" dirty="0"/>
           </a:p>

</xml_diff>

<commit_message>
Minor revisions to existing content and start new pillar section (#6)
</commit_message>
<xml_diff>
--- a/src/Stories/Story illustrations.pptx
+++ b/src/Stories/Story illustrations.pptx
@@ -191,7 +191,7 @@
           <a:p>
             <a:fld id="{91095A8E-9C53-4015-AAB0-2CFFE67F5AFD}" type="datetimeFigureOut">
               <a:rPr lang="en-CA" smtClean="0"/>
-              <a:t>2017-03-01</a:t>
+              <a:t>2017-03-13</a:t>
             </a:fld>
             <a:endParaRPr lang="en-CA"/>
           </a:p>
@@ -404,7 +404,7 @@
           <a:p>
             <a:fld id="{91095A8E-9C53-4015-AAB0-2CFFE67F5AFD}" type="datetimeFigureOut">
               <a:rPr lang="en-CA" smtClean="0"/>
-              <a:t>2017-03-01</a:t>
+              <a:t>2017-03-13</a:t>
             </a:fld>
             <a:endParaRPr lang="en-CA"/>
           </a:p>
@@ -2805,7 +2805,7 @@
         </p:blipFill>
         <p:spPr>
           <a:xfrm>
-            <a:off x="3098800" y="132868"/>
+            <a:off x="1275080" y="783108"/>
             <a:ext cx="914400" cy="914400"/>
           </a:xfrm>
           <a:prstGeom prst="rect">
@@ -2838,7 +2838,7 @@
         </p:blipFill>
         <p:spPr>
           <a:xfrm rot="5400000">
-            <a:off x="3766184" y="787400"/>
+            <a:off x="1942464" y="1437640"/>
             <a:ext cx="914400" cy="914400"/>
           </a:xfrm>
           <a:prstGeom prst="rect">
@@ -2871,7 +2871,7 @@
         </p:blipFill>
         <p:spPr>
           <a:xfrm rot="16200000">
-            <a:off x="2425064" y="787400"/>
+            <a:off x="601344" y="1437640"/>
             <a:ext cx="914400" cy="914400"/>
           </a:xfrm>
           <a:prstGeom prst="rect">
@@ -2887,7 +2887,7 @@
         </p:nvSpPr>
         <p:spPr>
           <a:xfrm>
-            <a:off x="3042920" y="744220"/>
+            <a:off x="1219200" y="1394460"/>
             <a:ext cx="1026160" cy="1000760"/>
           </a:xfrm>
           <a:prstGeom prst="ellipse">
@@ -2952,7 +2952,7 @@
         </p:blipFill>
         <p:spPr>
           <a:xfrm>
-            <a:off x="7307580" y="142152"/>
+            <a:off x="7592060" y="792392"/>
             <a:ext cx="914400" cy="914400"/>
           </a:xfrm>
           <a:prstGeom prst="rect">
@@ -2985,7 +2985,7 @@
         </p:blipFill>
         <p:spPr>
           <a:xfrm rot="5400000">
-            <a:off x="7974964" y="796684"/>
+            <a:off x="8259444" y="1446924"/>
             <a:ext cx="914400" cy="914400"/>
           </a:xfrm>
           <a:prstGeom prst="rect">
@@ -3018,7 +3018,7 @@
         </p:blipFill>
         <p:spPr>
           <a:xfrm rot="16200000">
-            <a:off x="6633844" y="796684"/>
+            <a:off x="6918324" y="1446924"/>
             <a:ext cx="914400" cy="914400"/>
           </a:xfrm>
           <a:prstGeom prst="rect">
@@ -3034,7 +3034,7 @@
         </p:nvSpPr>
         <p:spPr>
           <a:xfrm>
-            <a:off x="7251700" y="753504"/>
+            <a:off x="7536180" y="1403744"/>
             <a:ext cx="1026160" cy="1000760"/>
           </a:xfrm>
           <a:prstGeom prst="ellipse">
@@ -3082,8 +3082,8 @@
         </p:nvSpPr>
         <p:spPr>
           <a:xfrm>
-            <a:off x="2484120" y="1234440"/>
-            <a:ext cx="6380480" cy="690880"/>
+            <a:off x="660400" y="1884680"/>
+            <a:ext cx="8519160" cy="690880"/>
           </a:xfrm>
           <a:prstGeom prst="rect">
             <a:avLst/>
@@ -3126,8 +3126,8 @@
         </p:nvSpPr>
         <p:spPr>
           <a:xfrm>
-            <a:off x="2484120" y="3561080"/>
-            <a:ext cx="6380480" cy="690880"/>
+            <a:off x="660400" y="4211320"/>
+            <a:ext cx="8519160" cy="690880"/>
           </a:xfrm>
           <a:prstGeom prst="rect">
             <a:avLst/>
@@ -3193,7 +3193,7 @@
         </p:nvSpPr>
         <p:spPr>
           <a:xfrm>
-            <a:off x="2626360" y="1744980"/>
+            <a:off x="802640" y="2395220"/>
             <a:ext cx="1706880" cy="1998980"/>
           </a:xfrm>
           <a:prstGeom prst="rect">
@@ -3256,7 +3256,7 @@
         </p:nvSpPr>
         <p:spPr>
           <a:xfrm>
-            <a:off x="6944360" y="1744980"/>
+            <a:off x="5120640" y="2395220"/>
             <a:ext cx="1706880" cy="1998980"/>
           </a:xfrm>
           <a:prstGeom prst="rect">
@@ -3312,7 +3312,7 @@
         </p:nvSpPr>
         <p:spPr>
           <a:xfrm>
-            <a:off x="4734560" y="1744980"/>
+            <a:off x="2910840" y="2395220"/>
             <a:ext cx="1706880" cy="1998980"/>
           </a:xfrm>
           <a:prstGeom prst="rect">
@@ -3355,6 +3355,61 @@
             <a:r>
               <a:rPr lang="en-US" dirty="0"/>
               <a:t>WITH CLEAR BOUNDARIES</a:t>
+            </a:r>
+            <a:endParaRPr lang="en-CA" dirty="0"/>
+          </a:p>
+        </p:txBody>
+      </p:sp>
+      <p:sp>
+        <p:nvSpPr>
+          <p:cNvPr id="17" name="Rectangle 16">
+            <a:extLst>
+              <a:ext uri="{FF2B5EF4-FFF2-40B4-BE49-F238E27FC236}">
+                <a16:creationId xmlns:a16="http://schemas.microsoft.com/office/drawing/2014/main" id="{2B7D6C58-6AE6-4753-A52A-0A1147CB8810}"/>
+              </a:ext>
+            </a:extLst>
+          </p:cNvPr>
+          <p:cNvSpPr/>
+          <p:nvPr/>
+        </p:nvSpPr>
+        <p:spPr>
+          <a:xfrm>
+            <a:off x="7330440" y="2409495"/>
+            <a:ext cx="1706880" cy="1998980"/>
+          </a:xfrm>
+          <a:prstGeom prst="rect">
+            <a:avLst/>
+          </a:prstGeom>
+          <a:ln w="28575">
+            <a:solidFill>
+              <a:schemeClr val="bg2"/>
+            </a:solidFill>
+          </a:ln>
+        </p:spPr>
+        <p:style>
+          <a:lnRef idx="2">
+            <a:schemeClr val="dk1">
+              <a:shade val="50000"/>
+            </a:schemeClr>
+          </a:lnRef>
+          <a:fillRef idx="1">
+            <a:schemeClr val="dk1"/>
+          </a:fillRef>
+          <a:effectRef idx="0">
+            <a:schemeClr val="dk1"/>
+          </a:effectRef>
+          <a:fontRef idx="minor">
+            <a:schemeClr val="lt1"/>
+          </a:fontRef>
+        </p:style>
+        <p:txBody>
+          <a:bodyPr rtlCol="0" anchor="ctr"/>
+          <a:lstStyle/>
+          <a:p>
+            <a:pPr algn="ctr"/>
+            <a:r>
+              <a:rPr lang="en-US" dirty="0"/>
+              <a:t>REFLECTION</a:t>
             </a:r>
             <a:endParaRPr lang="en-CA" dirty="0"/>
           </a:p>

</xml_diff>

<commit_message>
Safety push as I'm working remote
</commit_message>
<xml_diff>
--- a/src/Stories/Story illustrations.pptx
+++ b/src/Stories/Story illustrations.pptx
@@ -7,6 +7,8 @@
   <p:sldIdLst>
     <p:sldId id="256" r:id="rId2"/>
     <p:sldId id="257" r:id="rId3"/>
+    <p:sldId id="259" r:id="rId4"/>
+    <p:sldId id="260" r:id="rId5"/>
   </p:sldIdLst>
   <p:sldSz cx="12192000" cy="6858000"/>
   <p:notesSz cx="6858000" cy="9144000"/>
@@ -117,6 +119,60 @@
 <p1510:revInfo xmlns:a="http://schemas.openxmlformats.org/drawingml/2006/main" xmlns:r="http://schemas.openxmlformats.org/officeDocument/2006/relationships" xmlns:p1510="http://schemas.microsoft.com/office/powerpoint/2015/10/main"/>
 </file>
 
+<file path=ppt/ink/ink1.xml><?xml version="1.0" encoding="utf-8"?>
+<inkml:ink xmlns:inkml="http://www.w3.org/2003/InkML">
+  <inkml:definitions>
+    <inkml:context xml:id="ctx0">
+      <inkml:inkSource xml:id="inkSrc0">
+        <inkml:traceFormat>
+          <inkml:channel name="X" type="integer" min="-2.14748E9" max="2.14748E9" units="cm"/>
+          <inkml:channel name="Y" type="integer" min="-2.14748E9" max="2.14748E9" units="cm"/>
+          <inkml:channel name="F" type="integer" max="32767" units="dev"/>
+        </inkml:traceFormat>
+        <inkml:channelProperties>
+          <inkml:channelProperty channel="X" name="resolution" value="1000" units="1/cm"/>
+          <inkml:channelProperty channel="Y" name="resolution" value="1000" units="1/cm"/>
+          <inkml:channelProperty channel="F" name="resolution" value="0" units="1/dev"/>
+        </inkml:channelProperties>
+      </inkml:inkSource>
+      <inkml:timestamp xml:id="ts0" timeString="2017-03-17T18:31:02.525"/>
+    </inkml:context>
+    <inkml:brush xml:id="br0">
+      <inkml:brushProperty name="width" value="0.025" units="cm"/>
+      <inkml:brushProperty name="height" value="0.025" units="cm"/>
+    </inkml:brush>
+  </inkml:definitions>
+  <inkml:trace contextRef="#ctx0" brushRef="#br0">4682 19399 1408,'13'-4'512,"-19"-2"-256,6-4-96,0 10 256,0-6-96,6 2 0,12-8-64,-6 8 0,0-8-64,0 1 32,-2 1 0,-4 0 32</inkml:trace>
+</inkml:ink>
+</file>
+
+<file path=ppt/ink/ink2.xml><?xml version="1.0" encoding="utf-8"?>
+<inkml:ink xmlns:inkml="http://www.w3.org/2003/InkML">
+  <inkml:definitions>
+    <inkml:context xml:id="ctx0">
+      <inkml:inkSource xml:id="inkSrc0">
+        <inkml:traceFormat>
+          <inkml:channel name="X" type="integer" min="-2.14748E9" max="2.14748E9" units="cm"/>
+          <inkml:channel name="Y" type="integer" min="-2.14748E9" max="2.14748E9" units="cm"/>
+          <inkml:channel name="F" type="integer" max="32767" units="dev"/>
+        </inkml:traceFormat>
+        <inkml:channelProperties>
+          <inkml:channelProperty channel="X" name="resolution" value="1000" units="1/cm"/>
+          <inkml:channelProperty channel="Y" name="resolution" value="1000" units="1/cm"/>
+          <inkml:channelProperty channel="F" name="resolution" value="0" units="1/dev"/>
+        </inkml:channelProperties>
+      </inkml:inkSource>
+      <inkml:timestamp xml:id="ts0" timeString="2017-03-17T18:31:13.532"/>
+    </inkml:context>
+    <inkml:brush xml:id="br0">
+      <inkml:brushProperty name="width" value="0.025" units="cm"/>
+      <inkml:brushProperty name="height" value="0.025" units="cm"/>
+    </inkml:brush>
+  </inkml:definitions>
+  <inkml:trace contextRef="#ctx0" brushRef="#br0">4502 19608 2176,'12'0'864,"-12"-21"-448,13 34-288,-13-13 256</inkml:trace>
+</inkml:ink>
+</file>
+
 <file path=ppt/slideLayouts/slideLayout1.xml><?xml version="1.0" encoding="utf-8"?>
 <p:sldLayout xmlns:a="http://schemas.openxmlformats.org/drawingml/2006/main" xmlns:r="http://schemas.openxmlformats.org/officeDocument/2006/relationships" xmlns:p="http://schemas.openxmlformats.org/presentationml/2006/main" type="titleOnly" preserve="1">
   <p:cSld name="Title Only">
@@ -191,7 +247,7 @@
           <a:p>
             <a:fld id="{91095A8E-9C53-4015-AAB0-2CFFE67F5AFD}" type="datetimeFigureOut">
               <a:rPr lang="en-CA" smtClean="0"/>
-              <a:t>2017-03-13</a:t>
+              <a:t>2017-03-18</a:t>
             </a:fld>
             <a:endParaRPr lang="en-CA"/>
           </a:p>
@@ -404,7 +460,7 @@
           <a:p>
             <a:fld id="{91095A8E-9C53-4015-AAB0-2CFFE67F5AFD}" type="datetimeFigureOut">
               <a:rPr lang="en-CA" smtClean="0"/>
-              <a:t>2017-03-13</a:t>
+              <a:t>2017-03-18</a:t>
             </a:fld>
             <a:endParaRPr lang="en-CA"/>
           </a:p>
@@ -3428,6 +3484,1331 @@
 </p:sld>
 </file>
 
+<file path=ppt/slides/slide3.xml><?xml version="1.0" encoding="utf-8"?>
+<p:sld xmlns:a="http://schemas.openxmlformats.org/drawingml/2006/main" xmlns:r="http://schemas.openxmlformats.org/officeDocument/2006/relationships" xmlns:p="http://schemas.openxmlformats.org/presentationml/2006/main">
+  <p:cSld>
+    <p:spTree>
+      <p:nvGrpSpPr>
+        <p:cNvPr id="1" name=""/>
+        <p:cNvGrpSpPr/>
+        <p:nvPr/>
+      </p:nvGrpSpPr>
+      <p:grpSpPr>
+        <a:xfrm>
+          <a:off x="0" y="0"/>
+          <a:ext cx="0" cy="0"/>
+          <a:chOff x="0" y="0"/>
+          <a:chExt cx="0" cy="0"/>
+        </a:xfrm>
+      </p:grpSpPr>
+      <p:cxnSp>
+        <p:nvCxnSpPr>
+          <p:cNvPr id="4" name="Straight Arrow Connector 3">
+            <a:extLst>
+              <a:ext uri="{FF2B5EF4-FFF2-40B4-BE49-F238E27FC236}">
+                <a16:creationId xmlns:a16="http://schemas.microsoft.com/office/drawing/2014/main" id="{40E64F3C-706F-4736-A9A3-71D00E9A82E1}"/>
+              </a:ext>
+            </a:extLst>
+          </p:cNvPr>
+          <p:cNvCxnSpPr>
+            <a:cxnSpLocks/>
+          </p:cNvCxnSpPr>
+          <p:nvPr/>
+        </p:nvCxnSpPr>
+        <p:spPr>
+          <a:xfrm flipV="1">
+            <a:off x="1437641" y="2299855"/>
+            <a:ext cx="0" cy="2714105"/>
+          </a:xfrm>
+          <a:prstGeom prst="straightConnector1">
+            <a:avLst/>
+          </a:prstGeom>
+          <a:ln w="57150">
+            <a:solidFill>
+              <a:schemeClr val="tx1"/>
+            </a:solidFill>
+            <a:tailEnd type="triangle" w="lg" len="sm"/>
+          </a:ln>
+        </p:spPr>
+        <p:style>
+          <a:lnRef idx="1">
+            <a:schemeClr val="accent1"/>
+          </a:lnRef>
+          <a:fillRef idx="0">
+            <a:schemeClr val="accent1"/>
+          </a:fillRef>
+          <a:effectRef idx="0">
+            <a:schemeClr val="accent1"/>
+          </a:effectRef>
+          <a:fontRef idx="minor">
+            <a:schemeClr val="tx1"/>
+          </a:fontRef>
+        </p:style>
+      </p:cxnSp>
+      <p:cxnSp>
+        <p:nvCxnSpPr>
+          <p:cNvPr id="7" name="Straight Arrow Connector 6">
+            <a:extLst>
+              <a:ext uri="{FF2B5EF4-FFF2-40B4-BE49-F238E27FC236}">
+                <a16:creationId xmlns:a16="http://schemas.microsoft.com/office/drawing/2014/main" id="{2734D75D-69A6-4EFC-B284-2D7F05394558}"/>
+              </a:ext>
+            </a:extLst>
+          </p:cNvPr>
+          <p:cNvCxnSpPr>
+            <a:cxnSpLocks/>
+          </p:cNvCxnSpPr>
+          <p:nvPr/>
+        </p:nvCxnSpPr>
+        <p:spPr>
+          <a:xfrm>
+            <a:off x="1437641" y="5013960"/>
+            <a:ext cx="6521795" cy="0"/>
+          </a:xfrm>
+          <a:prstGeom prst="straightConnector1">
+            <a:avLst/>
+          </a:prstGeom>
+          <a:ln w="57150">
+            <a:solidFill>
+              <a:schemeClr val="tx1"/>
+            </a:solidFill>
+            <a:tailEnd type="triangle" w="lg" len="sm"/>
+          </a:ln>
+        </p:spPr>
+        <p:style>
+          <a:lnRef idx="1">
+            <a:schemeClr val="accent1"/>
+          </a:lnRef>
+          <a:fillRef idx="0">
+            <a:schemeClr val="accent1"/>
+          </a:fillRef>
+          <a:effectRef idx="0">
+            <a:schemeClr val="accent1"/>
+          </a:effectRef>
+          <a:fontRef idx="minor">
+            <a:schemeClr val="tx1"/>
+          </a:fontRef>
+        </p:style>
+      </p:cxnSp>
+      <p:sp>
+        <p:nvSpPr>
+          <p:cNvPr id="10" name="TextBox 9">
+            <a:extLst>
+              <a:ext uri="{FF2B5EF4-FFF2-40B4-BE49-F238E27FC236}">
+                <a16:creationId xmlns:a16="http://schemas.microsoft.com/office/drawing/2014/main" id="{A173A2DC-7A17-4ED1-A351-353F52D8542C}"/>
+              </a:ext>
+            </a:extLst>
+          </p:cNvPr>
+          <p:cNvSpPr txBox="1"/>
+          <p:nvPr/>
+        </p:nvSpPr>
+        <p:spPr>
+          <a:xfrm>
+            <a:off x="7959436" y="4702233"/>
+            <a:ext cx="851515" cy="523220"/>
+          </a:xfrm>
+          <a:prstGeom prst="rect">
+            <a:avLst/>
+          </a:prstGeom>
+          <a:noFill/>
+        </p:spPr>
+        <p:txBody>
+          <a:bodyPr wrap="none" rtlCol="0">
+            <a:spAutoFit/>
+          </a:bodyPr>
+          <a:lstStyle/>
+          <a:p>
+            <a:r>
+              <a:rPr lang="en-US" sz="2800" dirty="0">
+                <a:latin typeface="Segoe UI Light" panose="020B0502040204020203" pitchFamily="34" charset="0"/>
+                <a:cs typeface="Segoe UI Light" panose="020B0502040204020203" pitchFamily="34" charset="0"/>
+              </a:rPr>
+              <a:t>time</a:t>
+            </a:r>
+            <a:endParaRPr lang="en-CA" sz="2800" dirty="0">
+              <a:latin typeface="Segoe UI Light" panose="020B0502040204020203" pitchFamily="34" charset="0"/>
+              <a:cs typeface="Segoe UI Light" panose="020B0502040204020203" pitchFamily="34" charset="0"/>
+            </a:endParaRPr>
+          </a:p>
+        </p:txBody>
+      </p:sp>
+      <p:sp>
+        <p:nvSpPr>
+          <p:cNvPr id="14" name="TextBox 13">
+            <a:extLst>
+              <a:ext uri="{FF2B5EF4-FFF2-40B4-BE49-F238E27FC236}">
+                <a16:creationId xmlns:a16="http://schemas.microsoft.com/office/drawing/2014/main" id="{413255A3-9E5D-4CD0-8190-12928763C57B}"/>
+              </a:ext>
+            </a:extLst>
+          </p:cNvPr>
+          <p:cNvSpPr txBox="1"/>
+          <p:nvPr/>
+        </p:nvSpPr>
+        <p:spPr>
+          <a:xfrm>
+            <a:off x="1253134" y="4702233"/>
+            <a:ext cx="369012" cy="523220"/>
+          </a:xfrm>
+          <a:prstGeom prst="rect">
+            <a:avLst/>
+          </a:prstGeom>
+          <a:solidFill>
+            <a:schemeClr val="bg1"/>
+          </a:solidFill>
+        </p:spPr>
+        <p:txBody>
+          <a:bodyPr wrap="none" rtlCol="0">
+            <a:spAutoFit/>
+          </a:bodyPr>
+          <a:lstStyle/>
+          <a:p>
+            <a:r>
+              <a:rPr lang="en-US" sz="2800" dirty="0">
+                <a:latin typeface="Segoe UI Light" panose="020B0502040204020203" pitchFamily="34" charset="0"/>
+                <a:cs typeface="Segoe UI Light" panose="020B0502040204020203" pitchFamily="34" charset="0"/>
+              </a:rPr>
+              <a:t>0</a:t>
+            </a:r>
+            <a:endParaRPr lang="en-CA" sz="2800" dirty="0">
+              <a:latin typeface="Segoe UI Light" panose="020B0502040204020203" pitchFamily="34" charset="0"/>
+              <a:cs typeface="Segoe UI Light" panose="020B0502040204020203" pitchFamily="34" charset="0"/>
+            </a:endParaRPr>
+          </a:p>
+        </p:txBody>
+      </p:sp>
+      <p:sp>
+        <p:nvSpPr>
+          <p:cNvPr id="16" name="Title 15">
+            <a:extLst>
+              <a:ext uri="{FF2B5EF4-FFF2-40B4-BE49-F238E27FC236}">
+                <a16:creationId xmlns:a16="http://schemas.microsoft.com/office/drawing/2014/main" id="{5EDA51C9-0511-418D-814A-897F390E9B3E}"/>
+              </a:ext>
+            </a:extLst>
+          </p:cNvPr>
+          <p:cNvSpPr txBox="1">
+            <a:spLocks noGrp="1"/>
+          </p:cNvSpPr>
+          <p:nvPr>
+            <p:ph type="title"/>
+          </p:nvPr>
+        </p:nvSpPr>
+        <p:spPr>
+          <a:xfrm>
+            <a:off x="0" y="39335"/>
+            <a:ext cx="4109651" cy="480131"/>
+          </a:xfrm>
+          <a:prstGeom prst="rect">
+            <a:avLst/>
+          </a:prstGeom>
+          <a:noFill/>
+        </p:spPr>
+        <p:txBody>
+          <a:bodyPr wrap="none" rtlCol="0">
+            <a:spAutoFit/>
+          </a:bodyPr>
+          <a:lstStyle/>
+          <a:p>
+            <a:r>
+              <a:rPr lang="en-US" sz="2800" dirty="0">
+                <a:latin typeface="Segoe UI Light" panose="020B0502040204020203" pitchFamily="34" charset="0"/>
+                <a:cs typeface="Segoe UI Light" panose="020B0502040204020203" pitchFamily="34" charset="0"/>
+              </a:rPr>
+              <a:t>From 0 to isolated success</a:t>
+            </a:r>
+            <a:endParaRPr lang="en-CA" sz="2800" dirty="0">
+              <a:latin typeface="Segoe UI Light" panose="020B0502040204020203" pitchFamily="34" charset="0"/>
+              <a:cs typeface="Segoe UI Light" panose="020B0502040204020203" pitchFamily="34" charset="0"/>
+            </a:endParaRPr>
+          </a:p>
+        </p:txBody>
+      </p:sp>
+      <p:sp>
+        <p:nvSpPr>
+          <p:cNvPr id="17" name="Rectangle 16">
+            <a:extLst>
+              <a:ext uri="{FF2B5EF4-FFF2-40B4-BE49-F238E27FC236}">
+                <a16:creationId xmlns:a16="http://schemas.microsoft.com/office/drawing/2014/main" id="{6050CCD8-D134-49FD-B611-E31EE2ECADD3}"/>
+              </a:ext>
+            </a:extLst>
+          </p:cNvPr>
+          <p:cNvSpPr/>
+          <p:nvPr/>
+        </p:nvSpPr>
+        <p:spPr>
+          <a:xfrm>
+            <a:off x="1445601" y="5331923"/>
+            <a:ext cx="187036" cy="210690"/>
+          </a:xfrm>
+          <a:prstGeom prst="rect">
+            <a:avLst/>
+          </a:prstGeom>
+          <a:ln>
+            <a:noFill/>
+          </a:ln>
+        </p:spPr>
+        <p:style>
+          <a:lnRef idx="2">
+            <a:schemeClr val="accent1">
+              <a:shade val="50000"/>
+            </a:schemeClr>
+          </a:lnRef>
+          <a:fillRef idx="1">
+            <a:schemeClr val="accent1"/>
+          </a:fillRef>
+          <a:effectRef idx="0">
+            <a:schemeClr val="accent1"/>
+          </a:effectRef>
+          <a:fontRef idx="minor">
+            <a:schemeClr val="lt1"/>
+          </a:fontRef>
+        </p:style>
+        <p:txBody>
+          <a:bodyPr rtlCol="0" anchor="ctr"/>
+          <a:lstStyle/>
+          <a:p>
+            <a:pPr algn="ctr"/>
+            <a:endParaRPr lang="en-CA"/>
+          </a:p>
+        </p:txBody>
+      </p:sp>
+      <p:sp>
+        <p:nvSpPr>
+          <p:cNvPr id="18" name="TextBox 17">
+            <a:extLst>
+              <a:ext uri="{FF2B5EF4-FFF2-40B4-BE49-F238E27FC236}">
+                <a16:creationId xmlns:a16="http://schemas.microsoft.com/office/drawing/2014/main" id="{5483DD0E-5991-4506-8D2C-734A73AE331D}"/>
+              </a:ext>
+            </a:extLst>
+          </p:cNvPr>
+          <p:cNvSpPr txBox="1"/>
+          <p:nvPr/>
+        </p:nvSpPr>
+        <p:spPr>
+          <a:xfrm>
+            <a:off x="1632637" y="5175658"/>
+            <a:ext cx="2479397" cy="523220"/>
+          </a:xfrm>
+          <a:prstGeom prst="rect">
+            <a:avLst/>
+          </a:prstGeom>
+          <a:noFill/>
+        </p:spPr>
+        <p:txBody>
+          <a:bodyPr wrap="none" rtlCol="0">
+            <a:spAutoFit/>
+          </a:bodyPr>
+          <a:lstStyle/>
+          <a:p>
+            <a:r>
+              <a:rPr lang="en-US" sz="2800" dirty="0">
+                <a:solidFill>
+                  <a:srgbClr val="0070C0"/>
+                </a:solidFill>
+                <a:latin typeface="Segoe UI Light" panose="020B0502040204020203" pitchFamily="34" charset="0"/>
+                <a:cs typeface="Segoe UI Light" panose="020B0502040204020203" pitchFamily="34" charset="0"/>
+              </a:rPr>
+              <a:t>delivered value</a:t>
+            </a:r>
+            <a:endParaRPr lang="en-CA" sz="2800" dirty="0">
+              <a:solidFill>
+                <a:srgbClr val="0070C0"/>
+              </a:solidFill>
+              <a:latin typeface="Segoe UI Light" panose="020B0502040204020203" pitchFamily="34" charset="0"/>
+              <a:cs typeface="Segoe UI Light" panose="020B0502040204020203" pitchFamily="34" charset="0"/>
+            </a:endParaRPr>
+          </a:p>
+        </p:txBody>
+      </p:sp>
+      <p:sp>
+        <p:nvSpPr>
+          <p:cNvPr id="19" name="Rectangle 18">
+            <a:extLst>
+              <a:ext uri="{FF2B5EF4-FFF2-40B4-BE49-F238E27FC236}">
+                <a16:creationId xmlns:a16="http://schemas.microsoft.com/office/drawing/2014/main" id="{2B998011-CEA6-4317-BB59-6B9FF698E46A}"/>
+              </a:ext>
+            </a:extLst>
+          </p:cNvPr>
+          <p:cNvSpPr/>
+          <p:nvPr/>
+        </p:nvSpPr>
+        <p:spPr>
+          <a:xfrm>
+            <a:off x="4248811" y="5331923"/>
+            <a:ext cx="187036" cy="210690"/>
+          </a:xfrm>
+          <a:prstGeom prst="rect">
+            <a:avLst/>
+          </a:prstGeom>
+          <a:solidFill>
+            <a:srgbClr val="C00000"/>
+          </a:solidFill>
+          <a:ln>
+            <a:noFill/>
+          </a:ln>
+        </p:spPr>
+        <p:style>
+          <a:lnRef idx="2">
+            <a:schemeClr val="accent1">
+              <a:shade val="50000"/>
+            </a:schemeClr>
+          </a:lnRef>
+          <a:fillRef idx="1">
+            <a:schemeClr val="accent1"/>
+          </a:fillRef>
+          <a:effectRef idx="0">
+            <a:schemeClr val="accent1"/>
+          </a:effectRef>
+          <a:fontRef idx="minor">
+            <a:schemeClr val="lt1"/>
+          </a:fontRef>
+        </p:style>
+        <p:txBody>
+          <a:bodyPr rtlCol="0" anchor="ctr"/>
+          <a:lstStyle/>
+          <a:p>
+            <a:pPr algn="ctr"/>
+            <a:endParaRPr lang="en-CA"/>
+          </a:p>
+        </p:txBody>
+      </p:sp>
+      <p:sp>
+        <p:nvSpPr>
+          <p:cNvPr id="20" name="TextBox 19">
+            <a:extLst>
+              <a:ext uri="{FF2B5EF4-FFF2-40B4-BE49-F238E27FC236}">
+                <a16:creationId xmlns:a16="http://schemas.microsoft.com/office/drawing/2014/main" id="{EB16F4D1-DD5E-4D7E-8C92-0C8D857C0DB0}"/>
+              </a:ext>
+            </a:extLst>
+          </p:cNvPr>
+          <p:cNvSpPr txBox="1"/>
+          <p:nvPr/>
+        </p:nvSpPr>
+        <p:spPr>
+          <a:xfrm>
+            <a:off x="4435847" y="5175658"/>
+            <a:ext cx="1008353" cy="523220"/>
+          </a:xfrm>
+          <a:prstGeom prst="rect">
+            <a:avLst/>
+          </a:prstGeom>
+          <a:noFill/>
+        </p:spPr>
+        <p:txBody>
+          <a:bodyPr wrap="none" rtlCol="0">
+            <a:spAutoFit/>
+          </a:bodyPr>
+          <a:lstStyle/>
+          <a:p>
+            <a:r>
+              <a:rPr lang="en-US" sz="2800" dirty="0">
+                <a:solidFill>
+                  <a:srgbClr val="C00000"/>
+                </a:solidFill>
+                <a:latin typeface="Segoe UI Light" panose="020B0502040204020203" pitchFamily="34" charset="0"/>
+                <a:cs typeface="Segoe UI Light" panose="020B0502040204020203" pitchFamily="34" charset="0"/>
+              </a:rPr>
+              <a:t>effort</a:t>
+            </a:r>
+            <a:endParaRPr lang="en-CA" sz="2800" dirty="0">
+              <a:solidFill>
+                <a:srgbClr val="C00000"/>
+              </a:solidFill>
+              <a:latin typeface="Segoe UI Light" panose="020B0502040204020203" pitchFamily="34" charset="0"/>
+              <a:cs typeface="Segoe UI Light" panose="020B0502040204020203" pitchFamily="34" charset="0"/>
+            </a:endParaRPr>
+          </a:p>
+        </p:txBody>
+      </p:sp>
+      <p:sp>
+        <p:nvSpPr>
+          <p:cNvPr id="21" name="Rectangle 20">
+            <a:extLst>
+              <a:ext uri="{FF2B5EF4-FFF2-40B4-BE49-F238E27FC236}">
+                <a16:creationId xmlns:a16="http://schemas.microsoft.com/office/drawing/2014/main" id="{F250CBAA-050D-436A-BBDF-89C1B16C0266}"/>
+              </a:ext>
+            </a:extLst>
+          </p:cNvPr>
+          <p:cNvSpPr/>
+          <p:nvPr/>
+        </p:nvSpPr>
+        <p:spPr>
+          <a:xfrm>
+            <a:off x="5755694" y="5331923"/>
+            <a:ext cx="187036" cy="210690"/>
+          </a:xfrm>
+          <a:prstGeom prst="rect">
+            <a:avLst/>
+          </a:prstGeom>
+          <a:solidFill>
+            <a:srgbClr val="00B050"/>
+          </a:solidFill>
+          <a:ln>
+            <a:noFill/>
+          </a:ln>
+        </p:spPr>
+        <p:style>
+          <a:lnRef idx="2">
+            <a:schemeClr val="accent1">
+              <a:shade val="50000"/>
+            </a:schemeClr>
+          </a:lnRef>
+          <a:fillRef idx="1">
+            <a:schemeClr val="accent1"/>
+          </a:fillRef>
+          <a:effectRef idx="0">
+            <a:schemeClr val="accent1"/>
+          </a:effectRef>
+          <a:fontRef idx="minor">
+            <a:schemeClr val="lt1"/>
+          </a:fontRef>
+        </p:style>
+        <p:txBody>
+          <a:bodyPr rtlCol="0" anchor="ctr"/>
+          <a:lstStyle/>
+          <a:p>
+            <a:pPr algn="ctr"/>
+            <a:endParaRPr lang="en-CA"/>
+          </a:p>
+        </p:txBody>
+      </p:sp>
+      <p:sp>
+        <p:nvSpPr>
+          <p:cNvPr id="22" name="TextBox 21">
+            <a:extLst>
+              <a:ext uri="{FF2B5EF4-FFF2-40B4-BE49-F238E27FC236}">
+                <a16:creationId xmlns:a16="http://schemas.microsoft.com/office/drawing/2014/main" id="{43F53E4A-5F2F-466B-AA25-887CD24126AA}"/>
+              </a:ext>
+            </a:extLst>
+          </p:cNvPr>
+          <p:cNvSpPr txBox="1"/>
+          <p:nvPr/>
+        </p:nvSpPr>
+        <p:spPr>
+          <a:xfrm>
+            <a:off x="5942730" y="5175658"/>
+            <a:ext cx="1309974" cy="523220"/>
+          </a:xfrm>
+          <a:prstGeom prst="rect">
+            <a:avLst/>
+          </a:prstGeom>
+          <a:noFill/>
+        </p:spPr>
+        <p:txBody>
+          <a:bodyPr wrap="none" rtlCol="0">
+            <a:spAutoFit/>
+          </a:bodyPr>
+          <a:lstStyle/>
+          <a:p>
+            <a:r>
+              <a:rPr lang="en-US" sz="2800" dirty="0">
+                <a:solidFill>
+                  <a:srgbClr val="00B050"/>
+                </a:solidFill>
+                <a:latin typeface="Segoe UI Light" panose="020B0502040204020203" pitchFamily="34" charset="0"/>
+                <a:cs typeface="Segoe UI Light" panose="020B0502040204020203" pitchFamily="34" charset="0"/>
+              </a:rPr>
+              <a:t>passion</a:t>
+            </a:r>
+            <a:endParaRPr lang="en-CA" sz="2800" dirty="0">
+              <a:solidFill>
+                <a:srgbClr val="00B050"/>
+              </a:solidFill>
+              <a:latin typeface="Segoe UI Light" panose="020B0502040204020203" pitchFamily="34" charset="0"/>
+              <a:cs typeface="Segoe UI Light" panose="020B0502040204020203" pitchFamily="34" charset="0"/>
+            </a:endParaRPr>
+          </a:p>
+        </p:txBody>
+      </p:sp>
+      <p:cxnSp>
+        <p:nvCxnSpPr>
+          <p:cNvPr id="24" name="Straight Connector 23">
+            <a:extLst>
+              <a:ext uri="{FF2B5EF4-FFF2-40B4-BE49-F238E27FC236}">
+                <a16:creationId xmlns:a16="http://schemas.microsoft.com/office/drawing/2014/main" id="{48BDA403-A455-45CB-8490-2D3D1589E62A}"/>
+              </a:ext>
+            </a:extLst>
+          </p:cNvPr>
+          <p:cNvCxnSpPr>
+            <a:cxnSpLocks/>
+          </p:cNvCxnSpPr>
+          <p:nvPr/>
+        </p:nvCxnSpPr>
+        <p:spPr>
+          <a:xfrm>
+            <a:off x="1732199" y="5698878"/>
+            <a:ext cx="2188637" cy="0"/>
+          </a:xfrm>
+          <a:prstGeom prst="line">
+            <a:avLst/>
+          </a:prstGeom>
+        </p:spPr>
+        <p:style>
+          <a:lnRef idx="1">
+            <a:schemeClr val="accent1"/>
+          </a:lnRef>
+          <a:fillRef idx="0">
+            <a:schemeClr val="accent1"/>
+          </a:fillRef>
+          <a:effectRef idx="0">
+            <a:schemeClr val="accent1"/>
+          </a:effectRef>
+          <a:fontRef idx="minor">
+            <a:schemeClr val="tx1"/>
+          </a:fontRef>
+        </p:style>
+      </p:cxnSp>
+      <p:cxnSp>
+        <p:nvCxnSpPr>
+          <p:cNvPr id="26" name="Straight Connector 25">
+            <a:extLst>
+              <a:ext uri="{FF2B5EF4-FFF2-40B4-BE49-F238E27FC236}">
+                <a16:creationId xmlns:a16="http://schemas.microsoft.com/office/drawing/2014/main" id="{631D13AB-90AD-4836-B8D0-D6A2301845CB}"/>
+              </a:ext>
+            </a:extLst>
+          </p:cNvPr>
+          <p:cNvCxnSpPr>
+            <a:cxnSpLocks/>
+          </p:cNvCxnSpPr>
+          <p:nvPr/>
+        </p:nvCxnSpPr>
+        <p:spPr>
+          <a:xfrm>
+            <a:off x="4516963" y="5698878"/>
+            <a:ext cx="823964" cy="0"/>
+          </a:xfrm>
+          <a:prstGeom prst="line">
+            <a:avLst/>
+          </a:prstGeom>
+          <a:ln>
+            <a:solidFill>
+              <a:srgbClr val="C00000"/>
+            </a:solidFill>
+            <a:prstDash val="dash"/>
+          </a:ln>
+        </p:spPr>
+        <p:style>
+          <a:lnRef idx="1">
+            <a:schemeClr val="accent1"/>
+          </a:lnRef>
+          <a:fillRef idx="0">
+            <a:schemeClr val="accent1"/>
+          </a:fillRef>
+          <a:effectRef idx="0">
+            <a:schemeClr val="accent1"/>
+          </a:effectRef>
+          <a:fontRef idx="minor">
+            <a:schemeClr val="tx1"/>
+          </a:fontRef>
+        </p:style>
+      </p:cxnSp>
+      <p:cxnSp>
+        <p:nvCxnSpPr>
+          <p:cNvPr id="28" name="Straight Connector 27">
+            <a:extLst>
+              <a:ext uri="{FF2B5EF4-FFF2-40B4-BE49-F238E27FC236}">
+                <a16:creationId xmlns:a16="http://schemas.microsoft.com/office/drawing/2014/main" id="{33C8B239-EE74-4901-AE8D-4AC9ECD34B14}"/>
+              </a:ext>
+            </a:extLst>
+          </p:cNvPr>
+          <p:cNvCxnSpPr>
+            <a:cxnSpLocks/>
+          </p:cNvCxnSpPr>
+          <p:nvPr/>
+        </p:nvCxnSpPr>
+        <p:spPr>
+          <a:xfrm>
+            <a:off x="6054817" y="5698878"/>
+            <a:ext cx="1107983" cy="0"/>
+          </a:xfrm>
+          <a:prstGeom prst="line">
+            <a:avLst/>
+          </a:prstGeom>
+          <a:ln cmpd="dbl">
+            <a:solidFill>
+              <a:srgbClr val="00B050"/>
+            </a:solidFill>
+            <a:prstDash val="lgDashDotDot"/>
+          </a:ln>
+        </p:spPr>
+        <p:style>
+          <a:lnRef idx="1">
+            <a:schemeClr val="accent1"/>
+          </a:lnRef>
+          <a:fillRef idx="0">
+            <a:schemeClr val="accent1"/>
+          </a:fillRef>
+          <a:effectRef idx="0">
+            <a:schemeClr val="accent1"/>
+          </a:effectRef>
+          <a:fontRef idx="minor">
+            <a:schemeClr val="tx1"/>
+          </a:fontRef>
+        </p:style>
+      </p:cxnSp>
+      <mc:AlternateContent xmlns:mc="http://schemas.openxmlformats.org/markup-compatibility/2006" xmlns:p14="http://schemas.microsoft.com/office/powerpoint/2010/main">
+        <mc:Choice Requires="p14">
+          <p:contentPart p14:bwMode="auto" r:id="rId2">
+            <p14:nvContentPartPr>
+              <p14:cNvPr id="31" name="Ink 30">
+                <a:extLst>
+                  <a:ext uri="{FF2B5EF4-FFF2-40B4-BE49-F238E27FC236}">
+                    <a16:creationId xmlns:a16="http://schemas.microsoft.com/office/drawing/2014/main" id="{ADAAC442-9FBC-4CEA-93B4-E7854CEF88BC}"/>
+                  </a:ext>
+                </a:extLst>
+              </p14:cNvPr>
+              <p14:cNvContentPartPr/>
+              <p14:nvPr/>
+            </p14:nvContentPartPr>
+            <p14:xfrm>
+              <a:off x="1505411" y="4831675"/>
+              <a:ext cx="30060" cy="32220"/>
+            </p14:xfrm>
+          </p:contentPart>
+        </mc:Choice>
+        <mc:Fallback xmlns="">
+          <p:pic>
+            <p:nvPicPr>
+              <p:cNvPr id="31" name="Ink 30">
+                <a:extLst>
+                  <a:ext uri="{FF2B5EF4-FFF2-40B4-BE49-F238E27FC236}">
+                    <a16:creationId xmlns:a16="http://schemas.microsoft.com/office/drawing/2014/main" id="{ADAAC442-9FBC-4CEA-93B4-E7854CEF88BC}"/>
+                  </a:ext>
+                </a:extLst>
+              </p:cNvPr>
+              <p:cNvPicPr/>
+              <p:nvPr/>
+            </p:nvPicPr>
+            <p:blipFill>
+              <a:blip r:embed="rId3"/>
+              <a:stretch>
+                <a:fillRect/>
+              </a:stretch>
+            </p:blipFill>
+            <p:spPr>
+              <a:xfrm>
+                <a:off x="1501117" y="4827379"/>
+                <a:ext cx="38649" cy="40812"/>
+              </a:xfrm>
+              <a:prstGeom prst="rect">
+                <a:avLst/>
+              </a:prstGeom>
+            </p:spPr>
+          </p:pic>
+        </mc:Fallback>
+      </mc:AlternateContent>
+      <mc:AlternateContent xmlns:mc="http://schemas.openxmlformats.org/markup-compatibility/2006" xmlns:p14="http://schemas.microsoft.com/office/powerpoint/2010/main">
+        <mc:Choice Requires="p14">
+          <p:contentPart p14:bwMode="auto" r:id="rId4">
+            <p14:nvContentPartPr>
+              <p14:cNvPr id="52" name="Ink 51">
+                <a:extLst>
+                  <a:ext uri="{FF2B5EF4-FFF2-40B4-BE49-F238E27FC236}">
+                    <a16:creationId xmlns:a16="http://schemas.microsoft.com/office/drawing/2014/main" id="{0B47966B-C0A8-4F45-8CB7-4240E6D04B08}"/>
+                  </a:ext>
+                </a:extLst>
+              </p14:cNvPr>
+              <p14:cNvContentPartPr/>
+              <p14:nvPr/>
+            </p14:nvContentPartPr>
+            <p14:xfrm>
+              <a:off x="1440611" y="4931395"/>
+              <a:ext cx="4500" cy="3780"/>
+            </p14:xfrm>
+          </p:contentPart>
+        </mc:Choice>
+        <mc:Fallback xmlns="">
+          <p:pic>
+            <p:nvPicPr>
+              <p:cNvPr id="52" name="Ink 51">
+                <a:extLst>
+                  <a:ext uri="{FF2B5EF4-FFF2-40B4-BE49-F238E27FC236}">
+                    <a16:creationId xmlns:a16="http://schemas.microsoft.com/office/drawing/2014/main" id="{0B47966B-C0A8-4F45-8CB7-4240E6D04B08}"/>
+                  </a:ext>
+                </a:extLst>
+              </p:cNvPr>
+              <p:cNvPicPr/>
+              <p:nvPr/>
+            </p:nvPicPr>
+            <p:blipFill>
+              <a:blip r:embed="rId5"/>
+              <a:stretch>
+                <a:fillRect/>
+              </a:stretch>
+            </p:blipFill>
+            <p:spPr>
+              <a:xfrm>
+                <a:off x="1438534" y="4929333"/>
+                <a:ext cx="8654" cy="7904"/>
+              </a:xfrm>
+              <a:prstGeom prst="rect">
+                <a:avLst/>
+              </a:prstGeom>
+            </p:spPr>
+          </p:pic>
+        </mc:Fallback>
+      </mc:AlternateContent>
+    </p:spTree>
+    <p:extLst>
+      <p:ext uri="{BB962C8B-B14F-4D97-AF65-F5344CB8AC3E}">
+        <p14:creationId xmlns:p14="http://schemas.microsoft.com/office/powerpoint/2010/main" val="490561077"/>
+      </p:ext>
+    </p:extLst>
+  </p:cSld>
+  <p:clrMapOvr>
+    <a:masterClrMapping/>
+  </p:clrMapOvr>
+</p:sld>
+</file>
+
+<file path=ppt/slides/slide4.xml><?xml version="1.0" encoding="utf-8"?>
+<p:sld xmlns:a="http://schemas.openxmlformats.org/drawingml/2006/main" xmlns:r="http://schemas.openxmlformats.org/officeDocument/2006/relationships" xmlns:p="http://schemas.openxmlformats.org/presentationml/2006/main">
+  <p:cSld>
+    <p:spTree>
+      <p:nvGrpSpPr>
+        <p:cNvPr id="1" name=""/>
+        <p:cNvGrpSpPr/>
+        <p:nvPr/>
+      </p:nvGrpSpPr>
+      <p:grpSpPr>
+        <a:xfrm>
+          <a:off x="0" y="0"/>
+          <a:ext cx="0" cy="0"/>
+          <a:chOff x="0" y="0"/>
+          <a:chExt cx="0" cy="0"/>
+        </a:xfrm>
+      </p:grpSpPr>
+      <p:pic>
+        <p:nvPicPr>
+          <p:cNvPr id="18" name="Graphic 17" descr="Solar system">
+            <a:extLst>
+              <a:ext uri="{FF2B5EF4-FFF2-40B4-BE49-F238E27FC236}">
+                <a16:creationId xmlns:a16="http://schemas.microsoft.com/office/drawing/2014/main" id="{C9145FF3-6D6A-4D78-8E07-149569340FD5}"/>
+              </a:ext>
+            </a:extLst>
+          </p:cNvPr>
+          <p:cNvPicPr>
+            <a:picLocks noChangeAspect="1"/>
+          </p:cNvPicPr>
+          <p:nvPr/>
+        </p:nvPicPr>
+        <p:blipFill>
+          <a:blip r:embed="rId2">
+            <a:extLst>
+              <a:ext uri="{28A0092B-C50C-407E-A947-70E740481C1C}">
+                <a14:useLocalDpi xmlns:a14="http://schemas.microsoft.com/office/drawing/2010/main" val="0"/>
+              </a:ext>
+              <a:ext uri="{96DAC541-7B7A-43D3-8B79-37D633B846F1}">
+                <asvg:svgBlip xmlns:asvg="http://schemas.microsoft.com/office/drawing/2016/SVG/main" r:embed="rId3"/>
+              </a:ext>
+            </a:extLst>
+          </a:blip>
+          <a:stretch>
+            <a:fillRect/>
+          </a:stretch>
+        </p:blipFill>
+        <p:spPr>
+          <a:xfrm>
+            <a:off x="1720639" y="3237160"/>
+            <a:ext cx="1610161" cy="1610161"/>
+          </a:xfrm>
+          <a:prstGeom prst="rect">
+            <a:avLst/>
+          </a:prstGeom>
+        </p:spPr>
+      </p:pic>
+      <p:sp>
+        <p:nvSpPr>
+          <p:cNvPr id="2" name="Title 1">
+            <a:extLst>
+              <a:ext uri="{FF2B5EF4-FFF2-40B4-BE49-F238E27FC236}">
+                <a16:creationId xmlns:a16="http://schemas.microsoft.com/office/drawing/2014/main" id="{8441AE34-CFD4-4F9B-A8E6-96B2575548EE}"/>
+              </a:ext>
+            </a:extLst>
+          </p:cNvPr>
+          <p:cNvSpPr>
+            <a:spLocks noGrp="1"/>
+          </p:cNvSpPr>
+          <p:nvPr>
+            <p:ph type="title"/>
+          </p:nvPr>
+        </p:nvSpPr>
+        <p:spPr/>
+        <p:txBody>
+          <a:bodyPr/>
+          <a:lstStyle/>
+          <a:p>
+            <a:r>
+              <a:rPr lang="en-US"/>
+              <a:t>P</a:t>
+            </a:r>
+            <a:endParaRPr lang="en-CA"/>
+          </a:p>
+        </p:txBody>
+      </p:sp>
+      <p:pic>
+        <p:nvPicPr>
+          <p:cNvPr id="4" name="Graphic 3" descr="Crawl">
+            <a:extLst>
+              <a:ext uri="{FF2B5EF4-FFF2-40B4-BE49-F238E27FC236}">
+                <a16:creationId xmlns:a16="http://schemas.microsoft.com/office/drawing/2014/main" id="{00EFF889-ED4C-4FB5-ADB9-75CE7E14504C}"/>
+              </a:ext>
+            </a:extLst>
+          </p:cNvPr>
+          <p:cNvPicPr>
+            <a:picLocks noChangeAspect="1"/>
+          </p:cNvPicPr>
+          <p:nvPr/>
+        </p:nvPicPr>
+        <p:blipFill>
+          <a:blip r:embed="rId4">
+            <a:extLst>
+              <a:ext uri="{28A0092B-C50C-407E-A947-70E740481C1C}">
+                <a14:useLocalDpi xmlns:a14="http://schemas.microsoft.com/office/drawing/2010/main" val="0"/>
+              </a:ext>
+              <a:ext uri="{96DAC541-7B7A-43D3-8B79-37D633B846F1}">
+                <asvg:svgBlip xmlns:asvg="http://schemas.microsoft.com/office/drawing/2016/SVG/main" r:embed="rId5"/>
+              </a:ext>
+            </a:extLst>
+          </a:blip>
+          <a:stretch>
+            <a:fillRect/>
+          </a:stretch>
+        </p:blipFill>
+        <p:spPr>
+          <a:xfrm>
+            <a:off x="7736840" y="746232"/>
+            <a:ext cx="1219200" cy="1219200"/>
+          </a:xfrm>
+          <a:prstGeom prst="rect">
+            <a:avLst/>
+          </a:prstGeom>
+        </p:spPr>
+      </p:pic>
+      <p:pic>
+        <p:nvPicPr>
+          <p:cNvPr id="6" name="Graphic 5" descr="Turtle">
+            <a:extLst>
+              <a:ext uri="{FF2B5EF4-FFF2-40B4-BE49-F238E27FC236}">
+                <a16:creationId xmlns:a16="http://schemas.microsoft.com/office/drawing/2014/main" id="{F0F80CE1-3903-498C-B101-B463F26D5A52}"/>
+              </a:ext>
+            </a:extLst>
+          </p:cNvPr>
+          <p:cNvPicPr>
+            <a:picLocks noChangeAspect="1"/>
+          </p:cNvPicPr>
+          <p:nvPr/>
+        </p:nvPicPr>
+        <p:blipFill>
+          <a:blip r:embed="rId6">
+            <a:extLst>
+              <a:ext uri="{28A0092B-C50C-407E-A947-70E740481C1C}">
+                <a14:useLocalDpi xmlns:a14="http://schemas.microsoft.com/office/drawing/2010/main" val="0"/>
+              </a:ext>
+              <a:ext uri="{96DAC541-7B7A-43D3-8B79-37D633B846F1}">
+                <asvg:svgBlip xmlns:asvg="http://schemas.microsoft.com/office/drawing/2016/SVG/main" r:embed="rId7"/>
+              </a:ext>
+            </a:extLst>
+          </a:blip>
+          <a:stretch>
+            <a:fillRect/>
+          </a:stretch>
+        </p:blipFill>
+        <p:spPr>
+          <a:xfrm>
+            <a:off x="8247800" y="3331420"/>
+            <a:ext cx="1363560" cy="1363560"/>
+          </a:xfrm>
+          <a:prstGeom prst="rect">
+            <a:avLst/>
+          </a:prstGeom>
+        </p:spPr>
+      </p:pic>
+      <p:pic>
+        <p:nvPicPr>
+          <p:cNvPr id="8" name="Graphic 7" descr="Table and chairs">
+            <a:extLst>
+              <a:ext uri="{FF2B5EF4-FFF2-40B4-BE49-F238E27FC236}">
+                <a16:creationId xmlns:a16="http://schemas.microsoft.com/office/drawing/2014/main" id="{A1F7908C-4745-45F6-81A9-86436970D2C7}"/>
+              </a:ext>
+            </a:extLst>
+          </p:cNvPr>
+          <p:cNvPicPr>
+            <a:picLocks noChangeAspect="1"/>
+          </p:cNvPicPr>
+          <p:nvPr/>
+        </p:nvPicPr>
+        <p:blipFill>
+          <a:blip r:embed="rId8">
+            <a:extLst>
+              <a:ext uri="{28A0092B-C50C-407E-A947-70E740481C1C}">
+                <a14:useLocalDpi xmlns:a14="http://schemas.microsoft.com/office/drawing/2010/main" val="0"/>
+              </a:ext>
+              <a:ext uri="{96DAC541-7B7A-43D3-8B79-37D633B846F1}">
+                <asvg:svgBlip xmlns:asvg="http://schemas.microsoft.com/office/drawing/2016/SVG/main" r:embed="rId9"/>
+              </a:ext>
+            </a:extLst>
+          </a:blip>
+          <a:stretch>
+            <a:fillRect/>
+          </a:stretch>
+        </p:blipFill>
+        <p:spPr>
+          <a:xfrm>
+            <a:off x="4627880" y="1327920"/>
+            <a:ext cx="1293640" cy="1293640"/>
+          </a:xfrm>
+          <a:prstGeom prst="rect">
+            <a:avLst/>
+          </a:prstGeom>
+        </p:spPr>
+      </p:pic>
+      <p:pic>
+        <p:nvPicPr>
+          <p:cNvPr id="21" name="Graphic 20" descr="User">
+            <a:extLst>
+              <a:ext uri="{FF2B5EF4-FFF2-40B4-BE49-F238E27FC236}">
+                <a16:creationId xmlns:a16="http://schemas.microsoft.com/office/drawing/2014/main" id="{62CBCCD1-1853-4579-914A-4D773994A701}"/>
+              </a:ext>
+            </a:extLst>
+          </p:cNvPr>
+          <p:cNvPicPr>
+            <a:picLocks noChangeAspect="1"/>
+          </p:cNvPicPr>
+          <p:nvPr/>
+        </p:nvPicPr>
+        <p:blipFill>
+          <a:blip r:embed="rId10">
+            <a:extLst>
+              <a:ext uri="{28A0092B-C50C-407E-A947-70E740481C1C}">
+                <a14:useLocalDpi xmlns:a14="http://schemas.microsoft.com/office/drawing/2010/main" val="0"/>
+              </a:ext>
+              <a:ext uri="{96DAC541-7B7A-43D3-8B79-37D633B846F1}">
+                <asvg:svgBlip xmlns:asvg="http://schemas.microsoft.com/office/drawing/2016/SVG/main" r:embed="rId11"/>
+              </a:ext>
+            </a:extLst>
+          </a:blip>
+          <a:stretch>
+            <a:fillRect/>
+          </a:stretch>
+        </p:blipFill>
+        <p:spPr>
+          <a:xfrm>
+            <a:off x="5464320" y="3237160"/>
+            <a:ext cx="500800" cy="500800"/>
+          </a:xfrm>
+          <a:prstGeom prst="rect">
+            <a:avLst/>
+          </a:prstGeom>
+        </p:spPr>
+      </p:pic>
+      <p:sp>
+        <p:nvSpPr>
+          <p:cNvPr id="23" name="Flowchart: Connector 22">
+            <a:extLst>
+              <a:ext uri="{FF2B5EF4-FFF2-40B4-BE49-F238E27FC236}">
+                <a16:creationId xmlns:a16="http://schemas.microsoft.com/office/drawing/2014/main" id="{555F42B9-3F6A-4020-9FCB-E724ED1CCC1A}"/>
+              </a:ext>
+            </a:extLst>
+          </p:cNvPr>
+          <p:cNvSpPr/>
+          <p:nvPr/>
+        </p:nvSpPr>
+        <p:spPr>
+          <a:xfrm>
+            <a:off x="5582080" y="3886200"/>
+            <a:ext cx="265280" cy="254000"/>
+          </a:xfrm>
+          <a:prstGeom prst="flowChartConnector">
+            <a:avLst/>
+          </a:prstGeom>
+          <a:solidFill>
+            <a:schemeClr val="tx1"/>
+          </a:solidFill>
+          <a:ln>
+            <a:solidFill>
+              <a:schemeClr val="tx1"/>
+            </a:solidFill>
+          </a:ln>
+        </p:spPr>
+        <p:style>
+          <a:lnRef idx="2">
+            <a:schemeClr val="accent1">
+              <a:shade val="50000"/>
+            </a:schemeClr>
+          </a:lnRef>
+          <a:fillRef idx="1">
+            <a:schemeClr val="accent1"/>
+          </a:fillRef>
+          <a:effectRef idx="0">
+            <a:schemeClr val="accent1"/>
+          </a:effectRef>
+          <a:fontRef idx="minor">
+            <a:schemeClr val="lt1"/>
+          </a:fontRef>
+        </p:style>
+        <p:txBody>
+          <a:bodyPr rtlCol="0" anchor="ctr"/>
+          <a:lstStyle/>
+          <a:p>
+            <a:pPr algn="ctr"/>
+            <a:endParaRPr lang="en-CA"/>
+          </a:p>
+        </p:txBody>
+      </p:sp>
+      <p:cxnSp>
+        <p:nvCxnSpPr>
+          <p:cNvPr id="29" name="Straight Connector 28">
+            <a:extLst>
+              <a:ext uri="{FF2B5EF4-FFF2-40B4-BE49-F238E27FC236}">
+                <a16:creationId xmlns:a16="http://schemas.microsoft.com/office/drawing/2014/main" id="{291873ED-D8D0-4478-8DA1-6CC784044C37}"/>
+              </a:ext>
+            </a:extLst>
+          </p:cNvPr>
+          <p:cNvCxnSpPr>
+            <a:cxnSpLocks/>
+          </p:cNvCxnSpPr>
+          <p:nvPr/>
+        </p:nvCxnSpPr>
+        <p:spPr>
+          <a:xfrm>
+            <a:off x="5154080" y="4013200"/>
+            <a:ext cx="1149000" cy="0"/>
+          </a:xfrm>
+          <a:prstGeom prst="line">
+            <a:avLst/>
+          </a:prstGeom>
+          <a:ln w="57150">
+            <a:solidFill>
+              <a:schemeClr val="tx1"/>
+            </a:solidFill>
+          </a:ln>
+        </p:spPr>
+        <p:style>
+          <a:lnRef idx="1">
+            <a:schemeClr val="accent1"/>
+          </a:lnRef>
+          <a:fillRef idx="0">
+            <a:schemeClr val="accent1"/>
+          </a:fillRef>
+          <a:effectRef idx="0">
+            <a:schemeClr val="accent1"/>
+          </a:effectRef>
+          <a:fontRef idx="minor">
+            <a:schemeClr val="tx1"/>
+          </a:fontRef>
+        </p:style>
+      </p:cxnSp>
+      <p:cxnSp>
+        <p:nvCxnSpPr>
+          <p:cNvPr id="33" name="Straight Connector 32">
+            <a:extLst>
+              <a:ext uri="{FF2B5EF4-FFF2-40B4-BE49-F238E27FC236}">
+                <a16:creationId xmlns:a16="http://schemas.microsoft.com/office/drawing/2014/main" id="{7D23D338-2A15-40F0-AD46-CC9F20C391BE}"/>
+              </a:ext>
+            </a:extLst>
+          </p:cNvPr>
+          <p:cNvCxnSpPr>
+            <a:cxnSpLocks/>
+          </p:cNvCxnSpPr>
+          <p:nvPr/>
+        </p:nvCxnSpPr>
+        <p:spPr>
+          <a:xfrm>
+            <a:off x="5714720" y="3512319"/>
+            <a:ext cx="0" cy="1001762"/>
+          </a:xfrm>
+          <a:prstGeom prst="line">
+            <a:avLst/>
+          </a:prstGeom>
+          <a:ln w="57150">
+            <a:solidFill>
+              <a:schemeClr val="tx1"/>
+            </a:solidFill>
+          </a:ln>
+        </p:spPr>
+        <p:style>
+          <a:lnRef idx="1">
+            <a:schemeClr val="accent1"/>
+          </a:lnRef>
+          <a:fillRef idx="0">
+            <a:schemeClr val="accent1"/>
+          </a:fillRef>
+          <a:effectRef idx="0">
+            <a:schemeClr val="accent1"/>
+          </a:effectRef>
+          <a:fontRef idx="minor">
+            <a:schemeClr val="tx1"/>
+          </a:fontRef>
+        </p:style>
+      </p:cxnSp>
+      <p:pic>
+        <p:nvPicPr>
+          <p:cNvPr id="36" name="Graphic 35" descr="User">
+            <a:extLst>
+              <a:ext uri="{FF2B5EF4-FFF2-40B4-BE49-F238E27FC236}">
+                <a16:creationId xmlns:a16="http://schemas.microsoft.com/office/drawing/2014/main" id="{36ADFBB5-8B22-4801-AE92-73DAAE62FE3B}"/>
+              </a:ext>
+            </a:extLst>
+          </p:cNvPr>
+          <p:cNvPicPr>
+            <a:picLocks noChangeAspect="1"/>
+          </p:cNvPicPr>
+          <p:nvPr/>
+        </p:nvPicPr>
+        <p:blipFill>
+          <a:blip r:embed="rId10">
+            <a:extLst>
+              <a:ext uri="{28A0092B-C50C-407E-A947-70E740481C1C}">
+                <a14:useLocalDpi xmlns:a14="http://schemas.microsoft.com/office/drawing/2010/main" val="0"/>
+              </a:ext>
+              <a:ext uri="{96DAC541-7B7A-43D3-8B79-37D633B846F1}">
+                <asvg:svgBlip xmlns:asvg="http://schemas.microsoft.com/office/drawing/2016/SVG/main" r:embed="rId11"/>
+              </a:ext>
+            </a:extLst>
+          </a:blip>
+          <a:stretch>
+            <a:fillRect/>
+          </a:stretch>
+        </p:blipFill>
+        <p:spPr>
+          <a:xfrm>
+            <a:off x="5464320" y="4288440"/>
+            <a:ext cx="500800" cy="500800"/>
+          </a:xfrm>
+          <a:prstGeom prst="rect">
+            <a:avLst/>
+          </a:prstGeom>
+        </p:spPr>
+      </p:pic>
+      <p:pic>
+        <p:nvPicPr>
+          <p:cNvPr id="37" name="Graphic 36" descr="User">
+            <a:extLst>
+              <a:ext uri="{FF2B5EF4-FFF2-40B4-BE49-F238E27FC236}">
+                <a16:creationId xmlns:a16="http://schemas.microsoft.com/office/drawing/2014/main" id="{3DB5CF8C-A99A-4617-A7AF-2D5579E81672}"/>
+              </a:ext>
+            </a:extLst>
+          </p:cNvPr>
+          <p:cNvPicPr>
+            <a:picLocks noChangeAspect="1"/>
+          </p:cNvPicPr>
+          <p:nvPr/>
+        </p:nvPicPr>
+        <p:blipFill>
+          <a:blip r:embed="rId10">
+            <a:extLst>
+              <a:ext uri="{28A0092B-C50C-407E-A947-70E740481C1C}">
+                <a14:useLocalDpi xmlns:a14="http://schemas.microsoft.com/office/drawing/2010/main" val="0"/>
+              </a:ext>
+              <a:ext uri="{96DAC541-7B7A-43D3-8B79-37D633B846F1}">
+                <asvg:svgBlip xmlns:asvg="http://schemas.microsoft.com/office/drawing/2016/SVG/main" r:embed="rId11"/>
+              </a:ext>
+            </a:extLst>
+          </a:blip>
+          <a:stretch>
+            <a:fillRect/>
+          </a:stretch>
+        </p:blipFill>
+        <p:spPr>
+          <a:xfrm>
+            <a:off x="6015639" y="3702400"/>
+            <a:ext cx="500800" cy="500800"/>
+          </a:xfrm>
+          <a:prstGeom prst="rect">
+            <a:avLst/>
+          </a:prstGeom>
+        </p:spPr>
+      </p:pic>
+      <p:pic>
+        <p:nvPicPr>
+          <p:cNvPr id="38" name="Graphic 37" descr="User">
+            <a:extLst>
+              <a:ext uri="{FF2B5EF4-FFF2-40B4-BE49-F238E27FC236}">
+                <a16:creationId xmlns:a16="http://schemas.microsoft.com/office/drawing/2014/main" id="{16F3A087-0B5F-4BB4-85DC-E24AE20E6D67}"/>
+              </a:ext>
+            </a:extLst>
+          </p:cNvPr>
+          <p:cNvPicPr>
+            <a:picLocks noChangeAspect="1"/>
+          </p:cNvPicPr>
+          <p:nvPr/>
+        </p:nvPicPr>
+        <p:blipFill>
+          <a:blip r:embed="rId10">
+            <a:extLst>
+              <a:ext uri="{28A0092B-C50C-407E-A947-70E740481C1C}">
+                <a14:useLocalDpi xmlns:a14="http://schemas.microsoft.com/office/drawing/2010/main" val="0"/>
+              </a:ext>
+              <a:ext uri="{96DAC541-7B7A-43D3-8B79-37D633B846F1}">
+                <asvg:svgBlip xmlns:asvg="http://schemas.microsoft.com/office/drawing/2016/SVG/main" r:embed="rId11"/>
+              </a:ext>
+            </a:extLst>
+          </a:blip>
+          <a:stretch>
+            <a:fillRect/>
+          </a:stretch>
+        </p:blipFill>
+        <p:spPr>
+          <a:xfrm>
+            <a:off x="4930641" y="3692240"/>
+            <a:ext cx="500800" cy="500800"/>
+          </a:xfrm>
+          <a:prstGeom prst="rect">
+            <a:avLst/>
+          </a:prstGeom>
+        </p:spPr>
+      </p:pic>
+      <p:pic>
+        <p:nvPicPr>
+          <p:cNvPr id="16" name="Graphic 15" descr="Stopwatch">
+            <a:extLst>
+              <a:ext uri="{FF2B5EF4-FFF2-40B4-BE49-F238E27FC236}">
+                <a16:creationId xmlns:a16="http://schemas.microsoft.com/office/drawing/2014/main" id="{C316E35B-BBF7-4633-B0DE-D2D1A599A818}"/>
+              </a:ext>
+            </a:extLst>
+          </p:cNvPr>
+          <p:cNvPicPr>
+            <a:picLocks noChangeAspect="1"/>
+          </p:cNvPicPr>
+          <p:nvPr/>
+        </p:nvPicPr>
+        <p:blipFill>
+          <a:blip r:embed="rId12">
+            <a:extLst>
+              <a:ext uri="{28A0092B-C50C-407E-A947-70E740481C1C}">
+                <a14:useLocalDpi xmlns:a14="http://schemas.microsoft.com/office/drawing/2010/main" val="0"/>
+              </a:ext>
+              <a:ext uri="{96DAC541-7B7A-43D3-8B79-37D633B846F1}">
+                <asvg:svgBlip xmlns:asvg="http://schemas.microsoft.com/office/drawing/2016/SVG/main" r:embed="rId13"/>
+              </a:ext>
+            </a:extLst>
+          </a:blip>
+          <a:stretch>
+            <a:fillRect/>
+          </a:stretch>
+        </p:blipFill>
+        <p:spPr>
+          <a:xfrm>
+            <a:off x="2924359" y="2127180"/>
+            <a:ext cx="666820" cy="666820"/>
+          </a:xfrm>
+          <a:prstGeom prst="rect">
+            <a:avLst/>
+          </a:prstGeom>
+        </p:spPr>
+      </p:pic>
+    </p:spTree>
+    <p:extLst>
+      <p:ext uri="{BB962C8B-B14F-4D97-AF65-F5344CB8AC3E}">
+        <p14:creationId xmlns:p14="http://schemas.microsoft.com/office/powerpoint/2010/main" val="3282302956"/>
+      </p:ext>
+    </p:extLst>
+  </p:cSld>
+  <p:clrMapOvr>
+    <a:masterClrMapping/>
+  </p:clrMapOvr>
+</p:sld>
+</file>
+
 <file path=ppt/theme/theme1.xml><?xml version="1.0" encoding="utf-8"?>
 <a:theme xmlns:a="http://schemas.openxmlformats.org/drawingml/2006/main" name="Office Theme">
   <a:themeElements>

</xml_diff>

<commit_message>
Update the patterns, associated images, and commit for safety.
</commit_message>
<xml_diff>
--- a/src/Stories/Story illustrations.pptx
+++ b/src/Stories/Story illustrations.pptx
@@ -7,6 +7,8 @@
   <p:sldIdLst>
     <p:sldId id="256" r:id="rId2"/>
     <p:sldId id="257" r:id="rId3"/>
+    <p:sldId id="259" r:id="rId4"/>
+    <p:sldId id="260" r:id="rId5"/>
   </p:sldIdLst>
   <p:sldSz cx="12192000" cy="6858000"/>
   <p:notesSz cx="6858000" cy="9144000"/>
@@ -117,6 +119,60 @@
 <p1510:revInfo xmlns:a="http://schemas.openxmlformats.org/drawingml/2006/main" xmlns:r="http://schemas.openxmlformats.org/officeDocument/2006/relationships" xmlns:p1510="http://schemas.microsoft.com/office/powerpoint/2015/10/main"/>
 </file>
 
+<file path=ppt/ink/ink1.xml><?xml version="1.0" encoding="utf-8"?>
+<inkml:ink xmlns:inkml="http://www.w3.org/2003/InkML">
+  <inkml:definitions>
+    <inkml:context xml:id="ctx0">
+      <inkml:inkSource xml:id="inkSrc0">
+        <inkml:traceFormat>
+          <inkml:channel name="X" type="integer" min="-2.14748E9" max="2.14748E9" units="cm"/>
+          <inkml:channel name="Y" type="integer" min="-2.14748E9" max="2.14748E9" units="cm"/>
+          <inkml:channel name="F" type="integer" max="32767" units="dev"/>
+        </inkml:traceFormat>
+        <inkml:channelProperties>
+          <inkml:channelProperty channel="X" name="resolution" value="1000" units="1/cm"/>
+          <inkml:channelProperty channel="Y" name="resolution" value="1000" units="1/cm"/>
+          <inkml:channelProperty channel="F" name="resolution" value="0" units="1/dev"/>
+        </inkml:channelProperties>
+      </inkml:inkSource>
+      <inkml:timestamp xml:id="ts0" timeString="2017-03-17T18:31:02.525"/>
+    </inkml:context>
+    <inkml:brush xml:id="br0">
+      <inkml:brushProperty name="width" value="0.025" units="cm"/>
+      <inkml:brushProperty name="height" value="0.025" units="cm"/>
+    </inkml:brush>
+  </inkml:definitions>
+  <inkml:trace contextRef="#ctx0" brushRef="#br0">4682 19399 1408,'13'-4'512,"-19"-2"-256,6-4-96,0 10 256,0-6-96,6 2 0,12-8-64,-6 8 0,0-8-64,0 1 32,-2 1 0,-4 0 32</inkml:trace>
+</inkml:ink>
+</file>
+
+<file path=ppt/ink/ink2.xml><?xml version="1.0" encoding="utf-8"?>
+<inkml:ink xmlns:inkml="http://www.w3.org/2003/InkML">
+  <inkml:definitions>
+    <inkml:context xml:id="ctx0">
+      <inkml:inkSource xml:id="inkSrc0">
+        <inkml:traceFormat>
+          <inkml:channel name="X" type="integer" min="-2.14748E9" max="2.14748E9" units="cm"/>
+          <inkml:channel name="Y" type="integer" min="-2.14748E9" max="2.14748E9" units="cm"/>
+          <inkml:channel name="F" type="integer" max="32767" units="dev"/>
+        </inkml:traceFormat>
+        <inkml:channelProperties>
+          <inkml:channelProperty channel="X" name="resolution" value="1000" units="1/cm"/>
+          <inkml:channelProperty channel="Y" name="resolution" value="1000" units="1/cm"/>
+          <inkml:channelProperty channel="F" name="resolution" value="0" units="1/dev"/>
+        </inkml:channelProperties>
+      </inkml:inkSource>
+      <inkml:timestamp xml:id="ts0" timeString="2017-03-17T18:31:13.532"/>
+    </inkml:context>
+    <inkml:brush xml:id="br0">
+      <inkml:brushProperty name="width" value="0.025" units="cm"/>
+      <inkml:brushProperty name="height" value="0.025" units="cm"/>
+    </inkml:brush>
+  </inkml:definitions>
+  <inkml:trace contextRef="#ctx0" brushRef="#br0">4502 19608 2176,'12'0'864,"-12"-21"-448,13 34-288,-13-13 256</inkml:trace>
+</inkml:ink>
+</file>
+
 <file path=ppt/slideLayouts/slideLayout1.xml><?xml version="1.0" encoding="utf-8"?>
 <p:sldLayout xmlns:a="http://schemas.openxmlformats.org/drawingml/2006/main" xmlns:r="http://schemas.openxmlformats.org/officeDocument/2006/relationships" xmlns:p="http://schemas.openxmlformats.org/presentationml/2006/main" type="titleOnly" preserve="1">
   <p:cSld name="Title Only">
@@ -191,7 +247,7 @@
           <a:p>
             <a:fld id="{91095A8E-9C53-4015-AAB0-2CFFE67F5AFD}" type="datetimeFigureOut">
               <a:rPr lang="en-CA" smtClean="0"/>
-              <a:t>2017-03-13</a:t>
+              <a:t>2017-03-18</a:t>
             </a:fld>
             <a:endParaRPr lang="en-CA"/>
           </a:p>
@@ -404,7 +460,7 @@
           <a:p>
             <a:fld id="{91095A8E-9C53-4015-AAB0-2CFFE67F5AFD}" type="datetimeFigureOut">
               <a:rPr lang="en-CA" smtClean="0"/>
-              <a:t>2017-03-13</a:t>
+              <a:t>2017-03-18</a:t>
             </a:fld>
             <a:endParaRPr lang="en-CA"/>
           </a:p>
@@ -3428,6 +3484,1331 @@
 </p:sld>
 </file>
 
+<file path=ppt/slides/slide3.xml><?xml version="1.0" encoding="utf-8"?>
+<p:sld xmlns:a="http://schemas.openxmlformats.org/drawingml/2006/main" xmlns:r="http://schemas.openxmlformats.org/officeDocument/2006/relationships" xmlns:p="http://schemas.openxmlformats.org/presentationml/2006/main">
+  <p:cSld>
+    <p:spTree>
+      <p:nvGrpSpPr>
+        <p:cNvPr id="1" name=""/>
+        <p:cNvGrpSpPr/>
+        <p:nvPr/>
+      </p:nvGrpSpPr>
+      <p:grpSpPr>
+        <a:xfrm>
+          <a:off x="0" y="0"/>
+          <a:ext cx="0" cy="0"/>
+          <a:chOff x="0" y="0"/>
+          <a:chExt cx="0" cy="0"/>
+        </a:xfrm>
+      </p:grpSpPr>
+      <p:cxnSp>
+        <p:nvCxnSpPr>
+          <p:cNvPr id="4" name="Straight Arrow Connector 3">
+            <a:extLst>
+              <a:ext uri="{FF2B5EF4-FFF2-40B4-BE49-F238E27FC236}">
+                <a16:creationId xmlns:a16="http://schemas.microsoft.com/office/drawing/2014/main" id="{40E64F3C-706F-4736-A9A3-71D00E9A82E1}"/>
+              </a:ext>
+            </a:extLst>
+          </p:cNvPr>
+          <p:cNvCxnSpPr>
+            <a:cxnSpLocks/>
+          </p:cNvCxnSpPr>
+          <p:nvPr/>
+        </p:nvCxnSpPr>
+        <p:spPr>
+          <a:xfrm flipV="1">
+            <a:off x="1437641" y="2299855"/>
+            <a:ext cx="0" cy="2714105"/>
+          </a:xfrm>
+          <a:prstGeom prst="straightConnector1">
+            <a:avLst/>
+          </a:prstGeom>
+          <a:ln w="57150">
+            <a:solidFill>
+              <a:schemeClr val="tx1"/>
+            </a:solidFill>
+            <a:tailEnd type="triangle" w="lg" len="sm"/>
+          </a:ln>
+        </p:spPr>
+        <p:style>
+          <a:lnRef idx="1">
+            <a:schemeClr val="accent1"/>
+          </a:lnRef>
+          <a:fillRef idx="0">
+            <a:schemeClr val="accent1"/>
+          </a:fillRef>
+          <a:effectRef idx="0">
+            <a:schemeClr val="accent1"/>
+          </a:effectRef>
+          <a:fontRef idx="minor">
+            <a:schemeClr val="tx1"/>
+          </a:fontRef>
+        </p:style>
+      </p:cxnSp>
+      <p:cxnSp>
+        <p:nvCxnSpPr>
+          <p:cNvPr id="7" name="Straight Arrow Connector 6">
+            <a:extLst>
+              <a:ext uri="{FF2B5EF4-FFF2-40B4-BE49-F238E27FC236}">
+                <a16:creationId xmlns:a16="http://schemas.microsoft.com/office/drawing/2014/main" id="{2734D75D-69A6-4EFC-B284-2D7F05394558}"/>
+              </a:ext>
+            </a:extLst>
+          </p:cNvPr>
+          <p:cNvCxnSpPr>
+            <a:cxnSpLocks/>
+          </p:cNvCxnSpPr>
+          <p:nvPr/>
+        </p:nvCxnSpPr>
+        <p:spPr>
+          <a:xfrm>
+            <a:off x="1437641" y="5013960"/>
+            <a:ext cx="6521795" cy="0"/>
+          </a:xfrm>
+          <a:prstGeom prst="straightConnector1">
+            <a:avLst/>
+          </a:prstGeom>
+          <a:ln w="57150">
+            <a:solidFill>
+              <a:schemeClr val="tx1"/>
+            </a:solidFill>
+            <a:tailEnd type="triangle" w="lg" len="sm"/>
+          </a:ln>
+        </p:spPr>
+        <p:style>
+          <a:lnRef idx="1">
+            <a:schemeClr val="accent1"/>
+          </a:lnRef>
+          <a:fillRef idx="0">
+            <a:schemeClr val="accent1"/>
+          </a:fillRef>
+          <a:effectRef idx="0">
+            <a:schemeClr val="accent1"/>
+          </a:effectRef>
+          <a:fontRef idx="minor">
+            <a:schemeClr val="tx1"/>
+          </a:fontRef>
+        </p:style>
+      </p:cxnSp>
+      <p:sp>
+        <p:nvSpPr>
+          <p:cNvPr id="10" name="TextBox 9">
+            <a:extLst>
+              <a:ext uri="{FF2B5EF4-FFF2-40B4-BE49-F238E27FC236}">
+                <a16:creationId xmlns:a16="http://schemas.microsoft.com/office/drawing/2014/main" id="{A173A2DC-7A17-4ED1-A351-353F52D8542C}"/>
+              </a:ext>
+            </a:extLst>
+          </p:cNvPr>
+          <p:cNvSpPr txBox="1"/>
+          <p:nvPr/>
+        </p:nvSpPr>
+        <p:spPr>
+          <a:xfrm>
+            <a:off x="7959436" y="4702233"/>
+            <a:ext cx="851515" cy="523220"/>
+          </a:xfrm>
+          <a:prstGeom prst="rect">
+            <a:avLst/>
+          </a:prstGeom>
+          <a:noFill/>
+        </p:spPr>
+        <p:txBody>
+          <a:bodyPr wrap="none" rtlCol="0">
+            <a:spAutoFit/>
+          </a:bodyPr>
+          <a:lstStyle/>
+          <a:p>
+            <a:r>
+              <a:rPr lang="en-US" sz="2800" dirty="0">
+                <a:latin typeface="Segoe UI Light" panose="020B0502040204020203" pitchFamily="34" charset="0"/>
+                <a:cs typeface="Segoe UI Light" panose="020B0502040204020203" pitchFamily="34" charset="0"/>
+              </a:rPr>
+              <a:t>time</a:t>
+            </a:r>
+            <a:endParaRPr lang="en-CA" sz="2800" dirty="0">
+              <a:latin typeface="Segoe UI Light" panose="020B0502040204020203" pitchFamily="34" charset="0"/>
+              <a:cs typeface="Segoe UI Light" panose="020B0502040204020203" pitchFamily="34" charset="0"/>
+            </a:endParaRPr>
+          </a:p>
+        </p:txBody>
+      </p:sp>
+      <p:sp>
+        <p:nvSpPr>
+          <p:cNvPr id="14" name="TextBox 13">
+            <a:extLst>
+              <a:ext uri="{FF2B5EF4-FFF2-40B4-BE49-F238E27FC236}">
+                <a16:creationId xmlns:a16="http://schemas.microsoft.com/office/drawing/2014/main" id="{413255A3-9E5D-4CD0-8190-12928763C57B}"/>
+              </a:ext>
+            </a:extLst>
+          </p:cNvPr>
+          <p:cNvSpPr txBox="1"/>
+          <p:nvPr/>
+        </p:nvSpPr>
+        <p:spPr>
+          <a:xfrm>
+            <a:off x="1253134" y="4702233"/>
+            <a:ext cx="369012" cy="523220"/>
+          </a:xfrm>
+          <a:prstGeom prst="rect">
+            <a:avLst/>
+          </a:prstGeom>
+          <a:solidFill>
+            <a:schemeClr val="bg1"/>
+          </a:solidFill>
+        </p:spPr>
+        <p:txBody>
+          <a:bodyPr wrap="none" rtlCol="0">
+            <a:spAutoFit/>
+          </a:bodyPr>
+          <a:lstStyle/>
+          <a:p>
+            <a:r>
+              <a:rPr lang="en-US" sz="2800" dirty="0">
+                <a:latin typeface="Segoe UI Light" panose="020B0502040204020203" pitchFamily="34" charset="0"/>
+                <a:cs typeface="Segoe UI Light" panose="020B0502040204020203" pitchFamily="34" charset="0"/>
+              </a:rPr>
+              <a:t>0</a:t>
+            </a:r>
+            <a:endParaRPr lang="en-CA" sz="2800" dirty="0">
+              <a:latin typeface="Segoe UI Light" panose="020B0502040204020203" pitchFamily="34" charset="0"/>
+              <a:cs typeface="Segoe UI Light" panose="020B0502040204020203" pitchFamily="34" charset="0"/>
+            </a:endParaRPr>
+          </a:p>
+        </p:txBody>
+      </p:sp>
+      <p:sp>
+        <p:nvSpPr>
+          <p:cNvPr id="16" name="Title 15">
+            <a:extLst>
+              <a:ext uri="{FF2B5EF4-FFF2-40B4-BE49-F238E27FC236}">
+                <a16:creationId xmlns:a16="http://schemas.microsoft.com/office/drawing/2014/main" id="{5EDA51C9-0511-418D-814A-897F390E9B3E}"/>
+              </a:ext>
+            </a:extLst>
+          </p:cNvPr>
+          <p:cNvSpPr txBox="1">
+            <a:spLocks noGrp="1"/>
+          </p:cNvSpPr>
+          <p:nvPr>
+            <p:ph type="title"/>
+          </p:nvPr>
+        </p:nvSpPr>
+        <p:spPr>
+          <a:xfrm>
+            <a:off x="0" y="39335"/>
+            <a:ext cx="4109651" cy="480131"/>
+          </a:xfrm>
+          <a:prstGeom prst="rect">
+            <a:avLst/>
+          </a:prstGeom>
+          <a:noFill/>
+        </p:spPr>
+        <p:txBody>
+          <a:bodyPr wrap="none" rtlCol="0">
+            <a:spAutoFit/>
+          </a:bodyPr>
+          <a:lstStyle/>
+          <a:p>
+            <a:r>
+              <a:rPr lang="en-US" sz="2800" dirty="0">
+                <a:latin typeface="Segoe UI Light" panose="020B0502040204020203" pitchFamily="34" charset="0"/>
+                <a:cs typeface="Segoe UI Light" panose="020B0502040204020203" pitchFamily="34" charset="0"/>
+              </a:rPr>
+              <a:t>From 0 to isolated success</a:t>
+            </a:r>
+            <a:endParaRPr lang="en-CA" sz="2800" dirty="0">
+              <a:latin typeface="Segoe UI Light" panose="020B0502040204020203" pitchFamily="34" charset="0"/>
+              <a:cs typeface="Segoe UI Light" panose="020B0502040204020203" pitchFamily="34" charset="0"/>
+            </a:endParaRPr>
+          </a:p>
+        </p:txBody>
+      </p:sp>
+      <p:sp>
+        <p:nvSpPr>
+          <p:cNvPr id="17" name="Rectangle 16">
+            <a:extLst>
+              <a:ext uri="{FF2B5EF4-FFF2-40B4-BE49-F238E27FC236}">
+                <a16:creationId xmlns:a16="http://schemas.microsoft.com/office/drawing/2014/main" id="{6050CCD8-D134-49FD-B611-E31EE2ECADD3}"/>
+              </a:ext>
+            </a:extLst>
+          </p:cNvPr>
+          <p:cNvSpPr/>
+          <p:nvPr/>
+        </p:nvSpPr>
+        <p:spPr>
+          <a:xfrm>
+            <a:off x="1445601" y="5331923"/>
+            <a:ext cx="187036" cy="210690"/>
+          </a:xfrm>
+          <a:prstGeom prst="rect">
+            <a:avLst/>
+          </a:prstGeom>
+          <a:ln>
+            <a:noFill/>
+          </a:ln>
+        </p:spPr>
+        <p:style>
+          <a:lnRef idx="2">
+            <a:schemeClr val="accent1">
+              <a:shade val="50000"/>
+            </a:schemeClr>
+          </a:lnRef>
+          <a:fillRef idx="1">
+            <a:schemeClr val="accent1"/>
+          </a:fillRef>
+          <a:effectRef idx="0">
+            <a:schemeClr val="accent1"/>
+          </a:effectRef>
+          <a:fontRef idx="minor">
+            <a:schemeClr val="lt1"/>
+          </a:fontRef>
+        </p:style>
+        <p:txBody>
+          <a:bodyPr rtlCol="0" anchor="ctr"/>
+          <a:lstStyle/>
+          <a:p>
+            <a:pPr algn="ctr"/>
+            <a:endParaRPr lang="en-CA"/>
+          </a:p>
+        </p:txBody>
+      </p:sp>
+      <p:sp>
+        <p:nvSpPr>
+          <p:cNvPr id="18" name="TextBox 17">
+            <a:extLst>
+              <a:ext uri="{FF2B5EF4-FFF2-40B4-BE49-F238E27FC236}">
+                <a16:creationId xmlns:a16="http://schemas.microsoft.com/office/drawing/2014/main" id="{5483DD0E-5991-4506-8D2C-734A73AE331D}"/>
+              </a:ext>
+            </a:extLst>
+          </p:cNvPr>
+          <p:cNvSpPr txBox="1"/>
+          <p:nvPr/>
+        </p:nvSpPr>
+        <p:spPr>
+          <a:xfrm>
+            <a:off x="1632637" y="5175658"/>
+            <a:ext cx="2479397" cy="523220"/>
+          </a:xfrm>
+          <a:prstGeom prst="rect">
+            <a:avLst/>
+          </a:prstGeom>
+          <a:noFill/>
+        </p:spPr>
+        <p:txBody>
+          <a:bodyPr wrap="none" rtlCol="0">
+            <a:spAutoFit/>
+          </a:bodyPr>
+          <a:lstStyle/>
+          <a:p>
+            <a:r>
+              <a:rPr lang="en-US" sz="2800" dirty="0">
+                <a:solidFill>
+                  <a:srgbClr val="0070C0"/>
+                </a:solidFill>
+                <a:latin typeface="Segoe UI Light" panose="020B0502040204020203" pitchFamily="34" charset="0"/>
+                <a:cs typeface="Segoe UI Light" panose="020B0502040204020203" pitchFamily="34" charset="0"/>
+              </a:rPr>
+              <a:t>delivered value</a:t>
+            </a:r>
+            <a:endParaRPr lang="en-CA" sz="2800" dirty="0">
+              <a:solidFill>
+                <a:srgbClr val="0070C0"/>
+              </a:solidFill>
+              <a:latin typeface="Segoe UI Light" panose="020B0502040204020203" pitchFamily="34" charset="0"/>
+              <a:cs typeface="Segoe UI Light" panose="020B0502040204020203" pitchFamily="34" charset="0"/>
+            </a:endParaRPr>
+          </a:p>
+        </p:txBody>
+      </p:sp>
+      <p:sp>
+        <p:nvSpPr>
+          <p:cNvPr id="19" name="Rectangle 18">
+            <a:extLst>
+              <a:ext uri="{FF2B5EF4-FFF2-40B4-BE49-F238E27FC236}">
+                <a16:creationId xmlns:a16="http://schemas.microsoft.com/office/drawing/2014/main" id="{2B998011-CEA6-4317-BB59-6B9FF698E46A}"/>
+              </a:ext>
+            </a:extLst>
+          </p:cNvPr>
+          <p:cNvSpPr/>
+          <p:nvPr/>
+        </p:nvSpPr>
+        <p:spPr>
+          <a:xfrm>
+            <a:off x="4248811" y="5331923"/>
+            <a:ext cx="187036" cy="210690"/>
+          </a:xfrm>
+          <a:prstGeom prst="rect">
+            <a:avLst/>
+          </a:prstGeom>
+          <a:solidFill>
+            <a:srgbClr val="C00000"/>
+          </a:solidFill>
+          <a:ln>
+            <a:noFill/>
+          </a:ln>
+        </p:spPr>
+        <p:style>
+          <a:lnRef idx="2">
+            <a:schemeClr val="accent1">
+              <a:shade val="50000"/>
+            </a:schemeClr>
+          </a:lnRef>
+          <a:fillRef idx="1">
+            <a:schemeClr val="accent1"/>
+          </a:fillRef>
+          <a:effectRef idx="0">
+            <a:schemeClr val="accent1"/>
+          </a:effectRef>
+          <a:fontRef idx="minor">
+            <a:schemeClr val="lt1"/>
+          </a:fontRef>
+        </p:style>
+        <p:txBody>
+          <a:bodyPr rtlCol="0" anchor="ctr"/>
+          <a:lstStyle/>
+          <a:p>
+            <a:pPr algn="ctr"/>
+            <a:endParaRPr lang="en-CA"/>
+          </a:p>
+        </p:txBody>
+      </p:sp>
+      <p:sp>
+        <p:nvSpPr>
+          <p:cNvPr id="20" name="TextBox 19">
+            <a:extLst>
+              <a:ext uri="{FF2B5EF4-FFF2-40B4-BE49-F238E27FC236}">
+                <a16:creationId xmlns:a16="http://schemas.microsoft.com/office/drawing/2014/main" id="{EB16F4D1-DD5E-4D7E-8C92-0C8D857C0DB0}"/>
+              </a:ext>
+            </a:extLst>
+          </p:cNvPr>
+          <p:cNvSpPr txBox="1"/>
+          <p:nvPr/>
+        </p:nvSpPr>
+        <p:spPr>
+          <a:xfrm>
+            <a:off x="4435847" y="5175658"/>
+            <a:ext cx="1008353" cy="523220"/>
+          </a:xfrm>
+          <a:prstGeom prst="rect">
+            <a:avLst/>
+          </a:prstGeom>
+          <a:noFill/>
+        </p:spPr>
+        <p:txBody>
+          <a:bodyPr wrap="none" rtlCol="0">
+            <a:spAutoFit/>
+          </a:bodyPr>
+          <a:lstStyle/>
+          <a:p>
+            <a:r>
+              <a:rPr lang="en-US" sz="2800" dirty="0">
+                <a:solidFill>
+                  <a:srgbClr val="C00000"/>
+                </a:solidFill>
+                <a:latin typeface="Segoe UI Light" panose="020B0502040204020203" pitchFamily="34" charset="0"/>
+                <a:cs typeface="Segoe UI Light" panose="020B0502040204020203" pitchFamily="34" charset="0"/>
+              </a:rPr>
+              <a:t>effort</a:t>
+            </a:r>
+            <a:endParaRPr lang="en-CA" sz="2800" dirty="0">
+              <a:solidFill>
+                <a:srgbClr val="C00000"/>
+              </a:solidFill>
+              <a:latin typeface="Segoe UI Light" panose="020B0502040204020203" pitchFamily="34" charset="0"/>
+              <a:cs typeface="Segoe UI Light" panose="020B0502040204020203" pitchFamily="34" charset="0"/>
+            </a:endParaRPr>
+          </a:p>
+        </p:txBody>
+      </p:sp>
+      <p:sp>
+        <p:nvSpPr>
+          <p:cNvPr id="21" name="Rectangle 20">
+            <a:extLst>
+              <a:ext uri="{FF2B5EF4-FFF2-40B4-BE49-F238E27FC236}">
+                <a16:creationId xmlns:a16="http://schemas.microsoft.com/office/drawing/2014/main" id="{F250CBAA-050D-436A-BBDF-89C1B16C0266}"/>
+              </a:ext>
+            </a:extLst>
+          </p:cNvPr>
+          <p:cNvSpPr/>
+          <p:nvPr/>
+        </p:nvSpPr>
+        <p:spPr>
+          <a:xfrm>
+            <a:off x="5755694" y="5331923"/>
+            <a:ext cx="187036" cy="210690"/>
+          </a:xfrm>
+          <a:prstGeom prst="rect">
+            <a:avLst/>
+          </a:prstGeom>
+          <a:solidFill>
+            <a:srgbClr val="00B050"/>
+          </a:solidFill>
+          <a:ln>
+            <a:noFill/>
+          </a:ln>
+        </p:spPr>
+        <p:style>
+          <a:lnRef idx="2">
+            <a:schemeClr val="accent1">
+              <a:shade val="50000"/>
+            </a:schemeClr>
+          </a:lnRef>
+          <a:fillRef idx="1">
+            <a:schemeClr val="accent1"/>
+          </a:fillRef>
+          <a:effectRef idx="0">
+            <a:schemeClr val="accent1"/>
+          </a:effectRef>
+          <a:fontRef idx="minor">
+            <a:schemeClr val="lt1"/>
+          </a:fontRef>
+        </p:style>
+        <p:txBody>
+          <a:bodyPr rtlCol="0" anchor="ctr"/>
+          <a:lstStyle/>
+          <a:p>
+            <a:pPr algn="ctr"/>
+            <a:endParaRPr lang="en-CA"/>
+          </a:p>
+        </p:txBody>
+      </p:sp>
+      <p:sp>
+        <p:nvSpPr>
+          <p:cNvPr id="22" name="TextBox 21">
+            <a:extLst>
+              <a:ext uri="{FF2B5EF4-FFF2-40B4-BE49-F238E27FC236}">
+                <a16:creationId xmlns:a16="http://schemas.microsoft.com/office/drawing/2014/main" id="{43F53E4A-5F2F-466B-AA25-887CD24126AA}"/>
+              </a:ext>
+            </a:extLst>
+          </p:cNvPr>
+          <p:cNvSpPr txBox="1"/>
+          <p:nvPr/>
+        </p:nvSpPr>
+        <p:spPr>
+          <a:xfrm>
+            <a:off x="5942730" y="5175658"/>
+            <a:ext cx="1309974" cy="523220"/>
+          </a:xfrm>
+          <a:prstGeom prst="rect">
+            <a:avLst/>
+          </a:prstGeom>
+          <a:noFill/>
+        </p:spPr>
+        <p:txBody>
+          <a:bodyPr wrap="none" rtlCol="0">
+            <a:spAutoFit/>
+          </a:bodyPr>
+          <a:lstStyle/>
+          <a:p>
+            <a:r>
+              <a:rPr lang="en-US" sz="2800" dirty="0">
+                <a:solidFill>
+                  <a:srgbClr val="00B050"/>
+                </a:solidFill>
+                <a:latin typeface="Segoe UI Light" panose="020B0502040204020203" pitchFamily="34" charset="0"/>
+                <a:cs typeface="Segoe UI Light" panose="020B0502040204020203" pitchFamily="34" charset="0"/>
+              </a:rPr>
+              <a:t>passion</a:t>
+            </a:r>
+            <a:endParaRPr lang="en-CA" sz="2800" dirty="0">
+              <a:solidFill>
+                <a:srgbClr val="00B050"/>
+              </a:solidFill>
+              <a:latin typeface="Segoe UI Light" panose="020B0502040204020203" pitchFamily="34" charset="0"/>
+              <a:cs typeface="Segoe UI Light" panose="020B0502040204020203" pitchFamily="34" charset="0"/>
+            </a:endParaRPr>
+          </a:p>
+        </p:txBody>
+      </p:sp>
+      <p:cxnSp>
+        <p:nvCxnSpPr>
+          <p:cNvPr id="24" name="Straight Connector 23">
+            <a:extLst>
+              <a:ext uri="{FF2B5EF4-FFF2-40B4-BE49-F238E27FC236}">
+                <a16:creationId xmlns:a16="http://schemas.microsoft.com/office/drawing/2014/main" id="{48BDA403-A455-45CB-8490-2D3D1589E62A}"/>
+              </a:ext>
+            </a:extLst>
+          </p:cNvPr>
+          <p:cNvCxnSpPr>
+            <a:cxnSpLocks/>
+          </p:cNvCxnSpPr>
+          <p:nvPr/>
+        </p:nvCxnSpPr>
+        <p:spPr>
+          <a:xfrm>
+            <a:off x="1732199" y="5698878"/>
+            <a:ext cx="2188637" cy="0"/>
+          </a:xfrm>
+          <a:prstGeom prst="line">
+            <a:avLst/>
+          </a:prstGeom>
+        </p:spPr>
+        <p:style>
+          <a:lnRef idx="1">
+            <a:schemeClr val="accent1"/>
+          </a:lnRef>
+          <a:fillRef idx="0">
+            <a:schemeClr val="accent1"/>
+          </a:fillRef>
+          <a:effectRef idx="0">
+            <a:schemeClr val="accent1"/>
+          </a:effectRef>
+          <a:fontRef idx="minor">
+            <a:schemeClr val="tx1"/>
+          </a:fontRef>
+        </p:style>
+      </p:cxnSp>
+      <p:cxnSp>
+        <p:nvCxnSpPr>
+          <p:cNvPr id="26" name="Straight Connector 25">
+            <a:extLst>
+              <a:ext uri="{FF2B5EF4-FFF2-40B4-BE49-F238E27FC236}">
+                <a16:creationId xmlns:a16="http://schemas.microsoft.com/office/drawing/2014/main" id="{631D13AB-90AD-4836-B8D0-D6A2301845CB}"/>
+              </a:ext>
+            </a:extLst>
+          </p:cNvPr>
+          <p:cNvCxnSpPr>
+            <a:cxnSpLocks/>
+          </p:cNvCxnSpPr>
+          <p:nvPr/>
+        </p:nvCxnSpPr>
+        <p:spPr>
+          <a:xfrm>
+            <a:off x="4516963" y="5698878"/>
+            <a:ext cx="823964" cy="0"/>
+          </a:xfrm>
+          <a:prstGeom prst="line">
+            <a:avLst/>
+          </a:prstGeom>
+          <a:ln>
+            <a:solidFill>
+              <a:srgbClr val="C00000"/>
+            </a:solidFill>
+            <a:prstDash val="dash"/>
+          </a:ln>
+        </p:spPr>
+        <p:style>
+          <a:lnRef idx="1">
+            <a:schemeClr val="accent1"/>
+          </a:lnRef>
+          <a:fillRef idx="0">
+            <a:schemeClr val="accent1"/>
+          </a:fillRef>
+          <a:effectRef idx="0">
+            <a:schemeClr val="accent1"/>
+          </a:effectRef>
+          <a:fontRef idx="minor">
+            <a:schemeClr val="tx1"/>
+          </a:fontRef>
+        </p:style>
+      </p:cxnSp>
+      <p:cxnSp>
+        <p:nvCxnSpPr>
+          <p:cNvPr id="28" name="Straight Connector 27">
+            <a:extLst>
+              <a:ext uri="{FF2B5EF4-FFF2-40B4-BE49-F238E27FC236}">
+                <a16:creationId xmlns:a16="http://schemas.microsoft.com/office/drawing/2014/main" id="{33C8B239-EE74-4901-AE8D-4AC9ECD34B14}"/>
+              </a:ext>
+            </a:extLst>
+          </p:cNvPr>
+          <p:cNvCxnSpPr>
+            <a:cxnSpLocks/>
+          </p:cNvCxnSpPr>
+          <p:nvPr/>
+        </p:nvCxnSpPr>
+        <p:spPr>
+          <a:xfrm>
+            <a:off x="6054817" y="5698878"/>
+            <a:ext cx="1107983" cy="0"/>
+          </a:xfrm>
+          <a:prstGeom prst="line">
+            <a:avLst/>
+          </a:prstGeom>
+          <a:ln cmpd="dbl">
+            <a:solidFill>
+              <a:srgbClr val="00B050"/>
+            </a:solidFill>
+            <a:prstDash val="lgDashDotDot"/>
+          </a:ln>
+        </p:spPr>
+        <p:style>
+          <a:lnRef idx="1">
+            <a:schemeClr val="accent1"/>
+          </a:lnRef>
+          <a:fillRef idx="0">
+            <a:schemeClr val="accent1"/>
+          </a:fillRef>
+          <a:effectRef idx="0">
+            <a:schemeClr val="accent1"/>
+          </a:effectRef>
+          <a:fontRef idx="minor">
+            <a:schemeClr val="tx1"/>
+          </a:fontRef>
+        </p:style>
+      </p:cxnSp>
+      <mc:AlternateContent xmlns:mc="http://schemas.openxmlformats.org/markup-compatibility/2006" xmlns:p14="http://schemas.microsoft.com/office/powerpoint/2010/main">
+        <mc:Choice Requires="p14">
+          <p:contentPart p14:bwMode="auto" r:id="rId2">
+            <p14:nvContentPartPr>
+              <p14:cNvPr id="31" name="Ink 30">
+                <a:extLst>
+                  <a:ext uri="{FF2B5EF4-FFF2-40B4-BE49-F238E27FC236}">
+                    <a16:creationId xmlns:a16="http://schemas.microsoft.com/office/drawing/2014/main" id="{ADAAC442-9FBC-4CEA-93B4-E7854CEF88BC}"/>
+                  </a:ext>
+                </a:extLst>
+              </p14:cNvPr>
+              <p14:cNvContentPartPr/>
+              <p14:nvPr/>
+            </p14:nvContentPartPr>
+            <p14:xfrm>
+              <a:off x="1505411" y="4831675"/>
+              <a:ext cx="30060" cy="32220"/>
+            </p14:xfrm>
+          </p:contentPart>
+        </mc:Choice>
+        <mc:Fallback xmlns="">
+          <p:pic>
+            <p:nvPicPr>
+              <p:cNvPr id="31" name="Ink 30">
+                <a:extLst>
+                  <a:ext uri="{FF2B5EF4-FFF2-40B4-BE49-F238E27FC236}">
+                    <a16:creationId xmlns:a16="http://schemas.microsoft.com/office/drawing/2014/main" id="{ADAAC442-9FBC-4CEA-93B4-E7854CEF88BC}"/>
+                  </a:ext>
+                </a:extLst>
+              </p:cNvPr>
+              <p:cNvPicPr/>
+              <p:nvPr/>
+            </p:nvPicPr>
+            <p:blipFill>
+              <a:blip r:embed="rId3"/>
+              <a:stretch>
+                <a:fillRect/>
+              </a:stretch>
+            </p:blipFill>
+            <p:spPr>
+              <a:xfrm>
+                <a:off x="1501117" y="4827379"/>
+                <a:ext cx="38649" cy="40812"/>
+              </a:xfrm>
+              <a:prstGeom prst="rect">
+                <a:avLst/>
+              </a:prstGeom>
+            </p:spPr>
+          </p:pic>
+        </mc:Fallback>
+      </mc:AlternateContent>
+      <mc:AlternateContent xmlns:mc="http://schemas.openxmlformats.org/markup-compatibility/2006" xmlns:p14="http://schemas.microsoft.com/office/powerpoint/2010/main">
+        <mc:Choice Requires="p14">
+          <p:contentPart p14:bwMode="auto" r:id="rId4">
+            <p14:nvContentPartPr>
+              <p14:cNvPr id="52" name="Ink 51">
+                <a:extLst>
+                  <a:ext uri="{FF2B5EF4-FFF2-40B4-BE49-F238E27FC236}">
+                    <a16:creationId xmlns:a16="http://schemas.microsoft.com/office/drawing/2014/main" id="{0B47966B-C0A8-4F45-8CB7-4240E6D04B08}"/>
+                  </a:ext>
+                </a:extLst>
+              </p14:cNvPr>
+              <p14:cNvContentPartPr/>
+              <p14:nvPr/>
+            </p14:nvContentPartPr>
+            <p14:xfrm>
+              <a:off x="1440611" y="4931395"/>
+              <a:ext cx="4500" cy="3780"/>
+            </p14:xfrm>
+          </p:contentPart>
+        </mc:Choice>
+        <mc:Fallback xmlns="">
+          <p:pic>
+            <p:nvPicPr>
+              <p:cNvPr id="52" name="Ink 51">
+                <a:extLst>
+                  <a:ext uri="{FF2B5EF4-FFF2-40B4-BE49-F238E27FC236}">
+                    <a16:creationId xmlns:a16="http://schemas.microsoft.com/office/drawing/2014/main" id="{0B47966B-C0A8-4F45-8CB7-4240E6D04B08}"/>
+                  </a:ext>
+                </a:extLst>
+              </p:cNvPr>
+              <p:cNvPicPr/>
+              <p:nvPr/>
+            </p:nvPicPr>
+            <p:blipFill>
+              <a:blip r:embed="rId5"/>
+              <a:stretch>
+                <a:fillRect/>
+              </a:stretch>
+            </p:blipFill>
+            <p:spPr>
+              <a:xfrm>
+                <a:off x="1438534" y="4929333"/>
+                <a:ext cx="8654" cy="7904"/>
+              </a:xfrm>
+              <a:prstGeom prst="rect">
+                <a:avLst/>
+              </a:prstGeom>
+            </p:spPr>
+          </p:pic>
+        </mc:Fallback>
+      </mc:AlternateContent>
+    </p:spTree>
+    <p:extLst>
+      <p:ext uri="{BB962C8B-B14F-4D97-AF65-F5344CB8AC3E}">
+        <p14:creationId xmlns:p14="http://schemas.microsoft.com/office/powerpoint/2010/main" val="490561077"/>
+      </p:ext>
+    </p:extLst>
+  </p:cSld>
+  <p:clrMapOvr>
+    <a:masterClrMapping/>
+  </p:clrMapOvr>
+</p:sld>
+</file>
+
+<file path=ppt/slides/slide4.xml><?xml version="1.0" encoding="utf-8"?>
+<p:sld xmlns:a="http://schemas.openxmlformats.org/drawingml/2006/main" xmlns:r="http://schemas.openxmlformats.org/officeDocument/2006/relationships" xmlns:p="http://schemas.openxmlformats.org/presentationml/2006/main">
+  <p:cSld>
+    <p:spTree>
+      <p:nvGrpSpPr>
+        <p:cNvPr id="1" name=""/>
+        <p:cNvGrpSpPr/>
+        <p:nvPr/>
+      </p:nvGrpSpPr>
+      <p:grpSpPr>
+        <a:xfrm>
+          <a:off x="0" y="0"/>
+          <a:ext cx="0" cy="0"/>
+          <a:chOff x="0" y="0"/>
+          <a:chExt cx="0" cy="0"/>
+        </a:xfrm>
+      </p:grpSpPr>
+      <p:pic>
+        <p:nvPicPr>
+          <p:cNvPr id="18" name="Graphic 17" descr="Solar system">
+            <a:extLst>
+              <a:ext uri="{FF2B5EF4-FFF2-40B4-BE49-F238E27FC236}">
+                <a16:creationId xmlns:a16="http://schemas.microsoft.com/office/drawing/2014/main" id="{C9145FF3-6D6A-4D78-8E07-149569340FD5}"/>
+              </a:ext>
+            </a:extLst>
+          </p:cNvPr>
+          <p:cNvPicPr>
+            <a:picLocks noChangeAspect="1"/>
+          </p:cNvPicPr>
+          <p:nvPr/>
+        </p:nvPicPr>
+        <p:blipFill>
+          <a:blip r:embed="rId2">
+            <a:extLst>
+              <a:ext uri="{28A0092B-C50C-407E-A947-70E740481C1C}">
+                <a14:useLocalDpi xmlns:a14="http://schemas.microsoft.com/office/drawing/2010/main" val="0"/>
+              </a:ext>
+              <a:ext uri="{96DAC541-7B7A-43D3-8B79-37D633B846F1}">
+                <asvg:svgBlip xmlns:asvg="http://schemas.microsoft.com/office/drawing/2016/SVG/main" r:embed="rId3"/>
+              </a:ext>
+            </a:extLst>
+          </a:blip>
+          <a:stretch>
+            <a:fillRect/>
+          </a:stretch>
+        </p:blipFill>
+        <p:spPr>
+          <a:xfrm>
+            <a:off x="1720639" y="3237160"/>
+            <a:ext cx="1610161" cy="1610161"/>
+          </a:xfrm>
+          <a:prstGeom prst="rect">
+            <a:avLst/>
+          </a:prstGeom>
+        </p:spPr>
+      </p:pic>
+      <p:sp>
+        <p:nvSpPr>
+          <p:cNvPr id="2" name="Title 1">
+            <a:extLst>
+              <a:ext uri="{FF2B5EF4-FFF2-40B4-BE49-F238E27FC236}">
+                <a16:creationId xmlns:a16="http://schemas.microsoft.com/office/drawing/2014/main" id="{8441AE34-CFD4-4F9B-A8E6-96B2575548EE}"/>
+              </a:ext>
+            </a:extLst>
+          </p:cNvPr>
+          <p:cNvSpPr>
+            <a:spLocks noGrp="1"/>
+          </p:cNvSpPr>
+          <p:nvPr>
+            <p:ph type="title"/>
+          </p:nvPr>
+        </p:nvSpPr>
+        <p:spPr/>
+        <p:txBody>
+          <a:bodyPr/>
+          <a:lstStyle/>
+          <a:p>
+            <a:r>
+              <a:rPr lang="en-US"/>
+              <a:t>P</a:t>
+            </a:r>
+            <a:endParaRPr lang="en-CA"/>
+          </a:p>
+        </p:txBody>
+      </p:sp>
+      <p:pic>
+        <p:nvPicPr>
+          <p:cNvPr id="4" name="Graphic 3" descr="Crawl">
+            <a:extLst>
+              <a:ext uri="{FF2B5EF4-FFF2-40B4-BE49-F238E27FC236}">
+                <a16:creationId xmlns:a16="http://schemas.microsoft.com/office/drawing/2014/main" id="{00EFF889-ED4C-4FB5-ADB9-75CE7E14504C}"/>
+              </a:ext>
+            </a:extLst>
+          </p:cNvPr>
+          <p:cNvPicPr>
+            <a:picLocks noChangeAspect="1"/>
+          </p:cNvPicPr>
+          <p:nvPr/>
+        </p:nvPicPr>
+        <p:blipFill>
+          <a:blip r:embed="rId4">
+            <a:extLst>
+              <a:ext uri="{28A0092B-C50C-407E-A947-70E740481C1C}">
+                <a14:useLocalDpi xmlns:a14="http://schemas.microsoft.com/office/drawing/2010/main" val="0"/>
+              </a:ext>
+              <a:ext uri="{96DAC541-7B7A-43D3-8B79-37D633B846F1}">
+                <asvg:svgBlip xmlns:asvg="http://schemas.microsoft.com/office/drawing/2016/SVG/main" r:embed="rId5"/>
+              </a:ext>
+            </a:extLst>
+          </a:blip>
+          <a:stretch>
+            <a:fillRect/>
+          </a:stretch>
+        </p:blipFill>
+        <p:spPr>
+          <a:xfrm>
+            <a:off x="7736840" y="746232"/>
+            <a:ext cx="1219200" cy="1219200"/>
+          </a:xfrm>
+          <a:prstGeom prst="rect">
+            <a:avLst/>
+          </a:prstGeom>
+        </p:spPr>
+      </p:pic>
+      <p:pic>
+        <p:nvPicPr>
+          <p:cNvPr id="6" name="Graphic 5" descr="Turtle">
+            <a:extLst>
+              <a:ext uri="{FF2B5EF4-FFF2-40B4-BE49-F238E27FC236}">
+                <a16:creationId xmlns:a16="http://schemas.microsoft.com/office/drawing/2014/main" id="{F0F80CE1-3903-498C-B101-B463F26D5A52}"/>
+              </a:ext>
+            </a:extLst>
+          </p:cNvPr>
+          <p:cNvPicPr>
+            <a:picLocks noChangeAspect="1"/>
+          </p:cNvPicPr>
+          <p:nvPr/>
+        </p:nvPicPr>
+        <p:blipFill>
+          <a:blip r:embed="rId6">
+            <a:extLst>
+              <a:ext uri="{28A0092B-C50C-407E-A947-70E740481C1C}">
+                <a14:useLocalDpi xmlns:a14="http://schemas.microsoft.com/office/drawing/2010/main" val="0"/>
+              </a:ext>
+              <a:ext uri="{96DAC541-7B7A-43D3-8B79-37D633B846F1}">
+                <asvg:svgBlip xmlns:asvg="http://schemas.microsoft.com/office/drawing/2016/SVG/main" r:embed="rId7"/>
+              </a:ext>
+            </a:extLst>
+          </a:blip>
+          <a:stretch>
+            <a:fillRect/>
+          </a:stretch>
+        </p:blipFill>
+        <p:spPr>
+          <a:xfrm>
+            <a:off x="8247800" y="3331420"/>
+            <a:ext cx="1363560" cy="1363560"/>
+          </a:xfrm>
+          <a:prstGeom prst="rect">
+            <a:avLst/>
+          </a:prstGeom>
+        </p:spPr>
+      </p:pic>
+      <p:pic>
+        <p:nvPicPr>
+          <p:cNvPr id="8" name="Graphic 7" descr="Table and chairs">
+            <a:extLst>
+              <a:ext uri="{FF2B5EF4-FFF2-40B4-BE49-F238E27FC236}">
+                <a16:creationId xmlns:a16="http://schemas.microsoft.com/office/drawing/2014/main" id="{A1F7908C-4745-45F6-81A9-86436970D2C7}"/>
+              </a:ext>
+            </a:extLst>
+          </p:cNvPr>
+          <p:cNvPicPr>
+            <a:picLocks noChangeAspect="1"/>
+          </p:cNvPicPr>
+          <p:nvPr/>
+        </p:nvPicPr>
+        <p:blipFill>
+          <a:blip r:embed="rId8">
+            <a:extLst>
+              <a:ext uri="{28A0092B-C50C-407E-A947-70E740481C1C}">
+                <a14:useLocalDpi xmlns:a14="http://schemas.microsoft.com/office/drawing/2010/main" val="0"/>
+              </a:ext>
+              <a:ext uri="{96DAC541-7B7A-43D3-8B79-37D633B846F1}">
+                <asvg:svgBlip xmlns:asvg="http://schemas.microsoft.com/office/drawing/2016/SVG/main" r:embed="rId9"/>
+              </a:ext>
+            </a:extLst>
+          </a:blip>
+          <a:stretch>
+            <a:fillRect/>
+          </a:stretch>
+        </p:blipFill>
+        <p:spPr>
+          <a:xfrm>
+            <a:off x="4627880" y="1327920"/>
+            <a:ext cx="1293640" cy="1293640"/>
+          </a:xfrm>
+          <a:prstGeom prst="rect">
+            <a:avLst/>
+          </a:prstGeom>
+        </p:spPr>
+      </p:pic>
+      <p:pic>
+        <p:nvPicPr>
+          <p:cNvPr id="21" name="Graphic 20" descr="User">
+            <a:extLst>
+              <a:ext uri="{FF2B5EF4-FFF2-40B4-BE49-F238E27FC236}">
+                <a16:creationId xmlns:a16="http://schemas.microsoft.com/office/drawing/2014/main" id="{62CBCCD1-1853-4579-914A-4D773994A701}"/>
+              </a:ext>
+            </a:extLst>
+          </p:cNvPr>
+          <p:cNvPicPr>
+            <a:picLocks noChangeAspect="1"/>
+          </p:cNvPicPr>
+          <p:nvPr/>
+        </p:nvPicPr>
+        <p:blipFill>
+          <a:blip r:embed="rId10">
+            <a:extLst>
+              <a:ext uri="{28A0092B-C50C-407E-A947-70E740481C1C}">
+                <a14:useLocalDpi xmlns:a14="http://schemas.microsoft.com/office/drawing/2010/main" val="0"/>
+              </a:ext>
+              <a:ext uri="{96DAC541-7B7A-43D3-8B79-37D633B846F1}">
+                <asvg:svgBlip xmlns:asvg="http://schemas.microsoft.com/office/drawing/2016/SVG/main" r:embed="rId11"/>
+              </a:ext>
+            </a:extLst>
+          </a:blip>
+          <a:stretch>
+            <a:fillRect/>
+          </a:stretch>
+        </p:blipFill>
+        <p:spPr>
+          <a:xfrm>
+            <a:off x="5464320" y="3237160"/>
+            <a:ext cx="500800" cy="500800"/>
+          </a:xfrm>
+          <a:prstGeom prst="rect">
+            <a:avLst/>
+          </a:prstGeom>
+        </p:spPr>
+      </p:pic>
+      <p:sp>
+        <p:nvSpPr>
+          <p:cNvPr id="23" name="Flowchart: Connector 22">
+            <a:extLst>
+              <a:ext uri="{FF2B5EF4-FFF2-40B4-BE49-F238E27FC236}">
+                <a16:creationId xmlns:a16="http://schemas.microsoft.com/office/drawing/2014/main" id="{555F42B9-3F6A-4020-9FCB-E724ED1CCC1A}"/>
+              </a:ext>
+            </a:extLst>
+          </p:cNvPr>
+          <p:cNvSpPr/>
+          <p:nvPr/>
+        </p:nvSpPr>
+        <p:spPr>
+          <a:xfrm>
+            <a:off x="5582080" y="3886200"/>
+            <a:ext cx="265280" cy="254000"/>
+          </a:xfrm>
+          <a:prstGeom prst="flowChartConnector">
+            <a:avLst/>
+          </a:prstGeom>
+          <a:solidFill>
+            <a:schemeClr val="tx1"/>
+          </a:solidFill>
+          <a:ln>
+            <a:solidFill>
+              <a:schemeClr val="tx1"/>
+            </a:solidFill>
+          </a:ln>
+        </p:spPr>
+        <p:style>
+          <a:lnRef idx="2">
+            <a:schemeClr val="accent1">
+              <a:shade val="50000"/>
+            </a:schemeClr>
+          </a:lnRef>
+          <a:fillRef idx="1">
+            <a:schemeClr val="accent1"/>
+          </a:fillRef>
+          <a:effectRef idx="0">
+            <a:schemeClr val="accent1"/>
+          </a:effectRef>
+          <a:fontRef idx="minor">
+            <a:schemeClr val="lt1"/>
+          </a:fontRef>
+        </p:style>
+        <p:txBody>
+          <a:bodyPr rtlCol="0" anchor="ctr"/>
+          <a:lstStyle/>
+          <a:p>
+            <a:pPr algn="ctr"/>
+            <a:endParaRPr lang="en-CA"/>
+          </a:p>
+        </p:txBody>
+      </p:sp>
+      <p:cxnSp>
+        <p:nvCxnSpPr>
+          <p:cNvPr id="29" name="Straight Connector 28">
+            <a:extLst>
+              <a:ext uri="{FF2B5EF4-FFF2-40B4-BE49-F238E27FC236}">
+                <a16:creationId xmlns:a16="http://schemas.microsoft.com/office/drawing/2014/main" id="{291873ED-D8D0-4478-8DA1-6CC784044C37}"/>
+              </a:ext>
+            </a:extLst>
+          </p:cNvPr>
+          <p:cNvCxnSpPr>
+            <a:cxnSpLocks/>
+          </p:cNvCxnSpPr>
+          <p:nvPr/>
+        </p:nvCxnSpPr>
+        <p:spPr>
+          <a:xfrm>
+            <a:off x="5154080" y="4013200"/>
+            <a:ext cx="1149000" cy="0"/>
+          </a:xfrm>
+          <a:prstGeom prst="line">
+            <a:avLst/>
+          </a:prstGeom>
+          <a:ln w="57150">
+            <a:solidFill>
+              <a:schemeClr val="tx1"/>
+            </a:solidFill>
+          </a:ln>
+        </p:spPr>
+        <p:style>
+          <a:lnRef idx="1">
+            <a:schemeClr val="accent1"/>
+          </a:lnRef>
+          <a:fillRef idx="0">
+            <a:schemeClr val="accent1"/>
+          </a:fillRef>
+          <a:effectRef idx="0">
+            <a:schemeClr val="accent1"/>
+          </a:effectRef>
+          <a:fontRef idx="minor">
+            <a:schemeClr val="tx1"/>
+          </a:fontRef>
+        </p:style>
+      </p:cxnSp>
+      <p:cxnSp>
+        <p:nvCxnSpPr>
+          <p:cNvPr id="33" name="Straight Connector 32">
+            <a:extLst>
+              <a:ext uri="{FF2B5EF4-FFF2-40B4-BE49-F238E27FC236}">
+                <a16:creationId xmlns:a16="http://schemas.microsoft.com/office/drawing/2014/main" id="{7D23D338-2A15-40F0-AD46-CC9F20C391BE}"/>
+              </a:ext>
+            </a:extLst>
+          </p:cNvPr>
+          <p:cNvCxnSpPr>
+            <a:cxnSpLocks/>
+          </p:cNvCxnSpPr>
+          <p:nvPr/>
+        </p:nvCxnSpPr>
+        <p:spPr>
+          <a:xfrm>
+            <a:off x="5714720" y="3512319"/>
+            <a:ext cx="0" cy="1001762"/>
+          </a:xfrm>
+          <a:prstGeom prst="line">
+            <a:avLst/>
+          </a:prstGeom>
+          <a:ln w="57150">
+            <a:solidFill>
+              <a:schemeClr val="tx1"/>
+            </a:solidFill>
+          </a:ln>
+        </p:spPr>
+        <p:style>
+          <a:lnRef idx="1">
+            <a:schemeClr val="accent1"/>
+          </a:lnRef>
+          <a:fillRef idx="0">
+            <a:schemeClr val="accent1"/>
+          </a:fillRef>
+          <a:effectRef idx="0">
+            <a:schemeClr val="accent1"/>
+          </a:effectRef>
+          <a:fontRef idx="minor">
+            <a:schemeClr val="tx1"/>
+          </a:fontRef>
+        </p:style>
+      </p:cxnSp>
+      <p:pic>
+        <p:nvPicPr>
+          <p:cNvPr id="36" name="Graphic 35" descr="User">
+            <a:extLst>
+              <a:ext uri="{FF2B5EF4-FFF2-40B4-BE49-F238E27FC236}">
+                <a16:creationId xmlns:a16="http://schemas.microsoft.com/office/drawing/2014/main" id="{36ADFBB5-8B22-4801-AE92-73DAAE62FE3B}"/>
+              </a:ext>
+            </a:extLst>
+          </p:cNvPr>
+          <p:cNvPicPr>
+            <a:picLocks noChangeAspect="1"/>
+          </p:cNvPicPr>
+          <p:nvPr/>
+        </p:nvPicPr>
+        <p:blipFill>
+          <a:blip r:embed="rId10">
+            <a:extLst>
+              <a:ext uri="{28A0092B-C50C-407E-A947-70E740481C1C}">
+                <a14:useLocalDpi xmlns:a14="http://schemas.microsoft.com/office/drawing/2010/main" val="0"/>
+              </a:ext>
+              <a:ext uri="{96DAC541-7B7A-43D3-8B79-37D633B846F1}">
+                <asvg:svgBlip xmlns:asvg="http://schemas.microsoft.com/office/drawing/2016/SVG/main" r:embed="rId11"/>
+              </a:ext>
+            </a:extLst>
+          </a:blip>
+          <a:stretch>
+            <a:fillRect/>
+          </a:stretch>
+        </p:blipFill>
+        <p:spPr>
+          <a:xfrm>
+            <a:off x="5464320" y="4288440"/>
+            <a:ext cx="500800" cy="500800"/>
+          </a:xfrm>
+          <a:prstGeom prst="rect">
+            <a:avLst/>
+          </a:prstGeom>
+        </p:spPr>
+      </p:pic>
+      <p:pic>
+        <p:nvPicPr>
+          <p:cNvPr id="37" name="Graphic 36" descr="User">
+            <a:extLst>
+              <a:ext uri="{FF2B5EF4-FFF2-40B4-BE49-F238E27FC236}">
+                <a16:creationId xmlns:a16="http://schemas.microsoft.com/office/drawing/2014/main" id="{3DB5CF8C-A99A-4617-A7AF-2D5579E81672}"/>
+              </a:ext>
+            </a:extLst>
+          </p:cNvPr>
+          <p:cNvPicPr>
+            <a:picLocks noChangeAspect="1"/>
+          </p:cNvPicPr>
+          <p:nvPr/>
+        </p:nvPicPr>
+        <p:blipFill>
+          <a:blip r:embed="rId10">
+            <a:extLst>
+              <a:ext uri="{28A0092B-C50C-407E-A947-70E740481C1C}">
+                <a14:useLocalDpi xmlns:a14="http://schemas.microsoft.com/office/drawing/2010/main" val="0"/>
+              </a:ext>
+              <a:ext uri="{96DAC541-7B7A-43D3-8B79-37D633B846F1}">
+                <asvg:svgBlip xmlns:asvg="http://schemas.microsoft.com/office/drawing/2016/SVG/main" r:embed="rId11"/>
+              </a:ext>
+            </a:extLst>
+          </a:blip>
+          <a:stretch>
+            <a:fillRect/>
+          </a:stretch>
+        </p:blipFill>
+        <p:spPr>
+          <a:xfrm>
+            <a:off x="6015639" y="3702400"/>
+            <a:ext cx="500800" cy="500800"/>
+          </a:xfrm>
+          <a:prstGeom prst="rect">
+            <a:avLst/>
+          </a:prstGeom>
+        </p:spPr>
+      </p:pic>
+      <p:pic>
+        <p:nvPicPr>
+          <p:cNvPr id="38" name="Graphic 37" descr="User">
+            <a:extLst>
+              <a:ext uri="{FF2B5EF4-FFF2-40B4-BE49-F238E27FC236}">
+                <a16:creationId xmlns:a16="http://schemas.microsoft.com/office/drawing/2014/main" id="{16F3A087-0B5F-4BB4-85DC-E24AE20E6D67}"/>
+              </a:ext>
+            </a:extLst>
+          </p:cNvPr>
+          <p:cNvPicPr>
+            <a:picLocks noChangeAspect="1"/>
+          </p:cNvPicPr>
+          <p:nvPr/>
+        </p:nvPicPr>
+        <p:blipFill>
+          <a:blip r:embed="rId10">
+            <a:extLst>
+              <a:ext uri="{28A0092B-C50C-407E-A947-70E740481C1C}">
+                <a14:useLocalDpi xmlns:a14="http://schemas.microsoft.com/office/drawing/2010/main" val="0"/>
+              </a:ext>
+              <a:ext uri="{96DAC541-7B7A-43D3-8B79-37D633B846F1}">
+                <asvg:svgBlip xmlns:asvg="http://schemas.microsoft.com/office/drawing/2016/SVG/main" r:embed="rId11"/>
+              </a:ext>
+            </a:extLst>
+          </a:blip>
+          <a:stretch>
+            <a:fillRect/>
+          </a:stretch>
+        </p:blipFill>
+        <p:spPr>
+          <a:xfrm>
+            <a:off x="4930641" y="3692240"/>
+            <a:ext cx="500800" cy="500800"/>
+          </a:xfrm>
+          <a:prstGeom prst="rect">
+            <a:avLst/>
+          </a:prstGeom>
+        </p:spPr>
+      </p:pic>
+      <p:pic>
+        <p:nvPicPr>
+          <p:cNvPr id="16" name="Graphic 15" descr="Stopwatch">
+            <a:extLst>
+              <a:ext uri="{FF2B5EF4-FFF2-40B4-BE49-F238E27FC236}">
+                <a16:creationId xmlns:a16="http://schemas.microsoft.com/office/drawing/2014/main" id="{C316E35B-BBF7-4633-B0DE-D2D1A599A818}"/>
+              </a:ext>
+            </a:extLst>
+          </p:cNvPr>
+          <p:cNvPicPr>
+            <a:picLocks noChangeAspect="1"/>
+          </p:cNvPicPr>
+          <p:nvPr/>
+        </p:nvPicPr>
+        <p:blipFill>
+          <a:blip r:embed="rId12">
+            <a:extLst>
+              <a:ext uri="{28A0092B-C50C-407E-A947-70E740481C1C}">
+                <a14:useLocalDpi xmlns:a14="http://schemas.microsoft.com/office/drawing/2010/main" val="0"/>
+              </a:ext>
+              <a:ext uri="{96DAC541-7B7A-43D3-8B79-37D633B846F1}">
+                <asvg:svgBlip xmlns:asvg="http://schemas.microsoft.com/office/drawing/2016/SVG/main" r:embed="rId13"/>
+              </a:ext>
+            </a:extLst>
+          </a:blip>
+          <a:stretch>
+            <a:fillRect/>
+          </a:stretch>
+        </p:blipFill>
+        <p:spPr>
+          <a:xfrm>
+            <a:off x="2924359" y="2127180"/>
+            <a:ext cx="666820" cy="666820"/>
+          </a:xfrm>
+          <a:prstGeom prst="rect">
+            <a:avLst/>
+          </a:prstGeom>
+        </p:spPr>
+      </p:pic>
+    </p:spTree>
+    <p:extLst>
+      <p:ext uri="{BB962C8B-B14F-4D97-AF65-F5344CB8AC3E}">
+        <p14:creationId xmlns:p14="http://schemas.microsoft.com/office/powerpoint/2010/main" val="3282302956"/>
+      </p:ext>
+    </p:extLst>
+  </p:cSld>
+  <p:clrMapOvr>
+    <a:masterClrMapping/>
+  </p:clrMapOvr>
+</p:sld>
+</file>
+
 <file path=ppt/theme/theme1.xml><?xml version="1.0" encoding="utf-8"?>
 <a:theme xmlns:a="http://schemas.openxmlformats.org/drawingml/2006/main" name="Office Theme">
   <a:themeElements>

</xml_diff>

<commit_message>
Update the patterns, associated images, and commit for safety. (#11)
</commit_message>
<xml_diff>
--- a/src/Stories/Story illustrations.pptx
+++ b/src/Stories/Story illustrations.pptx
@@ -7,6 +7,8 @@
   <p:sldIdLst>
     <p:sldId id="256" r:id="rId2"/>
     <p:sldId id="257" r:id="rId3"/>
+    <p:sldId id="259" r:id="rId4"/>
+    <p:sldId id="260" r:id="rId5"/>
   </p:sldIdLst>
   <p:sldSz cx="12192000" cy="6858000"/>
   <p:notesSz cx="6858000" cy="9144000"/>
@@ -117,6 +119,60 @@
 <p1510:revInfo xmlns:a="http://schemas.openxmlformats.org/drawingml/2006/main" xmlns:r="http://schemas.openxmlformats.org/officeDocument/2006/relationships" xmlns:p1510="http://schemas.microsoft.com/office/powerpoint/2015/10/main"/>
 </file>
 
+<file path=ppt/ink/ink1.xml><?xml version="1.0" encoding="utf-8"?>
+<inkml:ink xmlns:inkml="http://www.w3.org/2003/InkML">
+  <inkml:definitions>
+    <inkml:context xml:id="ctx0">
+      <inkml:inkSource xml:id="inkSrc0">
+        <inkml:traceFormat>
+          <inkml:channel name="X" type="integer" min="-2.14748E9" max="2.14748E9" units="cm"/>
+          <inkml:channel name="Y" type="integer" min="-2.14748E9" max="2.14748E9" units="cm"/>
+          <inkml:channel name="F" type="integer" max="32767" units="dev"/>
+        </inkml:traceFormat>
+        <inkml:channelProperties>
+          <inkml:channelProperty channel="X" name="resolution" value="1000" units="1/cm"/>
+          <inkml:channelProperty channel="Y" name="resolution" value="1000" units="1/cm"/>
+          <inkml:channelProperty channel="F" name="resolution" value="0" units="1/dev"/>
+        </inkml:channelProperties>
+      </inkml:inkSource>
+      <inkml:timestamp xml:id="ts0" timeString="2017-03-17T18:31:02.525"/>
+    </inkml:context>
+    <inkml:brush xml:id="br0">
+      <inkml:brushProperty name="width" value="0.025" units="cm"/>
+      <inkml:brushProperty name="height" value="0.025" units="cm"/>
+    </inkml:brush>
+  </inkml:definitions>
+  <inkml:trace contextRef="#ctx0" brushRef="#br0">4682 19399 1408,'13'-4'512,"-19"-2"-256,6-4-96,0 10 256,0-6-96,6 2 0,12-8-64,-6 8 0,0-8-64,0 1 32,-2 1 0,-4 0 32</inkml:trace>
+</inkml:ink>
+</file>
+
+<file path=ppt/ink/ink2.xml><?xml version="1.0" encoding="utf-8"?>
+<inkml:ink xmlns:inkml="http://www.w3.org/2003/InkML">
+  <inkml:definitions>
+    <inkml:context xml:id="ctx0">
+      <inkml:inkSource xml:id="inkSrc0">
+        <inkml:traceFormat>
+          <inkml:channel name="X" type="integer" min="-2.14748E9" max="2.14748E9" units="cm"/>
+          <inkml:channel name="Y" type="integer" min="-2.14748E9" max="2.14748E9" units="cm"/>
+          <inkml:channel name="F" type="integer" max="32767" units="dev"/>
+        </inkml:traceFormat>
+        <inkml:channelProperties>
+          <inkml:channelProperty channel="X" name="resolution" value="1000" units="1/cm"/>
+          <inkml:channelProperty channel="Y" name="resolution" value="1000" units="1/cm"/>
+          <inkml:channelProperty channel="F" name="resolution" value="0" units="1/dev"/>
+        </inkml:channelProperties>
+      </inkml:inkSource>
+      <inkml:timestamp xml:id="ts0" timeString="2017-03-17T18:31:13.532"/>
+    </inkml:context>
+    <inkml:brush xml:id="br0">
+      <inkml:brushProperty name="width" value="0.025" units="cm"/>
+      <inkml:brushProperty name="height" value="0.025" units="cm"/>
+    </inkml:brush>
+  </inkml:definitions>
+  <inkml:trace contextRef="#ctx0" brushRef="#br0">4502 19608 2176,'12'0'864,"-12"-21"-448,13 34-288,-13-13 256</inkml:trace>
+</inkml:ink>
+</file>
+
 <file path=ppt/slideLayouts/slideLayout1.xml><?xml version="1.0" encoding="utf-8"?>
 <p:sldLayout xmlns:a="http://schemas.openxmlformats.org/drawingml/2006/main" xmlns:r="http://schemas.openxmlformats.org/officeDocument/2006/relationships" xmlns:p="http://schemas.openxmlformats.org/presentationml/2006/main" type="titleOnly" preserve="1">
   <p:cSld name="Title Only">
@@ -191,7 +247,7 @@
           <a:p>
             <a:fld id="{91095A8E-9C53-4015-AAB0-2CFFE67F5AFD}" type="datetimeFigureOut">
               <a:rPr lang="en-CA" smtClean="0"/>
-              <a:t>2017-03-13</a:t>
+              <a:t>2017-03-18</a:t>
             </a:fld>
             <a:endParaRPr lang="en-CA"/>
           </a:p>
@@ -404,7 +460,7 @@
           <a:p>
             <a:fld id="{91095A8E-9C53-4015-AAB0-2CFFE67F5AFD}" type="datetimeFigureOut">
               <a:rPr lang="en-CA" smtClean="0"/>
-              <a:t>2017-03-13</a:t>
+              <a:t>2017-03-18</a:t>
             </a:fld>
             <a:endParaRPr lang="en-CA"/>
           </a:p>
@@ -3428,6 +3484,1331 @@
 </p:sld>
 </file>
 
+<file path=ppt/slides/slide3.xml><?xml version="1.0" encoding="utf-8"?>
+<p:sld xmlns:a="http://schemas.openxmlformats.org/drawingml/2006/main" xmlns:r="http://schemas.openxmlformats.org/officeDocument/2006/relationships" xmlns:p="http://schemas.openxmlformats.org/presentationml/2006/main">
+  <p:cSld>
+    <p:spTree>
+      <p:nvGrpSpPr>
+        <p:cNvPr id="1" name=""/>
+        <p:cNvGrpSpPr/>
+        <p:nvPr/>
+      </p:nvGrpSpPr>
+      <p:grpSpPr>
+        <a:xfrm>
+          <a:off x="0" y="0"/>
+          <a:ext cx="0" cy="0"/>
+          <a:chOff x="0" y="0"/>
+          <a:chExt cx="0" cy="0"/>
+        </a:xfrm>
+      </p:grpSpPr>
+      <p:cxnSp>
+        <p:nvCxnSpPr>
+          <p:cNvPr id="4" name="Straight Arrow Connector 3">
+            <a:extLst>
+              <a:ext uri="{FF2B5EF4-FFF2-40B4-BE49-F238E27FC236}">
+                <a16:creationId xmlns:a16="http://schemas.microsoft.com/office/drawing/2014/main" id="{40E64F3C-706F-4736-A9A3-71D00E9A82E1}"/>
+              </a:ext>
+            </a:extLst>
+          </p:cNvPr>
+          <p:cNvCxnSpPr>
+            <a:cxnSpLocks/>
+          </p:cNvCxnSpPr>
+          <p:nvPr/>
+        </p:nvCxnSpPr>
+        <p:spPr>
+          <a:xfrm flipV="1">
+            <a:off x="1437641" y="2299855"/>
+            <a:ext cx="0" cy="2714105"/>
+          </a:xfrm>
+          <a:prstGeom prst="straightConnector1">
+            <a:avLst/>
+          </a:prstGeom>
+          <a:ln w="57150">
+            <a:solidFill>
+              <a:schemeClr val="tx1"/>
+            </a:solidFill>
+            <a:tailEnd type="triangle" w="lg" len="sm"/>
+          </a:ln>
+        </p:spPr>
+        <p:style>
+          <a:lnRef idx="1">
+            <a:schemeClr val="accent1"/>
+          </a:lnRef>
+          <a:fillRef idx="0">
+            <a:schemeClr val="accent1"/>
+          </a:fillRef>
+          <a:effectRef idx="0">
+            <a:schemeClr val="accent1"/>
+          </a:effectRef>
+          <a:fontRef idx="minor">
+            <a:schemeClr val="tx1"/>
+          </a:fontRef>
+        </p:style>
+      </p:cxnSp>
+      <p:cxnSp>
+        <p:nvCxnSpPr>
+          <p:cNvPr id="7" name="Straight Arrow Connector 6">
+            <a:extLst>
+              <a:ext uri="{FF2B5EF4-FFF2-40B4-BE49-F238E27FC236}">
+                <a16:creationId xmlns:a16="http://schemas.microsoft.com/office/drawing/2014/main" id="{2734D75D-69A6-4EFC-B284-2D7F05394558}"/>
+              </a:ext>
+            </a:extLst>
+          </p:cNvPr>
+          <p:cNvCxnSpPr>
+            <a:cxnSpLocks/>
+          </p:cNvCxnSpPr>
+          <p:nvPr/>
+        </p:nvCxnSpPr>
+        <p:spPr>
+          <a:xfrm>
+            <a:off x="1437641" y="5013960"/>
+            <a:ext cx="6521795" cy="0"/>
+          </a:xfrm>
+          <a:prstGeom prst="straightConnector1">
+            <a:avLst/>
+          </a:prstGeom>
+          <a:ln w="57150">
+            <a:solidFill>
+              <a:schemeClr val="tx1"/>
+            </a:solidFill>
+            <a:tailEnd type="triangle" w="lg" len="sm"/>
+          </a:ln>
+        </p:spPr>
+        <p:style>
+          <a:lnRef idx="1">
+            <a:schemeClr val="accent1"/>
+          </a:lnRef>
+          <a:fillRef idx="0">
+            <a:schemeClr val="accent1"/>
+          </a:fillRef>
+          <a:effectRef idx="0">
+            <a:schemeClr val="accent1"/>
+          </a:effectRef>
+          <a:fontRef idx="minor">
+            <a:schemeClr val="tx1"/>
+          </a:fontRef>
+        </p:style>
+      </p:cxnSp>
+      <p:sp>
+        <p:nvSpPr>
+          <p:cNvPr id="10" name="TextBox 9">
+            <a:extLst>
+              <a:ext uri="{FF2B5EF4-FFF2-40B4-BE49-F238E27FC236}">
+                <a16:creationId xmlns:a16="http://schemas.microsoft.com/office/drawing/2014/main" id="{A173A2DC-7A17-4ED1-A351-353F52D8542C}"/>
+              </a:ext>
+            </a:extLst>
+          </p:cNvPr>
+          <p:cNvSpPr txBox="1"/>
+          <p:nvPr/>
+        </p:nvSpPr>
+        <p:spPr>
+          <a:xfrm>
+            <a:off x="7959436" y="4702233"/>
+            <a:ext cx="851515" cy="523220"/>
+          </a:xfrm>
+          <a:prstGeom prst="rect">
+            <a:avLst/>
+          </a:prstGeom>
+          <a:noFill/>
+        </p:spPr>
+        <p:txBody>
+          <a:bodyPr wrap="none" rtlCol="0">
+            <a:spAutoFit/>
+          </a:bodyPr>
+          <a:lstStyle/>
+          <a:p>
+            <a:r>
+              <a:rPr lang="en-US" sz="2800" dirty="0">
+                <a:latin typeface="Segoe UI Light" panose="020B0502040204020203" pitchFamily="34" charset="0"/>
+                <a:cs typeface="Segoe UI Light" panose="020B0502040204020203" pitchFamily="34" charset="0"/>
+              </a:rPr>
+              <a:t>time</a:t>
+            </a:r>
+            <a:endParaRPr lang="en-CA" sz="2800" dirty="0">
+              <a:latin typeface="Segoe UI Light" panose="020B0502040204020203" pitchFamily="34" charset="0"/>
+              <a:cs typeface="Segoe UI Light" panose="020B0502040204020203" pitchFamily="34" charset="0"/>
+            </a:endParaRPr>
+          </a:p>
+        </p:txBody>
+      </p:sp>
+      <p:sp>
+        <p:nvSpPr>
+          <p:cNvPr id="14" name="TextBox 13">
+            <a:extLst>
+              <a:ext uri="{FF2B5EF4-FFF2-40B4-BE49-F238E27FC236}">
+                <a16:creationId xmlns:a16="http://schemas.microsoft.com/office/drawing/2014/main" id="{413255A3-9E5D-4CD0-8190-12928763C57B}"/>
+              </a:ext>
+            </a:extLst>
+          </p:cNvPr>
+          <p:cNvSpPr txBox="1"/>
+          <p:nvPr/>
+        </p:nvSpPr>
+        <p:spPr>
+          <a:xfrm>
+            <a:off x="1253134" y="4702233"/>
+            <a:ext cx="369012" cy="523220"/>
+          </a:xfrm>
+          <a:prstGeom prst="rect">
+            <a:avLst/>
+          </a:prstGeom>
+          <a:solidFill>
+            <a:schemeClr val="bg1"/>
+          </a:solidFill>
+        </p:spPr>
+        <p:txBody>
+          <a:bodyPr wrap="none" rtlCol="0">
+            <a:spAutoFit/>
+          </a:bodyPr>
+          <a:lstStyle/>
+          <a:p>
+            <a:r>
+              <a:rPr lang="en-US" sz="2800" dirty="0">
+                <a:latin typeface="Segoe UI Light" panose="020B0502040204020203" pitchFamily="34" charset="0"/>
+                <a:cs typeface="Segoe UI Light" panose="020B0502040204020203" pitchFamily="34" charset="0"/>
+              </a:rPr>
+              <a:t>0</a:t>
+            </a:r>
+            <a:endParaRPr lang="en-CA" sz="2800" dirty="0">
+              <a:latin typeface="Segoe UI Light" panose="020B0502040204020203" pitchFamily="34" charset="0"/>
+              <a:cs typeface="Segoe UI Light" panose="020B0502040204020203" pitchFamily="34" charset="0"/>
+            </a:endParaRPr>
+          </a:p>
+        </p:txBody>
+      </p:sp>
+      <p:sp>
+        <p:nvSpPr>
+          <p:cNvPr id="16" name="Title 15">
+            <a:extLst>
+              <a:ext uri="{FF2B5EF4-FFF2-40B4-BE49-F238E27FC236}">
+                <a16:creationId xmlns:a16="http://schemas.microsoft.com/office/drawing/2014/main" id="{5EDA51C9-0511-418D-814A-897F390E9B3E}"/>
+              </a:ext>
+            </a:extLst>
+          </p:cNvPr>
+          <p:cNvSpPr txBox="1">
+            <a:spLocks noGrp="1"/>
+          </p:cNvSpPr>
+          <p:nvPr>
+            <p:ph type="title"/>
+          </p:nvPr>
+        </p:nvSpPr>
+        <p:spPr>
+          <a:xfrm>
+            <a:off x="0" y="39335"/>
+            <a:ext cx="4109651" cy="480131"/>
+          </a:xfrm>
+          <a:prstGeom prst="rect">
+            <a:avLst/>
+          </a:prstGeom>
+          <a:noFill/>
+        </p:spPr>
+        <p:txBody>
+          <a:bodyPr wrap="none" rtlCol="0">
+            <a:spAutoFit/>
+          </a:bodyPr>
+          <a:lstStyle/>
+          <a:p>
+            <a:r>
+              <a:rPr lang="en-US" sz="2800" dirty="0">
+                <a:latin typeface="Segoe UI Light" panose="020B0502040204020203" pitchFamily="34" charset="0"/>
+                <a:cs typeface="Segoe UI Light" panose="020B0502040204020203" pitchFamily="34" charset="0"/>
+              </a:rPr>
+              <a:t>From 0 to isolated success</a:t>
+            </a:r>
+            <a:endParaRPr lang="en-CA" sz="2800" dirty="0">
+              <a:latin typeface="Segoe UI Light" panose="020B0502040204020203" pitchFamily="34" charset="0"/>
+              <a:cs typeface="Segoe UI Light" panose="020B0502040204020203" pitchFamily="34" charset="0"/>
+            </a:endParaRPr>
+          </a:p>
+        </p:txBody>
+      </p:sp>
+      <p:sp>
+        <p:nvSpPr>
+          <p:cNvPr id="17" name="Rectangle 16">
+            <a:extLst>
+              <a:ext uri="{FF2B5EF4-FFF2-40B4-BE49-F238E27FC236}">
+                <a16:creationId xmlns:a16="http://schemas.microsoft.com/office/drawing/2014/main" id="{6050CCD8-D134-49FD-B611-E31EE2ECADD3}"/>
+              </a:ext>
+            </a:extLst>
+          </p:cNvPr>
+          <p:cNvSpPr/>
+          <p:nvPr/>
+        </p:nvSpPr>
+        <p:spPr>
+          <a:xfrm>
+            <a:off x="1445601" y="5331923"/>
+            <a:ext cx="187036" cy="210690"/>
+          </a:xfrm>
+          <a:prstGeom prst="rect">
+            <a:avLst/>
+          </a:prstGeom>
+          <a:ln>
+            <a:noFill/>
+          </a:ln>
+        </p:spPr>
+        <p:style>
+          <a:lnRef idx="2">
+            <a:schemeClr val="accent1">
+              <a:shade val="50000"/>
+            </a:schemeClr>
+          </a:lnRef>
+          <a:fillRef idx="1">
+            <a:schemeClr val="accent1"/>
+          </a:fillRef>
+          <a:effectRef idx="0">
+            <a:schemeClr val="accent1"/>
+          </a:effectRef>
+          <a:fontRef idx="minor">
+            <a:schemeClr val="lt1"/>
+          </a:fontRef>
+        </p:style>
+        <p:txBody>
+          <a:bodyPr rtlCol="0" anchor="ctr"/>
+          <a:lstStyle/>
+          <a:p>
+            <a:pPr algn="ctr"/>
+            <a:endParaRPr lang="en-CA"/>
+          </a:p>
+        </p:txBody>
+      </p:sp>
+      <p:sp>
+        <p:nvSpPr>
+          <p:cNvPr id="18" name="TextBox 17">
+            <a:extLst>
+              <a:ext uri="{FF2B5EF4-FFF2-40B4-BE49-F238E27FC236}">
+                <a16:creationId xmlns:a16="http://schemas.microsoft.com/office/drawing/2014/main" id="{5483DD0E-5991-4506-8D2C-734A73AE331D}"/>
+              </a:ext>
+            </a:extLst>
+          </p:cNvPr>
+          <p:cNvSpPr txBox="1"/>
+          <p:nvPr/>
+        </p:nvSpPr>
+        <p:spPr>
+          <a:xfrm>
+            <a:off x="1632637" y="5175658"/>
+            <a:ext cx="2479397" cy="523220"/>
+          </a:xfrm>
+          <a:prstGeom prst="rect">
+            <a:avLst/>
+          </a:prstGeom>
+          <a:noFill/>
+        </p:spPr>
+        <p:txBody>
+          <a:bodyPr wrap="none" rtlCol="0">
+            <a:spAutoFit/>
+          </a:bodyPr>
+          <a:lstStyle/>
+          <a:p>
+            <a:r>
+              <a:rPr lang="en-US" sz="2800" dirty="0">
+                <a:solidFill>
+                  <a:srgbClr val="0070C0"/>
+                </a:solidFill>
+                <a:latin typeface="Segoe UI Light" panose="020B0502040204020203" pitchFamily="34" charset="0"/>
+                <a:cs typeface="Segoe UI Light" panose="020B0502040204020203" pitchFamily="34" charset="0"/>
+              </a:rPr>
+              <a:t>delivered value</a:t>
+            </a:r>
+            <a:endParaRPr lang="en-CA" sz="2800" dirty="0">
+              <a:solidFill>
+                <a:srgbClr val="0070C0"/>
+              </a:solidFill>
+              <a:latin typeface="Segoe UI Light" panose="020B0502040204020203" pitchFamily="34" charset="0"/>
+              <a:cs typeface="Segoe UI Light" panose="020B0502040204020203" pitchFamily="34" charset="0"/>
+            </a:endParaRPr>
+          </a:p>
+        </p:txBody>
+      </p:sp>
+      <p:sp>
+        <p:nvSpPr>
+          <p:cNvPr id="19" name="Rectangle 18">
+            <a:extLst>
+              <a:ext uri="{FF2B5EF4-FFF2-40B4-BE49-F238E27FC236}">
+                <a16:creationId xmlns:a16="http://schemas.microsoft.com/office/drawing/2014/main" id="{2B998011-CEA6-4317-BB59-6B9FF698E46A}"/>
+              </a:ext>
+            </a:extLst>
+          </p:cNvPr>
+          <p:cNvSpPr/>
+          <p:nvPr/>
+        </p:nvSpPr>
+        <p:spPr>
+          <a:xfrm>
+            <a:off x="4248811" y="5331923"/>
+            <a:ext cx="187036" cy="210690"/>
+          </a:xfrm>
+          <a:prstGeom prst="rect">
+            <a:avLst/>
+          </a:prstGeom>
+          <a:solidFill>
+            <a:srgbClr val="C00000"/>
+          </a:solidFill>
+          <a:ln>
+            <a:noFill/>
+          </a:ln>
+        </p:spPr>
+        <p:style>
+          <a:lnRef idx="2">
+            <a:schemeClr val="accent1">
+              <a:shade val="50000"/>
+            </a:schemeClr>
+          </a:lnRef>
+          <a:fillRef idx="1">
+            <a:schemeClr val="accent1"/>
+          </a:fillRef>
+          <a:effectRef idx="0">
+            <a:schemeClr val="accent1"/>
+          </a:effectRef>
+          <a:fontRef idx="minor">
+            <a:schemeClr val="lt1"/>
+          </a:fontRef>
+        </p:style>
+        <p:txBody>
+          <a:bodyPr rtlCol="0" anchor="ctr"/>
+          <a:lstStyle/>
+          <a:p>
+            <a:pPr algn="ctr"/>
+            <a:endParaRPr lang="en-CA"/>
+          </a:p>
+        </p:txBody>
+      </p:sp>
+      <p:sp>
+        <p:nvSpPr>
+          <p:cNvPr id="20" name="TextBox 19">
+            <a:extLst>
+              <a:ext uri="{FF2B5EF4-FFF2-40B4-BE49-F238E27FC236}">
+                <a16:creationId xmlns:a16="http://schemas.microsoft.com/office/drawing/2014/main" id="{EB16F4D1-DD5E-4D7E-8C92-0C8D857C0DB0}"/>
+              </a:ext>
+            </a:extLst>
+          </p:cNvPr>
+          <p:cNvSpPr txBox="1"/>
+          <p:nvPr/>
+        </p:nvSpPr>
+        <p:spPr>
+          <a:xfrm>
+            <a:off x="4435847" y="5175658"/>
+            <a:ext cx="1008353" cy="523220"/>
+          </a:xfrm>
+          <a:prstGeom prst="rect">
+            <a:avLst/>
+          </a:prstGeom>
+          <a:noFill/>
+        </p:spPr>
+        <p:txBody>
+          <a:bodyPr wrap="none" rtlCol="0">
+            <a:spAutoFit/>
+          </a:bodyPr>
+          <a:lstStyle/>
+          <a:p>
+            <a:r>
+              <a:rPr lang="en-US" sz="2800" dirty="0">
+                <a:solidFill>
+                  <a:srgbClr val="C00000"/>
+                </a:solidFill>
+                <a:latin typeface="Segoe UI Light" panose="020B0502040204020203" pitchFamily="34" charset="0"/>
+                <a:cs typeface="Segoe UI Light" panose="020B0502040204020203" pitchFamily="34" charset="0"/>
+              </a:rPr>
+              <a:t>effort</a:t>
+            </a:r>
+            <a:endParaRPr lang="en-CA" sz="2800" dirty="0">
+              <a:solidFill>
+                <a:srgbClr val="C00000"/>
+              </a:solidFill>
+              <a:latin typeface="Segoe UI Light" panose="020B0502040204020203" pitchFamily="34" charset="0"/>
+              <a:cs typeface="Segoe UI Light" panose="020B0502040204020203" pitchFamily="34" charset="0"/>
+            </a:endParaRPr>
+          </a:p>
+        </p:txBody>
+      </p:sp>
+      <p:sp>
+        <p:nvSpPr>
+          <p:cNvPr id="21" name="Rectangle 20">
+            <a:extLst>
+              <a:ext uri="{FF2B5EF4-FFF2-40B4-BE49-F238E27FC236}">
+                <a16:creationId xmlns:a16="http://schemas.microsoft.com/office/drawing/2014/main" id="{F250CBAA-050D-436A-BBDF-89C1B16C0266}"/>
+              </a:ext>
+            </a:extLst>
+          </p:cNvPr>
+          <p:cNvSpPr/>
+          <p:nvPr/>
+        </p:nvSpPr>
+        <p:spPr>
+          <a:xfrm>
+            <a:off x="5755694" y="5331923"/>
+            <a:ext cx="187036" cy="210690"/>
+          </a:xfrm>
+          <a:prstGeom prst="rect">
+            <a:avLst/>
+          </a:prstGeom>
+          <a:solidFill>
+            <a:srgbClr val="00B050"/>
+          </a:solidFill>
+          <a:ln>
+            <a:noFill/>
+          </a:ln>
+        </p:spPr>
+        <p:style>
+          <a:lnRef idx="2">
+            <a:schemeClr val="accent1">
+              <a:shade val="50000"/>
+            </a:schemeClr>
+          </a:lnRef>
+          <a:fillRef idx="1">
+            <a:schemeClr val="accent1"/>
+          </a:fillRef>
+          <a:effectRef idx="0">
+            <a:schemeClr val="accent1"/>
+          </a:effectRef>
+          <a:fontRef idx="minor">
+            <a:schemeClr val="lt1"/>
+          </a:fontRef>
+        </p:style>
+        <p:txBody>
+          <a:bodyPr rtlCol="0" anchor="ctr"/>
+          <a:lstStyle/>
+          <a:p>
+            <a:pPr algn="ctr"/>
+            <a:endParaRPr lang="en-CA"/>
+          </a:p>
+        </p:txBody>
+      </p:sp>
+      <p:sp>
+        <p:nvSpPr>
+          <p:cNvPr id="22" name="TextBox 21">
+            <a:extLst>
+              <a:ext uri="{FF2B5EF4-FFF2-40B4-BE49-F238E27FC236}">
+                <a16:creationId xmlns:a16="http://schemas.microsoft.com/office/drawing/2014/main" id="{43F53E4A-5F2F-466B-AA25-887CD24126AA}"/>
+              </a:ext>
+            </a:extLst>
+          </p:cNvPr>
+          <p:cNvSpPr txBox="1"/>
+          <p:nvPr/>
+        </p:nvSpPr>
+        <p:spPr>
+          <a:xfrm>
+            <a:off x="5942730" y="5175658"/>
+            <a:ext cx="1309974" cy="523220"/>
+          </a:xfrm>
+          <a:prstGeom prst="rect">
+            <a:avLst/>
+          </a:prstGeom>
+          <a:noFill/>
+        </p:spPr>
+        <p:txBody>
+          <a:bodyPr wrap="none" rtlCol="0">
+            <a:spAutoFit/>
+          </a:bodyPr>
+          <a:lstStyle/>
+          <a:p>
+            <a:r>
+              <a:rPr lang="en-US" sz="2800" dirty="0">
+                <a:solidFill>
+                  <a:srgbClr val="00B050"/>
+                </a:solidFill>
+                <a:latin typeface="Segoe UI Light" panose="020B0502040204020203" pitchFamily="34" charset="0"/>
+                <a:cs typeface="Segoe UI Light" panose="020B0502040204020203" pitchFamily="34" charset="0"/>
+              </a:rPr>
+              <a:t>passion</a:t>
+            </a:r>
+            <a:endParaRPr lang="en-CA" sz="2800" dirty="0">
+              <a:solidFill>
+                <a:srgbClr val="00B050"/>
+              </a:solidFill>
+              <a:latin typeface="Segoe UI Light" panose="020B0502040204020203" pitchFamily="34" charset="0"/>
+              <a:cs typeface="Segoe UI Light" panose="020B0502040204020203" pitchFamily="34" charset="0"/>
+            </a:endParaRPr>
+          </a:p>
+        </p:txBody>
+      </p:sp>
+      <p:cxnSp>
+        <p:nvCxnSpPr>
+          <p:cNvPr id="24" name="Straight Connector 23">
+            <a:extLst>
+              <a:ext uri="{FF2B5EF4-FFF2-40B4-BE49-F238E27FC236}">
+                <a16:creationId xmlns:a16="http://schemas.microsoft.com/office/drawing/2014/main" id="{48BDA403-A455-45CB-8490-2D3D1589E62A}"/>
+              </a:ext>
+            </a:extLst>
+          </p:cNvPr>
+          <p:cNvCxnSpPr>
+            <a:cxnSpLocks/>
+          </p:cNvCxnSpPr>
+          <p:nvPr/>
+        </p:nvCxnSpPr>
+        <p:spPr>
+          <a:xfrm>
+            <a:off x="1732199" y="5698878"/>
+            <a:ext cx="2188637" cy="0"/>
+          </a:xfrm>
+          <a:prstGeom prst="line">
+            <a:avLst/>
+          </a:prstGeom>
+        </p:spPr>
+        <p:style>
+          <a:lnRef idx="1">
+            <a:schemeClr val="accent1"/>
+          </a:lnRef>
+          <a:fillRef idx="0">
+            <a:schemeClr val="accent1"/>
+          </a:fillRef>
+          <a:effectRef idx="0">
+            <a:schemeClr val="accent1"/>
+          </a:effectRef>
+          <a:fontRef idx="minor">
+            <a:schemeClr val="tx1"/>
+          </a:fontRef>
+        </p:style>
+      </p:cxnSp>
+      <p:cxnSp>
+        <p:nvCxnSpPr>
+          <p:cNvPr id="26" name="Straight Connector 25">
+            <a:extLst>
+              <a:ext uri="{FF2B5EF4-FFF2-40B4-BE49-F238E27FC236}">
+                <a16:creationId xmlns:a16="http://schemas.microsoft.com/office/drawing/2014/main" id="{631D13AB-90AD-4836-B8D0-D6A2301845CB}"/>
+              </a:ext>
+            </a:extLst>
+          </p:cNvPr>
+          <p:cNvCxnSpPr>
+            <a:cxnSpLocks/>
+          </p:cNvCxnSpPr>
+          <p:nvPr/>
+        </p:nvCxnSpPr>
+        <p:spPr>
+          <a:xfrm>
+            <a:off x="4516963" y="5698878"/>
+            <a:ext cx="823964" cy="0"/>
+          </a:xfrm>
+          <a:prstGeom prst="line">
+            <a:avLst/>
+          </a:prstGeom>
+          <a:ln>
+            <a:solidFill>
+              <a:srgbClr val="C00000"/>
+            </a:solidFill>
+            <a:prstDash val="dash"/>
+          </a:ln>
+        </p:spPr>
+        <p:style>
+          <a:lnRef idx="1">
+            <a:schemeClr val="accent1"/>
+          </a:lnRef>
+          <a:fillRef idx="0">
+            <a:schemeClr val="accent1"/>
+          </a:fillRef>
+          <a:effectRef idx="0">
+            <a:schemeClr val="accent1"/>
+          </a:effectRef>
+          <a:fontRef idx="minor">
+            <a:schemeClr val="tx1"/>
+          </a:fontRef>
+        </p:style>
+      </p:cxnSp>
+      <p:cxnSp>
+        <p:nvCxnSpPr>
+          <p:cNvPr id="28" name="Straight Connector 27">
+            <a:extLst>
+              <a:ext uri="{FF2B5EF4-FFF2-40B4-BE49-F238E27FC236}">
+                <a16:creationId xmlns:a16="http://schemas.microsoft.com/office/drawing/2014/main" id="{33C8B239-EE74-4901-AE8D-4AC9ECD34B14}"/>
+              </a:ext>
+            </a:extLst>
+          </p:cNvPr>
+          <p:cNvCxnSpPr>
+            <a:cxnSpLocks/>
+          </p:cNvCxnSpPr>
+          <p:nvPr/>
+        </p:nvCxnSpPr>
+        <p:spPr>
+          <a:xfrm>
+            <a:off x="6054817" y="5698878"/>
+            <a:ext cx="1107983" cy="0"/>
+          </a:xfrm>
+          <a:prstGeom prst="line">
+            <a:avLst/>
+          </a:prstGeom>
+          <a:ln cmpd="dbl">
+            <a:solidFill>
+              <a:srgbClr val="00B050"/>
+            </a:solidFill>
+            <a:prstDash val="lgDashDotDot"/>
+          </a:ln>
+        </p:spPr>
+        <p:style>
+          <a:lnRef idx="1">
+            <a:schemeClr val="accent1"/>
+          </a:lnRef>
+          <a:fillRef idx="0">
+            <a:schemeClr val="accent1"/>
+          </a:fillRef>
+          <a:effectRef idx="0">
+            <a:schemeClr val="accent1"/>
+          </a:effectRef>
+          <a:fontRef idx="minor">
+            <a:schemeClr val="tx1"/>
+          </a:fontRef>
+        </p:style>
+      </p:cxnSp>
+      <mc:AlternateContent xmlns:mc="http://schemas.openxmlformats.org/markup-compatibility/2006" xmlns:p14="http://schemas.microsoft.com/office/powerpoint/2010/main">
+        <mc:Choice Requires="p14">
+          <p:contentPart p14:bwMode="auto" r:id="rId2">
+            <p14:nvContentPartPr>
+              <p14:cNvPr id="31" name="Ink 30">
+                <a:extLst>
+                  <a:ext uri="{FF2B5EF4-FFF2-40B4-BE49-F238E27FC236}">
+                    <a16:creationId xmlns:a16="http://schemas.microsoft.com/office/drawing/2014/main" id="{ADAAC442-9FBC-4CEA-93B4-E7854CEF88BC}"/>
+                  </a:ext>
+                </a:extLst>
+              </p14:cNvPr>
+              <p14:cNvContentPartPr/>
+              <p14:nvPr/>
+            </p14:nvContentPartPr>
+            <p14:xfrm>
+              <a:off x="1505411" y="4831675"/>
+              <a:ext cx="30060" cy="32220"/>
+            </p14:xfrm>
+          </p:contentPart>
+        </mc:Choice>
+        <mc:Fallback xmlns="">
+          <p:pic>
+            <p:nvPicPr>
+              <p:cNvPr id="31" name="Ink 30">
+                <a:extLst>
+                  <a:ext uri="{FF2B5EF4-FFF2-40B4-BE49-F238E27FC236}">
+                    <a16:creationId xmlns:a16="http://schemas.microsoft.com/office/drawing/2014/main" id="{ADAAC442-9FBC-4CEA-93B4-E7854CEF88BC}"/>
+                  </a:ext>
+                </a:extLst>
+              </p:cNvPr>
+              <p:cNvPicPr/>
+              <p:nvPr/>
+            </p:nvPicPr>
+            <p:blipFill>
+              <a:blip r:embed="rId3"/>
+              <a:stretch>
+                <a:fillRect/>
+              </a:stretch>
+            </p:blipFill>
+            <p:spPr>
+              <a:xfrm>
+                <a:off x="1501117" y="4827379"/>
+                <a:ext cx="38649" cy="40812"/>
+              </a:xfrm>
+              <a:prstGeom prst="rect">
+                <a:avLst/>
+              </a:prstGeom>
+            </p:spPr>
+          </p:pic>
+        </mc:Fallback>
+      </mc:AlternateContent>
+      <mc:AlternateContent xmlns:mc="http://schemas.openxmlformats.org/markup-compatibility/2006" xmlns:p14="http://schemas.microsoft.com/office/powerpoint/2010/main">
+        <mc:Choice Requires="p14">
+          <p:contentPart p14:bwMode="auto" r:id="rId4">
+            <p14:nvContentPartPr>
+              <p14:cNvPr id="52" name="Ink 51">
+                <a:extLst>
+                  <a:ext uri="{FF2B5EF4-FFF2-40B4-BE49-F238E27FC236}">
+                    <a16:creationId xmlns:a16="http://schemas.microsoft.com/office/drawing/2014/main" id="{0B47966B-C0A8-4F45-8CB7-4240E6D04B08}"/>
+                  </a:ext>
+                </a:extLst>
+              </p14:cNvPr>
+              <p14:cNvContentPartPr/>
+              <p14:nvPr/>
+            </p14:nvContentPartPr>
+            <p14:xfrm>
+              <a:off x="1440611" y="4931395"/>
+              <a:ext cx="4500" cy="3780"/>
+            </p14:xfrm>
+          </p:contentPart>
+        </mc:Choice>
+        <mc:Fallback xmlns="">
+          <p:pic>
+            <p:nvPicPr>
+              <p:cNvPr id="52" name="Ink 51">
+                <a:extLst>
+                  <a:ext uri="{FF2B5EF4-FFF2-40B4-BE49-F238E27FC236}">
+                    <a16:creationId xmlns:a16="http://schemas.microsoft.com/office/drawing/2014/main" id="{0B47966B-C0A8-4F45-8CB7-4240E6D04B08}"/>
+                  </a:ext>
+                </a:extLst>
+              </p:cNvPr>
+              <p:cNvPicPr/>
+              <p:nvPr/>
+            </p:nvPicPr>
+            <p:blipFill>
+              <a:blip r:embed="rId5"/>
+              <a:stretch>
+                <a:fillRect/>
+              </a:stretch>
+            </p:blipFill>
+            <p:spPr>
+              <a:xfrm>
+                <a:off x="1438534" y="4929333"/>
+                <a:ext cx="8654" cy="7904"/>
+              </a:xfrm>
+              <a:prstGeom prst="rect">
+                <a:avLst/>
+              </a:prstGeom>
+            </p:spPr>
+          </p:pic>
+        </mc:Fallback>
+      </mc:AlternateContent>
+    </p:spTree>
+    <p:extLst>
+      <p:ext uri="{BB962C8B-B14F-4D97-AF65-F5344CB8AC3E}">
+        <p14:creationId xmlns:p14="http://schemas.microsoft.com/office/powerpoint/2010/main" val="490561077"/>
+      </p:ext>
+    </p:extLst>
+  </p:cSld>
+  <p:clrMapOvr>
+    <a:masterClrMapping/>
+  </p:clrMapOvr>
+</p:sld>
+</file>
+
+<file path=ppt/slides/slide4.xml><?xml version="1.0" encoding="utf-8"?>
+<p:sld xmlns:a="http://schemas.openxmlformats.org/drawingml/2006/main" xmlns:r="http://schemas.openxmlformats.org/officeDocument/2006/relationships" xmlns:p="http://schemas.openxmlformats.org/presentationml/2006/main">
+  <p:cSld>
+    <p:spTree>
+      <p:nvGrpSpPr>
+        <p:cNvPr id="1" name=""/>
+        <p:cNvGrpSpPr/>
+        <p:nvPr/>
+      </p:nvGrpSpPr>
+      <p:grpSpPr>
+        <a:xfrm>
+          <a:off x="0" y="0"/>
+          <a:ext cx="0" cy="0"/>
+          <a:chOff x="0" y="0"/>
+          <a:chExt cx="0" cy="0"/>
+        </a:xfrm>
+      </p:grpSpPr>
+      <p:pic>
+        <p:nvPicPr>
+          <p:cNvPr id="18" name="Graphic 17" descr="Solar system">
+            <a:extLst>
+              <a:ext uri="{FF2B5EF4-FFF2-40B4-BE49-F238E27FC236}">
+                <a16:creationId xmlns:a16="http://schemas.microsoft.com/office/drawing/2014/main" id="{C9145FF3-6D6A-4D78-8E07-149569340FD5}"/>
+              </a:ext>
+            </a:extLst>
+          </p:cNvPr>
+          <p:cNvPicPr>
+            <a:picLocks noChangeAspect="1"/>
+          </p:cNvPicPr>
+          <p:nvPr/>
+        </p:nvPicPr>
+        <p:blipFill>
+          <a:blip r:embed="rId2">
+            <a:extLst>
+              <a:ext uri="{28A0092B-C50C-407E-A947-70E740481C1C}">
+                <a14:useLocalDpi xmlns:a14="http://schemas.microsoft.com/office/drawing/2010/main" val="0"/>
+              </a:ext>
+              <a:ext uri="{96DAC541-7B7A-43D3-8B79-37D633B846F1}">
+                <asvg:svgBlip xmlns:asvg="http://schemas.microsoft.com/office/drawing/2016/SVG/main" r:embed="rId3"/>
+              </a:ext>
+            </a:extLst>
+          </a:blip>
+          <a:stretch>
+            <a:fillRect/>
+          </a:stretch>
+        </p:blipFill>
+        <p:spPr>
+          <a:xfrm>
+            <a:off x="1720639" y="3237160"/>
+            <a:ext cx="1610161" cy="1610161"/>
+          </a:xfrm>
+          <a:prstGeom prst="rect">
+            <a:avLst/>
+          </a:prstGeom>
+        </p:spPr>
+      </p:pic>
+      <p:sp>
+        <p:nvSpPr>
+          <p:cNvPr id="2" name="Title 1">
+            <a:extLst>
+              <a:ext uri="{FF2B5EF4-FFF2-40B4-BE49-F238E27FC236}">
+                <a16:creationId xmlns:a16="http://schemas.microsoft.com/office/drawing/2014/main" id="{8441AE34-CFD4-4F9B-A8E6-96B2575548EE}"/>
+              </a:ext>
+            </a:extLst>
+          </p:cNvPr>
+          <p:cNvSpPr>
+            <a:spLocks noGrp="1"/>
+          </p:cNvSpPr>
+          <p:nvPr>
+            <p:ph type="title"/>
+          </p:nvPr>
+        </p:nvSpPr>
+        <p:spPr/>
+        <p:txBody>
+          <a:bodyPr/>
+          <a:lstStyle/>
+          <a:p>
+            <a:r>
+              <a:rPr lang="en-US"/>
+              <a:t>P</a:t>
+            </a:r>
+            <a:endParaRPr lang="en-CA"/>
+          </a:p>
+        </p:txBody>
+      </p:sp>
+      <p:pic>
+        <p:nvPicPr>
+          <p:cNvPr id="4" name="Graphic 3" descr="Crawl">
+            <a:extLst>
+              <a:ext uri="{FF2B5EF4-FFF2-40B4-BE49-F238E27FC236}">
+                <a16:creationId xmlns:a16="http://schemas.microsoft.com/office/drawing/2014/main" id="{00EFF889-ED4C-4FB5-ADB9-75CE7E14504C}"/>
+              </a:ext>
+            </a:extLst>
+          </p:cNvPr>
+          <p:cNvPicPr>
+            <a:picLocks noChangeAspect="1"/>
+          </p:cNvPicPr>
+          <p:nvPr/>
+        </p:nvPicPr>
+        <p:blipFill>
+          <a:blip r:embed="rId4">
+            <a:extLst>
+              <a:ext uri="{28A0092B-C50C-407E-A947-70E740481C1C}">
+                <a14:useLocalDpi xmlns:a14="http://schemas.microsoft.com/office/drawing/2010/main" val="0"/>
+              </a:ext>
+              <a:ext uri="{96DAC541-7B7A-43D3-8B79-37D633B846F1}">
+                <asvg:svgBlip xmlns:asvg="http://schemas.microsoft.com/office/drawing/2016/SVG/main" r:embed="rId5"/>
+              </a:ext>
+            </a:extLst>
+          </a:blip>
+          <a:stretch>
+            <a:fillRect/>
+          </a:stretch>
+        </p:blipFill>
+        <p:spPr>
+          <a:xfrm>
+            <a:off x="7736840" y="746232"/>
+            <a:ext cx="1219200" cy="1219200"/>
+          </a:xfrm>
+          <a:prstGeom prst="rect">
+            <a:avLst/>
+          </a:prstGeom>
+        </p:spPr>
+      </p:pic>
+      <p:pic>
+        <p:nvPicPr>
+          <p:cNvPr id="6" name="Graphic 5" descr="Turtle">
+            <a:extLst>
+              <a:ext uri="{FF2B5EF4-FFF2-40B4-BE49-F238E27FC236}">
+                <a16:creationId xmlns:a16="http://schemas.microsoft.com/office/drawing/2014/main" id="{F0F80CE1-3903-498C-B101-B463F26D5A52}"/>
+              </a:ext>
+            </a:extLst>
+          </p:cNvPr>
+          <p:cNvPicPr>
+            <a:picLocks noChangeAspect="1"/>
+          </p:cNvPicPr>
+          <p:nvPr/>
+        </p:nvPicPr>
+        <p:blipFill>
+          <a:blip r:embed="rId6">
+            <a:extLst>
+              <a:ext uri="{28A0092B-C50C-407E-A947-70E740481C1C}">
+                <a14:useLocalDpi xmlns:a14="http://schemas.microsoft.com/office/drawing/2010/main" val="0"/>
+              </a:ext>
+              <a:ext uri="{96DAC541-7B7A-43D3-8B79-37D633B846F1}">
+                <asvg:svgBlip xmlns:asvg="http://schemas.microsoft.com/office/drawing/2016/SVG/main" r:embed="rId7"/>
+              </a:ext>
+            </a:extLst>
+          </a:blip>
+          <a:stretch>
+            <a:fillRect/>
+          </a:stretch>
+        </p:blipFill>
+        <p:spPr>
+          <a:xfrm>
+            <a:off x="8247800" y="3331420"/>
+            <a:ext cx="1363560" cy="1363560"/>
+          </a:xfrm>
+          <a:prstGeom prst="rect">
+            <a:avLst/>
+          </a:prstGeom>
+        </p:spPr>
+      </p:pic>
+      <p:pic>
+        <p:nvPicPr>
+          <p:cNvPr id="8" name="Graphic 7" descr="Table and chairs">
+            <a:extLst>
+              <a:ext uri="{FF2B5EF4-FFF2-40B4-BE49-F238E27FC236}">
+                <a16:creationId xmlns:a16="http://schemas.microsoft.com/office/drawing/2014/main" id="{A1F7908C-4745-45F6-81A9-86436970D2C7}"/>
+              </a:ext>
+            </a:extLst>
+          </p:cNvPr>
+          <p:cNvPicPr>
+            <a:picLocks noChangeAspect="1"/>
+          </p:cNvPicPr>
+          <p:nvPr/>
+        </p:nvPicPr>
+        <p:blipFill>
+          <a:blip r:embed="rId8">
+            <a:extLst>
+              <a:ext uri="{28A0092B-C50C-407E-A947-70E740481C1C}">
+                <a14:useLocalDpi xmlns:a14="http://schemas.microsoft.com/office/drawing/2010/main" val="0"/>
+              </a:ext>
+              <a:ext uri="{96DAC541-7B7A-43D3-8B79-37D633B846F1}">
+                <asvg:svgBlip xmlns:asvg="http://schemas.microsoft.com/office/drawing/2016/SVG/main" r:embed="rId9"/>
+              </a:ext>
+            </a:extLst>
+          </a:blip>
+          <a:stretch>
+            <a:fillRect/>
+          </a:stretch>
+        </p:blipFill>
+        <p:spPr>
+          <a:xfrm>
+            <a:off x="4627880" y="1327920"/>
+            <a:ext cx="1293640" cy="1293640"/>
+          </a:xfrm>
+          <a:prstGeom prst="rect">
+            <a:avLst/>
+          </a:prstGeom>
+        </p:spPr>
+      </p:pic>
+      <p:pic>
+        <p:nvPicPr>
+          <p:cNvPr id="21" name="Graphic 20" descr="User">
+            <a:extLst>
+              <a:ext uri="{FF2B5EF4-FFF2-40B4-BE49-F238E27FC236}">
+                <a16:creationId xmlns:a16="http://schemas.microsoft.com/office/drawing/2014/main" id="{62CBCCD1-1853-4579-914A-4D773994A701}"/>
+              </a:ext>
+            </a:extLst>
+          </p:cNvPr>
+          <p:cNvPicPr>
+            <a:picLocks noChangeAspect="1"/>
+          </p:cNvPicPr>
+          <p:nvPr/>
+        </p:nvPicPr>
+        <p:blipFill>
+          <a:blip r:embed="rId10">
+            <a:extLst>
+              <a:ext uri="{28A0092B-C50C-407E-A947-70E740481C1C}">
+                <a14:useLocalDpi xmlns:a14="http://schemas.microsoft.com/office/drawing/2010/main" val="0"/>
+              </a:ext>
+              <a:ext uri="{96DAC541-7B7A-43D3-8B79-37D633B846F1}">
+                <asvg:svgBlip xmlns:asvg="http://schemas.microsoft.com/office/drawing/2016/SVG/main" r:embed="rId11"/>
+              </a:ext>
+            </a:extLst>
+          </a:blip>
+          <a:stretch>
+            <a:fillRect/>
+          </a:stretch>
+        </p:blipFill>
+        <p:spPr>
+          <a:xfrm>
+            <a:off x="5464320" y="3237160"/>
+            <a:ext cx="500800" cy="500800"/>
+          </a:xfrm>
+          <a:prstGeom prst="rect">
+            <a:avLst/>
+          </a:prstGeom>
+        </p:spPr>
+      </p:pic>
+      <p:sp>
+        <p:nvSpPr>
+          <p:cNvPr id="23" name="Flowchart: Connector 22">
+            <a:extLst>
+              <a:ext uri="{FF2B5EF4-FFF2-40B4-BE49-F238E27FC236}">
+                <a16:creationId xmlns:a16="http://schemas.microsoft.com/office/drawing/2014/main" id="{555F42B9-3F6A-4020-9FCB-E724ED1CCC1A}"/>
+              </a:ext>
+            </a:extLst>
+          </p:cNvPr>
+          <p:cNvSpPr/>
+          <p:nvPr/>
+        </p:nvSpPr>
+        <p:spPr>
+          <a:xfrm>
+            <a:off x="5582080" y="3886200"/>
+            <a:ext cx="265280" cy="254000"/>
+          </a:xfrm>
+          <a:prstGeom prst="flowChartConnector">
+            <a:avLst/>
+          </a:prstGeom>
+          <a:solidFill>
+            <a:schemeClr val="tx1"/>
+          </a:solidFill>
+          <a:ln>
+            <a:solidFill>
+              <a:schemeClr val="tx1"/>
+            </a:solidFill>
+          </a:ln>
+        </p:spPr>
+        <p:style>
+          <a:lnRef idx="2">
+            <a:schemeClr val="accent1">
+              <a:shade val="50000"/>
+            </a:schemeClr>
+          </a:lnRef>
+          <a:fillRef idx="1">
+            <a:schemeClr val="accent1"/>
+          </a:fillRef>
+          <a:effectRef idx="0">
+            <a:schemeClr val="accent1"/>
+          </a:effectRef>
+          <a:fontRef idx="minor">
+            <a:schemeClr val="lt1"/>
+          </a:fontRef>
+        </p:style>
+        <p:txBody>
+          <a:bodyPr rtlCol="0" anchor="ctr"/>
+          <a:lstStyle/>
+          <a:p>
+            <a:pPr algn="ctr"/>
+            <a:endParaRPr lang="en-CA"/>
+          </a:p>
+        </p:txBody>
+      </p:sp>
+      <p:cxnSp>
+        <p:nvCxnSpPr>
+          <p:cNvPr id="29" name="Straight Connector 28">
+            <a:extLst>
+              <a:ext uri="{FF2B5EF4-FFF2-40B4-BE49-F238E27FC236}">
+                <a16:creationId xmlns:a16="http://schemas.microsoft.com/office/drawing/2014/main" id="{291873ED-D8D0-4478-8DA1-6CC784044C37}"/>
+              </a:ext>
+            </a:extLst>
+          </p:cNvPr>
+          <p:cNvCxnSpPr>
+            <a:cxnSpLocks/>
+          </p:cNvCxnSpPr>
+          <p:nvPr/>
+        </p:nvCxnSpPr>
+        <p:spPr>
+          <a:xfrm>
+            <a:off x="5154080" y="4013200"/>
+            <a:ext cx="1149000" cy="0"/>
+          </a:xfrm>
+          <a:prstGeom prst="line">
+            <a:avLst/>
+          </a:prstGeom>
+          <a:ln w="57150">
+            <a:solidFill>
+              <a:schemeClr val="tx1"/>
+            </a:solidFill>
+          </a:ln>
+        </p:spPr>
+        <p:style>
+          <a:lnRef idx="1">
+            <a:schemeClr val="accent1"/>
+          </a:lnRef>
+          <a:fillRef idx="0">
+            <a:schemeClr val="accent1"/>
+          </a:fillRef>
+          <a:effectRef idx="0">
+            <a:schemeClr val="accent1"/>
+          </a:effectRef>
+          <a:fontRef idx="minor">
+            <a:schemeClr val="tx1"/>
+          </a:fontRef>
+        </p:style>
+      </p:cxnSp>
+      <p:cxnSp>
+        <p:nvCxnSpPr>
+          <p:cNvPr id="33" name="Straight Connector 32">
+            <a:extLst>
+              <a:ext uri="{FF2B5EF4-FFF2-40B4-BE49-F238E27FC236}">
+                <a16:creationId xmlns:a16="http://schemas.microsoft.com/office/drawing/2014/main" id="{7D23D338-2A15-40F0-AD46-CC9F20C391BE}"/>
+              </a:ext>
+            </a:extLst>
+          </p:cNvPr>
+          <p:cNvCxnSpPr>
+            <a:cxnSpLocks/>
+          </p:cNvCxnSpPr>
+          <p:nvPr/>
+        </p:nvCxnSpPr>
+        <p:spPr>
+          <a:xfrm>
+            <a:off x="5714720" y="3512319"/>
+            <a:ext cx="0" cy="1001762"/>
+          </a:xfrm>
+          <a:prstGeom prst="line">
+            <a:avLst/>
+          </a:prstGeom>
+          <a:ln w="57150">
+            <a:solidFill>
+              <a:schemeClr val="tx1"/>
+            </a:solidFill>
+          </a:ln>
+        </p:spPr>
+        <p:style>
+          <a:lnRef idx="1">
+            <a:schemeClr val="accent1"/>
+          </a:lnRef>
+          <a:fillRef idx="0">
+            <a:schemeClr val="accent1"/>
+          </a:fillRef>
+          <a:effectRef idx="0">
+            <a:schemeClr val="accent1"/>
+          </a:effectRef>
+          <a:fontRef idx="minor">
+            <a:schemeClr val="tx1"/>
+          </a:fontRef>
+        </p:style>
+      </p:cxnSp>
+      <p:pic>
+        <p:nvPicPr>
+          <p:cNvPr id="36" name="Graphic 35" descr="User">
+            <a:extLst>
+              <a:ext uri="{FF2B5EF4-FFF2-40B4-BE49-F238E27FC236}">
+                <a16:creationId xmlns:a16="http://schemas.microsoft.com/office/drawing/2014/main" id="{36ADFBB5-8B22-4801-AE92-73DAAE62FE3B}"/>
+              </a:ext>
+            </a:extLst>
+          </p:cNvPr>
+          <p:cNvPicPr>
+            <a:picLocks noChangeAspect="1"/>
+          </p:cNvPicPr>
+          <p:nvPr/>
+        </p:nvPicPr>
+        <p:blipFill>
+          <a:blip r:embed="rId10">
+            <a:extLst>
+              <a:ext uri="{28A0092B-C50C-407E-A947-70E740481C1C}">
+                <a14:useLocalDpi xmlns:a14="http://schemas.microsoft.com/office/drawing/2010/main" val="0"/>
+              </a:ext>
+              <a:ext uri="{96DAC541-7B7A-43D3-8B79-37D633B846F1}">
+                <asvg:svgBlip xmlns:asvg="http://schemas.microsoft.com/office/drawing/2016/SVG/main" r:embed="rId11"/>
+              </a:ext>
+            </a:extLst>
+          </a:blip>
+          <a:stretch>
+            <a:fillRect/>
+          </a:stretch>
+        </p:blipFill>
+        <p:spPr>
+          <a:xfrm>
+            <a:off x="5464320" y="4288440"/>
+            <a:ext cx="500800" cy="500800"/>
+          </a:xfrm>
+          <a:prstGeom prst="rect">
+            <a:avLst/>
+          </a:prstGeom>
+        </p:spPr>
+      </p:pic>
+      <p:pic>
+        <p:nvPicPr>
+          <p:cNvPr id="37" name="Graphic 36" descr="User">
+            <a:extLst>
+              <a:ext uri="{FF2B5EF4-FFF2-40B4-BE49-F238E27FC236}">
+                <a16:creationId xmlns:a16="http://schemas.microsoft.com/office/drawing/2014/main" id="{3DB5CF8C-A99A-4617-A7AF-2D5579E81672}"/>
+              </a:ext>
+            </a:extLst>
+          </p:cNvPr>
+          <p:cNvPicPr>
+            <a:picLocks noChangeAspect="1"/>
+          </p:cNvPicPr>
+          <p:nvPr/>
+        </p:nvPicPr>
+        <p:blipFill>
+          <a:blip r:embed="rId10">
+            <a:extLst>
+              <a:ext uri="{28A0092B-C50C-407E-A947-70E740481C1C}">
+                <a14:useLocalDpi xmlns:a14="http://schemas.microsoft.com/office/drawing/2010/main" val="0"/>
+              </a:ext>
+              <a:ext uri="{96DAC541-7B7A-43D3-8B79-37D633B846F1}">
+                <asvg:svgBlip xmlns:asvg="http://schemas.microsoft.com/office/drawing/2016/SVG/main" r:embed="rId11"/>
+              </a:ext>
+            </a:extLst>
+          </a:blip>
+          <a:stretch>
+            <a:fillRect/>
+          </a:stretch>
+        </p:blipFill>
+        <p:spPr>
+          <a:xfrm>
+            <a:off x="6015639" y="3702400"/>
+            <a:ext cx="500800" cy="500800"/>
+          </a:xfrm>
+          <a:prstGeom prst="rect">
+            <a:avLst/>
+          </a:prstGeom>
+        </p:spPr>
+      </p:pic>
+      <p:pic>
+        <p:nvPicPr>
+          <p:cNvPr id="38" name="Graphic 37" descr="User">
+            <a:extLst>
+              <a:ext uri="{FF2B5EF4-FFF2-40B4-BE49-F238E27FC236}">
+                <a16:creationId xmlns:a16="http://schemas.microsoft.com/office/drawing/2014/main" id="{16F3A087-0B5F-4BB4-85DC-E24AE20E6D67}"/>
+              </a:ext>
+            </a:extLst>
+          </p:cNvPr>
+          <p:cNvPicPr>
+            <a:picLocks noChangeAspect="1"/>
+          </p:cNvPicPr>
+          <p:nvPr/>
+        </p:nvPicPr>
+        <p:blipFill>
+          <a:blip r:embed="rId10">
+            <a:extLst>
+              <a:ext uri="{28A0092B-C50C-407E-A947-70E740481C1C}">
+                <a14:useLocalDpi xmlns:a14="http://schemas.microsoft.com/office/drawing/2010/main" val="0"/>
+              </a:ext>
+              <a:ext uri="{96DAC541-7B7A-43D3-8B79-37D633B846F1}">
+                <asvg:svgBlip xmlns:asvg="http://schemas.microsoft.com/office/drawing/2016/SVG/main" r:embed="rId11"/>
+              </a:ext>
+            </a:extLst>
+          </a:blip>
+          <a:stretch>
+            <a:fillRect/>
+          </a:stretch>
+        </p:blipFill>
+        <p:spPr>
+          <a:xfrm>
+            <a:off x="4930641" y="3692240"/>
+            <a:ext cx="500800" cy="500800"/>
+          </a:xfrm>
+          <a:prstGeom prst="rect">
+            <a:avLst/>
+          </a:prstGeom>
+        </p:spPr>
+      </p:pic>
+      <p:pic>
+        <p:nvPicPr>
+          <p:cNvPr id="16" name="Graphic 15" descr="Stopwatch">
+            <a:extLst>
+              <a:ext uri="{FF2B5EF4-FFF2-40B4-BE49-F238E27FC236}">
+                <a16:creationId xmlns:a16="http://schemas.microsoft.com/office/drawing/2014/main" id="{C316E35B-BBF7-4633-B0DE-D2D1A599A818}"/>
+              </a:ext>
+            </a:extLst>
+          </p:cNvPr>
+          <p:cNvPicPr>
+            <a:picLocks noChangeAspect="1"/>
+          </p:cNvPicPr>
+          <p:nvPr/>
+        </p:nvPicPr>
+        <p:blipFill>
+          <a:blip r:embed="rId12">
+            <a:extLst>
+              <a:ext uri="{28A0092B-C50C-407E-A947-70E740481C1C}">
+                <a14:useLocalDpi xmlns:a14="http://schemas.microsoft.com/office/drawing/2010/main" val="0"/>
+              </a:ext>
+              <a:ext uri="{96DAC541-7B7A-43D3-8B79-37D633B846F1}">
+                <asvg:svgBlip xmlns:asvg="http://schemas.microsoft.com/office/drawing/2016/SVG/main" r:embed="rId13"/>
+              </a:ext>
+            </a:extLst>
+          </a:blip>
+          <a:stretch>
+            <a:fillRect/>
+          </a:stretch>
+        </p:blipFill>
+        <p:spPr>
+          <a:xfrm>
+            <a:off x="2924359" y="2127180"/>
+            <a:ext cx="666820" cy="666820"/>
+          </a:xfrm>
+          <a:prstGeom prst="rect">
+            <a:avLst/>
+          </a:prstGeom>
+        </p:spPr>
+      </p:pic>
+    </p:spTree>
+    <p:extLst>
+      <p:ext uri="{BB962C8B-B14F-4D97-AF65-F5344CB8AC3E}">
+        <p14:creationId xmlns:p14="http://schemas.microsoft.com/office/powerpoint/2010/main" val="3282302956"/>
+      </p:ext>
+    </p:extLst>
+  </p:cSld>
+  <p:clrMapOvr>
+    <a:masterClrMapping/>
+  </p:clrMapOvr>
+</p:sld>
+</file>
+
 <file path=ppt/theme/theme1.xml><?xml version="1.0" encoding="utf-8"?>
 <a:theme xmlns:a="http://schemas.openxmlformats.org/drawingml/2006/main" name="Office Theme">
   <a:themeElements>

</xml_diff>

<commit_message>
Minore content revisions, new team pattern, and finish willys placeholders.
</commit_message>
<xml_diff>
--- a/src/Stories/Story illustrations.pptx
+++ b/src/Stories/Story illustrations.pptx
@@ -4,11 +4,15 @@
   <p:sldMasterIdLst>
     <p:sldMasterId id="2147483648" r:id="rId1"/>
   </p:sldMasterIdLst>
+  <p:notesMasterIdLst>
+    <p:notesMasterId r:id="rId7"/>
+  </p:notesMasterIdLst>
   <p:sldIdLst>
     <p:sldId id="256" r:id="rId2"/>
     <p:sldId id="257" r:id="rId3"/>
     <p:sldId id="259" r:id="rId4"/>
     <p:sldId id="260" r:id="rId5"/>
+    <p:sldId id="261" r:id="rId6"/>
   </p:sldIdLst>
   <p:sldSz cx="12192000" cy="6858000"/>
   <p:notesSz cx="6858000" cy="9144000"/>
@@ -173,6 +177,792 @@
 </inkml:ink>
 </file>
 
+<file path=ppt/notesMasters/notesMaster1.xml><?xml version="1.0" encoding="utf-8"?>
+<p:notesMaster xmlns:a="http://schemas.openxmlformats.org/drawingml/2006/main" xmlns:r="http://schemas.openxmlformats.org/officeDocument/2006/relationships" xmlns:p="http://schemas.openxmlformats.org/presentationml/2006/main">
+  <p:cSld>
+    <p:bg>
+      <p:bgRef idx="1001">
+        <a:schemeClr val="bg1"/>
+      </p:bgRef>
+    </p:bg>
+    <p:spTree>
+      <p:nvGrpSpPr>
+        <p:cNvPr id="1" name=""/>
+        <p:cNvGrpSpPr/>
+        <p:nvPr/>
+      </p:nvGrpSpPr>
+      <p:grpSpPr>
+        <a:xfrm>
+          <a:off x="0" y="0"/>
+          <a:ext cx="0" cy="0"/>
+          <a:chOff x="0" y="0"/>
+          <a:chExt cx="0" cy="0"/>
+        </a:xfrm>
+      </p:grpSpPr>
+      <p:sp>
+        <p:nvSpPr>
+          <p:cNvPr id="2" name="Header Placeholder 1"/>
+          <p:cNvSpPr>
+            <a:spLocks noGrp="1"/>
+          </p:cNvSpPr>
+          <p:nvPr>
+            <p:ph type="hdr" sz="quarter"/>
+          </p:nvPr>
+        </p:nvSpPr>
+        <p:spPr>
+          <a:xfrm>
+            <a:off x="0" y="0"/>
+            <a:ext cx="2971800" cy="458788"/>
+          </a:xfrm>
+          <a:prstGeom prst="rect">
+            <a:avLst/>
+          </a:prstGeom>
+        </p:spPr>
+        <p:txBody>
+          <a:bodyPr vert="horz" lIns="91440" tIns="45720" rIns="91440" bIns="45720" rtlCol="0"/>
+          <a:lstStyle>
+            <a:lvl1pPr algn="l">
+              <a:defRPr sz="1200"/>
+            </a:lvl1pPr>
+          </a:lstStyle>
+          <a:p>
+            <a:endParaRPr lang="en-CA"/>
+          </a:p>
+        </p:txBody>
+      </p:sp>
+      <p:sp>
+        <p:nvSpPr>
+          <p:cNvPr id="3" name="Date Placeholder 2"/>
+          <p:cNvSpPr>
+            <a:spLocks noGrp="1"/>
+          </p:cNvSpPr>
+          <p:nvPr>
+            <p:ph type="dt" idx="1"/>
+          </p:nvPr>
+        </p:nvSpPr>
+        <p:spPr>
+          <a:xfrm>
+            <a:off x="3884613" y="0"/>
+            <a:ext cx="2971800" cy="458788"/>
+          </a:xfrm>
+          <a:prstGeom prst="rect">
+            <a:avLst/>
+          </a:prstGeom>
+        </p:spPr>
+        <p:txBody>
+          <a:bodyPr vert="horz" lIns="91440" tIns="45720" rIns="91440" bIns="45720" rtlCol="0"/>
+          <a:lstStyle>
+            <a:lvl1pPr algn="r">
+              <a:defRPr sz="1200"/>
+            </a:lvl1pPr>
+          </a:lstStyle>
+          <a:p>
+            <a:fld id="{BC8E98BD-6AE1-4307-B1DC-BAE68787EC38}" type="datetimeFigureOut">
+              <a:rPr lang="en-CA" smtClean="0"/>
+              <a:t>2017-06-24</a:t>
+            </a:fld>
+            <a:endParaRPr lang="en-CA"/>
+          </a:p>
+        </p:txBody>
+      </p:sp>
+      <p:sp>
+        <p:nvSpPr>
+          <p:cNvPr id="4" name="Slide Image Placeholder 3"/>
+          <p:cNvSpPr>
+            <a:spLocks noGrp="1" noRot="1" noChangeAspect="1"/>
+          </p:cNvSpPr>
+          <p:nvPr>
+            <p:ph type="sldImg" idx="2"/>
+          </p:nvPr>
+        </p:nvSpPr>
+        <p:spPr>
+          <a:xfrm>
+            <a:off x="685800" y="1143000"/>
+            <a:ext cx="5486400" cy="3086100"/>
+          </a:xfrm>
+          <a:prstGeom prst="rect">
+            <a:avLst/>
+          </a:prstGeom>
+          <a:noFill/>
+          <a:ln w="12700">
+            <a:solidFill>
+              <a:prstClr val="black"/>
+            </a:solidFill>
+          </a:ln>
+        </p:spPr>
+        <p:txBody>
+          <a:bodyPr vert="horz" lIns="91440" tIns="45720" rIns="91440" bIns="45720" rtlCol="0" anchor="ctr"/>
+          <a:lstStyle/>
+          <a:p>
+            <a:endParaRPr lang="en-CA"/>
+          </a:p>
+        </p:txBody>
+      </p:sp>
+      <p:sp>
+        <p:nvSpPr>
+          <p:cNvPr id="5" name="Notes Placeholder 4"/>
+          <p:cNvSpPr>
+            <a:spLocks noGrp="1"/>
+          </p:cNvSpPr>
+          <p:nvPr>
+            <p:ph type="body" sz="quarter" idx="3"/>
+          </p:nvPr>
+        </p:nvSpPr>
+        <p:spPr>
+          <a:xfrm>
+            <a:off x="685800" y="4400550"/>
+            <a:ext cx="5486400" cy="3600450"/>
+          </a:xfrm>
+          <a:prstGeom prst="rect">
+            <a:avLst/>
+          </a:prstGeom>
+        </p:spPr>
+        <p:txBody>
+          <a:bodyPr vert="horz" lIns="91440" tIns="45720" rIns="91440" bIns="45720" rtlCol="0"/>
+          <a:lstStyle/>
+          <a:p>
+            <a:pPr lvl="0"/>
+            <a:r>
+              <a:rPr lang="en-US"/>
+              <a:t>Edit Master text styles</a:t>
+            </a:r>
+          </a:p>
+          <a:p>
+            <a:pPr lvl="1"/>
+            <a:r>
+              <a:rPr lang="en-US"/>
+              <a:t>Second level</a:t>
+            </a:r>
+          </a:p>
+          <a:p>
+            <a:pPr lvl="2"/>
+            <a:r>
+              <a:rPr lang="en-US"/>
+              <a:t>Third level</a:t>
+            </a:r>
+          </a:p>
+          <a:p>
+            <a:pPr lvl="3"/>
+            <a:r>
+              <a:rPr lang="en-US"/>
+              <a:t>Fourth level</a:t>
+            </a:r>
+          </a:p>
+          <a:p>
+            <a:pPr lvl="4"/>
+            <a:r>
+              <a:rPr lang="en-US"/>
+              <a:t>Fifth level</a:t>
+            </a:r>
+            <a:endParaRPr lang="en-CA"/>
+          </a:p>
+        </p:txBody>
+      </p:sp>
+      <p:sp>
+        <p:nvSpPr>
+          <p:cNvPr id="6" name="Footer Placeholder 5"/>
+          <p:cNvSpPr>
+            <a:spLocks noGrp="1"/>
+          </p:cNvSpPr>
+          <p:nvPr>
+            <p:ph type="ftr" sz="quarter" idx="4"/>
+          </p:nvPr>
+        </p:nvSpPr>
+        <p:spPr>
+          <a:xfrm>
+            <a:off x="0" y="8685213"/>
+            <a:ext cx="2971800" cy="458787"/>
+          </a:xfrm>
+          <a:prstGeom prst="rect">
+            <a:avLst/>
+          </a:prstGeom>
+        </p:spPr>
+        <p:txBody>
+          <a:bodyPr vert="horz" lIns="91440" tIns="45720" rIns="91440" bIns="45720" rtlCol="0" anchor="b"/>
+          <a:lstStyle>
+            <a:lvl1pPr algn="l">
+              <a:defRPr sz="1200"/>
+            </a:lvl1pPr>
+          </a:lstStyle>
+          <a:p>
+            <a:endParaRPr lang="en-CA"/>
+          </a:p>
+        </p:txBody>
+      </p:sp>
+      <p:sp>
+        <p:nvSpPr>
+          <p:cNvPr id="7" name="Slide Number Placeholder 6"/>
+          <p:cNvSpPr>
+            <a:spLocks noGrp="1"/>
+          </p:cNvSpPr>
+          <p:nvPr>
+            <p:ph type="sldNum" sz="quarter" idx="5"/>
+          </p:nvPr>
+        </p:nvSpPr>
+        <p:spPr>
+          <a:xfrm>
+            <a:off x="3884613" y="8685213"/>
+            <a:ext cx="2971800" cy="458787"/>
+          </a:xfrm>
+          <a:prstGeom prst="rect">
+            <a:avLst/>
+          </a:prstGeom>
+        </p:spPr>
+        <p:txBody>
+          <a:bodyPr vert="horz" lIns="91440" tIns="45720" rIns="91440" bIns="45720" rtlCol="0" anchor="b"/>
+          <a:lstStyle>
+            <a:lvl1pPr algn="r">
+              <a:defRPr sz="1200"/>
+            </a:lvl1pPr>
+          </a:lstStyle>
+          <a:p>
+            <a:fld id="{F6A75A2C-6036-4CC3-919B-29E2F0BD9283}" type="slidenum">
+              <a:rPr lang="en-CA" smtClean="0"/>
+              <a:t>‹#›</a:t>
+            </a:fld>
+            <a:endParaRPr lang="en-CA"/>
+          </a:p>
+        </p:txBody>
+      </p:sp>
+    </p:spTree>
+    <p:extLst>
+      <p:ext uri="{BB962C8B-B14F-4D97-AF65-F5344CB8AC3E}">
+        <p14:creationId xmlns:p14="http://schemas.microsoft.com/office/powerpoint/2010/main" val="1768519539"/>
+      </p:ext>
+    </p:extLst>
+  </p:cSld>
+  <p:clrMap bg1="lt1" tx1="dk1" bg2="lt2" tx2="dk2" accent1="accent1" accent2="accent2" accent3="accent3" accent4="accent4" accent5="accent5" accent6="accent6" hlink="hlink" folHlink="folHlink"/>
+  <p:notesStyle>
+    <a:lvl1pPr marL="0" algn="l" defTabSz="914400" rtl="0" eaLnBrk="1" latinLnBrk="0" hangingPunct="1">
+      <a:defRPr sz="1200" kern="1200">
+        <a:solidFill>
+          <a:schemeClr val="tx1"/>
+        </a:solidFill>
+        <a:latin typeface="+mn-lt"/>
+        <a:ea typeface="+mn-ea"/>
+        <a:cs typeface="+mn-cs"/>
+      </a:defRPr>
+    </a:lvl1pPr>
+    <a:lvl2pPr marL="457200" algn="l" defTabSz="914400" rtl="0" eaLnBrk="1" latinLnBrk="0" hangingPunct="1">
+      <a:defRPr sz="1200" kern="1200">
+        <a:solidFill>
+          <a:schemeClr val="tx1"/>
+        </a:solidFill>
+        <a:latin typeface="+mn-lt"/>
+        <a:ea typeface="+mn-ea"/>
+        <a:cs typeface="+mn-cs"/>
+      </a:defRPr>
+    </a:lvl2pPr>
+    <a:lvl3pPr marL="914400" algn="l" defTabSz="914400" rtl="0" eaLnBrk="1" latinLnBrk="0" hangingPunct="1">
+      <a:defRPr sz="1200" kern="1200">
+        <a:solidFill>
+          <a:schemeClr val="tx1"/>
+        </a:solidFill>
+        <a:latin typeface="+mn-lt"/>
+        <a:ea typeface="+mn-ea"/>
+        <a:cs typeface="+mn-cs"/>
+      </a:defRPr>
+    </a:lvl3pPr>
+    <a:lvl4pPr marL="1371600" algn="l" defTabSz="914400" rtl="0" eaLnBrk="1" latinLnBrk="0" hangingPunct="1">
+      <a:defRPr sz="1200" kern="1200">
+        <a:solidFill>
+          <a:schemeClr val="tx1"/>
+        </a:solidFill>
+        <a:latin typeface="+mn-lt"/>
+        <a:ea typeface="+mn-ea"/>
+        <a:cs typeface="+mn-cs"/>
+      </a:defRPr>
+    </a:lvl4pPr>
+    <a:lvl5pPr marL="1828800" algn="l" defTabSz="914400" rtl="0" eaLnBrk="1" latinLnBrk="0" hangingPunct="1">
+      <a:defRPr sz="1200" kern="1200">
+        <a:solidFill>
+          <a:schemeClr val="tx1"/>
+        </a:solidFill>
+        <a:latin typeface="+mn-lt"/>
+        <a:ea typeface="+mn-ea"/>
+        <a:cs typeface="+mn-cs"/>
+      </a:defRPr>
+    </a:lvl5pPr>
+    <a:lvl6pPr marL="2286000" algn="l" defTabSz="914400" rtl="0" eaLnBrk="1" latinLnBrk="0" hangingPunct="1">
+      <a:defRPr sz="1200" kern="1200">
+        <a:solidFill>
+          <a:schemeClr val="tx1"/>
+        </a:solidFill>
+        <a:latin typeface="+mn-lt"/>
+        <a:ea typeface="+mn-ea"/>
+        <a:cs typeface="+mn-cs"/>
+      </a:defRPr>
+    </a:lvl6pPr>
+    <a:lvl7pPr marL="2743200" algn="l" defTabSz="914400" rtl="0" eaLnBrk="1" latinLnBrk="0" hangingPunct="1">
+      <a:defRPr sz="1200" kern="1200">
+        <a:solidFill>
+          <a:schemeClr val="tx1"/>
+        </a:solidFill>
+        <a:latin typeface="+mn-lt"/>
+        <a:ea typeface="+mn-ea"/>
+        <a:cs typeface="+mn-cs"/>
+      </a:defRPr>
+    </a:lvl7pPr>
+    <a:lvl8pPr marL="3200400" algn="l" defTabSz="914400" rtl="0" eaLnBrk="1" latinLnBrk="0" hangingPunct="1">
+      <a:defRPr sz="1200" kern="1200">
+        <a:solidFill>
+          <a:schemeClr val="tx1"/>
+        </a:solidFill>
+        <a:latin typeface="+mn-lt"/>
+        <a:ea typeface="+mn-ea"/>
+        <a:cs typeface="+mn-cs"/>
+      </a:defRPr>
+    </a:lvl8pPr>
+    <a:lvl9pPr marL="3657600" algn="l" defTabSz="914400" rtl="0" eaLnBrk="1" latinLnBrk="0" hangingPunct="1">
+      <a:defRPr sz="1200" kern="1200">
+        <a:solidFill>
+          <a:schemeClr val="tx1"/>
+        </a:solidFill>
+        <a:latin typeface="+mn-lt"/>
+        <a:ea typeface="+mn-ea"/>
+        <a:cs typeface="+mn-cs"/>
+      </a:defRPr>
+    </a:lvl9pPr>
+  </p:notesStyle>
+</p:notesMaster>
+</file>
+
+<file path=ppt/notesSlides/notesSlide1.xml><?xml version="1.0" encoding="utf-8"?>
+<p:notes xmlns:a="http://schemas.openxmlformats.org/drawingml/2006/main" xmlns:r="http://schemas.openxmlformats.org/officeDocument/2006/relationships" xmlns:p="http://schemas.openxmlformats.org/presentationml/2006/main">
+  <p:cSld>
+    <p:spTree>
+      <p:nvGrpSpPr>
+        <p:cNvPr id="1" name=""/>
+        <p:cNvGrpSpPr/>
+        <p:nvPr/>
+      </p:nvGrpSpPr>
+      <p:grpSpPr>
+        <a:xfrm>
+          <a:off x="0" y="0"/>
+          <a:ext cx="0" cy="0"/>
+          <a:chOff x="0" y="0"/>
+          <a:chExt cx="0" cy="0"/>
+        </a:xfrm>
+      </p:grpSpPr>
+      <p:sp>
+        <p:nvSpPr>
+          <p:cNvPr id="2" name="Slide Image Placeholder 1"/>
+          <p:cNvSpPr>
+            <a:spLocks noGrp="1" noRot="1" noChangeAspect="1"/>
+          </p:cNvSpPr>
+          <p:nvPr>
+            <p:ph type="sldImg"/>
+          </p:nvPr>
+        </p:nvSpPr>
+        <p:spPr/>
+      </p:sp>
+      <p:sp>
+        <p:nvSpPr>
+          <p:cNvPr id="3" name="Notes Placeholder 2"/>
+          <p:cNvSpPr>
+            <a:spLocks noGrp="1"/>
+          </p:cNvSpPr>
+          <p:nvPr>
+            <p:ph type="body" idx="1"/>
+          </p:nvPr>
+        </p:nvSpPr>
+        <p:spPr/>
+        <p:txBody>
+          <a:bodyPr/>
+          <a:lstStyle/>
+          <a:p>
+            <a:endParaRPr lang="en-CA"/>
+          </a:p>
+        </p:txBody>
+      </p:sp>
+      <p:sp>
+        <p:nvSpPr>
+          <p:cNvPr id="4" name="Slide Number Placeholder 3"/>
+          <p:cNvSpPr>
+            <a:spLocks noGrp="1"/>
+          </p:cNvSpPr>
+          <p:nvPr>
+            <p:ph type="sldNum" sz="quarter" idx="10"/>
+          </p:nvPr>
+        </p:nvSpPr>
+        <p:spPr/>
+        <p:txBody>
+          <a:bodyPr/>
+          <a:lstStyle/>
+          <a:p>
+            <a:fld id="{F6A75A2C-6036-4CC3-919B-29E2F0BD9283}" type="slidenum">
+              <a:rPr lang="en-CA" smtClean="0"/>
+              <a:t>1</a:t>
+            </a:fld>
+            <a:endParaRPr lang="en-CA"/>
+          </a:p>
+        </p:txBody>
+      </p:sp>
+    </p:spTree>
+    <p:extLst>
+      <p:ext uri="{BB962C8B-B14F-4D97-AF65-F5344CB8AC3E}">
+        <p14:creationId xmlns:p14="http://schemas.microsoft.com/office/powerpoint/2010/main" val="44204371"/>
+      </p:ext>
+    </p:extLst>
+  </p:cSld>
+  <p:clrMapOvr>
+    <a:masterClrMapping/>
+  </p:clrMapOvr>
+</p:notes>
+</file>
+
+<file path=ppt/notesSlides/notesSlide2.xml><?xml version="1.0" encoding="utf-8"?>
+<p:notes xmlns:a="http://schemas.openxmlformats.org/drawingml/2006/main" xmlns:r="http://schemas.openxmlformats.org/officeDocument/2006/relationships" xmlns:p="http://schemas.openxmlformats.org/presentationml/2006/main">
+  <p:cSld>
+    <p:spTree>
+      <p:nvGrpSpPr>
+        <p:cNvPr id="1" name=""/>
+        <p:cNvGrpSpPr/>
+        <p:nvPr/>
+      </p:nvGrpSpPr>
+      <p:grpSpPr>
+        <a:xfrm>
+          <a:off x="0" y="0"/>
+          <a:ext cx="0" cy="0"/>
+          <a:chOff x="0" y="0"/>
+          <a:chExt cx="0" cy="0"/>
+        </a:xfrm>
+      </p:grpSpPr>
+      <p:sp>
+        <p:nvSpPr>
+          <p:cNvPr id="2" name="Slide Image Placeholder 1"/>
+          <p:cNvSpPr>
+            <a:spLocks noGrp="1" noRot="1" noChangeAspect="1"/>
+          </p:cNvSpPr>
+          <p:nvPr>
+            <p:ph type="sldImg"/>
+          </p:nvPr>
+        </p:nvSpPr>
+        <p:spPr/>
+      </p:sp>
+      <p:sp>
+        <p:nvSpPr>
+          <p:cNvPr id="3" name="Notes Placeholder 2"/>
+          <p:cNvSpPr>
+            <a:spLocks noGrp="1"/>
+          </p:cNvSpPr>
+          <p:nvPr>
+            <p:ph type="body" idx="1"/>
+          </p:nvPr>
+        </p:nvSpPr>
+        <p:spPr/>
+        <p:txBody>
+          <a:bodyPr/>
+          <a:lstStyle/>
+          <a:p>
+            <a:endParaRPr lang="en-CA"/>
+          </a:p>
+        </p:txBody>
+      </p:sp>
+      <p:sp>
+        <p:nvSpPr>
+          <p:cNvPr id="4" name="Slide Number Placeholder 3"/>
+          <p:cNvSpPr>
+            <a:spLocks noGrp="1"/>
+          </p:cNvSpPr>
+          <p:nvPr>
+            <p:ph type="sldNum" sz="quarter" idx="10"/>
+          </p:nvPr>
+        </p:nvSpPr>
+        <p:spPr/>
+        <p:txBody>
+          <a:bodyPr/>
+          <a:lstStyle/>
+          <a:p>
+            <a:fld id="{F6A75A2C-6036-4CC3-919B-29E2F0BD9283}" type="slidenum">
+              <a:rPr lang="en-CA" smtClean="0"/>
+              <a:t>2</a:t>
+            </a:fld>
+            <a:endParaRPr lang="en-CA"/>
+          </a:p>
+        </p:txBody>
+      </p:sp>
+    </p:spTree>
+    <p:extLst>
+      <p:ext uri="{BB962C8B-B14F-4D97-AF65-F5344CB8AC3E}">
+        <p14:creationId xmlns:p14="http://schemas.microsoft.com/office/powerpoint/2010/main" val="3249387486"/>
+      </p:ext>
+    </p:extLst>
+  </p:cSld>
+  <p:clrMapOvr>
+    <a:masterClrMapping/>
+  </p:clrMapOvr>
+</p:notes>
+</file>
+
+<file path=ppt/notesSlides/notesSlide3.xml><?xml version="1.0" encoding="utf-8"?>
+<p:notes xmlns:a="http://schemas.openxmlformats.org/drawingml/2006/main" xmlns:r="http://schemas.openxmlformats.org/officeDocument/2006/relationships" xmlns:p="http://schemas.openxmlformats.org/presentationml/2006/main">
+  <p:cSld>
+    <p:spTree>
+      <p:nvGrpSpPr>
+        <p:cNvPr id="1" name=""/>
+        <p:cNvGrpSpPr/>
+        <p:nvPr/>
+      </p:nvGrpSpPr>
+      <p:grpSpPr>
+        <a:xfrm>
+          <a:off x="0" y="0"/>
+          <a:ext cx="0" cy="0"/>
+          <a:chOff x="0" y="0"/>
+          <a:chExt cx="0" cy="0"/>
+        </a:xfrm>
+      </p:grpSpPr>
+      <p:sp>
+        <p:nvSpPr>
+          <p:cNvPr id="2" name="Slide Image Placeholder 1"/>
+          <p:cNvSpPr>
+            <a:spLocks noGrp="1" noRot="1" noChangeAspect="1"/>
+          </p:cNvSpPr>
+          <p:nvPr>
+            <p:ph type="sldImg"/>
+          </p:nvPr>
+        </p:nvSpPr>
+        <p:spPr/>
+      </p:sp>
+      <p:sp>
+        <p:nvSpPr>
+          <p:cNvPr id="3" name="Notes Placeholder 2"/>
+          <p:cNvSpPr>
+            <a:spLocks noGrp="1"/>
+          </p:cNvSpPr>
+          <p:nvPr>
+            <p:ph type="body" idx="1"/>
+          </p:nvPr>
+        </p:nvSpPr>
+        <p:spPr/>
+        <p:txBody>
+          <a:bodyPr/>
+          <a:lstStyle/>
+          <a:p>
+            <a:endParaRPr lang="en-CA"/>
+          </a:p>
+        </p:txBody>
+      </p:sp>
+      <p:sp>
+        <p:nvSpPr>
+          <p:cNvPr id="4" name="Slide Number Placeholder 3"/>
+          <p:cNvSpPr>
+            <a:spLocks noGrp="1"/>
+          </p:cNvSpPr>
+          <p:nvPr>
+            <p:ph type="sldNum" sz="quarter" idx="10"/>
+          </p:nvPr>
+        </p:nvSpPr>
+        <p:spPr/>
+        <p:txBody>
+          <a:bodyPr/>
+          <a:lstStyle/>
+          <a:p>
+            <a:fld id="{F6A75A2C-6036-4CC3-919B-29E2F0BD9283}" type="slidenum">
+              <a:rPr lang="en-CA" smtClean="0"/>
+              <a:t>3</a:t>
+            </a:fld>
+            <a:endParaRPr lang="en-CA"/>
+          </a:p>
+        </p:txBody>
+      </p:sp>
+    </p:spTree>
+    <p:extLst>
+      <p:ext uri="{BB962C8B-B14F-4D97-AF65-F5344CB8AC3E}">
+        <p14:creationId xmlns:p14="http://schemas.microsoft.com/office/powerpoint/2010/main" val="111212966"/>
+      </p:ext>
+    </p:extLst>
+  </p:cSld>
+  <p:clrMapOvr>
+    <a:masterClrMapping/>
+  </p:clrMapOvr>
+</p:notes>
+</file>
+
+<file path=ppt/notesSlides/notesSlide4.xml><?xml version="1.0" encoding="utf-8"?>
+<p:notes xmlns:a="http://schemas.openxmlformats.org/drawingml/2006/main" xmlns:r="http://schemas.openxmlformats.org/officeDocument/2006/relationships" xmlns:p="http://schemas.openxmlformats.org/presentationml/2006/main">
+  <p:cSld>
+    <p:spTree>
+      <p:nvGrpSpPr>
+        <p:cNvPr id="1" name=""/>
+        <p:cNvGrpSpPr/>
+        <p:nvPr/>
+      </p:nvGrpSpPr>
+      <p:grpSpPr>
+        <a:xfrm>
+          <a:off x="0" y="0"/>
+          <a:ext cx="0" cy="0"/>
+          <a:chOff x="0" y="0"/>
+          <a:chExt cx="0" cy="0"/>
+        </a:xfrm>
+      </p:grpSpPr>
+      <p:sp>
+        <p:nvSpPr>
+          <p:cNvPr id="2" name="Slide Image Placeholder 1"/>
+          <p:cNvSpPr>
+            <a:spLocks noGrp="1" noRot="1" noChangeAspect="1"/>
+          </p:cNvSpPr>
+          <p:nvPr>
+            <p:ph type="sldImg"/>
+          </p:nvPr>
+        </p:nvSpPr>
+        <p:spPr/>
+      </p:sp>
+      <p:sp>
+        <p:nvSpPr>
+          <p:cNvPr id="3" name="Notes Placeholder 2"/>
+          <p:cNvSpPr>
+            <a:spLocks noGrp="1"/>
+          </p:cNvSpPr>
+          <p:nvPr>
+            <p:ph type="body" idx="1"/>
+          </p:nvPr>
+        </p:nvSpPr>
+        <p:spPr/>
+        <p:txBody>
+          <a:bodyPr/>
+          <a:lstStyle/>
+          <a:p>
+            <a:endParaRPr lang="en-CA"/>
+          </a:p>
+        </p:txBody>
+      </p:sp>
+      <p:sp>
+        <p:nvSpPr>
+          <p:cNvPr id="4" name="Slide Number Placeholder 3"/>
+          <p:cNvSpPr>
+            <a:spLocks noGrp="1"/>
+          </p:cNvSpPr>
+          <p:nvPr>
+            <p:ph type="sldNum" sz="quarter" idx="10"/>
+          </p:nvPr>
+        </p:nvSpPr>
+        <p:spPr/>
+        <p:txBody>
+          <a:bodyPr/>
+          <a:lstStyle/>
+          <a:p>
+            <a:fld id="{F6A75A2C-6036-4CC3-919B-29E2F0BD9283}" type="slidenum">
+              <a:rPr lang="en-CA" smtClean="0"/>
+              <a:t>4</a:t>
+            </a:fld>
+            <a:endParaRPr lang="en-CA"/>
+          </a:p>
+        </p:txBody>
+      </p:sp>
+    </p:spTree>
+    <p:extLst>
+      <p:ext uri="{BB962C8B-B14F-4D97-AF65-F5344CB8AC3E}">
+        <p14:creationId xmlns:p14="http://schemas.microsoft.com/office/powerpoint/2010/main" val="2963911695"/>
+      </p:ext>
+    </p:extLst>
+  </p:cSld>
+  <p:clrMapOvr>
+    <a:masterClrMapping/>
+  </p:clrMapOvr>
+</p:notes>
+</file>
+
+<file path=ppt/notesSlides/notesSlide5.xml><?xml version="1.0" encoding="utf-8"?>
+<p:notes xmlns:a="http://schemas.openxmlformats.org/drawingml/2006/main" xmlns:r="http://schemas.openxmlformats.org/officeDocument/2006/relationships" xmlns:p="http://schemas.openxmlformats.org/presentationml/2006/main">
+  <p:cSld>
+    <p:spTree>
+      <p:nvGrpSpPr>
+        <p:cNvPr id="1" name=""/>
+        <p:cNvGrpSpPr/>
+        <p:nvPr/>
+      </p:nvGrpSpPr>
+      <p:grpSpPr>
+        <a:xfrm>
+          <a:off x="0" y="0"/>
+          <a:ext cx="0" cy="0"/>
+          <a:chOff x="0" y="0"/>
+          <a:chExt cx="0" cy="0"/>
+        </a:xfrm>
+      </p:grpSpPr>
+      <p:sp>
+        <p:nvSpPr>
+          <p:cNvPr id="2" name="Slide Image Placeholder 1"/>
+          <p:cNvSpPr>
+            <a:spLocks noGrp="1" noRot="1" noChangeAspect="1"/>
+          </p:cNvSpPr>
+          <p:nvPr>
+            <p:ph type="sldImg"/>
+          </p:nvPr>
+        </p:nvSpPr>
+        <p:spPr/>
+      </p:sp>
+      <p:sp>
+        <p:nvSpPr>
+          <p:cNvPr id="3" name="Notes Placeholder 2"/>
+          <p:cNvSpPr>
+            <a:spLocks noGrp="1"/>
+          </p:cNvSpPr>
+          <p:nvPr>
+            <p:ph type="body" idx="1"/>
+          </p:nvPr>
+        </p:nvSpPr>
+        <p:spPr/>
+        <p:txBody>
+          <a:bodyPr/>
+          <a:lstStyle/>
+          <a:p>
+            <a:endParaRPr lang="en-CA"/>
+          </a:p>
+        </p:txBody>
+      </p:sp>
+      <p:sp>
+        <p:nvSpPr>
+          <p:cNvPr id="4" name="Slide Number Placeholder 3"/>
+          <p:cNvSpPr>
+            <a:spLocks noGrp="1"/>
+          </p:cNvSpPr>
+          <p:nvPr>
+            <p:ph type="sldNum" sz="quarter" idx="10"/>
+          </p:nvPr>
+        </p:nvSpPr>
+        <p:spPr/>
+        <p:txBody>
+          <a:bodyPr/>
+          <a:lstStyle/>
+          <a:p>
+            <a:pPr defTabSz="906902">
+              <a:defRPr/>
+            </a:pPr>
+            <a:fld id="{05240458-CBDF-4242-A98F-5E1D8B45E643}" type="slidenum">
+              <a:rPr lang="en-CA">
+                <a:solidFill>
+                  <a:prstClr val="black"/>
+                </a:solidFill>
+                <a:latin typeface="Calibri" panose="020F0502020204030204"/>
+              </a:rPr>
+              <a:pPr defTabSz="906902">
+                <a:defRPr/>
+              </a:pPr>
+              <a:t>5</a:t>
+            </a:fld>
+            <a:endParaRPr lang="en-CA">
+              <a:solidFill>
+                <a:prstClr val="black"/>
+              </a:solidFill>
+              <a:latin typeface="Calibri" panose="020F0502020204030204"/>
+            </a:endParaRPr>
+          </a:p>
+        </p:txBody>
+      </p:sp>
+    </p:spTree>
+    <p:extLst>
+      <p:ext uri="{BB962C8B-B14F-4D97-AF65-F5344CB8AC3E}">
+        <p14:creationId xmlns:p14="http://schemas.microsoft.com/office/powerpoint/2010/main" val="222442787"/>
+      </p:ext>
+    </p:extLst>
+  </p:cSld>
+  <p:clrMapOvr>
+    <a:masterClrMapping/>
+  </p:clrMapOvr>
+</p:notes>
+</file>
+
 <file path=ppt/slideLayouts/slideLayout1.xml><?xml version="1.0" encoding="utf-8"?>
 <p:sldLayout xmlns:a="http://schemas.openxmlformats.org/drawingml/2006/main" xmlns:r="http://schemas.openxmlformats.org/officeDocument/2006/relationships" xmlns:p="http://schemas.openxmlformats.org/presentationml/2006/main" type="titleOnly" preserve="1">
   <p:cSld name="Title Only">
@@ -247,7 +1037,7 @@
           <a:p>
             <a:fld id="{91095A8E-9C53-4015-AAB0-2CFFE67F5AFD}" type="datetimeFigureOut">
               <a:rPr lang="en-CA" smtClean="0"/>
-              <a:t>2017-03-18</a:t>
+              <a:t>2017-06-24</a:t>
             </a:fld>
             <a:endParaRPr lang="en-CA"/>
           </a:p>
@@ -460,7 +1250,7 @@
           <a:p>
             <a:fld id="{91095A8E-9C53-4015-AAB0-2CFFE67F5AFD}" type="datetimeFigureOut">
               <a:rPr lang="en-CA" smtClean="0"/>
-              <a:t>2017-03-18</a:t>
+              <a:t>2017-06-24</a:t>
             </a:fld>
             <a:endParaRPr lang="en-CA"/>
           </a:p>
@@ -902,13 +1692,13 @@
           <p:nvPr/>
         </p:nvPicPr>
         <p:blipFill>
-          <a:blip r:embed="rId2">
+          <a:blip r:embed="rId3">
             <a:extLst>
               <a:ext uri="{28A0092B-C50C-407E-A947-70E740481C1C}">
                 <a14:useLocalDpi xmlns:a14="http://schemas.microsoft.com/office/drawing/2010/main" val="0"/>
               </a:ext>
               <a:ext uri="{96DAC541-7B7A-43D3-8B79-37D633B846F1}">
-                <asvg:svgBlip xmlns:asvg="http://schemas.microsoft.com/office/drawing/2016/SVG/main" r:embed="rId3"/>
+                <asvg:svgBlip xmlns:asvg="http://schemas.microsoft.com/office/drawing/2016/SVG/main" r:embed="rId4"/>
               </a:ext>
             </a:extLst>
           </a:blip>
@@ -935,13 +1725,13 @@
           <p:nvPr/>
         </p:nvPicPr>
         <p:blipFill>
-          <a:blip r:embed="rId2">
+          <a:blip r:embed="rId3">
             <a:extLst>
               <a:ext uri="{28A0092B-C50C-407E-A947-70E740481C1C}">
                 <a14:useLocalDpi xmlns:a14="http://schemas.microsoft.com/office/drawing/2010/main" val="0"/>
               </a:ext>
               <a:ext uri="{96DAC541-7B7A-43D3-8B79-37D633B846F1}">
-                <asvg:svgBlip xmlns:asvg="http://schemas.microsoft.com/office/drawing/2016/SVG/main" r:embed="rId3"/>
+                <asvg:svgBlip xmlns:asvg="http://schemas.microsoft.com/office/drawing/2016/SVG/main" r:embed="rId4"/>
               </a:ext>
             </a:extLst>
           </a:blip>
@@ -968,13 +1758,13 @@
           <p:nvPr/>
         </p:nvPicPr>
         <p:blipFill>
-          <a:blip r:embed="rId2">
+          <a:blip r:embed="rId3">
             <a:extLst>
               <a:ext uri="{28A0092B-C50C-407E-A947-70E740481C1C}">
                 <a14:useLocalDpi xmlns:a14="http://schemas.microsoft.com/office/drawing/2010/main" val="0"/>
               </a:ext>
               <a:ext uri="{96DAC541-7B7A-43D3-8B79-37D633B846F1}">
-                <asvg:svgBlip xmlns:asvg="http://schemas.microsoft.com/office/drawing/2016/SVG/main" r:embed="rId3"/>
+                <asvg:svgBlip xmlns:asvg="http://schemas.microsoft.com/office/drawing/2016/SVG/main" r:embed="rId4"/>
               </a:ext>
             </a:extLst>
           </a:blip>
@@ -1001,13 +1791,13 @@
           <p:nvPr/>
         </p:nvPicPr>
         <p:blipFill>
-          <a:blip r:embed="rId2">
+          <a:blip r:embed="rId3">
             <a:extLst>
               <a:ext uri="{28A0092B-C50C-407E-A947-70E740481C1C}">
                 <a14:useLocalDpi xmlns:a14="http://schemas.microsoft.com/office/drawing/2010/main" val="0"/>
               </a:ext>
               <a:ext uri="{96DAC541-7B7A-43D3-8B79-37D633B846F1}">
-                <asvg:svgBlip xmlns:asvg="http://schemas.microsoft.com/office/drawing/2016/SVG/main" r:embed="rId3"/>
+                <asvg:svgBlip xmlns:asvg="http://schemas.microsoft.com/office/drawing/2016/SVG/main" r:embed="rId4"/>
               </a:ext>
             </a:extLst>
           </a:blip>
@@ -1034,13 +1824,13 @@
           <p:nvPr/>
         </p:nvPicPr>
         <p:blipFill>
-          <a:blip r:embed="rId2">
+          <a:blip r:embed="rId3">
             <a:extLst>
               <a:ext uri="{28A0092B-C50C-407E-A947-70E740481C1C}">
                 <a14:useLocalDpi xmlns:a14="http://schemas.microsoft.com/office/drawing/2010/main" val="0"/>
               </a:ext>
               <a:ext uri="{96DAC541-7B7A-43D3-8B79-37D633B846F1}">
-                <asvg:svgBlip xmlns:asvg="http://schemas.microsoft.com/office/drawing/2016/SVG/main" r:embed="rId3"/>
+                <asvg:svgBlip xmlns:asvg="http://schemas.microsoft.com/office/drawing/2016/SVG/main" r:embed="rId4"/>
               </a:ext>
             </a:extLst>
           </a:blip>
@@ -1185,13 +1975,13 @@
           <p:nvPr/>
         </p:nvPicPr>
         <p:blipFill>
-          <a:blip r:embed="rId2">
+          <a:blip r:embed="rId3">
             <a:extLst>
               <a:ext uri="{28A0092B-C50C-407E-A947-70E740481C1C}">
                 <a14:useLocalDpi xmlns:a14="http://schemas.microsoft.com/office/drawing/2010/main" val="0"/>
               </a:ext>
               <a:ext uri="{96DAC541-7B7A-43D3-8B79-37D633B846F1}">
-                <asvg:svgBlip xmlns:asvg="http://schemas.microsoft.com/office/drawing/2016/SVG/main" r:embed="rId3"/>
+                <asvg:svgBlip xmlns:asvg="http://schemas.microsoft.com/office/drawing/2016/SVG/main" r:embed="rId4"/>
               </a:ext>
             </a:extLst>
           </a:blip>
@@ -1218,13 +2008,13 @@
           <p:nvPr/>
         </p:nvPicPr>
         <p:blipFill>
-          <a:blip r:embed="rId2">
+          <a:blip r:embed="rId3">
             <a:extLst>
               <a:ext uri="{28A0092B-C50C-407E-A947-70E740481C1C}">
                 <a14:useLocalDpi xmlns:a14="http://schemas.microsoft.com/office/drawing/2010/main" val="0"/>
               </a:ext>
               <a:ext uri="{96DAC541-7B7A-43D3-8B79-37D633B846F1}">
-                <asvg:svgBlip xmlns:asvg="http://schemas.microsoft.com/office/drawing/2016/SVG/main" r:embed="rId3"/>
+                <asvg:svgBlip xmlns:asvg="http://schemas.microsoft.com/office/drawing/2016/SVG/main" r:embed="rId4"/>
               </a:ext>
             </a:extLst>
           </a:blip>
@@ -1251,13 +2041,13 @@
           <p:nvPr/>
         </p:nvPicPr>
         <p:blipFill>
-          <a:blip r:embed="rId2">
+          <a:blip r:embed="rId3">
             <a:extLst>
               <a:ext uri="{28A0092B-C50C-407E-A947-70E740481C1C}">
                 <a14:useLocalDpi xmlns:a14="http://schemas.microsoft.com/office/drawing/2010/main" val="0"/>
               </a:ext>
               <a:ext uri="{96DAC541-7B7A-43D3-8B79-37D633B846F1}">
-                <asvg:svgBlip xmlns:asvg="http://schemas.microsoft.com/office/drawing/2016/SVG/main" r:embed="rId3"/>
+                <asvg:svgBlip xmlns:asvg="http://schemas.microsoft.com/office/drawing/2016/SVG/main" r:embed="rId4"/>
               </a:ext>
             </a:extLst>
           </a:blip>
@@ -1284,13 +2074,13 @@
           <p:nvPr/>
         </p:nvPicPr>
         <p:blipFill>
-          <a:blip r:embed="rId2">
+          <a:blip r:embed="rId3">
             <a:extLst>
               <a:ext uri="{28A0092B-C50C-407E-A947-70E740481C1C}">
                 <a14:useLocalDpi xmlns:a14="http://schemas.microsoft.com/office/drawing/2010/main" val="0"/>
               </a:ext>
               <a:ext uri="{96DAC541-7B7A-43D3-8B79-37D633B846F1}">
-                <asvg:svgBlip xmlns:asvg="http://schemas.microsoft.com/office/drawing/2016/SVG/main" r:embed="rId3"/>
+                <asvg:svgBlip xmlns:asvg="http://schemas.microsoft.com/office/drawing/2016/SVG/main" r:embed="rId4"/>
               </a:ext>
             </a:extLst>
           </a:blip>
@@ -1517,13 +2307,13 @@
           <p:nvPr/>
         </p:nvPicPr>
         <p:blipFill>
-          <a:blip r:embed="rId2">
+          <a:blip r:embed="rId3">
             <a:extLst>
               <a:ext uri="{28A0092B-C50C-407E-A947-70E740481C1C}">
                 <a14:useLocalDpi xmlns:a14="http://schemas.microsoft.com/office/drawing/2010/main" val="0"/>
               </a:ext>
               <a:ext uri="{96DAC541-7B7A-43D3-8B79-37D633B846F1}">
-                <asvg:svgBlip xmlns:asvg="http://schemas.microsoft.com/office/drawing/2016/SVG/main" r:embed="rId3"/>
+                <asvg:svgBlip xmlns:asvg="http://schemas.microsoft.com/office/drawing/2016/SVG/main" r:embed="rId4"/>
               </a:ext>
             </a:extLst>
           </a:blip>
@@ -1550,13 +2340,13 @@
           <p:nvPr/>
         </p:nvPicPr>
         <p:blipFill>
-          <a:blip r:embed="rId2">
+          <a:blip r:embed="rId3">
             <a:extLst>
               <a:ext uri="{28A0092B-C50C-407E-A947-70E740481C1C}">
                 <a14:useLocalDpi xmlns:a14="http://schemas.microsoft.com/office/drawing/2010/main" val="0"/>
               </a:ext>
               <a:ext uri="{96DAC541-7B7A-43D3-8B79-37D633B846F1}">
-                <asvg:svgBlip xmlns:asvg="http://schemas.microsoft.com/office/drawing/2016/SVG/main" r:embed="rId3"/>
+                <asvg:svgBlip xmlns:asvg="http://schemas.microsoft.com/office/drawing/2016/SVG/main" r:embed="rId4"/>
               </a:ext>
             </a:extLst>
           </a:blip>
@@ -1583,13 +2373,13 @@
           <p:nvPr/>
         </p:nvPicPr>
         <p:blipFill>
-          <a:blip r:embed="rId2">
+          <a:blip r:embed="rId3">
             <a:extLst>
               <a:ext uri="{28A0092B-C50C-407E-A947-70E740481C1C}">
                 <a14:useLocalDpi xmlns:a14="http://schemas.microsoft.com/office/drawing/2010/main" val="0"/>
               </a:ext>
               <a:ext uri="{96DAC541-7B7A-43D3-8B79-37D633B846F1}">
-                <asvg:svgBlip xmlns:asvg="http://schemas.microsoft.com/office/drawing/2016/SVG/main" r:embed="rId3"/>
+                <asvg:svgBlip xmlns:asvg="http://schemas.microsoft.com/office/drawing/2016/SVG/main" r:embed="rId4"/>
               </a:ext>
             </a:extLst>
           </a:blip>
@@ -1616,13 +2406,13 @@
           <p:nvPr/>
         </p:nvPicPr>
         <p:blipFill>
-          <a:blip r:embed="rId2">
+          <a:blip r:embed="rId3">
             <a:extLst>
               <a:ext uri="{28A0092B-C50C-407E-A947-70E740481C1C}">
                 <a14:useLocalDpi xmlns:a14="http://schemas.microsoft.com/office/drawing/2010/main" val="0"/>
               </a:ext>
               <a:ext uri="{96DAC541-7B7A-43D3-8B79-37D633B846F1}">
-                <asvg:svgBlip xmlns:asvg="http://schemas.microsoft.com/office/drawing/2016/SVG/main" r:embed="rId3"/>
+                <asvg:svgBlip xmlns:asvg="http://schemas.microsoft.com/office/drawing/2016/SVG/main" r:embed="rId4"/>
               </a:ext>
             </a:extLst>
           </a:blip>
@@ -1697,13 +2487,13 @@
           <p:nvPr/>
         </p:nvPicPr>
         <p:blipFill>
-          <a:blip r:embed="rId2">
+          <a:blip r:embed="rId3">
             <a:extLst>
               <a:ext uri="{28A0092B-C50C-407E-A947-70E740481C1C}">
                 <a14:useLocalDpi xmlns:a14="http://schemas.microsoft.com/office/drawing/2010/main" val="0"/>
               </a:ext>
               <a:ext uri="{96DAC541-7B7A-43D3-8B79-37D633B846F1}">
-                <asvg:svgBlip xmlns:asvg="http://schemas.microsoft.com/office/drawing/2016/SVG/main" r:embed="rId3"/>
+                <asvg:svgBlip xmlns:asvg="http://schemas.microsoft.com/office/drawing/2016/SVG/main" r:embed="rId4"/>
               </a:ext>
             </a:extLst>
           </a:blip>
@@ -1730,13 +2520,13 @@
           <p:nvPr/>
         </p:nvPicPr>
         <p:blipFill>
-          <a:blip r:embed="rId2">
+          <a:blip r:embed="rId3">
             <a:extLst>
               <a:ext uri="{28A0092B-C50C-407E-A947-70E740481C1C}">
                 <a14:useLocalDpi xmlns:a14="http://schemas.microsoft.com/office/drawing/2010/main" val="0"/>
               </a:ext>
               <a:ext uri="{96DAC541-7B7A-43D3-8B79-37D633B846F1}">
-                <asvg:svgBlip xmlns:asvg="http://schemas.microsoft.com/office/drawing/2016/SVG/main" r:embed="rId3"/>
+                <asvg:svgBlip xmlns:asvg="http://schemas.microsoft.com/office/drawing/2016/SVG/main" r:embed="rId4"/>
               </a:ext>
             </a:extLst>
           </a:blip>
@@ -1763,13 +2553,13 @@
           <p:nvPr/>
         </p:nvPicPr>
         <p:blipFill>
-          <a:blip r:embed="rId2">
+          <a:blip r:embed="rId3">
             <a:extLst>
               <a:ext uri="{28A0092B-C50C-407E-A947-70E740481C1C}">
                 <a14:useLocalDpi xmlns:a14="http://schemas.microsoft.com/office/drawing/2010/main" val="0"/>
               </a:ext>
               <a:ext uri="{96DAC541-7B7A-43D3-8B79-37D633B846F1}">
-                <asvg:svgBlip xmlns:asvg="http://schemas.microsoft.com/office/drawing/2016/SVG/main" r:embed="rId3"/>
+                <asvg:svgBlip xmlns:asvg="http://schemas.microsoft.com/office/drawing/2016/SVG/main" r:embed="rId4"/>
               </a:ext>
             </a:extLst>
           </a:blip>
@@ -1796,13 +2586,13 @@
           <p:nvPr/>
         </p:nvPicPr>
         <p:blipFill>
-          <a:blip r:embed="rId2">
+          <a:blip r:embed="rId3">
             <a:extLst>
               <a:ext uri="{28A0092B-C50C-407E-A947-70E740481C1C}">
                 <a14:useLocalDpi xmlns:a14="http://schemas.microsoft.com/office/drawing/2010/main" val="0"/>
               </a:ext>
               <a:ext uri="{96DAC541-7B7A-43D3-8B79-37D633B846F1}">
-                <asvg:svgBlip xmlns:asvg="http://schemas.microsoft.com/office/drawing/2016/SVG/main" r:embed="rId3"/>
+                <asvg:svgBlip xmlns:asvg="http://schemas.microsoft.com/office/drawing/2016/SVG/main" r:embed="rId4"/>
               </a:ext>
             </a:extLst>
           </a:blip>
@@ -1877,13 +2667,13 @@
           <p:nvPr/>
         </p:nvPicPr>
         <p:blipFill>
-          <a:blip r:embed="rId2">
+          <a:blip r:embed="rId3">
             <a:extLst>
               <a:ext uri="{28A0092B-C50C-407E-A947-70E740481C1C}">
                 <a14:useLocalDpi xmlns:a14="http://schemas.microsoft.com/office/drawing/2010/main" val="0"/>
               </a:ext>
               <a:ext uri="{96DAC541-7B7A-43D3-8B79-37D633B846F1}">
-                <asvg:svgBlip xmlns:asvg="http://schemas.microsoft.com/office/drawing/2016/SVG/main" r:embed="rId3"/>
+                <asvg:svgBlip xmlns:asvg="http://schemas.microsoft.com/office/drawing/2016/SVG/main" r:embed="rId4"/>
               </a:ext>
             </a:extLst>
           </a:blip>
@@ -2845,13 +3635,13 @@
           <p:nvPr/>
         </p:nvPicPr>
         <p:blipFill>
-          <a:blip r:embed="rId2">
+          <a:blip r:embed="rId3">
             <a:extLst>
               <a:ext uri="{28A0092B-C50C-407E-A947-70E740481C1C}">
                 <a14:useLocalDpi xmlns:a14="http://schemas.microsoft.com/office/drawing/2010/main" val="0"/>
               </a:ext>
               <a:ext uri="{96DAC541-7B7A-43D3-8B79-37D633B846F1}">
-                <asvg:svgBlip xmlns:asvg="http://schemas.microsoft.com/office/drawing/2016/SVG/main" r:embed="rId3"/>
+                <asvg:svgBlip xmlns:asvg="http://schemas.microsoft.com/office/drawing/2016/SVG/main" r:embed="rId4"/>
               </a:ext>
             </a:extLst>
           </a:blip>
@@ -2878,13 +3668,13 @@
           <p:nvPr/>
         </p:nvPicPr>
         <p:blipFill>
-          <a:blip r:embed="rId2">
+          <a:blip r:embed="rId3">
             <a:extLst>
               <a:ext uri="{28A0092B-C50C-407E-A947-70E740481C1C}">
                 <a14:useLocalDpi xmlns:a14="http://schemas.microsoft.com/office/drawing/2010/main" val="0"/>
               </a:ext>
               <a:ext uri="{96DAC541-7B7A-43D3-8B79-37D633B846F1}">
-                <asvg:svgBlip xmlns:asvg="http://schemas.microsoft.com/office/drawing/2016/SVG/main" r:embed="rId3"/>
+                <asvg:svgBlip xmlns:asvg="http://schemas.microsoft.com/office/drawing/2016/SVG/main" r:embed="rId4"/>
               </a:ext>
             </a:extLst>
           </a:blip>
@@ -2911,13 +3701,13 @@
           <p:nvPr/>
         </p:nvPicPr>
         <p:blipFill>
-          <a:blip r:embed="rId2">
+          <a:blip r:embed="rId3">
             <a:extLst>
               <a:ext uri="{28A0092B-C50C-407E-A947-70E740481C1C}">
                 <a14:useLocalDpi xmlns:a14="http://schemas.microsoft.com/office/drawing/2010/main" val="0"/>
               </a:ext>
               <a:ext uri="{96DAC541-7B7A-43D3-8B79-37D633B846F1}">
-                <asvg:svgBlip xmlns:asvg="http://schemas.microsoft.com/office/drawing/2016/SVG/main" r:embed="rId3"/>
+                <asvg:svgBlip xmlns:asvg="http://schemas.microsoft.com/office/drawing/2016/SVG/main" r:embed="rId4"/>
               </a:ext>
             </a:extLst>
           </a:blip>
@@ -2992,13 +3782,13 @@
           <p:nvPr/>
         </p:nvPicPr>
         <p:blipFill>
-          <a:blip r:embed="rId2">
+          <a:blip r:embed="rId3">
             <a:extLst>
               <a:ext uri="{28A0092B-C50C-407E-A947-70E740481C1C}">
                 <a14:useLocalDpi xmlns:a14="http://schemas.microsoft.com/office/drawing/2010/main" val="0"/>
               </a:ext>
               <a:ext uri="{96DAC541-7B7A-43D3-8B79-37D633B846F1}">
-                <asvg:svgBlip xmlns:asvg="http://schemas.microsoft.com/office/drawing/2016/SVG/main" r:embed="rId3"/>
+                <asvg:svgBlip xmlns:asvg="http://schemas.microsoft.com/office/drawing/2016/SVG/main" r:embed="rId4"/>
               </a:ext>
             </a:extLst>
           </a:blip>
@@ -3025,13 +3815,13 @@
           <p:nvPr/>
         </p:nvPicPr>
         <p:blipFill>
-          <a:blip r:embed="rId2">
+          <a:blip r:embed="rId3">
             <a:extLst>
               <a:ext uri="{28A0092B-C50C-407E-A947-70E740481C1C}">
                 <a14:useLocalDpi xmlns:a14="http://schemas.microsoft.com/office/drawing/2010/main" val="0"/>
               </a:ext>
               <a:ext uri="{96DAC541-7B7A-43D3-8B79-37D633B846F1}">
-                <asvg:svgBlip xmlns:asvg="http://schemas.microsoft.com/office/drawing/2016/SVG/main" r:embed="rId3"/>
+                <asvg:svgBlip xmlns:asvg="http://schemas.microsoft.com/office/drawing/2016/SVG/main" r:embed="rId4"/>
               </a:ext>
             </a:extLst>
           </a:blip>
@@ -3058,13 +3848,13 @@
           <p:nvPr/>
         </p:nvPicPr>
         <p:blipFill>
-          <a:blip r:embed="rId2">
+          <a:blip r:embed="rId3">
             <a:extLst>
               <a:ext uri="{28A0092B-C50C-407E-A947-70E740481C1C}">
                 <a14:useLocalDpi xmlns:a14="http://schemas.microsoft.com/office/drawing/2010/main" val="0"/>
               </a:ext>
               <a:ext uri="{96DAC541-7B7A-43D3-8B79-37D633B846F1}">
-                <asvg:svgBlip xmlns:asvg="http://schemas.microsoft.com/office/drawing/2016/SVG/main" r:embed="rId3"/>
+                <asvg:svgBlip xmlns:asvg="http://schemas.microsoft.com/office/drawing/2016/SVG/main" r:embed="rId4"/>
               </a:ext>
             </a:extLst>
           </a:blip>
@@ -4146,7 +4936,7 @@
       </p:cxnSp>
       <mc:AlternateContent xmlns:mc="http://schemas.openxmlformats.org/markup-compatibility/2006" xmlns:p14="http://schemas.microsoft.com/office/powerpoint/2010/main">
         <mc:Choice Requires="p14">
-          <p:contentPart p14:bwMode="auto" r:id="rId2">
+          <p:contentPart p14:bwMode="auto" r:id="rId3">
             <p14:nvContentPartPr>
               <p14:cNvPr id="31" name="Ink 30">
                 <a:extLst>
@@ -4178,7 +4968,7 @@
               <p:nvPr/>
             </p:nvPicPr>
             <p:blipFill>
-              <a:blip r:embed="rId3"/>
+              <a:blip r:embed="rId4"/>
               <a:stretch>
                 <a:fillRect/>
               </a:stretch>
@@ -4197,7 +4987,7 @@
       </mc:AlternateContent>
       <mc:AlternateContent xmlns:mc="http://schemas.openxmlformats.org/markup-compatibility/2006" xmlns:p14="http://schemas.microsoft.com/office/powerpoint/2010/main">
         <mc:Choice Requires="p14">
-          <p:contentPart p14:bwMode="auto" r:id="rId4">
+          <p:contentPart p14:bwMode="auto" r:id="rId5">
             <p14:nvContentPartPr>
               <p14:cNvPr id="52" name="Ink 51">
                 <a:extLst>
@@ -4229,7 +5019,7 @@
               <p:nvPr/>
             </p:nvPicPr>
             <p:blipFill>
-              <a:blip r:embed="rId5"/>
+              <a:blip r:embed="rId6"/>
               <a:stretch>
                 <a:fillRect/>
               </a:stretch>
@@ -4291,13 +5081,13 @@
           <p:nvPr/>
         </p:nvPicPr>
         <p:blipFill>
-          <a:blip r:embed="rId2">
+          <a:blip r:embed="rId3">
             <a:extLst>
               <a:ext uri="{28A0092B-C50C-407E-A947-70E740481C1C}">
                 <a14:useLocalDpi xmlns:a14="http://schemas.microsoft.com/office/drawing/2010/main" val="0"/>
               </a:ext>
               <a:ext uri="{96DAC541-7B7A-43D3-8B79-37D633B846F1}">
-                <asvg:svgBlip xmlns:asvg="http://schemas.microsoft.com/office/drawing/2016/SVG/main" r:embed="rId3"/>
+                <asvg:svgBlip xmlns:asvg="http://schemas.microsoft.com/office/drawing/2016/SVG/main" r:embed="rId4"/>
               </a:ext>
             </a:extLst>
           </a:blip>
@@ -4359,13 +5149,13 @@
           <p:nvPr/>
         </p:nvPicPr>
         <p:blipFill>
-          <a:blip r:embed="rId4">
+          <a:blip r:embed="rId5">
             <a:extLst>
               <a:ext uri="{28A0092B-C50C-407E-A947-70E740481C1C}">
                 <a14:useLocalDpi xmlns:a14="http://schemas.microsoft.com/office/drawing/2010/main" val="0"/>
               </a:ext>
               <a:ext uri="{96DAC541-7B7A-43D3-8B79-37D633B846F1}">
-                <asvg:svgBlip xmlns:asvg="http://schemas.microsoft.com/office/drawing/2016/SVG/main" r:embed="rId5"/>
+                <asvg:svgBlip xmlns:asvg="http://schemas.microsoft.com/office/drawing/2016/SVG/main" r:embed="rId6"/>
               </a:ext>
             </a:extLst>
           </a:blip>
@@ -4398,13 +5188,13 @@
           <p:nvPr/>
         </p:nvPicPr>
         <p:blipFill>
-          <a:blip r:embed="rId6">
+          <a:blip r:embed="rId7">
             <a:extLst>
               <a:ext uri="{28A0092B-C50C-407E-A947-70E740481C1C}">
                 <a14:useLocalDpi xmlns:a14="http://schemas.microsoft.com/office/drawing/2010/main" val="0"/>
               </a:ext>
               <a:ext uri="{96DAC541-7B7A-43D3-8B79-37D633B846F1}">
-                <asvg:svgBlip xmlns:asvg="http://schemas.microsoft.com/office/drawing/2016/SVG/main" r:embed="rId7"/>
+                <asvg:svgBlip xmlns:asvg="http://schemas.microsoft.com/office/drawing/2016/SVG/main" r:embed="rId8"/>
               </a:ext>
             </a:extLst>
           </a:blip>
@@ -4437,13 +5227,13 @@
           <p:nvPr/>
         </p:nvPicPr>
         <p:blipFill>
-          <a:blip r:embed="rId8">
+          <a:blip r:embed="rId9">
             <a:extLst>
               <a:ext uri="{28A0092B-C50C-407E-A947-70E740481C1C}">
                 <a14:useLocalDpi xmlns:a14="http://schemas.microsoft.com/office/drawing/2010/main" val="0"/>
               </a:ext>
               <a:ext uri="{96DAC541-7B7A-43D3-8B79-37D633B846F1}">
-                <asvg:svgBlip xmlns:asvg="http://schemas.microsoft.com/office/drawing/2016/SVG/main" r:embed="rId9"/>
+                <asvg:svgBlip xmlns:asvg="http://schemas.microsoft.com/office/drawing/2016/SVG/main" r:embed="rId10"/>
               </a:ext>
             </a:extLst>
           </a:blip>
@@ -4476,13 +5266,13 @@
           <p:nvPr/>
         </p:nvPicPr>
         <p:blipFill>
-          <a:blip r:embed="rId10">
+          <a:blip r:embed="rId11">
             <a:extLst>
               <a:ext uri="{28A0092B-C50C-407E-A947-70E740481C1C}">
                 <a14:useLocalDpi xmlns:a14="http://schemas.microsoft.com/office/drawing/2010/main" val="0"/>
               </a:ext>
               <a:ext uri="{96DAC541-7B7A-43D3-8B79-37D633B846F1}">
-                <asvg:svgBlip xmlns:asvg="http://schemas.microsoft.com/office/drawing/2016/SVG/main" r:embed="rId11"/>
+                <asvg:svgBlip xmlns:asvg="http://schemas.microsoft.com/office/drawing/2016/SVG/main" r:embed="rId12"/>
               </a:ext>
             </a:extLst>
           </a:blip>
@@ -4655,13 +5445,13 @@
           <p:nvPr/>
         </p:nvPicPr>
         <p:blipFill>
-          <a:blip r:embed="rId10">
+          <a:blip r:embed="rId11">
             <a:extLst>
               <a:ext uri="{28A0092B-C50C-407E-A947-70E740481C1C}">
                 <a14:useLocalDpi xmlns:a14="http://schemas.microsoft.com/office/drawing/2010/main" val="0"/>
               </a:ext>
               <a:ext uri="{96DAC541-7B7A-43D3-8B79-37D633B846F1}">
-                <asvg:svgBlip xmlns:asvg="http://schemas.microsoft.com/office/drawing/2016/SVG/main" r:embed="rId11"/>
+                <asvg:svgBlip xmlns:asvg="http://schemas.microsoft.com/office/drawing/2016/SVG/main" r:embed="rId12"/>
               </a:ext>
             </a:extLst>
           </a:blip>
@@ -4694,13 +5484,13 @@
           <p:nvPr/>
         </p:nvPicPr>
         <p:blipFill>
-          <a:blip r:embed="rId10">
+          <a:blip r:embed="rId11">
             <a:extLst>
               <a:ext uri="{28A0092B-C50C-407E-A947-70E740481C1C}">
                 <a14:useLocalDpi xmlns:a14="http://schemas.microsoft.com/office/drawing/2010/main" val="0"/>
               </a:ext>
               <a:ext uri="{96DAC541-7B7A-43D3-8B79-37D633B846F1}">
-                <asvg:svgBlip xmlns:asvg="http://schemas.microsoft.com/office/drawing/2016/SVG/main" r:embed="rId11"/>
+                <asvg:svgBlip xmlns:asvg="http://schemas.microsoft.com/office/drawing/2016/SVG/main" r:embed="rId12"/>
               </a:ext>
             </a:extLst>
           </a:blip>
@@ -4733,13 +5523,13 @@
           <p:nvPr/>
         </p:nvPicPr>
         <p:blipFill>
-          <a:blip r:embed="rId10">
+          <a:blip r:embed="rId11">
             <a:extLst>
               <a:ext uri="{28A0092B-C50C-407E-A947-70E740481C1C}">
                 <a14:useLocalDpi xmlns:a14="http://schemas.microsoft.com/office/drawing/2010/main" val="0"/>
               </a:ext>
               <a:ext uri="{96DAC541-7B7A-43D3-8B79-37D633B846F1}">
-                <asvg:svgBlip xmlns:asvg="http://schemas.microsoft.com/office/drawing/2016/SVG/main" r:embed="rId11"/>
+                <asvg:svgBlip xmlns:asvg="http://schemas.microsoft.com/office/drawing/2016/SVG/main" r:embed="rId12"/>
               </a:ext>
             </a:extLst>
           </a:blip>
@@ -4772,13 +5562,13 @@
           <p:nvPr/>
         </p:nvPicPr>
         <p:blipFill>
-          <a:blip r:embed="rId12">
+          <a:blip r:embed="rId13">
             <a:extLst>
               <a:ext uri="{28A0092B-C50C-407E-A947-70E740481C1C}">
                 <a14:useLocalDpi xmlns:a14="http://schemas.microsoft.com/office/drawing/2010/main" val="0"/>
               </a:ext>
               <a:ext uri="{96DAC541-7B7A-43D3-8B79-37D633B846F1}">
-                <asvg:svgBlip xmlns:asvg="http://schemas.microsoft.com/office/drawing/2016/SVG/main" r:embed="rId13"/>
+                <asvg:svgBlip xmlns:asvg="http://schemas.microsoft.com/office/drawing/2016/SVG/main" r:embed="rId14"/>
               </a:ext>
             </a:extLst>
           </a:blip>
@@ -4788,8 +5578,47 @@
         </p:blipFill>
         <p:spPr>
           <a:xfrm>
-            <a:off x="2924359" y="2127180"/>
+            <a:off x="4173737" y="412822"/>
             <a:ext cx="666820" cy="666820"/>
+          </a:xfrm>
+          <a:prstGeom prst="rect">
+            <a:avLst/>
+          </a:prstGeom>
+        </p:spPr>
+      </p:pic>
+      <p:pic>
+        <p:nvPicPr>
+          <p:cNvPr id="5" name="Graphic 4" descr="Medical">
+            <a:extLst>
+              <a:ext uri="{FF2B5EF4-FFF2-40B4-BE49-F238E27FC236}">
+                <a16:creationId xmlns:a16="http://schemas.microsoft.com/office/drawing/2014/main" id="{6D441BD3-AB7F-4029-9866-3CC62DE41FB1}"/>
+              </a:ext>
+            </a:extLst>
+          </p:cNvPr>
+          <p:cNvPicPr>
+            <a:picLocks noChangeAspect="1"/>
+          </p:cNvPicPr>
+          <p:nvPr/>
+        </p:nvPicPr>
+        <p:blipFill>
+          <a:blip r:embed="rId15">
+            <a:extLst>
+              <a:ext uri="{28A0092B-C50C-407E-A947-70E740481C1C}">
+                <a14:useLocalDpi xmlns:a14="http://schemas.microsoft.com/office/drawing/2010/main" val="0"/>
+              </a:ext>
+              <a:ext uri="{96DAC541-7B7A-43D3-8B79-37D633B846F1}">
+                <asvg:svgBlip xmlns:asvg="http://schemas.microsoft.com/office/drawing/2016/SVG/main" r:embed="rId16"/>
+              </a:ext>
+            </a:extLst>
+          </a:blip>
+          <a:stretch>
+            <a:fillRect/>
+          </a:stretch>
+        </p:blipFill>
+        <p:spPr>
+          <a:xfrm>
+            <a:off x="1172468" y="983579"/>
+            <a:ext cx="1833282" cy="1833282"/>
           </a:xfrm>
           <a:prstGeom prst="rect">
             <a:avLst/>
@@ -4800,6 +5629,1970 @@
     <p:extLst>
       <p:ext uri="{BB962C8B-B14F-4D97-AF65-F5344CB8AC3E}">
         <p14:creationId xmlns:p14="http://schemas.microsoft.com/office/powerpoint/2010/main" val="3282302956"/>
+      </p:ext>
+    </p:extLst>
+  </p:cSld>
+  <p:clrMapOvr>
+    <a:masterClrMapping/>
+  </p:clrMapOvr>
+</p:sld>
+</file>
+
+<file path=ppt/slides/slide5.xml><?xml version="1.0" encoding="utf-8"?>
+<p:sld xmlns:a="http://schemas.openxmlformats.org/drawingml/2006/main" xmlns:r="http://schemas.openxmlformats.org/officeDocument/2006/relationships" xmlns:p="http://schemas.openxmlformats.org/presentationml/2006/main" show="0">
+  <p:cSld>
+    <p:spTree>
+      <p:nvGrpSpPr>
+        <p:cNvPr id="1" name=""/>
+        <p:cNvGrpSpPr/>
+        <p:nvPr/>
+      </p:nvGrpSpPr>
+      <p:grpSpPr>
+        <a:xfrm>
+          <a:off x="0" y="0"/>
+          <a:ext cx="0" cy="0"/>
+          <a:chOff x="0" y="0"/>
+          <a:chExt cx="0" cy="0"/>
+        </a:xfrm>
+      </p:grpSpPr>
+      <p:sp>
+        <p:nvSpPr>
+          <p:cNvPr id="52" name="Right Triangle 51">
+            <a:extLst>
+              <a:ext uri="{FF2B5EF4-FFF2-40B4-BE49-F238E27FC236}">
+                <a16:creationId xmlns:a16="http://schemas.microsoft.com/office/drawing/2014/main" id="{7EEC47FB-05CD-4B35-9AE0-C2A61A013DBF}"/>
+              </a:ext>
+            </a:extLst>
+          </p:cNvPr>
+          <p:cNvSpPr/>
+          <p:nvPr/>
+        </p:nvSpPr>
+        <p:spPr>
+          <a:xfrm flipH="1">
+            <a:off x="1983928" y="2665272"/>
+            <a:ext cx="8743432" cy="2153072"/>
+          </a:xfrm>
+          <a:prstGeom prst="rtTriangle">
+            <a:avLst/>
+          </a:prstGeom>
+          <a:solidFill>
+            <a:schemeClr val="tx2">
+              <a:lumMod val="20000"/>
+              <a:lumOff val="80000"/>
+            </a:schemeClr>
+          </a:solidFill>
+          <a:ln>
+            <a:noFill/>
+          </a:ln>
+        </p:spPr>
+        <p:style>
+          <a:lnRef idx="2">
+            <a:schemeClr val="accent1">
+              <a:shade val="50000"/>
+            </a:schemeClr>
+          </a:lnRef>
+          <a:fillRef idx="1">
+            <a:schemeClr val="accent1"/>
+          </a:fillRef>
+          <a:effectRef idx="0">
+            <a:schemeClr val="accent1"/>
+          </a:effectRef>
+          <a:fontRef idx="minor">
+            <a:schemeClr val="lt1"/>
+          </a:fontRef>
+        </p:style>
+        <p:txBody>
+          <a:bodyPr rtlCol="0" anchor="ctr"/>
+          <a:lstStyle/>
+          <a:p>
+            <a:pPr algn="ctr" defTabSz="914225"/>
+            <a:endParaRPr lang="en-CA">
+              <a:solidFill>
+                <a:prstClr val="white"/>
+              </a:solidFill>
+              <a:latin typeface="Calibri" panose="020F0502020204030204"/>
+            </a:endParaRPr>
+          </a:p>
+        </p:txBody>
+      </p:sp>
+      <p:cxnSp>
+        <p:nvCxnSpPr>
+          <p:cNvPr id="57" name="Straight Connector 56">
+            <a:extLst>
+              <a:ext uri="{FF2B5EF4-FFF2-40B4-BE49-F238E27FC236}">
+                <a16:creationId xmlns:a16="http://schemas.microsoft.com/office/drawing/2014/main" id="{A2E57009-F88B-412B-890D-C7F6065077AE}"/>
+              </a:ext>
+            </a:extLst>
+          </p:cNvPr>
+          <p:cNvCxnSpPr>
+            <a:cxnSpLocks/>
+          </p:cNvCxnSpPr>
+          <p:nvPr/>
+        </p:nvCxnSpPr>
+        <p:spPr>
+          <a:xfrm flipH="1" flipV="1">
+            <a:off x="1769680" y="4268650"/>
+            <a:ext cx="8697055" cy="22935"/>
+          </a:xfrm>
+          <a:prstGeom prst="line">
+            <a:avLst/>
+          </a:prstGeom>
+          <a:ln/>
+        </p:spPr>
+        <p:style>
+          <a:lnRef idx="1">
+            <a:schemeClr val="accent3"/>
+          </a:lnRef>
+          <a:fillRef idx="0">
+            <a:schemeClr val="accent3"/>
+          </a:fillRef>
+          <a:effectRef idx="0">
+            <a:schemeClr val="accent3"/>
+          </a:effectRef>
+          <a:fontRef idx="minor">
+            <a:schemeClr val="tx1"/>
+          </a:fontRef>
+        </p:style>
+      </p:cxnSp>
+      <p:cxnSp>
+        <p:nvCxnSpPr>
+          <p:cNvPr id="61" name="Straight Connector 60">
+            <a:extLst>
+              <a:ext uri="{FF2B5EF4-FFF2-40B4-BE49-F238E27FC236}">
+                <a16:creationId xmlns:a16="http://schemas.microsoft.com/office/drawing/2014/main" id="{AC56B326-4519-482A-9F9A-93BC826B9AB3}"/>
+              </a:ext>
+            </a:extLst>
+          </p:cNvPr>
+          <p:cNvCxnSpPr>
+            <a:cxnSpLocks/>
+          </p:cNvCxnSpPr>
+          <p:nvPr/>
+        </p:nvCxnSpPr>
+        <p:spPr>
+          <a:xfrm flipH="1">
+            <a:off x="1757806" y="3707804"/>
+            <a:ext cx="8708927" cy="0"/>
+          </a:xfrm>
+          <a:prstGeom prst="line">
+            <a:avLst/>
+          </a:prstGeom>
+          <a:ln/>
+        </p:spPr>
+        <p:style>
+          <a:lnRef idx="1">
+            <a:schemeClr val="accent3"/>
+          </a:lnRef>
+          <a:fillRef idx="0">
+            <a:schemeClr val="accent3"/>
+          </a:fillRef>
+          <a:effectRef idx="0">
+            <a:schemeClr val="accent3"/>
+          </a:effectRef>
+          <a:fontRef idx="minor">
+            <a:schemeClr val="tx1"/>
+          </a:fontRef>
+        </p:style>
+      </p:cxnSp>
+      <p:cxnSp>
+        <p:nvCxnSpPr>
+          <p:cNvPr id="64" name="Straight Connector 63">
+            <a:extLst>
+              <a:ext uri="{FF2B5EF4-FFF2-40B4-BE49-F238E27FC236}">
+                <a16:creationId xmlns:a16="http://schemas.microsoft.com/office/drawing/2014/main" id="{C0EF3E87-77F2-46B0-A6F1-45E6F71A5D57}"/>
+              </a:ext>
+            </a:extLst>
+          </p:cNvPr>
+          <p:cNvCxnSpPr>
+            <a:cxnSpLocks/>
+          </p:cNvCxnSpPr>
+          <p:nvPr/>
+        </p:nvCxnSpPr>
+        <p:spPr>
+          <a:xfrm flipH="1">
+            <a:off x="1771216" y="3194515"/>
+            <a:ext cx="8695517" cy="2474"/>
+          </a:xfrm>
+          <a:prstGeom prst="line">
+            <a:avLst/>
+          </a:prstGeom>
+          <a:ln/>
+        </p:spPr>
+        <p:style>
+          <a:lnRef idx="1">
+            <a:schemeClr val="accent3"/>
+          </a:lnRef>
+          <a:fillRef idx="0">
+            <a:schemeClr val="accent3"/>
+          </a:fillRef>
+          <a:effectRef idx="0">
+            <a:schemeClr val="accent3"/>
+          </a:effectRef>
+          <a:fontRef idx="minor">
+            <a:schemeClr val="tx1"/>
+          </a:fontRef>
+        </p:style>
+      </p:cxnSp>
+      <p:pic>
+        <p:nvPicPr>
+          <p:cNvPr id="5" name="Picture 4">
+            <a:extLst>
+              <a:ext uri="{FF2B5EF4-FFF2-40B4-BE49-F238E27FC236}">
+                <a16:creationId xmlns:a16="http://schemas.microsoft.com/office/drawing/2014/main" id="{40A931D9-88CF-4930-847D-B2F1926DDABA}"/>
+              </a:ext>
+            </a:extLst>
+          </p:cNvPr>
+          <p:cNvPicPr>
+            <a:picLocks noChangeAspect="1"/>
+          </p:cNvPicPr>
+          <p:nvPr/>
+        </p:nvPicPr>
+        <p:blipFill>
+          <a:blip r:embed="rId3"/>
+          <a:stretch>
+            <a:fillRect/>
+          </a:stretch>
+        </p:blipFill>
+        <p:spPr>
+          <a:xfrm>
+            <a:off x="258449" y="3199568"/>
+            <a:ext cx="2985768" cy="2985768"/>
+          </a:xfrm>
+          <a:prstGeom prst="rect">
+            <a:avLst/>
+          </a:prstGeom>
+        </p:spPr>
+      </p:pic>
+      <p:sp>
+        <p:nvSpPr>
+          <p:cNvPr id="94" name="Cylinder 93">
+            <a:extLst>
+              <a:ext uri="{FF2B5EF4-FFF2-40B4-BE49-F238E27FC236}">
+                <a16:creationId xmlns:a16="http://schemas.microsoft.com/office/drawing/2014/main" id="{A0958864-8217-4156-8404-E313E3BD06F2}"/>
+              </a:ext>
+            </a:extLst>
+          </p:cNvPr>
+          <p:cNvSpPr/>
+          <p:nvPr/>
+        </p:nvSpPr>
+        <p:spPr>
+          <a:xfrm rot="16200000">
+            <a:off x="4568714" y="-3522269"/>
+            <a:ext cx="1519433" cy="10368493"/>
+          </a:xfrm>
+          <a:prstGeom prst="can">
+            <a:avLst>
+              <a:gd name="adj" fmla="val 13510"/>
+            </a:avLst>
+          </a:prstGeom>
+        </p:spPr>
+        <p:style>
+          <a:lnRef idx="2">
+            <a:schemeClr val="accent5"/>
+          </a:lnRef>
+          <a:fillRef idx="1">
+            <a:schemeClr val="lt1"/>
+          </a:fillRef>
+          <a:effectRef idx="0">
+            <a:schemeClr val="accent5"/>
+          </a:effectRef>
+          <a:fontRef idx="minor">
+            <a:schemeClr val="dk1"/>
+          </a:fontRef>
+        </p:style>
+        <p:txBody>
+          <a:bodyPr rtlCol="0" anchor="ctr"/>
+          <a:lstStyle/>
+          <a:p>
+            <a:pPr algn="ctr" defTabSz="914225"/>
+            <a:endParaRPr lang="en-CA">
+              <a:solidFill>
+                <a:prstClr val="black"/>
+              </a:solidFill>
+              <a:latin typeface="Calibri" panose="020F0502020204030204"/>
+            </a:endParaRPr>
+          </a:p>
+        </p:txBody>
+      </p:sp>
+      <p:sp>
+        <p:nvSpPr>
+          <p:cNvPr id="2" name="Title 1">
+            <a:extLst>
+              <a:ext uri="{FF2B5EF4-FFF2-40B4-BE49-F238E27FC236}">
+                <a16:creationId xmlns:a16="http://schemas.microsoft.com/office/drawing/2014/main" id="{CEAF62CB-986D-4422-AD92-7948472BBB85}"/>
+              </a:ext>
+            </a:extLst>
+          </p:cNvPr>
+          <p:cNvSpPr>
+            <a:spLocks noGrp="1"/>
+          </p:cNvSpPr>
+          <p:nvPr>
+            <p:ph type="title"/>
+          </p:nvPr>
+        </p:nvSpPr>
+        <p:spPr>
+          <a:xfrm>
+            <a:off x="865" y="487"/>
+            <a:ext cx="12190271" cy="615549"/>
+          </a:xfrm>
+        </p:spPr>
+        <p:txBody>
+          <a:bodyPr/>
+          <a:lstStyle/>
+          <a:p>
+            <a:r>
+              <a:rPr lang="en-US" dirty="0"/>
+              <a:t>Team Services Pipeline with DEV, BETA, and PROD environments</a:t>
+            </a:r>
+            <a:endParaRPr lang="en-CA" dirty="0"/>
+          </a:p>
+        </p:txBody>
+      </p:sp>
+      <p:pic>
+        <p:nvPicPr>
+          <p:cNvPr id="4" name="Graphic 3" descr="Gears">
+            <a:extLst>
+              <a:ext uri="{FF2B5EF4-FFF2-40B4-BE49-F238E27FC236}">
+                <a16:creationId xmlns:a16="http://schemas.microsoft.com/office/drawing/2014/main" id="{6CE2A62B-CD7E-4252-B334-F4147CD33518}"/>
+              </a:ext>
+            </a:extLst>
+          </p:cNvPr>
+          <p:cNvPicPr>
+            <a:picLocks noChangeAspect="1"/>
+          </p:cNvPicPr>
+          <p:nvPr/>
+        </p:nvPicPr>
+        <p:blipFill>
+          <a:blip r:embed="rId4">
+            <a:extLst>
+              <a:ext uri="{28A0092B-C50C-407E-A947-70E740481C1C}">
+                <a14:useLocalDpi xmlns:a14="http://schemas.microsoft.com/office/drawing/2010/main" val="0"/>
+              </a:ext>
+              <a:ext uri="{96DAC541-7B7A-43D3-8B79-37D633B846F1}">
+                <asvg:svgBlip xmlns:asvg="http://schemas.microsoft.com/office/drawing/2016/SVG/main" r:embed="rId5"/>
+              </a:ext>
+            </a:extLst>
+          </a:blip>
+          <a:stretch>
+            <a:fillRect/>
+          </a:stretch>
+        </p:blipFill>
+        <p:spPr>
+          <a:xfrm>
+            <a:off x="2461026" y="1467098"/>
+            <a:ext cx="914270" cy="914270"/>
+          </a:xfrm>
+          <a:prstGeom prst="rect">
+            <a:avLst/>
+          </a:prstGeom>
+        </p:spPr>
+      </p:pic>
+      <p:pic>
+        <p:nvPicPr>
+          <p:cNvPr id="6" name="Graphic 5" descr="Computer">
+            <a:extLst>
+              <a:ext uri="{FF2B5EF4-FFF2-40B4-BE49-F238E27FC236}">
+                <a16:creationId xmlns:a16="http://schemas.microsoft.com/office/drawing/2014/main" id="{42247EB7-625F-4E22-8D37-B42F0E49E146}"/>
+              </a:ext>
+            </a:extLst>
+          </p:cNvPr>
+          <p:cNvPicPr>
+            <a:picLocks noChangeAspect="1"/>
+          </p:cNvPicPr>
+          <p:nvPr/>
+        </p:nvPicPr>
+        <p:blipFill>
+          <a:blip r:embed="rId6">
+            <a:extLst>
+              <a:ext uri="{28A0092B-C50C-407E-A947-70E740481C1C}">
+                <a14:useLocalDpi xmlns:a14="http://schemas.microsoft.com/office/drawing/2010/main" val="0"/>
+              </a:ext>
+              <a:ext uri="{96DAC541-7B7A-43D3-8B79-37D633B846F1}">
+                <asvg:svgBlip xmlns:asvg="http://schemas.microsoft.com/office/drawing/2016/SVG/main" r:embed="rId7"/>
+              </a:ext>
+            </a:extLst>
+          </a:blip>
+          <a:stretch>
+            <a:fillRect/>
+          </a:stretch>
+        </p:blipFill>
+        <p:spPr>
+          <a:xfrm>
+            <a:off x="762769" y="1467098"/>
+            <a:ext cx="914270" cy="914270"/>
+          </a:xfrm>
+          <a:prstGeom prst="rect">
+            <a:avLst/>
+          </a:prstGeom>
+        </p:spPr>
+      </p:pic>
+      <p:pic>
+        <p:nvPicPr>
+          <p:cNvPr id="10" name="Graphic 9" descr="Box">
+            <a:extLst>
+              <a:ext uri="{FF2B5EF4-FFF2-40B4-BE49-F238E27FC236}">
+                <a16:creationId xmlns:a16="http://schemas.microsoft.com/office/drawing/2014/main" id="{30853494-58A6-468A-A259-3F1D9A1B56A0}"/>
+              </a:ext>
+            </a:extLst>
+          </p:cNvPr>
+          <p:cNvPicPr>
+            <a:picLocks noChangeAspect="1"/>
+          </p:cNvPicPr>
+          <p:nvPr/>
+        </p:nvPicPr>
+        <p:blipFill>
+          <a:blip r:embed="rId8">
+            <a:extLst>
+              <a:ext uri="{28A0092B-C50C-407E-A947-70E740481C1C}">
+                <a14:useLocalDpi xmlns:a14="http://schemas.microsoft.com/office/drawing/2010/main" val="0"/>
+              </a:ext>
+              <a:ext uri="{96DAC541-7B7A-43D3-8B79-37D633B846F1}">
+                <asvg:svgBlip xmlns:asvg="http://schemas.microsoft.com/office/drawing/2016/SVG/main" r:embed="rId9"/>
+              </a:ext>
+            </a:extLst>
+          </a:blip>
+          <a:stretch>
+            <a:fillRect/>
+          </a:stretch>
+        </p:blipFill>
+        <p:spPr>
+          <a:xfrm>
+            <a:off x="4332197" y="1467098"/>
+            <a:ext cx="914270" cy="914270"/>
+          </a:xfrm>
+          <a:prstGeom prst="rect">
+            <a:avLst/>
+          </a:prstGeom>
+        </p:spPr>
+      </p:pic>
+      <p:pic>
+        <p:nvPicPr>
+          <p:cNvPr id="12" name="Graphic 11" descr="Box trolley">
+            <a:extLst>
+              <a:ext uri="{FF2B5EF4-FFF2-40B4-BE49-F238E27FC236}">
+                <a16:creationId xmlns:a16="http://schemas.microsoft.com/office/drawing/2014/main" id="{FE598C15-12F9-4167-A8EF-182D2F021827}"/>
+              </a:ext>
+            </a:extLst>
+          </p:cNvPr>
+          <p:cNvPicPr>
+            <a:picLocks noChangeAspect="1"/>
+          </p:cNvPicPr>
+          <p:nvPr/>
+        </p:nvPicPr>
+        <p:blipFill>
+          <a:blip r:embed="rId10">
+            <a:extLst>
+              <a:ext uri="{28A0092B-C50C-407E-A947-70E740481C1C}">
+                <a14:useLocalDpi xmlns:a14="http://schemas.microsoft.com/office/drawing/2010/main" val="0"/>
+              </a:ext>
+              <a:ext uri="{96DAC541-7B7A-43D3-8B79-37D633B846F1}">
+                <asvg:svgBlip xmlns:asvg="http://schemas.microsoft.com/office/drawing/2016/SVG/main" r:embed="rId11"/>
+              </a:ext>
+            </a:extLst>
+          </a:blip>
+          <a:stretch>
+            <a:fillRect/>
+          </a:stretch>
+        </p:blipFill>
+        <p:spPr>
+          <a:xfrm>
+            <a:off x="8405410" y="1467098"/>
+            <a:ext cx="914270" cy="914270"/>
+          </a:xfrm>
+          <a:prstGeom prst="rect">
+            <a:avLst/>
+          </a:prstGeom>
+        </p:spPr>
+      </p:pic>
+      <p:pic>
+        <p:nvPicPr>
+          <p:cNvPr id="13" name="Graphic 12" descr="Box">
+            <a:extLst>
+              <a:ext uri="{FF2B5EF4-FFF2-40B4-BE49-F238E27FC236}">
+                <a16:creationId xmlns:a16="http://schemas.microsoft.com/office/drawing/2014/main" id="{9CD2C510-9B55-422E-B301-D8CE180E97C6}"/>
+              </a:ext>
+            </a:extLst>
+          </p:cNvPr>
+          <p:cNvPicPr>
+            <a:picLocks noChangeAspect="1"/>
+          </p:cNvPicPr>
+          <p:nvPr/>
+        </p:nvPicPr>
+        <p:blipFill>
+          <a:blip r:embed="rId8">
+            <a:extLst>
+              <a:ext uri="{28A0092B-C50C-407E-A947-70E740481C1C}">
+                <a14:useLocalDpi xmlns:a14="http://schemas.microsoft.com/office/drawing/2010/main" val="0"/>
+              </a:ext>
+              <a:ext uri="{96DAC541-7B7A-43D3-8B79-37D633B846F1}">
+                <asvg:svgBlip xmlns:asvg="http://schemas.microsoft.com/office/drawing/2016/SVG/main" r:embed="rId9"/>
+              </a:ext>
+            </a:extLst>
+          </a:blip>
+          <a:stretch>
+            <a:fillRect/>
+          </a:stretch>
+        </p:blipFill>
+        <p:spPr>
+          <a:xfrm>
+            <a:off x="6371166" y="1467098"/>
+            <a:ext cx="914270" cy="914270"/>
+          </a:xfrm>
+          <a:prstGeom prst="rect">
+            <a:avLst/>
+          </a:prstGeom>
+        </p:spPr>
+      </p:pic>
+      <p:cxnSp>
+        <p:nvCxnSpPr>
+          <p:cNvPr id="15" name="Straight Arrow Connector 14">
+            <a:extLst>
+              <a:ext uri="{FF2B5EF4-FFF2-40B4-BE49-F238E27FC236}">
+                <a16:creationId xmlns:a16="http://schemas.microsoft.com/office/drawing/2014/main" id="{16EFD71A-C902-48ED-8100-A97B5D91BE17}"/>
+              </a:ext>
+            </a:extLst>
+          </p:cNvPr>
+          <p:cNvCxnSpPr>
+            <a:stCxn id="6" idx="3"/>
+            <a:endCxn id="4" idx="1"/>
+          </p:cNvCxnSpPr>
+          <p:nvPr/>
+        </p:nvCxnSpPr>
+        <p:spPr>
+          <a:xfrm>
+            <a:off x="1677040" y="1924233"/>
+            <a:ext cx="783986" cy="0"/>
+          </a:xfrm>
+          <a:prstGeom prst="straightConnector1">
+            <a:avLst/>
+          </a:prstGeom>
+          <a:ln w="38100">
+            <a:solidFill>
+              <a:schemeClr val="accent5"/>
+            </a:solidFill>
+            <a:tailEnd type="triangle" w="lg" len="sm"/>
+          </a:ln>
+        </p:spPr>
+        <p:style>
+          <a:lnRef idx="1">
+            <a:schemeClr val="accent1"/>
+          </a:lnRef>
+          <a:fillRef idx="0">
+            <a:schemeClr val="accent1"/>
+          </a:fillRef>
+          <a:effectRef idx="0">
+            <a:schemeClr val="accent1"/>
+          </a:effectRef>
+          <a:fontRef idx="minor">
+            <a:schemeClr val="tx1"/>
+          </a:fontRef>
+        </p:style>
+      </p:cxnSp>
+      <p:cxnSp>
+        <p:nvCxnSpPr>
+          <p:cNvPr id="16" name="Straight Arrow Connector 15">
+            <a:extLst>
+              <a:ext uri="{FF2B5EF4-FFF2-40B4-BE49-F238E27FC236}">
+                <a16:creationId xmlns:a16="http://schemas.microsoft.com/office/drawing/2014/main" id="{6EF96954-50C6-4AE3-AA3F-77B20AB4E43C}"/>
+              </a:ext>
+            </a:extLst>
+          </p:cNvPr>
+          <p:cNvCxnSpPr>
+            <a:cxnSpLocks/>
+            <a:stCxn id="4" idx="3"/>
+            <a:endCxn id="10" idx="1"/>
+          </p:cNvCxnSpPr>
+          <p:nvPr/>
+        </p:nvCxnSpPr>
+        <p:spPr>
+          <a:xfrm>
+            <a:off x="3375297" y="1924233"/>
+            <a:ext cx="956901" cy="0"/>
+          </a:xfrm>
+          <a:prstGeom prst="straightConnector1">
+            <a:avLst/>
+          </a:prstGeom>
+          <a:ln w="38100">
+            <a:solidFill>
+              <a:schemeClr val="accent5"/>
+            </a:solidFill>
+            <a:tailEnd type="triangle" w="lg" len="sm"/>
+          </a:ln>
+        </p:spPr>
+        <p:style>
+          <a:lnRef idx="1">
+            <a:schemeClr val="accent1"/>
+          </a:lnRef>
+          <a:fillRef idx="0">
+            <a:schemeClr val="accent1"/>
+          </a:fillRef>
+          <a:effectRef idx="0">
+            <a:schemeClr val="accent1"/>
+          </a:effectRef>
+          <a:fontRef idx="minor">
+            <a:schemeClr val="tx1"/>
+          </a:fontRef>
+        </p:style>
+      </p:cxnSp>
+      <p:cxnSp>
+        <p:nvCxnSpPr>
+          <p:cNvPr id="19" name="Straight Arrow Connector 18">
+            <a:extLst>
+              <a:ext uri="{FF2B5EF4-FFF2-40B4-BE49-F238E27FC236}">
+                <a16:creationId xmlns:a16="http://schemas.microsoft.com/office/drawing/2014/main" id="{D63647E5-C3EF-4852-AA98-37D36098606A}"/>
+              </a:ext>
+            </a:extLst>
+          </p:cNvPr>
+          <p:cNvCxnSpPr>
+            <a:cxnSpLocks/>
+            <a:stCxn id="10" idx="3"/>
+            <a:endCxn id="13" idx="1"/>
+          </p:cNvCxnSpPr>
+          <p:nvPr/>
+        </p:nvCxnSpPr>
+        <p:spPr>
+          <a:xfrm>
+            <a:off x="5246468" y="1924233"/>
+            <a:ext cx="1124697" cy="0"/>
+          </a:xfrm>
+          <a:prstGeom prst="straightConnector1">
+            <a:avLst/>
+          </a:prstGeom>
+          <a:ln w="38100">
+            <a:solidFill>
+              <a:schemeClr val="accent5"/>
+            </a:solidFill>
+            <a:tailEnd type="triangle" w="lg" len="sm"/>
+          </a:ln>
+        </p:spPr>
+        <p:style>
+          <a:lnRef idx="1">
+            <a:schemeClr val="accent1"/>
+          </a:lnRef>
+          <a:fillRef idx="0">
+            <a:schemeClr val="accent1"/>
+          </a:fillRef>
+          <a:effectRef idx="0">
+            <a:schemeClr val="accent1"/>
+          </a:effectRef>
+          <a:fontRef idx="minor">
+            <a:schemeClr val="tx1"/>
+          </a:fontRef>
+        </p:style>
+      </p:cxnSp>
+      <p:cxnSp>
+        <p:nvCxnSpPr>
+          <p:cNvPr id="22" name="Straight Arrow Connector 21">
+            <a:extLst>
+              <a:ext uri="{FF2B5EF4-FFF2-40B4-BE49-F238E27FC236}">
+                <a16:creationId xmlns:a16="http://schemas.microsoft.com/office/drawing/2014/main" id="{88311723-73D1-4020-95F3-8FB4E1EED231}"/>
+              </a:ext>
+            </a:extLst>
+          </p:cNvPr>
+          <p:cNvCxnSpPr>
+            <a:cxnSpLocks/>
+            <a:stCxn id="13" idx="3"/>
+            <a:endCxn id="12" idx="1"/>
+          </p:cNvCxnSpPr>
+          <p:nvPr/>
+        </p:nvCxnSpPr>
+        <p:spPr>
+          <a:xfrm>
+            <a:off x="7285435" y="1924233"/>
+            <a:ext cx="1119974" cy="0"/>
+          </a:xfrm>
+          <a:prstGeom prst="straightConnector1">
+            <a:avLst/>
+          </a:prstGeom>
+          <a:ln w="38100">
+            <a:solidFill>
+              <a:schemeClr val="accent5"/>
+            </a:solidFill>
+            <a:tailEnd type="triangle" w="lg" len="sm"/>
+          </a:ln>
+        </p:spPr>
+        <p:style>
+          <a:lnRef idx="1">
+            <a:schemeClr val="accent1"/>
+          </a:lnRef>
+          <a:fillRef idx="0">
+            <a:schemeClr val="accent1"/>
+          </a:fillRef>
+          <a:effectRef idx="0">
+            <a:schemeClr val="accent1"/>
+          </a:effectRef>
+          <a:fontRef idx="minor">
+            <a:schemeClr val="tx1"/>
+          </a:fontRef>
+        </p:style>
+      </p:cxnSp>
+      <p:pic>
+        <p:nvPicPr>
+          <p:cNvPr id="8" name="Graphic 7" descr="Users">
+            <a:extLst>
+              <a:ext uri="{FF2B5EF4-FFF2-40B4-BE49-F238E27FC236}">
+                <a16:creationId xmlns:a16="http://schemas.microsoft.com/office/drawing/2014/main" id="{33D1FEEA-A59E-4F2B-83C9-94AFA3F45ECE}"/>
+              </a:ext>
+            </a:extLst>
+          </p:cNvPr>
+          <p:cNvPicPr>
+            <a:picLocks noChangeAspect="1"/>
+          </p:cNvPicPr>
+          <p:nvPr/>
+        </p:nvPicPr>
+        <p:blipFill>
+          <a:blip r:embed="rId12">
+            <a:extLst>
+              <a:ext uri="{28A0092B-C50C-407E-A947-70E740481C1C}">
+                <a14:useLocalDpi xmlns:a14="http://schemas.microsoft.com/office/drawing/2010/main" val="0"/>
+              </a:ext>
+              <a:ext uri="{96DAC541-7B7A-43D3-8B79-37D633B846F1}">
+                <asvg:svgBlip xmlns:asvg="http://schemas.microsoft.com/office/drawing/2016/SVG/main" r:embed="rId13"/>
+              </a:ext>
+            </a:extLst>
+          </a:blip>
+          <a:stretch>
+            <a:fillRect/>
+          </a:stretch>
+        </p:blipFill>
+        <p:spPr>
+          <a:xfrm>
+            <a:off x="5527380" y="1430251"/>
+            <a:ext cx="562874" cy="562874"/>
+          </a:xfrm>
+          <a:prstGeom prst="rect">
+            <a:avLst/>
+          </a:prstGeom>
+        </p:spPr>
+      </p:pic>
+      <p:pic>
+        <p:nvPicPr>
+          <p:cNvPr id="25" name="Graphic 24" descr="Users">
+            <a:extLst>
+              <a:ext uri="{FF2B5EF4-FFF2-40B4-BE49-F238E27FC236}">
+                <a16:creationId xmlns:a16="http://schemas.microsoft.com/office/drawing/2014/main" id="{C2B37791-10C9-438D-9698-B07A5EFA3C6A}"/>
+              </a:ext>
+            </a:extLst>
+          </p:cNvPr>
+          <p:cNvPicPr>
+            <a:picLocks noChangeAspect="1"/>
+          </p:cNvPicPr>
+          <p:nvPr/>
+        </p:nvPicPr>
+        <p:blipFill>
+          <a:blip r:embed="rId12">
+            <a:extLst>
+              <a:ext uri="{28A0092B-C50C-407E-A947-70E740481C1C}">
+                <a14:useLocalDpi xmlns:a14="http://schemas.microsoft.com/office/drawing/2010/main" val="0"/>
+              </a:ext>
+              <a:ext uri="{96DAC541-7B7A-43D3-8B79-37D633B846F1}">
+                <asvg:svgBlip xmlns:asvg="http://schemas.microsoft.com/office/drawing/2016/SVG/main" r:embed="rId13"/>
+              </a:ext>
+            </a:extLst>
+          </a:blip>
+          <a:stretch>
+            <a:fillRect/>
+          </a:stretch>
+        </p:blipFill>
+        <p:spPr>
+          <a:xfrm>
+            <a:off x="7509682" y="1430251"/>
+            <a:ext cx="562874" cy="562874"/>
+          </a:xfrm>
+          <a:prstGeom prst="rect">
+            <a:avLst/>
+          </a:prstGeom>
+        </p:spPr>
+      </p:pic>
+      <p:sp>
+        <p:nvSpPr>
+          <p:cNvPr id="26" name="TextBox 25">
+            <a:extLst>
+              <a:ext uri="{FF2B5EF4-FFF2-40B4-BE49-F238E27FC236}">
+                <a16:creationId xmlns:a16="http://schemas.microsoft.com/office/drawing/2014/main" id="{30616876-95DC-42BA-B8DA-4365FFDD5FC3}"/>
+              </a:ext>
+            </a:extLst>
+          </p:cNvPr>
+          <p:cNvSpPr txBox="1"/>
+          <p:nvPr/>
+        </p:nvSpPr>
+        <p:spPr>
+          <a:xfrm>
+            <a:off x="770567" y="902261"/>
+            <a:ext cx="2879261" cy="374793"/>
+          </a:xfrm>
+          <a:prstGeom prst="rect">
+            <a:avLst/>
+          </a:prstGeom>
+          <a:noFill/>
+        </p:spPr>
+        <p:txBody>
+          <a:bodyPr wrap="square" rtlCol="0">
+            <a:spAutoFit/>
+          </a:bodyPr>
+          <a:lstStyle/>
+          <a:p>
+            <a:pPr algn="ctr" defTabSz="914225"/>
+            <a:r>
+              <a:rPr lang="en-US" dirty="0">
+                <a:solidFill>
+                  <a:srgbClr val="4472C4"/>
+                </a:solidFill>
+                <a:latin typeface="Calibri" panose="020F0502020204030204"/>
+              </a:rPr>
+              <a:t>Continuous Integration (CI)</a:t>
+            </a:r>
+            <a:endParaRPr lang="en-CA" dirty="0">
+              <a:solidFill>
+                <a:srgbClr val="4472C4"/>
+              </a:solidFill>
+              <a:latin typeface="Calibri" panose="020F0502020204030204"/>
+            </a:endParaRPr>
+          </a:p>
+        </p:txBody>
+      </p:sp>
+      <p:sp>
+        <p:nvSpPr>
+          <p:cNvPr id="27" name="TextBox 26">
+            <a:extLst>
+              <a:ext uri="{FF2B5EF4-FFF2-40B4-BE49-F238E27FC236}">
+                <a16:creationId xmlns:a16="http://schemas.microsoft.com/office/drawing/2014/main" id="{EADA062A-E007-4FF0-8017-EE517FA519E6}"/>
+              </a:ext>
+            </a:extLst>
+          </p:cNvPr>
+          <p:cNvSpPr txBox="1"/>
+          <p:nvPr/>
+        </p:nvSpPr>
+        <p:spPr>
+          <a:xfrm>
+            <a:off x="4225417" y="938112"/>
+            <a:ext cx="4561029" cy="374793"/>
+          </a:xfrm>
+          <a:prstGeom prst="rect">
+            <a:avLst/>
+          </a:prstGeom>
+          <a:noFill/>
+        </p:spPr>
+        <p:txBody>
+          <a:bodyPr wrap="square" rtlCol="0">
+            <a:spAutoFit/>
+          </a:bodyPr>
+          <a:lstStyle/>
+          <a:p>
+            <a:pPr algn="ctr" defTabSz="914225"/>
+            <a:r>
+              <a:rPr lang="en-US" dirty="0">
+                <a:solidFill>
+                  <a:srgbClr val="4472C4"/>
+                </a:solidFill>
+                <a:latin typeface="Calibri" panose="020F0502020204030204"/>
+              </a:rPr>
+              <a:t>Continuous Delivery (CD)</a:t>
+            </a:r>
+            <a:endParaRPr lang="en-CA" dirty="0">
+              <a:solidFill>
+                <a:srgbClr val="4472C4"/>
+              </a:solidFill>
+              <a:latin typeface="Calibri" panose="020F0502020204030204"/>
+            </a:endParaRPr>
+          </a:p>
+        </p:txBody>
+      </p:sp>
+      <p:sp>
+        <p:nvSpPr>
+          <p:cNvPr id="32" name="Right Brace 31">
+            <a:extLst>
+              <a:ext uri="{FF2B5EF4-FFF2-40B4-BE49-F238E27FC236}">
+                <a16:creationId xmlns:a16="http://schemas.microsoft.com/office/drawing/2014/main" id="{B72D28CE-6001-4865-A640-C81827C7A958}"/>
+              </a:ext>
+            </a:extLst>
+          </p:cNvPr>
+          <p:cNvSpPr/>
+          <p:nvPr/>
+        </p:nvSpPr>
+        <p:spPr>
+          <a:xfrm rot="16200000">
+            <a:off x="6427091" y="-1437269"/>
+            <a:ext cx="157681" cy="5677591"/>
+          </a:xfrm>
+          <a:prstGeom prst="rightBrace">
+            <a:avLst/>
+          </a:prstGeom>
+        </p:spPr>
+        <p:style>
+          <a:lnRef idx="1">
+            <a:schemeClr val="accent1"/>
+          </a:lnRef>
+          <a:fillRef idx="0">
+            <a:schemeClr val="accent1"/>
+          </a:fillRef>
+          <a:effectRef idx="0">
+            <a:schemeClr val="accent1"/>
+          </a:effectRef>
+          <a:fontRef idx="minor">
+            <a:schemeClr val="tx1"/>
+          </a:fontRef>
+        </p:style>
+        <p:txBody>
+          <a:bodyPr rtlCol="0" anchor="ctr"/>
+          <a:lstStyle/>
+          <a:p>
+            <a:pPr algn="ctr" defTabSz="914225"/>
+            <a:endParaRPr lang="en-CA">
+              <a:solidFill>
+                <a:prstClr val="black"/>
+              </a:solidFill>
+              <a:latin typeface="Calibri" panose="020F0502020204030204"/>
+            </a:endParaRPr>
+          </a:p>
+        </p:txBody>
+      </p:sp>
+      <p:sp>
+        <p:nvSpPr>
+          <p:cNvPr id="33" name="Right Brace 32">
+            <a:extLst>
+              <a:ext uri="{FF2B5EF4-FFF2-40B4-BE49-F238E27FC236}">
+                <a16:creationId xmlns:a16="http://schemas.microsoft.com/office/drawing/2014/main" id="{3AADABDB-81F4-47F3-808B-65E34F10BE78}"/>
+              </a:ext>
+            </a:extLst>
+          </p:cNvPr>
+          <p:cNvSpPr/>
+          <p:nvPr/>
+        </p:nvSpPr>
+        <p:spPr>
+          <a:xfrm rot="16200000">
+            <a:off x="2079662" y="-7559"/>
+            <a:ext cx="154107" cy="2827882"/>
+          </a:xfrm>
+          <a:prstGeom prst="rightBrace">
+            <a:avLst/>
+          </a:prstGeom>
+        </p:spPr>
+        <p:style>
+          <a:lnRef idx="1">
+            <a:schemeClr val="accent1"/>
+          </a:lnRef>
+          <a:fillRef idx="0">
+            <a:schemeClr val="accent1"/>
+          </a:fillRef>
+          <a:effectRef idx="0">
+            <a:schemeClr val="accent1"/>
+          </a:effectRef>
+          <a:fontRef idx="minor">
+            <a:schemeClr val="tx1"/>
+          </a:fontRef>
+        </p:style>
+        <p:txBody>
+          <a:bodyPr rtlCol="0" anchor="ctr"/>
+          <a:lstStyle/>
+          <a:p>
+            <a:pPr algn="ctr" defTabSz="914225"/>
+            <a:endParaRPr lang="en-CA">
+              <a:solidFill>
+                <a:prstClr val="black"/>
+              </a:solidFill>
+              <a:latin typeface="Calibri" panose="020F0502020204030204"/>
+            </a:endParaRPr>
+          </a:p>
+        </p:txBody>
+      </p:sp>
+      <p:sp>
+        <p:nvSpPr>
+          <p:cNvPr id="34" name="TextBox 33">
+            <a:extLst>
+              <a:ext uri="{FF2B5EF4-FFF2-40B4-BE49-F238E27FC236}">
+                <a16:creationId xmlns:a16="http://schemas.microsoft.com/office/drawing/2014/main" id="{1E94C33A-7921-463C-B96A-B643B7902577}"/>
+              </a:ext>
+            </a:extLst>
+          </p:cNvPr>
+          <p:cNvSpPr txBox="1"/>
+          <p:nvPr/>
+        </p:nvSpPr>
+        <p:spPr>
+          <a:xfrm>
+            <a:off x="1719675" y="1924233"/>
+            <a:ext cx="909094" cy="374793"/>
+          </a:xfrm>
+          <a:prstGeom prst="rect">
+            <a:avLst/>
+          </a:prstGeom>
+          <a:noFill/>
+        </p:spPr>
+        <p:txBody>
+          <a:bodyPr wrap="none" rtlCol="0">
+            <a:spAutoFit/>
+          </a:bodyPr>
+          <a:lstStyle/>
+          <a:p>
+            <a:pPr defTabSz="914225"/>
+            <a:r>
+              <a:rPr lang="en-US" dirty="0" err="1">
+                <a:solidFill>
+                  <a:srgbClr val="4472C4"/>
+                </a:solidFill>
+                <a:latin typeface="Calibri" panose="020F0502020204030204"/>
+              </a:rPr>
+              <a:t>checkin</a:t>
+            </a:r>
+            <a:endParaRPr lang="en-CA" dirty="0">
+              <a:solidFill>
+                <a:srgbClr val="4472C4"/>
+              </a:solidFill>
+              <a:latin typeface="Calibri" panose="020F0502020204030204"/>
+            </a:endParaRPr>
+          </a:p>
+        </p:txBody>
+      </p:sp>
+      <p:sp>
+        <p:nvSpPr>
+          <p:cNvPr id="35" name="TextBox 34">
+            <a:extLst>
+              <a:ext uri="{FF2B5EF4-FFF2-40B4-BE49-F238E27FC236}">
+                <a16:creationId xmlns:a16="http://schemas.microsoft.com/office/drawing/2014/main" id="{1FB60D12-76A5-44D8-A534-5ED7E597F5B7}"/>
+              </a:ext>
+            </a:extLst>
+          </p:cNvPr>
+          <p:cNvSpPr txBox="1"/>
+          <p:nvPr/>
+        </p:nvSpPr>
+        <p:spPr>
+          <a:xfrm>
+            <a:off x="3139014" y="1965219"/>
+            <a:ext cx="1307736" cy="374793"/>
+          </a:xfrm>
+          <a:prstGeom prst="rect">
+            <a:avLst/>
+          </a:prstGeom>
+          <a:noFill/>
+        </p:spPr>
+        <p:txBody>
+          <a:bodyPr wrap="none" rtlCol="0">
+            <a:spAutoFit/>
+          </a:bodyPr>
+          <a:lstStyle/>
+          <a:p>
+            <a:pPr defTabSz="914225"/>
+            <a:r>
+              <a:rPr lang="en-US" dirty="0">
+                <a:solidFill>
+                  <a:srgbClr val="4472C4"/>
+                </a:solidFill>
+                <a:latin typeface="Calibri" panose="020F0502020204030204"/>
+              </a:rPr>
+              <a:t>auto trigger</a:t>
+            </a:r>
+            <a:endParaRPr lang="en-CA" dirty="0">
+              <a:solidFill>
+                <a:srgbClr val="4472C4"/>
+              </a:solidFill>
+              <a:latin typeface="Calibri" panose="020F0502020204030204"/>
+            </a:endParaRPr>
+          </a:p>
+        </p:txBody>
+      </p:sp>
+      <p:sp>
+        <p:nvSpPr>
+          <p:cNvPr id="36" name="TextBox 35">
+            <a:extLst>
+              <a:ext uri="{FF2B5EF4-FFF2-40B4-BE49-F238E27FC236}">
+                <a16:creationId xmlns:a16="http://schemas.microsoft.com/office/drawing/2014/main" id="{C6F53E87-8BF8-456D-8571-89AD36568C0D}"/>
+              </a:ext>
+            </a:extLst>
+          </p:cNvPr>
+          <p:cNvSpPr txBox="1"/>
+          <p:nvPr/>
+        </p:nvSpPr>
+        <p:spPr>
+          <a:xfrm>
+            <a:off x="5375875" y="1965219"/>
+            <a:ext cx="1013018" cy="374793"/>
+          </a:xfrm>
+          <a:prstGeom prst="rect">
+            <a:avLst/>
+          </a:prstGeom>
+          <a:noFill/>
+        </p:spPr>
+        <p:txBody>
+          <a:bodyPr wrap="none" rtlCol="0">
+            <a:spAutoFit/>
+          </a:bodyPr>
+          <a:lstStyle/>
+          <a:p>
+            <a:pPr defTabSz="914225"/>
+            <a:r>
+              <a:rPr lang="en-US" dirty="0">
+                <a:solidFill>
+                  <a:srgbClr val="4472C4"/>
+                </a:solidFill>
+                <a:latin typeface="Calibri" panose="020F0502020204030204"/>
+              </a:rPr>
+              <a:t>approval</a:t>
+            </a:r>
+            <a:endParaRPr lang="en-CA" dirty="0">
+              <a:solidFill>
+                <a:srgbClr val="4472C4"/>
+              </a:solidFill>
+              <a:latin typeface="Calibri" panose="020F0502020204030204"/>
+            </a:endParaRPr>
+          </a:p>
+        </p:txBody>
+      </p:sp>
+      <p:sp>
+        <p:nvSpPr>
+          <p:cNvPr id="39" name="TextBox 38">
+            <a:extLst>
+              <a:ext uri="{FF2B5EF4-FFF2-40B4-BE49-F238E27FC236}">
+                <a16:creationId xmlns:a16="http://schemas.microsoft.com/office/drawing/2014/main" id="{B3BBD6F1-A1BE-4C62-9F83-7CDE39CD0146}"/>
+              </a:ext>
+            </a:extLst>
+          </p:cNvPr>
+          <p:cNvSpPr txBox="1"/>
+          <p:nvPr/>
+        </p:nvSpPr>
+        <p:spPr>
+          <a:xfrm>
+            <a:off x="7347621" y="1965219"/>
+            <a:ext cx="1013018" cy="374793"/>
+          </a:xfrm>
+          <a:prstGeom prst="rect">
+            <a:avLst/>
+          </a:prstGeom>
+          <a:noFill/>
+        </p:spPr>
+        <p:txBody>
+          <a:bodyPr wrap="none" rtlCol="0">
+            <a:spAutoFit/>
+          </a:bodyPr>
+          <a:lstStyle/>
+          <a:p>
+            <a:pPr defTabSz="914225"/>
+            <a:r>
+              <a:rPr lang="en-US" dirty="0">
+                <a:solidFill>
+                  <a:srgbClr val="4472C4"/>
+                </a:solidFill>
+                <a:latin typeface="Calibri" panose="020F0502020204030204"/>
+              </a:rPr>
+              <a:t>approval</a:t>
+            </a:r>
+            <a:endParaRPr lang="en-CA" dirty="0">
+              <a:solidFill>
+                <a:srgbClr val="4472C4"/>
+              </a:solidFill>
+              <a:latin typeface="Calibri" panose="020F0502020204030204"/>
+            </a:endParaRPr>
+          </a:p>
+        </p:txBody>
+      </p:sp>
+      <p:cxnSp>
+        <p:nvCxnSpPr>
+          <p:cNvPr id="48" name="Straight Arrow Connector 47">
+            <a:extLst>
+              <a:ext uri="{FF2B5EF4-FFF2-40B4-BE49-F238E27FC236}">
+                <a16:creationId xmlns:a16="http://schemas.microsoft.com/office/drawing/2014/main" id="{4197CFFE-FF41-46D2-84B4-3AB8B1F1C865}"/>
+              </a:ext>
+            </a:extLst>
+          </p:cNvPr>
+          <p:cNvCxnSpPr>
+            <a:cxnSpLocks/>
+            <a:stCxn id="12" idx="2"/>
+            <a:endCxn id="56" idx="0"/>
+          </p:cNvCxnSpPr>
+          <p:nvPr/>
+        </p:nvCxnSpPr>
+        <p:spPr>
+          <a:xfrm>
+            <a:off x="8862546" y="2381369"/>
+            <a:ext cx="11157" cy="813146"/>
+          </a:xfrm>
+          <a:prstGeom prst="straightConnector1">
+            <a:avLst/>
+          </a:prstGeom>
+          <a:ln w="25400">
+            <a:solidFill>
+              <a:schemeClr val="accent1"/>
+            </a:solidFill>
+            <a:prstDash val="sysDash"/>
+            <a:headEnd w="lg" len="sm"/>
+            <a:tailEnd type="triangle" w="lg" len="sm"/>
+          </a:ln>
+        </p:spPr>
+        <p:style>
+          <a:lnRef idx="1">
+            <a:schemeClr val="accent1"/>
+          </a:lnRef>
+          <a:fillRef idx="0">
+            <a:schemeClr val="accent1"/>
+          </a:fillRef>
+          <a:effectRef idx="0">
+            <a:schemeClr val="accent1"/>
+          </a:effectRef>
+          <a:fontRef idx="minor">
+            <a:schemeClr val="tx1"/>
+          </a:fontRef>
+        </p:style>
+      </p:cxnSp>
+      <p:cxnSp>
+        <p:nvCxnSpPr>
+          <p:cNvPr id="51" name="Straight Arrow Connector 50">
+            <a:extLst>
+              <a:ext uri="{FF2B5EF4-FFF2-40B4-BE49-F238E27FC236}">
+                <a16:creationId xmlns:a16="http://schemas.microsoft.com/office/drawing/2014/main" id="{F606D633-7EE9-4972-8954-D8820835F949}"/>
+              </a:ext>
+            </a:extLst>
+          </p:cNvPr>
+          <p:cNvCxnSpPr>
+            <a:cxnSpLocks/>
+            <a:stCxn id="13" idx="2"/>
+            <a:endCxn id="50" idx="0"/>
+          </p:cNvCxnSpPr>
+          <p:nvPr/>
+        </p:nvCxnSpPr>
+        <p:spPr>
+          <a:xfrm>
+            <a:off x="6828300" y="2381369"/>
+            <a:ext cx="13106" cy="1326437"/>
+          </a:xfrm>
+          <a:prstGeom prst="straightConnector1">
+            <a:avLst/>
+          </a:prstGeom>
+          <a:ln w="25400">
+            <a:solidFill>
+              <a:srgbClr val="3366CC"/>
+            </a:solidFill>
+            <a:prstDash val="sysDash"/>
+            <a:headEnd w="lg" len="sm"/>
+            <a:tailEnd type="triangle" w="lg" len="sm"/>
+          </a:ln>
+        </p:spPr>
+        <p:style>
+          <a:lnRef idx="1">
+            <a:schemeClr val="accent1"/>
+          </a:lnRef>
+          <a:fillRef idx="0">
+            <a:schemeClr val="accent1"/>
+          </a:fillRef>
+          <a:effectRef idx="0">
+            <a:schemeClr val="accent1"/>
+          </a:effectRef>
+          <a:fontRef idx="minor">
+            <a:schemeClr val="tx1"/>
+          </a:fontRef>
+        </p:style>
+      </p:cxnSp>
+      <p:cxnSp>
+        <p:nvCxnSpPr>
+          <p:cNvPr id="54" name="Straight Arrow Connector 53">
+            <a:extLst>
+              <a:ext uri="{FF2B5EF4-FFF2-40B4-BE49-F238E27FC236}">
+                <a16:creationId xmlns:a16="http://schemas.microsoft.com/office/drawing/2014/main" id="{614CB16D-F1C7-4723-96C8-92B494EE56F2}"/>
+              </a:ext>
+            </a:extLst>
+          </p:cNvPr>
+          <p:cNvCxnSpPr>
+            <a:cxnSpLocks/>
+            <a:stCxn id="10" idx="2"/>
+            <a:endCxn id="55" idx="0"/>
+          </p:cNvCxnSpPr>
+          <p:nvPr/>
+        </p:nvCxnSpPr>
+        <p:spPr>
+          <a:xfrm>
+            <a:off x="4789332" y="2381368"/>
+            <a:ext cx="12170" cy="1887282"/>
+          </a:xfrm>
+          <a:prstGeom prst="straightConnector1">
+            <a:avLst/>
+          </a:prstGeom>
+          <a:ln w="25400">
+            <a:solidFill>
+              <a:schemeClr val="tx1"/>
+            </a:solidFill>
+            <a:prstDash val="sysDash"/>
+            <a:headEnd w="lg" len="sm"/>
+            <a:tailEnd type="triangle" w="lg" len="sm"/>
+          </a:ln>
+        </p:spPr>
+        <p:style>
+          <a:lnRef idx="1">
+            <a:schemeClr val="accent1"/>
+          </a:lnRef>
+          <a:fillRef idx="0">
+            <a:schemeClr val="accent1"/>
+          </a:fillRef>
+          <a:effectRef idx="0">
+            <a:schemeClr val="accent1"/>
+          </a:effectRef>
+          <a:fontRef idx="minor">
+            <a:schemeClr val="tx1"/>
+          </a:fontRef>
+        </p:style>
+      </p:cxnSp>
+      <p:sp>
+        <p:nvSpPr>
+          <p:cNvPr id="74" name="TextBox 73">
+            <a:extLst>
+              <a:ext uri="{FF2B5EF4-FFF2-40B4-BE49-F238E27FC236}">
+                <a16:creationId xmlns:a16="http://schemas.microsoft.com/office/drawing/2014/main" id="{67CCE3B4-509D-45C3-A37B-9EB72909E972}"/>
+              </a:ext>
+            </a:extLst>
+          </p:cNvPr>
+          <p:cNvSpPr txBox="1"/>
+          <p:nvPr/>
+        </p:nvSpPr>
+        <p:spPr>
+          <a:xfrm>
+            <a:off x="153639" y="2431262"/>
+            <a:ext cx="1085166" cy="374793"/>
+          </a:xfrm>
+          <a:prstGeom prst="rect">
+            <a:avLst/>
+          </a:prstGeom>
+          <a:noFill/>
+        </p:spPr>
+        <p:txBody>
+          <a:bodyPr wrap="square" rtlCol="0">
+            <a:spAutoFit/>
+          </a:bodyPr>
+          <a:lstStyle/>
+          <a:p>
+            <a:pPr algn="ctr" defTabSz="914225"/>
+            <a:r>
+              <a:rPr lang="en-US" dirty="0">
+                <a:solidFill>
+                  <a:srgbClr val="4472C4"/>
+                </a:solidFill>
+                <a:latin typeface="Calibri" panose="020F0502020204030204"/>
+              </a:rPr>
+              <a:t>PIPELINE</a:t>
+            </a:r>
+            <a:endParaRPr lang="en-CA" dirty="0">
+              <a:solidFill>
+                <a:srgbClr val="4472C4"/>
+              </a:solidFill>
+              <a:latin typeface="Calibri" panose="020F0502020204030204"/>
+            </a:endParaRPr>
+          </a:p>
+        </p:txBody>
+      </p:sp>
+      <p:sp>
+        <p:nvSpPr>
+          <p:cNvPr id="50" name="Rectangle: Rounded Corners 49">
+            <a:extLst>
+              <a:ext uri="{FF2B5EF4-FFF2-40B4-BE49-F238E27FC236}">
+                <a16:creationId xmlns:a16="http://schemas.microsoft.com/office/drawing/2014/main" id="{9C5E88E7-C695-4FB5-A7D9-97F0FC51FB29}"/>
+              </a:ext>
+            </a:extLst>
+          </p:cNvPr>
+          <p:cNvSpPr/>
+          <p:nvPr/>
+        </p:nvSpPr>
+        <p:spPr>
+          <a:xfrm>
+            <a:off x="6199652" y="3707805"/>
+            <a:ext cx="1283509" cy="1121692"/>
+          </a:xfrm>
+          <a:prstGeom prst="roundRect">
+            <a:avLst/>
+          </a:prstGeom>
+          <a:solidFill>
+            <a:srgbClr val="3366CC"/>
+          </a:solidFill>
+          <a:ln>
+            <a:noFill/>
+          </a:ln>
+        </p:spPr>
+        <p:style>
+          <a:lnRef idx="2">
+            <a:schemeClr val="accent1">
+              <a:shade val="50000"/>
+            </a:schemeClr>
+          </a:lnRef>
+          <a:fillRef idx="1">
+            <a:schemeClr val="accent1"/>
+          </a:fillRef>
+          <a:effectRef idx="0">
+            <a:schemeClr val="accent1"/>
+          </a:effectRef>
+          <a:fontRef idx="minor">
+            <a:schemeClr val="lt1"/>
+          </a:fontRef>
+        </p:style>
+        <p:txBody>
+          <a:bodyPr rtlCol="0" anchor="ctr"/>
+          <a:lstStyle/>
+          <a:p>
+            <a:pPr algn="ctr" defTabSz="914225"/>
+            <a:r>
+              <a:rPr lang="en-US" dirty="0">
+                <a:solidFill>
+                  <a:prstClr val="white"/>
+                </a:solidFill>
+                <a:latin typeface="Calibri" panose="020F0502020204030204"/>
+              </a:rPr>
+              <a:t>Early Adopters</a:t>
+            </a:r>
+            <a:endParaRPr lang="en-CA" dirty="0">
+              <a:solidFill>
+                <a:prstClr val="white"/>
+              </a:solidFill>
+              <a:latin typeface="Calibri" panose="020F0502020204030204"/>
+            </a:endParaRPr>
+          </a:p>
+        </p:txBody>
+      </p:sp>
+      <p:sp>
+        <p:nvSpPr>
+          <p:cNvPr id="55" name="Rectangle: Rounded Corners 54">
+            <a:extLst>
+              <a:ext uri="{FF2B5EF4-FFF2-40B4-BE49-F238E27FC236}">
+                <a16:creationId xmlns:a16="http://schemas.microsoft.com/office/drawing/2014/main" id="{288E7A8A-C49F-4AB8-B6C8-BEEF8A4FC830}"/>
+              </a:ext>
+            </a:extLst>
+          </p:cNvPr>
+          <p:cNvSpPr/>
+          <p:nvPr/>
+        </p:nvSpPr>
+        <p:spPr>
+          <a:xfrm>
+            <a:off x="4159748" y="4268649"/>
+            <a:ext cx="1283509" cy="555372"/>
+          </a:xfrm>
+          <a:prstGeom prst="roundRect">
+            <a:avLst/>
+          </a:prstGeom>
+          <a:solidFill>
+            <a:schemeClr val="tx1"/>
+          </a:solidFill>
+          <a:ln>
+            <a:noFill/>
+          </a:ln>
+        </p:spPr>
+        <p:style>
+          <a:lnRef idx="2">
+            <a:schemeClr val="accent1">
+              <a:shade val="50000"/>
+            </a:schemeClr>
+          </a:lnRef>
+          <a:fillRef idx="1">
+            <a:schemeClr val="accent1"/>
+          </a:fillRef>
+          <a:effectRef idx="0">
+            <a:schemeClr val="accent1"/>
+          </a:effectRef>
+          <a:fontRef idx="minor">
+            <a:schemeClr val="lt1"/>
+          </a:fontRef>
+        </p:style>
+        <p:txBody>
+          <a:bodyPr rtlCol="0" anchor="ctr"/>
+          <a:lstStyle/>
+          <a:p>
+            <a:pPr algn="ctr" defTabSz="914225"/>
+            <a:r>
+              <a:rPr lang="en-US" dirty="0">
+                <a:solidFill>
+                  <a:prstClr val="white"/>
+                </a:solidFill>
+                <a:latin typeface="Calibri" panose="020F0502020204030204"/>
+              </a:rPr>
+              <a:t>Canaries</a:t>
+            </a:r>
+            <a:endParaRPr lang="en-CA" dirty="0">
+              <a:solidFill>
+                <a:prstClr val="white"/>
+              </a:solidFill>
+              <a:latin typeface="Calibri" panose="020F0502020204030204"/>
+            </a:endParaRPr>
+          </a:p>
+        </p:txBody>
+      </p:sp>
+      <p:sp>
+        <p:nvSpPr>
+          <p:cNvPr id="56" name="Rectangle: Rounded Corners 55">
+            <a:extLst>
+              <a:ext uri="{FF2B5EF4-FFF2-40B4-BE49-F238E27FC236}">
+                <a16:creationId xmlns:a16="http://schemas.microsoft.com/office/drawing/2014/main" id="{D682599B-F71F-4935-8D54-65112F594AC7}"/>
+              </a:ext>
+            </a:extLst>
+          </p:cNvPr>
+          <p:cNvSpPr/>
+          <p:nvPr/>
+        </p:nvSpPr>
+        <p:spPr>
+          <a:xfrm>
+            <a:off x="8231948" y="3194514"/>
+            <a:ext cx="1283509" cy="1642786"/>
+          </a:xfrm>
+          <a:prstGeom prst="roundRect">
+            <a:avLst/>
+          </a:prstGeom>
+          <a:ln>
+            <a:noFill/>
+          </a:ln>
+        </p:spPr>
+        <p:style>
+          <a:lnRef idx="2">
+            <a:schemeClr val="accent1">
+              <a:shade val="50000"/>
+            </a:schemeClr>
+          </a:lnRef>
+          <a:fillRef idx="1">
+            <a:schemeClr val="accent1"/>
+          </a:fillRef>
+          <a:effectRef idx="0">
+            <a:schemeClr val="accent1"/>
+          </a:effectRef>
+          <a:fontRef idx="minor">
+            <a:schemeClr val="lt1"/>
+          </a:fontRef>
+        </p:style>
+        <p:txBody>
+          <a:bodyPr rtlCol="0" anchor="ctr"/>
+          <a:lstStyle/>
+          <a:p>
+            <a:pPr algn="ctr" defTabSz="914225"/>
+            <a:r>
+              <a:rPr lang="en-US" dirty="0">
+                <a:solidFill>
+                  <a:prstClr val="white"/>
+                </a:solidFill>
+                <a:latin typeface="Calibri" panose="020F0502020204030204"/>
+              </a:rPr>
+              <a:t>Users</a:t>
+            </a:r>
+            <a:endParaRPr lang="en-CA" dirty="0">
+              <a:solidFill>
+                <a:prstClr val="white"/>
+              </a:solidFill>
+              <a:latin typeface="Calibri" panose="020F0502020204030204"/>
+            </a:endParaRPr>
+          </a:p>
+        </p:txBody>
+      </p:sp>
+      <p:sp>
+        <p:nvSpPr>
+          <p:cNvPr id="76" name="Arrow: Right 75">
+            <a:extLst>
+              <a:ext uri="{FF2B5EF4-FFF2-40B4-BE49-F238E27FC236}">
+                <a16:creationId xmlns:a16="http://schemas.microsoft.com/office/drawing/2014/main" id="{001D007F-B636-4968-956F-E7E0899B39AC}"/>
+              </a:ext>
+            </a:extLst>
+          </p:cNvPr>
+          <p:cNvSpPr/>
+          <p:nvPr/>
+        </p:nvSpPr>
+        <p:spPr>
+          <a:xfrm>
+            <a:off x="5607028" y="4398541"/>
+            <a:ext cx="436461" cy="330792"/>
+          </a:xfrm>
+          <a:prstGeom prst="rightArrow">
+            <a:avLst/>
+          </a:prstGeom>
+          <a:solidFill>
+            <a:schemeClr val="bg1"/>
+          </a:solidFill>
+          <a:ln>
+            <a:noFill/>
+          </a:ln>
+        </p:spPr>
+        <p:style>
+          <a:lnRef idx="2">
+            <a:schemeClr val="accent1">
+              <a:shade val="50000"/>
+            </a:schemeClr>
+          </a:lnRef>
+          <a:fillRef idx="1">
+            <a:schemeClr val="accent1"/>
+          </a:fillRef>
+          <a:effectRef idx="0">
+            <a:schemeClr val="accent1"/>
+          </a:effectRef>
+          <a:fontRef idx="minor">
+            <a:schemeClr val="lt1"/>
+          </a:fontRef>
+        </p:style>
+        <p:txBody>
+          <a:bodyPr rtlCol="0" anchor="ctr"/>
+          <a:lstStyle/>
+          <a:p>
+            <a:pPr algn="ctr" defTabSz="914225"/>
+            <a:endParaRPr lang="en-CA">
+              <a:solidFill>
+                <a:prstClr val="white"/>
+              </a:solidFill>
+              <a:latin typeface="Calibri" panose="020F0502020204030204"/>
+            </a:endParaRPr>
+          </a:p>
+        </p:txBody>
+      </p:sp>
+      <p:sp>
+        <p:nvSpPr>
+          <p:cNvPr id="77" name="Arrow: Right 76">
+            <a:extLst>
+              <a:ext uri="{FF2B5EF4-FFF2-40B4-BE49-F238E27FC236}">
+                <a16:creationId xmlns:a16="http://schemas.microsoft.com/office/drawing/2014/main" id="{2D7D67BC-E51A-4BF7-975B-0950EF02E4AC}"/>
+              </a:ext>
+            </a:extLst>
+          </p:cNvPr>
+          <p:cNvSpPr/>
+          <p:nvPr/>
+        </p:nvSpPr>
+        <p:spPr>
+          <a:xfrm>
+            <a:off x="7672111" y="4402710"/>
+            <a:ext cx="436461" cy="330792"/>
+          </a:xfrm>
+          <a:prstGeom prst="rightArrow">
+            <a:avLst/>
+          </a:prstGeom>
+          <a:solidFill>
+            <a:schemeClr val="bg1"/>
+          </a:solidFill>
+          <a:ln>
+            <a:noFill/>
+          </a:ln>
+        </p:spPr>
+        <p:style>
+          <a:lnRef idx="2">
+            <a:schemeClr val="accent1">
+              <a:shade val="50000"/>
+            </a:schemeClr>
+          </a:lnRef>
+          <a:fillRef idx="1">
+            <a:schemeClr val="accent1"/>
+          </a:fillRef>
+          <a:effectRef idx="0">
+            <a:schemeClr val="accent1"/>
+          </a:effectRef>
+          <a:fontRef idx="minor">
+            <a:schemeClr val="lt1"/>
+          </a:fontRef>
+        </p:style>
+        <p:txBody>
+          <a:bodyPr rtlCol="0" anchor="ctr"/>
+          <a:lstStyle/>
+          <a:p>
+            <a:pPr algn="ctr" defTabSz="914225"/>
+            <a:endParaRPr lang="en-CA">
+              <a:solidFill>
+                <a:prstClr val="white"/>
+              </a:solidFill>
+              <a:latin typeface="Calibri" panose="020F0502020204030204"/>
+            </a:endParaRPr>
+          </a:p>
+        </p:txBody>
+      </p:sp>
+      <p:sp>
+        <p:nvSpPr>
+          <p:cNvPr id="78" name="Rectangle: Rounded Corners 77">
+            <a:extLst>
+              <a:ext uri="{FF2B5EF4-FFF2-40B4-BE49-F238E27FC236}">
+                <a16:creationId xmlns:a16="http://schemas.microsoft.com/office/drawing/2014/main" id="{4E00C7DC-E618-4BC7-9320-DC58F1FFD931}"/>
+              </a:ext>
+            </a:extLst>
+          </p:cNvPr>
+          <p:cNvSpPr/>
+          <p:nvPr/>
+        </p:nvSpPr>
+        <p:spPr>
+          <a:xfrm>
+            <a:off x="3850908" y="2787941"/>
+            <a:ext cx="6032346" cy="2133067"/>
+          </a:xfrm>
+          <a:prstGeom prst="roundRect">
+            <a:avLst>
+              <a:gd name="adj" fmla="val 3973"/>
+            </a:avLst>
+          </a:prstGeom>
+          <a:noFill/>
+          <a:ln>
+            <a:solidFill>
+              <a:srgbClr val="C00000"/>
+            </a:solidFill>
+          </a:ln>
+        </p:spPr>
+        <p:style>
+          <a:lnRef idx="2">
+            <a:schemeClr val="accent1">
+              <a:shade val="50000"/>
+            </a:schemeClr>
+          </a:lnRef>
+          <a:fillRef idx="1">
+            <a:schemeClr val="accent1"/>
+          </a:fillRef>
+          <a:effectRef idx="0">
+            <a:schemeClr val="accent1"/>
+          </a:effectRef>
+          <a:fontRef idx="minor">
+            <a:schemeClr val="lt1"/>
+          </a:fontRef>
+        </p:style>
+        <p:txBody>
+          <a:bodyPr rtlCol="0" anchor="ctr"/>
+          <a:lstStyle/>
+          <a:p>
+            <a:pPr algn="ctr" defTabSz="914225"/>
+            <a:endParaRPr lang="en-CA">
+              <a:solidFill>
+                <a:prstClr val="white"/>
+              </a:solidFill>
+              <a:latin typeface="Calibri" panose="020F0502020204030204"/>
+            </a:endParaRPr>
+          </a:p>
+        </p:txBody>
+      </p:sp>
+      <p:sp>
+        <p:nvSpPr>
+          <p:cNvPr id="91" name="TextBox 90">
+            <a:extLst>
+              <a:ext uri="{FF2B5EF4-FFF2-40B4-BE49-F238E27FC236}">
+                <a16:creationId xmlns:a16="http://schemas.microsoft.com/office/drawing/2014/main" id="{8CE76E01-13D9-46C7-94CB-E064263B7654}"/>
+              </a:ext>
+            </a:extLst>
+          </p:cNvPr>
+          <p:cNvSpPr txBox="1"/>
+          <p:nvPr/>
+        </p:nvSpPr>
+        <p:spPr>
+          <a:xfrm>
+            <a:off x="6085709" y="4918318"/>
+            <a:ext cx="1562745" cy="374793"/>
+          </a:xfrm>
+          <a:prstGeom prst="rect">
+            <a:avLst/>
+          </a:prstGeom>
+          <a:noFill/>
+        </p:spPr>
+        <p:txBody>
+          <a:bodyPr wrap="square" rtlCol="0">
+            <a:spAutoFit/>
+          </a:bodyPr>
+          <a:lstStyle/>
+          <a:p>
+            <a:pPr algn="ctr" defTabSz="914225"/>
+            <a:r>
+              <a:rPr lang="en-US" dirty="0">
+                <a:solidFill>
+                  <a:srgbClr val="4472C4"/>
+                </a:solidFill>
+                <a:latin typeface="Calibri" panose="020F0502020204030204"/>
+              </a:rPr>
+              <a:t>PRODUCTION</a:t>
+            </a:r>
+            <a:endParaRPr lang="en-CA" dirty="0">
+              <a:solidFill>
+                <a:srgbClr val="4472C4"/>
+              </a:solidFill>
+              <a:latin typeface="Calibri" panose="020F0502020204030204"/>
+            </a:endParaRPr>
+          </a:p>
+        </p:txBody>
+      </p:sp>
+      <p:sp>
+        <p:nvSpPr>
+          <p:cNvPr id="92" name="Right Brace 91">
+            <a:extLst>
+              <a:ext uri="{FF2B5EF4-FFF2-40B4-BE49-F238E27FC236}">
+                <a16:creationId xmlns:a16="http://schemas.microsoft.com/office/drawing/2014/main" id="{EBE17CC5-8068-4094-9C19-A80C42D31655}"/>
+              </a:ext>
+            </a:extLst>
+          </p:cNvPr>
+          <p:cNvSpPr/>
+          <p:nvPr/>
+        </p:nvSpPr>
+        <p:spPr>
+          <a:xfrm>
+            <a:off x="10571155" y="2670949"/>
+            <a:ext cx="51785" cy="2166351"/>
+          </a:xfrm>
+          <a:prstGeom prst="rightBrace">
+            <a:avLst/>
+          </a:prstGeom>
+        </p:spPr>
+        <p:style>
+          <a:lnRef idx="1">
+            <a:schemeClr val="accent1"/>
+          </a:lnRef>
+          <a:fillRef idx="0">
+            <a:schemeClr val="accent1"/>
+          </a:fillRef>
+          <a:effectRef idx="0">
+            <a:schemeClr val="accent1"/>
+          </a:effectRef>
+          <a:fontRef idx="minor">
+            <a:schemeClr val="tx1"/>
+          </a:fontRef>
+        </p:style>
+        <p:txBody>
+          <a:bodyPr rtlCol="0" anchor="ctr"/>
+          <a:lstStyle/>
+          <a:p>
+            <a:pPr algn="ctr" defTabSz="914225"/>
+            <a:endParaRPr lang="en-CA">
+              <a:solidFill>
+                <a:prstClr val="black"/>
+              </a:solidFill>
+              <a:latin typeface="Calibri" panose="020F0502020204030204"/>
+            </a:endParaRPr>
+          </a:p>
+        </p:txBody>
+      </p:sp>
+      <p:sp>
+        <p:nvSpPr>
+          <p:cNvPr id="95" name="TextBox 94">
+            <a:extLst>
+              <a:ext uri="{FF2B5EF4-FFF2-40B4-BE49-F238E27FC236}">
+                <a16:creationId xmlns:a16="http://schemas.microsoft.com/office/drawing/2014/main" id="{5F8DAC43-CA3B-4540-9A63-D2064FB521AE}"/>
+              </a:ext>
+            </a:extLst>
+          </p:cNvPr>
+          <p:cNvSpPr txBox="1"/>
+          <p:nvPr/>
+        </p:nvSpPr>
+        <p:spPr>
+          <a:xfrm rot="16200000">
+            <a:off x="9911370" y="3507499"/>
+            <a:ext cx="1857909" cy="374793"/>
+          </a:xfrm>
+          <a:prstGeom prst="rect">
+            <a:avLst/>
+          </a:prstGeom>
+          <a:noFill/>
+        </p:spPr>
+        <p:txBody>
+          <a:bodyPr wrap="square" rtlCol="0">
+            <a:spAutoFit/>
+          </a:bodyPr>
+          <a:lstStyle/>
+          <a:p>
+            <a:pPr algn="ctr" defTabSz="914225"/>
+            <a:r>
+              <a:rPr lang="en-US" dirty="0">
+                <a:solidFill>
+                  <a:srgbClr val="4472C4"/>
+                </a:solidFill>
+                <a:latin typeface="Calibri" panose="020F0502020204030204"/>
+              </a:rPr>
+              <a:t>IMPACT RADIUS</a:t>
+            </a:r>
+            <a:endParaRPr lang="en-CA" dirty="0">
+              <a:solidFill>
+                <a:srgbClr val="4472C4"/>
+              </a:solidFill>
+              <a:latin typeface="Calibri" panose="020F0502020204030204"/>
+            </a:endParaRPr>
+          </a:p>
+        </p:txBody>
+      </p:sp>
+      <p:sp>
+        <p:nvSpPr>
+          <p:cNvPr id="3" name="Rectangle 2">
+            <a:extLst>
+              <a:ext uri="{FF2B5EF4-FFF2-40B4-BE49-F238E27FC236}">
+                <a16:creationId xmlns:a16="http://schemas.microsoft.com/office/drawing/2014/main" id="{7916D823-0B55-454F-A33D-CC568DAAD096}"/>
+              </a:ext>
+            </a:extLst>
+          </p:cNvPr>
+          <p:cNvSpPr/>
+          <p:nvPr/>
+        </p:nvSpPr>
+        <p:spPr>
+          <a:xfrm>
+            <a:off x="258447" y="4831196"/>
+            <a:ext cx="3008979" cy="1415807"/>
+          </a:xfrm>
+          <a:prstGeom prst="rect">
+            <a:avLst/>
+          </a:prstGeom>
+          <a:solidFill>
+            <a:schemeClr val="bg2"/>
+          </a:solidFill>
+          <a:ln>
+            <a:noFill/>
+          </a:ln>
+        </p:spPr>
+        <p:style>
+          <a:lnRef idx="2">
+            <a:schemeClr val="accent1">
+              <a:shade val="50000"/>
+            </a:schemeClr>
+          </a:lnRef>
+          <a:fillRef idx="1">
+            <a:schemeClr val="accent1"/>
+          </a:fillRef>
+          <a:effectRef idx="0">
+            <a:schemeClr val="accent1"/>
+          </a:effectRef>
+          <a:fontRef idx="minor">
+            <a:schemeClr val="lt1"/>
+          </a:fontRef>
+        </p:style>
+        <p:txBody>
+          <a:bodyPr rtlCol="0" anchor="ctr"/>
+          <a:lstStyle/>
+          <a:p>
+            <a:pPr algn="ctr" defTabSz="914225"/>
+            <a:endParaRPr lang="en-CA">
+              <a:solidFill>
+                <a:prstClr val="white"/>
+              </a:solidFill>
+              <a:latin typeface="Calibri" panose="020F0502020204030204"/>
+            </a:endParaRPr>
+          </a:p>
+        </p:txBody>
+      </p:sp>
+      <p:sp>
+        <p:nvSpPr>
+          <p:cNvPr id="93" name="TextBox 92">
+            <a:extLst>
+              <a:ext uri="{FF2B5EF4-FFF2-40B4-BE49-F238E27FC236}">
+                <a16:creationId xmlns:a16="http://schemas.microsoft.com/office/drawing/2014/main" id="{BA66B829-BAF5-47A7-88EE-09F6A035853E}"/>
+              </a:ext>
+            </a:extLst>
+          </p:cNvPr>
+          <p:cNvSpPr txBox="1"/>
+          <p:nvPr/>
+        </p:nvSpPr>
+        <p:spPr>
+          <a:xfrm>
+            <a:off x="988306" y="4888636"/>
+            <a:ext cx="1562745" cy="374793"/>
+          </a:xfrm>
+          <a:prstGeom prst="rect">
+            <a:avLst/>
+          </a:prstGeom>
+          <a:noFill/>
+        </p:spPr>
+        <p:txBody>
+          <a:bodyPr wrap="square" rtlCol="0">
+            <a:spAutoFit/>
+          </a:bodyPr>
+          <a:lstStyle/>
+          <a:p>
+            <a:pPr algn="ctr" defTabSz="914225"/>
+            <a:r>
+              <a:rPr lang="en-US" dirty="0">
+                <a:solidFill>
+                  <a:srgbClr val="4472C4"/>
+                </a:solidFill>
+                <a:latin typeface="Calibri" panose="020F0502020204030204"/>
+              </a:rPr>
+              <a:t>RINGS</a:t>
+            </a:r>
+            <a:endParaRPr lang="en-CA" dirty="0">
+              <a:solidFill>
+                <a:srgbClr val="4472C4"/>
+              </a:solidFill>
+              <a:latin typeface="Calibri" panose="020F0502020204030204"/>
+            </a:endParaRPr>
+          </a:p>
+        </p:txBody>
+      </p:sp>
+    </p:spTree>
+    <p:extLst>
+      <p:ext uri="{BB962C8B-B14F-4D97-AF65-F5344CB8AC3E}">
+        <p14:creationId xmlns:p14="http://schemas.microsoft.com/office/powerpoint/2010/main" val="2987767499"/>
       </p:ext>
     </p:extLst>
   </p:cSld>
@@ -5102,4 +7895,299 @@
     </a:ext>
   </a:extLst>
 </a:theme>
+</file>
+
+<file path=ppt/theme/theme2.xml><?xml version="1.0" encoding="utf-8"?>
+<a:theme xmlns:a="http://schemas.openxmlformats.org/drawingml/2006/main" name="Office Theme">
+  <a:themeElements>
+    <a:clrScheme name="Office">
+      <a:dk1>
+        <a:sysClr val="windowText" lastClr="000000"/>
+      </a:dk1>
+      <a:lt1>
+        <a:sysClr val="window" lastClr="FFFFFF"/>
+      </a:lt1>
+      <a:dk2>
+        <a:srgbClr val="44546A"/>
+      </a:dk2>
+      <a:lt2>
+        <a:srgbClr val="E7E6E6"/>
+      </a:lt2>
+      <a:accent1>
+        <a:srgbClr val="4472C4"/>
+      </a:accent1>
+      <a:accent2>
+        <a:srgbClr val="ED7D31"/>
+      </a:accent2>
+      <a:accent3>
+        <a:srgbClr val="A5A5A5"/>
+      </a:accent3>
+      <a:accent4>
+        <a:srgbClr val="FFC000"/>
+      </a:accent4>
+      <a:accent5>
+        <a:srgbClr val="5B9BD5"/>
+      </a:accent5>
+      <a:accent6>
+        <a:srgbClr val="70AD47"/>
+      </a:accent6>
+      <a:hlink>
+        <a:srgbClr val="0563C1"/>
+      </a:hlink>
+      <a:folHlink>
+        <a:srgbClr val="954F72"/>
+      </a:folHlink>
+    </a:clrScheme>
+    <a:fontScheme name="Office">
+      <a:majorFont>
+        <a:latin typeface="Calibri Light" panose="020F0302020204030204"/>
+        <a:ea typeface=""/>
+        <a:cs typeface=""/>
+        <a:font script="Jpan" typeface="游ゴシック Light"/>
+        <a:font script="Hang" typeface="맑은 고딕"/>
+        <a:font script="Hans" typeface="等线 Light"/>
+        <a:font script="Hant" typeface="新細明體"/>
+        <a:font script="Arab" typeface="Times New Roman"/>
+        <a:font script="Hebr" typeface="Times New Roman"/>
+        <a:font script="Thai" typeface="Angsana New"/>
+        <a:font script="Ethi" typeface="Nyala"/>
+        <a:font script="Beng" typeface="Vrinda"/>
+        <a:font script="Gujr" typeface="Shruti"/>
+        <a:font script="Khmr" typeface="MoolBoran"/>
+        <a:font script="Knda" typeface="Tunga"/>
+        <a:font script="Guru" typeface="Raavi"/>
+        <a:font script="Cans" typeface="Euphemia"/>
+        <a:font script="Cher" typeface="Plantagenet Cherokee"/>
+        <a:font script="Yiii" typeface="Microsoft Yi Baiti"/>
+        <a:font script="Tibt" typeface="Microsoft Himalaya"/>
+        <a:font script="Thaa" typeface="MV Boli"/>
+        <a:font script="Deva" typeface="Mangal"/>
+        <a:font script="Telu" typeface="Gautami"/>
+        <a:font script="Taml" typeface="Latha"/>
+        <a:font script="Syrc" typeface="Estrangelo Edessa"/>
+        <a:font script="Orya" typeface="Kalinga"/>
+        <a:font script="Mlym" typeface="Kartika"/>
+        <a:font script="Laoo" typeface="DokChampa"/>
+        <a:font script="Sinh" typeface="Iskoola Pota"/>
+        <a:font script="Mong" typeface="Mongolian Baiti"/>
+        <a:font script="Viet" typeface="Times New Roman"/>
+        <a:font script="Uigh" typeface="Microsoft Uighur"/>
+        <a:font script="Geor" typeface="Sylfaen"/>
+        <a:font script="Armn" typeface="Arial"/>
+        <a:font script="Bugi" typeface="Leelawadee UI"/>
+        <a:font script="Bopo" typeface="Microsoft JhengHei"/>
+        <a:font script="Java" typeface="Javanese Text"/>
+        <a:font script="Lisu" typeface="Segoe UI"/>
+        <a:font script="Mymr" typeface="Myanmar Text"/>
+        <a:font script="Nkoo" typeface="Ebrima"/>
+        <a:font script="Olck" typeface="Nirmala UI"/>
+        <a:font script="Osma" typeface="Ebrima"/>
+        <a:font script="Phag" typeface="Phagspa"/>
+        <a:font script="Syrn" typeface="Estrangelo Edessa"/>
+        <a:font script="Syrj" typeface="Estrangelo Edessa"/>
+        <a:font script="Syre" typeface="Estrangelo Edessa"/>
+        <a:font script="Sora" typeface="Nirmala UI"/>
+        <a:font script="Tale" typeface="Microsoft Tai Le"/>
+        <a:font script="Talu" typeface="Microsoft New Tai Lue"/>
+        <a:font script="Tfng" typeface="Ebrima"/>
+      </a:majorFont>
+      <a:minorFont>
+        <a:latin typeface="Calibri" panose="020F0502020204030204"/>
+        <a:ea typeface=""/>
+        <a:cs typeface=""/>
+        <a:font script="Jpan" typeface="游ゴシック"/>
+        <a:font script="Hang" typeface="맑은 고딕"/>
+        <a:font script="Hans" typeface="等线"/>
+        <a:font script="Hant" typeface="新細明體"/>
+        <a:font script="Arab" typeface="Arial"/>
+        <a:font script="Hebr" typeface="Arial"/>
+        <a:font script="Thai" typeface="Cordia New"/>
+        <a:font script="Ethi" typeface="Nyala"/>
+        <a:font script="Beng" typeface="Vrinda"/>
+        <a:font script="Gujr" typeface="Shruti"/>
+        <a:font script="Khmr" typeface="DaunPenh"/>
+        <a:font script="Knda" typeface="Tunga"/>
+        <a:font script="Guru" typeface="Raavi"/>
+        <a:font script="Cans" typeface="Euphemia"/>
+        <a:font script="Cher" typeface="Plantagenet Cherokee"/>
+        <a:font script="Yiii" typeface="Microsoft Yi Baiti"/>
+        <a:font script="Tibt" typeface="Microsoft Himalaya"/>
+        <a:font script="Thaa" typeface="MV Boli"/>
+        <a:font script="Deva" typeface="Mangal"/>
+        <a:font script="Telu" typeface="Gautami"/>
+        <a:font script="Taml" typeface="Latha"/>
+        <a:font script="Syrc" typeface="Estrangelo Edessa"/>
+        <a:font script="Orya" typeface="Kalinga"/>
+        <a:font script="Mlym" typeface="Kartika"/>
+        <a:font script="Laoo" typeface="DokChampa"/>
+        <a:font script="Sinh" typeface="Iskoola Pota"/>
+        <a:font script="Mong" typeface="Mongolian Baiti"/>
+        <a:font script="Viet" typeface="Arial"/>
+        <a:font script="Uigh" typeface="Microsoft Uighur"/>
+        <a:font script="Geor" typeface="Sylfaen"/>
+        <a:font script="Armn" typeface="Arial"/>
+        <a:font script="Bugi" typeface="Leelawadee UI"/>
+        <a:font script="Bopo" typeface="Microsoft JhengHei"/>
+        <a:font script="Java" typeface="Javanese Text"/>
+        <a:font script="Lisu" typeface="Segoe UI"/>
+        <a:font script="Mymr" typeface="Myanmar Text"/>
+        <a:font script="Nkoo" typeface="Ebrima"/>
+        <a:font script="Olck" typeface="Nirmala UI"/>
+        <a:font script="Osma" typeface="Ebrima"/>
+        <a:font script="Phag" typeface="Phagspa"/>
+        <a:font script="Syrn" typeface="Estrangelo Edessa"/>
+        <a:font script="Syrj" typeface="Estrangelo Edessa"/>
+        <a:font script="Syre" typeface="Estrangelo Edessa"/>
+        <a:font script="Sora" typeface="Nirmala UI"/>
+        <a:font script="Tale" typeface="Microsoft Tai Le"/>
+        <a:font script="Talu" typeface="Microsoft New Tai Lue"/>
+        <a:font script="Tfng" typeface="Ebrima"/>
+      </a:minorFont>
+    </a:fontScheme>
+    <a:fmtScheme name="Office">
+      <a:fillStyleLst>
+        <a:solidFill>
+          <a:schemeClr val="phClr"/>
+        </a:solidFill>
+        <a:gradFill rotWithShape="1">
+          <a:gsLst>
+            <a:gs pos="0">
+              <a:schemeClr val="phClr">
+                <a:lumMod val="110000"/>
+                <a:satMod val="105000"/>
+                <a:tint val="67000"/>
+              </a:schemeClr>
+            </a:gs>
+            <a:gs pos="50000">
+              <a:schemeClr val="phClr">
+                <a:lumMod val="105000"/>
+                <a:satMod val="103000"/>
+                <a:tint val="73000"/>
+              </a:schemeClr>
+            </a:gs>
+            <a:gs pos="100000">
+              <a:schemeClr val="phClr">
+                <a:lumMod val="105000"/>
+                <a:satMod val="109000"/>
+                <a:tint val="81000"/>
+              </a:schemeClr>
+            </a:gs>
+          </a:gsLst>
+          <a:lin ang="5400000" scaled="0"/>
+        </a:gradFill>
+        <a:gradFill rotWithShape="1">
+          <a:gsLst>
+            <a:gs pos="0">
+              <a:schemeClr val="phClr">
+                <a:satMod val="103000"/>
+                <a:lumMod val="102000"/>
+                <a:tint val="94000"/>
+              </a:schemeClr>
+            </a:gs>
+            <a:gs pos="50000">
+              <a:schemeClr val="phClr">
+                <a:satMod val="110000"/>
+                <a:lumMod val="100000"/>
+                <a:shade val="100000"/>
+              </a:schemeClr>
+            </a:gs>
+            <a:gs pos="100000">
+              <a:schemeClr val="phClr">
+                <a:lumMod val="99000"/>
+                <a:satMod val="120000"/>
+                <a:shade val="78000"/>
+              </a:schemeClr>
+            </a:gs>
+          </a:gsLst>
+          <a:lin ang="5400000" scaled="0"/>
+        </a:gradFill>
+      </a:fillStyleLst>
+      <a:lnStyleLst>
+        <a:ln w="6350" cap="flat" cmpd="sng" algn="ctr">
+          <a:solidFill>
+            <a:schemeClr val="phClr"/>
+          </a:solidFill>
+          <a:prstDash val="solid"/>
+          <a:miter lim="800000"/>
+        </a:ln>
+        <a:ln w="12700" cap="flat" cmpd="sng" algn="ctr">
+          <a:solidFill>
+            <a:schemeClr val="phClr"/>
+          </a:solidFill>
+          <a:prstDash val="solid"/>
+          <a:miter lim="800000"/>
+        </a:ln>
+        <a:ln w="19050" cap="flat" cmpd="sng" algn="ctr">
+          <a:solidFill>
+            <a:schemeClr val="phClr"/>
+          </a:solidFill>
+          <a:prstDash val="solid"/>
+          <a:miter lim="800000"/>
+        </a:ln>
+      </a:lnStyleLst>
+      <a:effectStyleLst>
+        <a:effectStyle>
+          <a:effectLst/>
+        </a:effectStyle>
+        <a:effectStyle>
+          <a:effectLst/>
+        </a:effectStyle>
+        <a:effectStyle>
+          <a:effectLst>
+            <a:outerShdw blurRad="57150" dist="19050" dir="5400000" algn="ctr" rotWithShape="0">
+              <a:srgbClr val="000000">
+                <a:alpha val="63000"/>
+              </a:srgbClr>
+            </a:outerShdw>
+          </a:effectLst>
+        </a:effectStyle>
+      </a:effectStyleLst>
+      <a:bgFillStyleLst>
+        <a:solidFill>
+          <a:schemeClr val="phClr"/>
+        </a:solidFill>
+        <a:solidFill>
+          <a:schemeClr val="phClr">
+            <a:tint val="95000"/>
+            <a:satMod val="170000"/>
+          </a:schemeClr>
+        </a:solidFill>
+        <a:gradFill rotWithShape="1">
+          <a:gsLst>
+            <a:gs pos="0">
+              <a:schemeClr val="phClr">
+                <a:tint val="93000"/>
+                <a:satMod val="150000"/>
+                <a:shade val="98000"/>
+                <a:lumMod val="102000"/>
+              </a:schemeClr>
+            </a:gs>
+            <a:gs pos="50000">
+              <a:schemeClr val="phClr">
+                <a:tint val="98000"/>
+                <a:satMod val="130000"/>
+                <a:shade val="90000"/>
+                <a:lumMod val="103000"/>
+              </a:schemeClr>
+            </a:gs>
+            <a:gs pos="100000">
+              <a:schemeClr val="phClr">
+                <a:shade val="63000"/>
+                <a:satMod val="120000"/>
+              </a:schemeClr>
+            </a:gs>
+          </a:gsLst>
+          <a:lin ang="5400000" scaled="0"/>
+        </a:gradFill>
+      </a:bgFillStyleLst>
+    </a:fmtScheme>
+  </a:themeElements>
+  <a:objectDefaults/>
+  <a:extraClrSchemeLst/>
+  <a:extLst>
+    <a:ext uri="{05A4C25C-085E-4340-85A3-A5531E510DB2}">
+      <thm15:themeFamily xmlns:thm15="http://schemas.microsoft.com/office/thememl/2012/main" name="Office Theme" id="{62F939B6-93AF-4DB8-9C6B-D6C7DFDC589F}" vid="{4A3C46E8-61CC-4603-A589-7422A47A8E4A}"/>
+    </a:ext>
+  </a:extLst>
+</a:theme>
 </file>
</xml_diff>

<commit_message>
Insert Rui's section (#25)
</commit_message>
<xml_diff>
--- a/src/Stories/Story illustrations.pptx
+++ b/src/Stories/Story illustrations.pptx
@@ -5,7 +5,7 @@
     <p:sldMasterId id="2147483648" r:id="rId1"/>
   </p:sldMasterIdLst>
   <p:notesMasterIdLst>
-    <p:notesMasterId r:id="rId7"/>
+    <p:notesMasterId r:id="rId8"/>
   </p:notesMasterIdLst>
   <p:sldIdLst>
     <p:sldId id="256" r:id="rId2"/>
@@ -13,6 +13,7 @@
     <p:sldId id="259" r:id="rId4"/>
     <p:sldId id="260" r:id="rId5"/>
     <p:sldId id="261" r:id="rId6"/>
+    <p:sldId id="262" r:id="rId7"/>
   </p:sldIdLst>
   <p:sldSz cx="12192000" cy="6858000"/>
   <p:notesSz cx="6858000" cy="9144000"/>
@@ -259,7 +260,7 @@
           <a:p>
             <a:fld id="{BC8E98BD-6AE1-4307-B1DC-BAE68787EC38}" type="datetimeFigureOut">
               <a:rPr lang="en-CA" smtClean="0"/>
-              <a:t>2017-06-24</a:t>
+              <a:t>2017-07-20</a:t>
             </a:fld>
             <a:endParaRPr lang="en-CA"/>
           </a:p>
@@ -963,6 +964,90 @@
 </p:notes>
 </file>
 
+<file path=ppt/notesSlides/notesSlide6.xml><?xml version="1.0" encoding="utf-8"?>
+<p:notes xmlns:a="http://schemas.openxmlformats.org/drawingml/2006/main" xmlns:r="http://schemas.openxmlformats.org/officeDocument/2006/relationships" xmlns:p="http://schemas.openxmlformats.org/presentationml/2006/main">
+  <p:cSld>
+    <p:spTree>
+      <p:nvGrpSpPr>
+        <p:cNvPr id="1" name=""/>
+        <p:cNvGrpSpPr/>
+        <p:nvPr/>
+      </p:nvGrpSpPr>
+      <p:grpSpPr>
+        <a:xfrm>
+          <a:off x="0" y="0"/>
+          <a:ext cx="0" cy="0"/>
+          <a:chOff x="0" y="0"/>
+          <a:chExt cx="0" cy="0"/>
+        </a:xfrm>
+      </p:grpSpPr>
+      <p:sp>
+        <p:nvSpPr>
+          <p:cNvPr id="2" name="Slide Image Placeholder 1"/>
+          <p:cNvSpPr>
+            <a:spLocks noGrp="1" noRot="1" noChangeAspect="1"/>
+          </p:cNvSpPr>
+          <p:nvPr>
+            <p:ph type="sldImg"/>
+          </p:nvPr>
+        </p:nvSpPr>
+        <p:spPr/>
+      </p:sp>
+      <p:sp>
+        <p:nvSpPr>
+          <p:cNvPr id="3" name="Notes Placeholder 2"/>
+          <p:cNvSpPr>
+            <a:spLocks noGrp="1"/>
+          </p:cNvSpPr>
+          <p:nvPr>
+            <p:ph type="body" idx="1"/>
+          </p:nvPr>
+        </p:nvSpPr>
+        <p:spPr/>
+        <p:txBody>
+          <a:bodyPr/>
+          <a:lstStyle/>
+          <a:p>
+            <a:endParaRPr lang="en-CA"/>
+          </a:p>
+        </p:txBody>
+      </p:sp>
+      <p:sp>
+        <p:nvSpPr>
+          <p:cNvPr id="4" name="Slide Number Placeholder 3"/>
+          <p:cNvSpPr>
+            <a:spLocks noGrp="1"/>
+          </p:cNvSpPr>
+          <p:nvPr>
+            <p:ph type="sldNum" sz="quarter" idx="10"/>
+          </p:nvPr>
+        </p:nvSpPr>
+        <p:spPr/>
+        <p:txBody>
+          <a:bodyPr/>
+          <a:lstStyle/>
+          <a:p>
+            <a:fld id="{F6A75A2C-6036-4CC3-919B-29E2F0BD9283}" type="slidenum">
+              <a:rPr lang="en-CA" smtClean="0"/>
+              <a:t>6</a:t>
+            </a:fld>
+            <a:endParaRPr lang="en-CA"/>
+          </a:p>
+        </p:txBody>
+      </p:sp>
+    </p:spTree>
+    <p:extLst>
+      <p:ext uri="{BB962C8B-B14F-4D97-AF65-F5344CB8AC3E}">
+        <p14:creationId xmlns:p14="http://schemas.microsoft.com/office/powerpoint/2010/main" val="2185946530"/>
+      </p:ext>
+    </p:extLst>
+  </p:cSld>
+  <p:clrMapOvr>
+    <a:masterClrMapping/>
+  </p:clrMapOvr>
+</p:notes>
+</file>
+
 <file path=ppt/slideLayouts/slideLayout1.xml><?xml version="1.0" encoding="utf-8"?>
 <p:sldLayout xmlns:a="http://schemas.openxmlformats.org/drawingml/2006/main" xmlns:r="http://schemas.openxmlformats.org/officeDocument/2006/relationships" xmlns:p="http://schemas.openxmlformats.org/presentationml/2006/main" type="titleOnly" preserve="1">
   <p:cSld name="Title Only">
@@ -1037,7 +1122,7 @@
           <a:p>
             <a:fld id="{91095A8E-9C53-4015-AAB0-2CFFE67F5AFD}" type="datetimeFigureOut">
               <a:rPr lang="en-CA" smtClean="0"/>
-              <a:t>2017-06-24</a:t>
+              <a:t>2017-07-20</a:t>
             </a:fld>
             <a:endParaRPr lang="en-CA"/>
           </a:p>
@@ -1250,7 +1335,7 @@
           <a:p>
             <a:fld id="{91095A8E-9C53-4015-AAB0-2CFFE67F5AFD}" type="datetimeFigureOut">
               <a:rPr lang="en-CA" smtClean="0"/>
-              <a:t>2017-06-24</a:t>
+              <a:t>2017-07-20</a:t>
             </a:fld>
             <a:endParaRPr lang="en-CA"/>
           </a:p>
@@ -7599,6 +7684,1508 @@
   <p:clrMapOvr>
     <a:masterClrMapping/>
   </p:clrMapOvr>
+</p:sld>
+</file>
+
+<file path=ppt/slides/slide6.xml><?xml version="1.0" encoding="utf-8"?>
+<p:sld xmlns:a="http://schemas.openxmlformats.org/drawingml/2006/main" xmlns:r="http://schemas.openxmlformats.org/officeDocument/2006/relationships" xmlns:p="http://schemas.openxmlformats.org/presentationml/2006/main">
+  <p:cSld>
+    <p:spTree>
+      <p:nvGrpSpPr>
+        <p:cNvPr id="1" name=""/>
+        <p:cNvGrpSpPr/>
+        <p:nvPr/>
+      </p:nvGrpSpPr>
+      <p:grpSpPr>
+        <a:xfrm>
+          <a:off x="0" y="0"/>
+          <a:ext cx="0" cy="0"/>
+          <a:chOff x="0" y="0"/>
+          <a:chExt cx="0" cy="0"/>
+        </a:xfrm>
+      </p:grpSpPr>
+      <p:sp>
+        <p:nvSpPr>
+          <p:cNvPr id="2" name="Title 1">
+            <a:extLst>
+              <a:ext uri="{FF2B5EF4-FFF2-40B4-BE49-F238E27FC236}">
+                <a16:creationId xmlns:a16="http://schemas.microsoft.com/office/drawing/2014/main" id="{7204C3A5-ED99-4122-B625-27E9185F1D37}"/>
+              </a:ext>
+            </a:extLst>
+          </p:cNvPr>
+          <p:cNvSpPr>
+            <a:spLocks noGrp="1"/>
+          </p:cNvSpPr>
+          <p:nvPr>
+            <p:ph type="title"/>
+          </p:nvPr>
+        </p:nvSpPr>
+        <p:spPr/>
+        <p:txBody>
+          <a:bodyPr/>
+          <a:lstStyle/>
+          <a:p>
+            <a:r>
+              <a:rPr lang="en-US"/>
+              <a:t>Our evolution</a:t>
+            </a:r>
+            <a:endParaRPr lang="en-CA"/>
+          </a:p>
+        </p:txBody>
+      </p:sp>
+      <p:grpSp>
+        <p:nvGrpSpPr>
+          <p:cNvPr id="3" name="Group 2">
+            <a:extLst>
+              <a:ext uri="{FF2B5EF4-FFF2-40B4-BE49-F238E27FC236}">
+                <a16:creationId xmlns:a16="http://schemas.microsoft.com/office/drawing/2014/main" id="{74CDF40A-7E1E-406F-AE0C-8D15D8C2D2B3}"/>
+              </a:ext>
+            </a:extLst>
+          </p:cNvPr>
+          <p:cNvGrpSpPr/>
+          <p:nvPr/>
+        </p:nvGrpSpPr>
+        <p:grpSpPr>
+          <a:xfrm>
+            <a:off x="226291" y="1573213"/>
+            <a:ext cx="11983771" cy="4208805"/>
+            <a:chOff x="177944" y="1253204"/>
+            <a:chExt cx="11059290" cy="3479742"/>
+          </a:xfrm>
+        </p:grpSpPr>
+        <p:sp>
+          <p:nvSpPr>
+            <p:cNvPr id="4" name="Right Arrow 26">
+              <a:extLst>
+                <a:ext uri="{FF2B5EF4-FFF2-40B4-BE49-F238E27FC236}">
+                  <a16:creationId xmlns:a16="http://schemas.microsoft.com/office/drawing/2014/main" id="{36DC51FB-B10D-4DF9-BB16-E5E4E101047F}"/>
+                </a:ext>
+              </a:extLst>
+            </p:cNvPr>
+            <p:cNvSpPr/>
+            <p:nvPr/>
+          </p:nvSpPr>
+          <p:spPr>
+            <a:xfrm>
+              <a:off x="561272" y="2154327"/>
+              <a:ext cx="10364224" cy="576530"/>
+            </a:xfrm>
+            <a:prstGeom prst="rightArrow">
+              <a:avLst/>
+            </a:prstGeom>
+            <a:solidFill>
+              <a:srgbClr val="3366CC"/>
+            </a:solidFill>
+            <a:ln w="12700" cap="flat" cmpd="sng" algn="ctr">
+              <a:solidFill>
+                <a:srgbClr val="0070C0"/>
+              </a:solidFill>
+              <a:prstDash val="solid"/>
+              <a:miter lim="800000"/>
+            </a:ln>
+            <a:effectLst/>
+          </p:spPr>
+          <p:txBody>
+            <a:bodyPr rtlCol="0" anchor="ctr"/>
+            <a:lstStyle/>
+            <a:p>
+              <a:pPr marL="0" marR="0" lvl="0" indent="0" algn="ctr" defTabSz="914400" eaLnBrk="1" fontAlgn="auto" latinLnBrk="0" hangingPunct="1">
+                <a:lnSpc>
+                  <a:spcPct val="100000"/>
+                </a:lnSpc>
+                <a:spcBef>
+                  <a:spcPts val="0"/>
+                </a:spcBef>
+                <a:spcAft>
+                  <a:spcPts val="0"/>
+                </a:spcAft>
+                <a:buClrTx/>
+                <a:buSzTx/>
+                <a:buFontTx/>
+                <a:buNone/>
+                <a:tabLst/>
+                <a:defRPr/>
+              </a:pPr>
+              <a:endParaRPr kumimoji="0" lang="en-CA" sz="1800" b="0" i="0" u="none" strike="noStrike" kern="0" cap="none" spc="0" normalizeH="0" baseline="0" noProof="0" dirty="0">
+                <a:ln>
+                  <a:noFill/>
+                </a:ln>
+                <a:solidFill>
+                  <a:prstClr val="white"/>
+                </a:solidFill>
+                <a:effectLst/>
+                <a:uLnTx/>
+                <a:uFillTx/>
+                <a:latin typeface="Calibri" panose="020F0502020204030204"/>
+                <a:ea typeface="+mn-ea"/>
+                <a:cs typeface="+mn-cs"/>
+              </a:endParaRPr>
+            </a:p>
+          </p:txBody>
+        </p:sp>
+        <p:sp>
+          <p:nvSpPr>
+            <p:cNvPr id="5" name="TextBox 4">
+              <a:extLst>
+                <a:ext uri="{FF2B5EF4-FFF2-40B4-BE49-F238E27FC236}">
+                  <a16:creationId xmlns:a16="http://schemas.microsoft.com/office/drawing/2014/main" id="{A50307A3-5F8E-402D-B32F-5E7B5BD037C6}"/>
+                </a:ext>
+              </a:extLst>
+            </p:cNvPr>
+            <p:cNvSpPr txBox="1"/>
+            <p:nvPr/>
+          </p:nvSpPr>
+          <p:spPr>
+            <a:xfrm>
+              <a:off x="561272" y="2263768"/>
+              <a:ext cx="744404" cy="381694"/>
+            </a:xfrm>
+            <a:prstGeom prst="rect">
+              <a:avLst/>
+            </a:prstGeom>
+            <a:noFill/>
+          </p:spPr>
+          <p:txBody>
+            <a:bodyPr wrap="none" rtlCol="0">
+              <a:spAutoFit/>
+            </a:bodyPr>
+            <a:lstStyle/>
+            <a:p>
+              <a:pPr defTabSz="914400"/>
+              <a:r>
+                <a:rPr lang="en-CA" sz="2400" dirty="0">
+                  <a:solidFill>
+                    <a:prstClr val="white"/>
+                  </a:solidFill>
+                  <a:latin typeface="Calibri" panose="020F0502020204030204"/>
+                </a:rPr>
+                <a:t>2006</a:t>
+              </a:r>
+            </a:p>
+          </p:txBody>
+        </p:sp>
+        <p:sp>
+          <p:nvSpPr>
+            <p:cNvPr id="6" name="TextBox 5">
+              <a:extLst>
+                <a:ext uri="{FF2B5EF4-FFF2-40B4-BE49-F238E27FC236}">
+                  <a16:creationId xmlns:a16="http://schemas.microsoft.com/office/drawing/2014/main" id="{473F59DC-78D0-4E6A-A7AD-E6044E9B1BA4}"/>
+                </a:ext>
+              </a:extLst>
+            </p:cNvPr>
+            <p:cNvSpPr txBox="1"/>
+            <p:nvPr/>
+          </p:nvSpPr>
+          <p:spPr>
+            <a:xfrm>
+              <a:off x="2794189" y="2263768"/>
+              <a:ext cx="744404" cy="381694"/>
+            </a:xfrm>
+            <a:prstGeom prst="rect">
+              <a:avLst/>
+            </a:prstGeom>
+            <a:noFill/>
+          </p:spPr>
+          <p:txBody>
+            <a:bodyPr wrap="none" rtlCol="0">
+              <a:spAutoFit/>
+            </a:bodyPr>
+            <a:lstStyle/>
+            <a:p>
+              <a:pPr defTabSz="914400"/>
+              <a:r>
+                <a:rPr lang="en-CA" sz="2400" dirty="0">
+                  <a:solidFill>
+                    <a:prstClr val="white"/>
+                  </a:solidFill>
+                  <a:latin typeface="Calibri" panose="020F0502020204030204"/>
+                </a:rPr>
+                <a:t>2009</a:t>
+              </a:r>
+            </a:p>
+          </p:txBody>
+        </p:sp>
+        <p:sp>
+          <p:nvSpPr>
+            <p:cNvPr id="7" name="TextBox 6">
+              <a:extLst>
+                <a:ext uri="{FF2B5EF4-FFF2-40B4-BE49-F238E27FC236}">
+                  <a16:creationId xmlns:a16="http://schemas.microsoft.com/office/drawing/2014/main" id="{CAC5CD84-5EDE-4BE2-9ABC-4D3F4BE867BB}"/>
+                </a:ext>
+              </a:extLst>
+            </p:cNvPr>
+            <p:cNvSpPr txBox="1"/>
+            <p:nvPr/>
+          </p:nvSpPr>
+          <p:spPr>
+            <a:xfrm>
+              <a:off x="5150396" y="2263768"/>
+              <a:ext cx="744404" cy="381694"/>
+            </a:xfrm>
+            <a:prstGeom prst="rect">
+              <a:avLst/>
+            </a:prstGeom>
+            <a:noFill/>
+          </p:spPr>
+          <p:txBody>
+            <a:bodyPr wrap="none" rtlCol="0">
+              <a:spAutoFit/>
+            </a:bodyPr>
+            <a:lstStyle/>
+            <a:p>
+              <a:pPr defTabSz="914400"/>
+              <a:r>
+                <a:rPr lang="en-CA" sz="2400" dirty="0">
+                  <a:solidFill>
+                    <a:prstClr val="white"/>
+                  </a:solidFill>
+                  <a:latin typeface="Calibri" panose="020F0502020204030204"/>
+                </a:rPr>
+                <a:t>2012</a:t>
+              </a:r>
+            </a:p>
+          </p:txBody>
+        </p:sp>
+        <p:pic>
+          <p:nvPicPr>
+            <p:cNvPr id="8" name="Picture 7">
+              <a:extLst>
+                <a:ext uri="{FF2B5EF4-FFF2-40B4-BE49-F238E27FC236}">
+                  <a16:creationId xmlns:a16="http://schemas.microsoft.com/office/drawing/2014/main" id="{8E0D8764-F014-489E-880F-35021D93992A}"/>
+                </a:ext>
+              </a:extLst>
+            </p:cNvPr>
+            <p:cNvPicPr>
+              <a:picLocks noChangeAspect="1"/>
+            </p:cNvPicPr>
+            <p:nvPr/>
+          </p:nvPicPr>
+          <p:blipFill>
+            <a:blip r:embed="rId3"/>
+            <a:stretch>
+              <a:fillRect/>
+            </a:stretch>
+          </p:blipFill>
+          <p:spPr>
+            <a:xfrm>
+              <a:off x="7381175" y="1253204"/>
+              <a:ext cx="760104" cy="900000"/>
+            </a:xfrm>
+            <a:prstGeom prst="rect">
+              <a:avLst/>
+            </a:prstGeom>
+          </p:spPr>
+        </p:pic>
+        <p:sp>
+          <p:nvSpPr>
+            <p:cNvPr id="9" name="TextBox 8">
+              <a:extLst>
+                <a:ext uri="{FF2B5EF4-FFF2-40B4-BE49-F238E27FC236}">
+                  <a16:creationId xmlns:a16="http://schemas.microsoft.com/office/drawing/2014/main" id="{2178973D-4D28-4A04-ACE7-8D0DB234C7C3}"/>
+                </a:ext>
+              </a:extLst>
+            </p:cNvPr>
+            <p:cNvSpPr txBox="1"/>
+            <p:nvPr/>
+          </p:nvSpPr>
+          <p:spPr>
+            <a:xfrm>
+              <a:off x="7429192" y="2263768"/>
+              <a:ext cx="744404" cy="381694"/>
+            </a:xfrm>
+            <a:prstGeom prst="rect">
+              <a:avLst/>
+            </a:prstGeom>
+            <a:noFill/>
+          </p:spPr>
+          <p:txBody>
+            <a:bodyPr wrap="none" rtlCol="0">
+              <a:spAutoFit/>
+            </a:bodyPr>
+            <a:lstStyle/>
+            <a:p>
+              <a:pPr defTabSz="914400"/>
+              <a:r>
+                <a:rPr lang="en-CA" sz="2400" dirty="0">
+                  <a:solidFill>
+                    <a:prstClr val="white"/>
+                  </a:solidFill>
+                  <a:latin typeface="Calibri" panose="020F0502020204030204"/>
+                </a:rPr>
+                <a:t>2015</a:t>
+              </a:r>
+            </a:p>
+          </p:txBody>
+        </p:sp>
+        <p:sp>
+          <p:nvSpPr>
+            <p:cNvPr id="10" name="TextBox 9">
+              <a:extLst>
+                <a:ext uri="{FF2B5EF4-FFF2-40B4-BE49-F238E27FC236}">
+                  <a16:creationId xmlns:a16="http://schemas.microsoft.com/office/drawing/2014/main" id="{30DF7553-B29D-41F4-8AFB-55631DA74800}"/>
+                </a:ext>
+              </a:extLst>
+            </p:cNvPr>
+            <p:cNvSpPr txBox="1"/>
+            <p:nvPr/>
+          </p:nvSpPr>
+          <p:spPr>
+            <a:xfrm>
+              <a:off x="338208" y="1705709"/>
+              <a:ext cx="714817" cy="381694"/>
+            </a:xfrm>
+            <a:prstGeom prst="rect">
+              <a:avLst/>
+            </a:prstGeom>
+            <a:noFill/>
+          </p:spPr>
+          <p:txBody>
+            <a:bodyPr wrap="none" rtlCol="0">
+              <a:spAutoFit/>
+            </a:bodyPr>
+            <a:lstStyle/>
+            <a:p>
+              <a:pPr defTabSz="914400"/>
+              <a:r>
+                <a:rPr lang="en-CA" sz="2400" dirty="0">
+                  <a:solidFill>
+                    <a:prstClr val="black"/>
+                  </a:solidFill>
+                </a:rPr>
+                <a:t>MSF</a:t>
+              </a:r>
+            </a:p>
+          </p:txBody>
+        </p:sp>
+        <p:sp>
+          <p:nvSpPr>
+            <p:cNvPr id="11" name="TextBox 10">
+              <a:extLst>
+                <a:ext uri="{FF2B5EF4-FFF2-40B4-BE49-F238E27FC236}">
+                  <a16:creationId xmlns:a16="http://schemas.microsoft.com/office/drawing/2014/main" id="{6A2FA652-8B0C-4BB7-B094-21BA3C138E66}"/>
+                </a:ext>
+              </a:extLst>
+            </p:cNvPr>
+            <p:cNvSpPr txBox="1"/>
+            <p:nvPr/>
+          </p:nvSpPr>
+          <p:spPr>
+            <a:xfrm>
+              <a:off x="2794189" y="1722442"/>
+              <a:ext cx="957429" cy="381694"/>
+            </a:xfrm>
+            <a:prstGeom prst="rect">
+              <a:avLst/>
+            </a:prstGeom>
+            <a:noFill/>
+          </p:spPr>
+          <p:txBody>
+            <a:bodyPr wrap="none" rtlCol="0">
+              <a:spAutoFit/>
+            </a:bodyPr>
+            <a:lstStyle/>
+            <a:p>
+              <a:pPr defTabSz="914400"/>
+              <a:r>
+                <a:rPr lang="en-CA" sz="2400" dirty="0">
+                  <a:solidFill>
+                    <a:prstClr val="black"/>
+                  </a:solidFill>
+                </a:rPr>
+                <a:t>Scrum</a:t>
+              </a:r>
+            </a:p>
+          </p:txBody>
+        </p:sp>
+        <p:sp>
+          <p:nvSpPr>
+            <p:cNvPr id="12" name="TextBox 11">
+              <a:extLst>
+                <a:ext uri="{FF2B5EF4-FFF2-40B4-BE49-F238E27FC236}">
+                  <a16:creationId xmlns:a16="http://schemas.microsoft.com/office/drawing/2014/main" id="{6004B616-4B45-4C21-8C8E-1C6571A335B9}"/>
+                </a:ext>
+              </a:extLst>
+            </p:cNvPr>
+            <p:cNvSpPr txBox="1"/>
+            <p:nvPr/>
+          </p:nvSpPr>
+          <p:spPr>
+            <a:xfrm>
+              <a:off x="4372568" y="1711279"/>
+              <a:ext cx="2596538" cy="381694"/>
+            </a:xfrm>
+            <a:prstGeom prst="rect">
+              <a:avLst/>
+            </a:prstGeom>
+            <a:noFill/>
+          </p:spPr>
+          <p:txBody>
+            <a:bodyPr wrap="none" rtlCol="0">
+              <a:spAutoFit/>
+            </a:bodyPr>
+            <a:lstStyle/>
+            <a:p>
+              <a:pPr defTabSz="914400"/>
+              <a:r>
+                <a:rPr lang="en-CA" sz="2400" dirty="0">
+                  <a:solidFill>
+                    <a:prstClr val="black"/>
+                  </a:solidFill>
+                </a:rPr>
+                <a:t>Ruck (loose-Scrum)</a:t>
+              </a:r>
+            </a:p>
+          </p:txBody>
+        </p:sp>
+        <p:sp>
+          <p:nvSpPr>
+            <p:cNvPr id="13" name="TextBox 12">
+              <a:extLst>
+                <a:ext uri="{FF2B5EF4-FFF2-40B4-BE49-F238E27FC236}">
+                  <a16:creationId xmlns:a16="http://schemas.microsoft.com/office/drawing/2014/main" id="{A983B20D-9DE2-42AE-A277-01161A8FB8FF}"/>
+                </a:ext>
+              </a:extLst>
+            </p:cNvPr>
+            <p:cNvSpPr txBox="1"/>
+            <p:nvPr/>
+          </p:nvSpPr>
+          <p:spPr>
+            <a:xfrm>
+              <a:off x="8827976" y="2263768"/>
+              <a:ext cx="744404" cy="381694"/>
+            </a:xfrm>
+            <a:prstGeom prst="rect">
+              <a:avLst/>
+            </a:prstGeom>
+            <a:noFill/>
+          </p:spPr>
+          <p:txBody>
+            <a:bodyPr wrap="none" rtlCol="0">
+              <a:spAutoFit/>
+            </a:bodyPr>
+            <a:lstStyle/>
+            <a:p>
+              <a:pPr defTabSz="914400"/>
+              <a:r>
+                <a:rPr lang="en-CA" sz="2400" dirty="0">
+                  <a:solidFill>
+                    <a:prstClr val="white"/>
+                  </a:solidFill>
+                  <a:latin typeface="Calibri" panose="020F0502020204030204"/>
+                </a:rPr>
+                <a:t>2016</a:t>
+              </a:r>
+            </a:p>
+          </p:txBody>
+        </p:sp>
+        <p:sp>
+          <p:nvSpPr>
+            <p:cNvPr id="14" name="TextBox 13">
+              <a:extLst>
+                <a:ext uri="{FF2B5EF4-FFF2-40B4-BE49-F238E27FC236}">
+                  <a16:creationId xmlns:a16="http://schemas.microsoft.com/office/drawing/2014/main" id="{8D0F91DA-3149-4C25-8827-CD89C593DA76}"/>
+                </a:ext>
+              </a:extLst>
+            </p:cNvPr>
+            <p:cNvSpPr txBox="1"/>
+            <p:nvPr/>
+          </p:nvSpPr>
+          <p:spPr>
+            <a:xfrm>
+              <a:off x="8553351" y="1401610"/>
+              <a:ext cx="2038057" cy="687049"/>
+            </a:xfrm>
+            <a:prstGeom prst="rect">
+              <a:avLst/>
+            </a:prstGeom>
+            <a:noFill/>
+          </p:spPr>
+          <p:txBody>
+            <a:bodyPr wrap="none" rtlCol="0">
+              <a:spAutoFit/>
+            </a:bodyPr>
+            <a:lstStyle/>
+            <a:p>
+              <a:pPr defTabSz="914400"/>
+              <a:r>
+                <a:rPr lang="en-CA" sz="2400" dirty="0">
+                  <a:solidFill>
+                    <a:prstClr val="black"/>
+                  </a:solidFill>
+                </a:rPr>
+                <a:t>Kanban + </a:t>
+              </a:r>
+            </a:p>
+            <a:p>
+              <a:pPr defTabSz="914400"/>
+              <a:r>
+                <a:rPr lang="en-CA" sz="2400" dirty="0">
+                  <a:solidFill>
+                    <a:prstClr val="black"/>
+                  </a:solidFill>
+                </a:rPr>
+                <a:t>Self-Organized</a:t>
+              </a:r>
+            </a:p>
+          </p:txBody>
+        </p:sp>
+        <p:pic>
+          <p:nvPicPr>
+            <p:cNvPr id="15" name="Picture 14">
+              <a:extLst>
+                <a:ext uri="{FF2B5EF4-FFF2-40B4-BE49-F238E27FC236}">
+                  <a16:creationId xmlns:a16="http://schemas.microsoft.com/office/drawing/2014/main" id="{E9F7EA79-8CD5-4109-88F8-0845E370D05F}"/>
+                </a:ext>
+              </a:extLst>
+            </p:cNvPr>
+            <p:cNvPicPr>
+              <a:picLocks noChangeAspect="1"/>
+            </p:cNvPicPr>
+            <p:nvPr/>
+          </p:nvPicPr>
+          <p:blipFill>
+            <a:blip r:embed="rId4">
+              <a:extLst>
+                <a:ext uri="{28A0092B-C50C-407E-A947-70E740481C1C}">
+                  <a14:useLocalDpi xmlns:a14="http://schemas.microsoft.com/office/drawing/2010/main" val="0"/>
+                </a:ext>
+              </a:extLst>
+            </a:blip>
+            <a:stretch>
+              <a:fillRect/>
+            </a:stretch>
+          </p:blipFill>
+          <p:spPr>
+            <a:xfrm>
+              <a:off x="1718536" y="1265621"/>
+              <a:ext cx="726597" cy="900000"/>
+            </a:xfrm>
+            <a:prstGeom prst="rect">
+              <a:avLst/>
+            </a:prstGeom>
+          </p:spPr>
+        </p:pic>
+        <p:cxnSp>
+          <p:nvCxnSpPr>
+            <p:cNvPr id="16" name="Straight Arrow Connector 15">
+              <a:extLst>
+                <a:ext uri="{FF2B5EF4-FFF2-40B4-BE49-F238E27FC236}">
+                  <a16:creationId xmlns:a16="http://schemas.microsoft.com/office/drawing/2014/main" id="{9DD179D8-6FCD-4055-9355-EED406714827}"/>
+                </a:ext>
+              </a:extLst>
+            </p:cNvPr>
+            <p:cNvCxnSpPr/>
+            <p:nvPr/>
+          </p:nvCxnSpPr>
+          <p:spPr>
+            <a:xfrm flipV="1">
+              <a:off x="555103" y="3173905"/>
+              <a:ext cx="0" cy="1279132"/>
+            </a:xfrm>
+            <a:prstGeom prst="straightConnector1">
+              <a:avLst/>
+            </a:prstGeom>
+            <a:noFill/>
+            <a:ln w="38100" cap="flat" cmpd="sng" algn="ctr">
+              <a:solidFill>
+                <a:srgbClr val="0070C0"/>
+              </a:solidFill>
+              <a:prstDash val="solid"/>
+              <a:miter lim="800000"/>
+              <a:headEnd type="triangle" w="lg" len="sm"/>
+              <a:tailEnd type="triangle" w="lg" len="sm"/>
+            </a:ln>
+            <a:effectLst/>
+          </p:spPr>
+        </p:cxnSp>
+        <p:sp>
+          <p:nvSpPr>
+            <p:cNvPr id="17" name="TextBox 16">
+              <a:extLst>
+                <a:ext uri="{FF2B5EF4-FFF2-40B4-BE49-F238E27FC236}">
+                  <a16:creationId xmlns:a16="http://schemas.microsoft.com/office/drawing/2014/main" id="{0055DC42-65E6-4DDB-B759-216A6C08EE03}"/>
+                </a:ext>
+              </a:extLst>
+            </p:cNvPr>
+            <p:cNvSpPr txBox="1"/>
+            <p:nvPr/>
+          </p:nvSpPr>
+          <p:spPr>
+            <a:xfrm>
+              <a:off x="258904" y="2890307"/>
+              <a:ext cx="590554" cy="279909"/>
+            </a:xfrm>
+            <a:prstGeom prst="rect">
+              <a:avLst/>
+            </a:prstGeom>
+            <a:noFill/>
+          </p:spPr>
+          <p:txBody>
+            <a:bodyPr wrap="none" rtlCol="0">
+              <a:spAutoFit/>
+            </a:bodyPr>
+            <a:lstStyle/>
+            <a:p>
+              <a:pPr algn="ctr" defTabSz="914400"/>
+              <a:r>
+                <a:rPr lang="en-CA" sz="1600" dirty="0">
+                  <a:solidFill>
+                    <a:srgbClr val="0070C0"/>
+                  </a:solidFill>
+                  <a:latin typeface="Calibri" panose="020F0502020204030204"/>
+                </a:rPr>
+                <a:t>Rigid </a:t>
+              </a:r>
+            </a:p>
+          </p:txBody>
+        </p:sp>
+        <p:sp>
+          <p:nvSpPr>
+            <p:cNvPr id="18" name="TextBox 17">
+              <a:extLst>
+                <a:ext uri="{FF2B5EF4-FFF2-40B4-BE49-F238E27FC236}">
+                  <a16:creationId xmlns:a16="http://schemas.microsoft.com/office/drawing/2014/main" id="{DF2F7A6D-0AAA-4E8A-97C6-393E596B9A33}"/>
+                </a:ext>
+              </a:extLst>
+            </p:cNvPr>
+            <p:cNvSpPr txBox="1"/>
+            <p:nvPr/>
+          </p:nvSpPr>
+          <p:spPr>
+            <a:xfrm>
+              <a:off x="262929" y="4453037"/>
+              <a:ext cx="592032" cy="279909"/>
+            </a:xfrm>
+            <a:prstGeom prst="rect">
+              <a:avLst/>
+            </a:prstGeom>
+            <a:noFill/>
+          </p:spPr>
+          <p:txBody>
+            <a:bodyPr wrap="none" rtlCol="0">
+              <a:spAutoFit/>
+            </a:bodyPr>
+            <a:lstStyle/>
+            <a:p>
+              <a:pPr algn="ctr" defTabSz="914400"/>
+              <a:r>
+                <a:rPr lang="en-CA" sz="1600" dirty="0">
+                  <a:solidFill>
+                    <a:srgbClr val="0070C0"/>
+                  </a:solidFill>
+                  <a:latin typeface="Calibri" panose="020F0502020204030204"/>
+                </a:rPr>
+                <a:t>Agile </a:t>
+              </a:r>
+            </a:p>
+          </p:txBody>
+        </p:sp>
+        <p:sp>
+          <p:nvSpPr>
+            <p:cNvPr id="19" name="TextBox 18">
+              <a:extLst>
+                <a:ext uri="{FF2B5EF4-FFF2-40B4-BE49-F238E27FC236}">
+                  <a16:creationId xmlns:a16="http://schemas.microsoft.com/office/drawing/2014/main" id="{A034AE2D-8C6D-42D6-B844-3D01FE7E3BE1}"/>
+                </a:ext>
+              </a:extLst>
+            </p:cNvPr>
+            <p:cNvSpPr txBox="1"/>
+            <p:nvPr/>
+          </p:nvSpPr>
+          <p:spPr>
+            <a:xfrm rot="16200000">
+              <a:off x="-110981" y="3569062"/>
+              <a:ext cx="947182" cy="369332"/>
+            </a:xfrm>
+            <a:prstGeom prst="rect">
+              <a:avLst/>
+            </a:prstGeom>
+            <a:noFill/>
+          </p:spPr>
+          <p:txBody>
+            <a:bodyPr wrap="none" rtlCol="0">
+              <a:spAutoFit/>
+            </a:bodyPr>
+            <a:lstStyle/>
+            <a:p>
+              <a:pPr defTabSz="914400"/>
+              <a:r>
+                <a:rPr lang="en-CA" dirty="0">
+                  <a:solidFill>
+                    <a:srgbClr val="0070C0"/>
+                  </a:solidFill>
+                  <a:latin typeface="Calibri" panose="020F0502020204030204"/>
+                </a:rPr>
+                <a:t>Process </a:t>
+              </a:r>
+            </a:p>
+          </p:txBody>
+        </p:sp>
+        <p:cxnSp>
+          <p:nvCxnSpPr>
+            <p:cNvPr id="20" name="Straight Arrow Connector 19">
+              <a:extLst>
+                <a:ext uri="{FF2B5EF4-FFF2-40B4-BE49-F238E27FC236}">
+                  <a16:creationId xmlns:a16="http://schemas.microsoft.com/office/drawing/2014/main" id="{462907BE-E03C-4156-9D7E-1F69F0D22D82}"/>
+                </a:ext>
+              </a:extLst>
+            </p:cNvPr>
+            <p:cNvCxnSpPr/>
+            <p:nvPr/>
+          </p:nvCxnSpPr>
+          <p:spPr>
+            <a:xfrm flipV="1">
+              <a:off x="10894491" y="3173905"/>
+              <a:ext cx="0" cy="1279132"/>
+            </a:xfrm>
+            <a:prstGeom prst="straightConnector1">
+              <a:avLst/>
+            </a:prstGeom>
+            <a:noFill/>
+            <a:ln w="38100" cap="flat" cmpd="sng" algn="ctr">
+              <a:solidFill>
+                <a:srgbClr val="0070C0"/>
+              </a:solidFill>
+              <a:prstDash val="solid"/>
+              <a:miter lim="800000"/>
+              <a:headEnd type="triangle" w="lg" len="sm"/>
+              <a:tailEnd type="triangle" w="lg" len="sm"/>
+            </a:ln>
+            <a:effectLst/>
+          </p:spPr>
+        </p:cxnSp>
+        <p:sp>
+          <p:nvSpPr>
+            <p:cNvPr id="21" name="TextBox 20">
+              <a:extLst>
+                <a:ext uri="{FF2B5EF4-FFF2-40B4-BE49-F238E27FC236}">
+                  <a16:creationId xmlns:a16="http://schemas.microsoft.com/office/drawing/2014/main" id="{62F4069A-6205-4151-B670-B8DFB7F3CFDE}"/>
+                </a:ext>
+              </a:extLst>
+            </p:cNvPr>
+            <p:cNvSpPr txBox="1"/>
+            <p:nvPr/>
+          </p:nvSpPr>
+          <p:spPr>
+            <a:xfrm>
+              <a:off x="10609765" y="2890307"/>
+              <a:ext cx="590553" cy="279909"/>
+            </a:xfrm>
+            <a:prstGeom prst="rect">
+              <a:avLst/>
+            </a:prstGeom>
+            <a:noFill/>
+          </p:spPr>
+          <p:txBody>
+            <a:bodyPr wrap="none" rtlCol="0">
+              <a:spAutoFit/>
+            </a:bodyPr>
+            <a:lstStyle/>
+            <a:p>
+              <a:pPr defTabSz="914400"/>
+              <a:r>
+                <a:rPr lang="en-CA" sz="1600" dirty="0">
+                  <a:solidFill>
+                    <a:srgbClr val="0070C0"/>
+                  </a:solidFill>
+                  <a:latin typeface="Calibri" panose="020F0502020204030204"/>
+                </a:rPr>
+                <a:t>Rigid </a:t>
+              </a:r>
+            </a:p>
+          </p:txBody>
+        </p:sp>
+        <p:sp>
+          <p:nvSpPr>
+            <p:cNvPr id="22" name="TextBox 21">
+              <a:extLst>
+                <a:ext uri="{FF2B5EF4-FFF2-40B4-BE49-F238E27FC236}">
+                  <a16:creationId xmlns:a16="http://schemas.microsoft.com/office/drawing/2014/main" id="{B0505091-AC8E-4A0D-A372-E46F1CEE4C87}"/>
+                </a:ext>
+              </a:extLst>
+            </p:cNvPr>
+            <p:cNvSpPr txBox="1"/>
+            <p:nvPr/>
+          </p:nvSpPr>
+          <p:spPr>
+            <a:xfrm>
+              <a:off x="10544211" y="4453037"/>
+              <a:ext cx="592032" cy="279909"/>
+            </a:xfrm>
+            <a:prstGeom prst="rect">
+              <a:avLst/>
+            </a:prstGeom>
+            <a:noFill/>
+          </p:spPr>
+          <p:txBody>
+            <a:bodyPr wrap="none" rtlCol="0">
+              <a:spAutoFit/>
+            </a:bodyPr>
+            <a:lstStyle/>
+            <a:p>
+              <a:pPr defTabSz="914400"/>
+              <a:r>
+                <a:rPr lang="en-CA" sz="1600" dirty="0">
+                  <a:solidFill>
+                    <a:srgbClr val="0070C0"/>
+                  </a:solidFill>
+                  <a:latin typeface="Calibri" panose="020F0502020204030204"/>
+                </a:rPr>
+                <a:t>Agile </a:t>
+              </a:r>
+            </a:p>
+          </p:txBody>
+        </p:sp>
+        <p:sp>
+          <p:nvSpPr>
+            <p:cNvPr id="23" name="TextBox 22">
+              <a:extLst>
+                <a:ext uri="{FF2B5EF4-FFF2-40B4-BE49-F238E27FC236}">
+                  <a16:creationId xmlns:a16="http://schemas.microsoft.com/office/drawing/2014/main" id="{008E929F-A682-42BC-8CFD-E58D2E9B232B}"/>
+                </a:ext>
+              </a:extLst>
+            </p:cNvPr>
+            <p:cNvSpPr txBox="1"/>
+            <p:nvPr/>
+          </p:nvSpPr>
+          <p:spPr>
+            <a:xfrm rot="16200000">
+              <a:off x="10578977" y="3570586"/>
+              <a:ext cx="947182" cy="369332"/>
+            </a:xfrm>
+            <a:prstGeom prst="rect">
+              <a:avLst/>
+            </a:prstGeom>
+            <a:noFill/>
+          </p:spPr>
+          <p:txBody>
+            <a:bodyPr wrap="none" rtlCol="0">
+              <a:spAutoFit/>
+            </a:bodyPr>
+            <a:lstStyle/>
+            <a:p>
+              <a:pPr defTabSz="914400"/>
+              <a:r>
+                <a:rPr lang="en-CA" dirty="0">
+                  <a:solidFill>
+                    <a:srgbClr val="0070C0"/>
+                  </a:solidFill>
+                  <a:latin typeface="Calibri" panose="020F0502020204030204"/>
+                </a:rPr>
+                <a:t>Process </a:t>
+              </a:r>
+            </a:p>
+          </p:txBody>
+        </p:sp>
+        <p:cxnSp>
+          <p:nvCxnSpPr>
+            <p:cNvPr id="24" name="Straight Connector 23">
+              <a:extLst>
+                <a:ext uri="{FF2B5EF4-FFF2-40B4-BE49-F238E27FC236}">
+                  <a16:creationId xmlns:a16="http://schemas.microsoft.com/office/drawing/2014/main" id="{5FC39484-32F1-4CDE-BD7B-35E355F3DA76}"/>
+                </a:ext>
+              </a:extLst>
+            </p:cNvPr>
+            <p:cNvCxnSpPr/>
+            <p:nvPr/>
+          </p:nvCxnSpPr>
+          <p:spPr>
+            <a:xfrm>
+              <a:off x="638175" y="3304065"/>
+              <a:ext cx="10150037" cy="980598"/>
+            </a:xfrm>
+            <a:prstGeom prst="line">
+              <a:avLst/>
+            </a:prstGeom>
+            <a:noFill/>
+            <a:ln w="19050" cap="flat" cmpd="sng" algn="ctr">
+              <a:solidFill>
+                <a:srgbClr val="ED7D31"/>
+              </a:solidFill>
+              <a:prstDash val="sysDot"/>
+              <a:miter lim="800000"/>
+            </a:ln>
+            <a:effectLst/>
+          </p:spPr>
+        </p:cxnSp>
+      </p:grpSp>
+      <p:sp>
+        <p:nvSpPr>
+          <p:cNvPr id="25" name="TextBox 24">
+            <a:extLst>
+              <a:ext uri="{FF2B5EF4-FFF2-40B4-BE49-F238E27FC236}">
+                <a16:creationId xmlns:a16="http://schemas.microsoft.com/office/drawing/2014/main" id="{E25435B5-7FFF-4E8A-A53A-2B48579A9C95}"/>
+              </a:ext>
+            </a:extLst>
+          </p:cNvPr>
+          <p:cNvSpPr txBox="1"/>
+          <p:nvPr/>
+        </p:nvSpPr>
+        <p:spPr>
+          <a:xfrm>
+            <a:off x="2320859" y="3548191"/>
+            <a:ext cx="2261388" cy="2265236"/>
+          </a:xfrm>
+          <a:prstGeom prst="rect">
+            <a:avLst/>
+          </a:prstGeom>
+          <a:noFill/>
+        </p:spPr>
+        <p:txBody>
+          <a:bodyPr wrap="none" lIns="182880" tIns="146304" rIns="182880" bIns="146304" rtlCol="0">
+            <a:spAutoFit/>
+          </a:bodyPr>
+          <a:lstStyle/>
+          <a:p>
+            <a:pPr algn="ctr">
+              <a:lnSpc>
+                <a:spcPct val="90000"/>
+              </a:lnSpc>
+              <a:spcAft>
+                <a:spcPts val="600"/>
+              </a:spcAft>
+            </a:pPr>
+            <a:r>
+              <a:rPr lang="en-CA" sz="2400" dirty="0">
+                <a:solidFill>
+                  <a:srgbClr val="0070C0"/>
+                </a:solidFill>
+              </a:rPr>
+              <a:t>2 PMs </a:t>
+            </a:r>
+          </a:p>
+          <a:p>
+            <a:pPr algn="ctr">
+              <a:lnSpc>
+                <a:spcPct val="90000"/>
+              </a:lnSpc>
+              <a:spcAft>
+                <a:spcPts val="600"/>
+              </a:spcAft>
+            </a:pPr>
+            <a:endParaRPr lang="en-CA" sz="2400" dirty="0">
+              <a:solidFill>
+                <a:srgbClr val="0070C0"/>
+              </a:solidFill>
+            </a:endParaRPr>
+          </a:p>
+          <a:p>
+            <a:pPr algn="ctr">
+              <a:lnSpc>
+                <a:spcPct val="90000"/>
+              </a:lnSpc>
+              <a:spcAft>
+                <a:spcPts val="600"/>
+              </a:spcAft>
+            </a:pPr>
+            <a:r>
+              <a:rPr lang="en-CA" sz="2400" dirty="0">
+                <a:solidFill>
+                  <a:srgbClr val="0070C0"/>
+                </a:solidFill>
+              </a:rPr>
+              <a:t>200+ Rangers</a:t>
+            </a:r>
+          </a:p>
+          <a:p>
+            <a:pPr algn="ctr">
+              <a:lnSpc>
+                <a:spcPct val="90000"/>
+              </a:lnSpc>
+              <a:spcAft>
+                <a:spcPts val="600"/>
+              </a:spcAft>
+            </a:pPr>
+            <a:endParaRPr lang="en-CA" sz="2400" dirty="0">
+              <a:solidFill>
+                <a:srgbClr val="0070C0"/>
+              </a:solidFill>
+            </a:endParaRPr>
+          </a:p>
+          <a:p>
+            <a:pPr algn="ctr">
+              <a:lnSpc>
+                <a:spcPct val="90000"/>
+              </a:lnSpc>
+              <a:spcAft>
+                <a:spcPts val="600"/>
+              </a:spcAft>
+            </a:pPr>
+            <a:r>
+              <a:rPr lang="en-CA" sz="2400" dirty="0">
+                <a:solidFill>
+                  <a:srgbClr val="0070C0"/>
+                </a:solidFill>
+              </a:rPr>
+              <a:t>5 Projects</a:t>
+            </a:r>
+          </a:p>
+        </p:txBody>
+      </p:sp>
+      <p:sp>
+        <p:nvSpPr>
+          <p:cNvPr id="26" name="TextBox 25">
+            <a:extLst>
+              <a:ext uri="{FF2B5EF4-FFF2-40B4-BE49-F238E27FC236}">
+                <a16:creationId xmlns:a16="http://schemas.microsoft.com/office/drawing/2014/main" id="{FCF8139C-71FF-424D-9B41-D9470C270483}"/>
+              </a:ext>
+            </a:extLst>
+          </p:cNvPr>
+          <p:cNvSpPr txBox="1"/>
+          <p:nvPr/>
+        </p:nvSpPr>
+        <p:spPr>
+          <a:xfrm>
+            <a:off x="8508852" y="3548191"/>
+            <a:ext cx="2987742" cy="2265236"/>
+          </a:xfrm>
+          <a:prstGeom prst="rect">
+            <a:avLst/>
+          </a:prstGeom>
+          <a:noFill/>
+        </p:spPr>
+        <p:txBody>
+          <a:bodyPr wrap="none" lIns="182880" tIns="146304" rIns="182880" bIns="146304" rtlCol="0">
+            <a:spAutoFit/>
+          </a:bodyPr>
+          <a:lstStyle/>
+          <a:p>
+            <a:pPr algn="ctr">
+              <a:lnSpc>
+                <a:spcPct val="90000"/>
+              </a:lnSpc>
+              <a:spcAft>
+                <a:spcPts val="600"/>
+              </a:spcAft>
+            </a:pPr>
+            <a:r>
+              <a:rPr lang="en-CA" sz="2400" dirty="0">
+                <a:solidFill>
+                  <a:srgbClr val="0070C0"/>
+                </a:solidFill>
+              </a:rPr>
+              <a:t>0.5 PM </a:t>
+            </a:r>
+          </a:p>
+          <a:p>
+            <a:pPr algn="ctr">
+              <a:lnSpc>
+                <a:spcPct val="90000"/>
+              </a:lnSpc>
+              <a:spcAft>
+                <a:spcPts val="600"/>
+              </a:spcAft>
+            </a:pPr>
+            <a:endParaRPr lang="en-CA" sz="2400" dirty="0">
+              <a:solidFill>
+                <a:srgbClr val="0070C0"/>
+              </a:solidFill>
+            </a:endParaRPr>
+          </a:p>
+          <a:p>
+            <a:pPr algn="ctr">
+              <a:lnSpc>
+                <a:spcPct val="90000"/>
+              </a:lnSpc>
+              <a:spcAft>
+                <a:spcPts val="600"/>
+              </a:spcAft>
+            </a:pPr>
+            <a:r>
+              <a:rPr lang="en-CA" sz="2400" dirty="0">
+                <a:solidFill>
+                  <a:srgbClr val="0070C0"/>
+                </a:solidFill>
+              </a:rPr>
+              <a:t>100 </a:t>
+            </a:r>
+            <a:r>
+              <a:rPr lang="en-CA" sz="2400" b="1" dirty="0">
+                <a:solidFill>
+                  <a:srgbClr val="0070C0"/>
+                </a:solidFill>
+              </a:rPr>
+              <a:t>active</a:t>
+            </a:r>
+            <a:r>
+              <a:rPr lang="en-CA" sz="2400" dirty="0">
+                <a:solidFill>
+                  <a:srgbClr val="0070C0"/>
+                </a:solidFill>
+              </a:rPr>
+              <a:t> Rangers</a:t>
+            </a:r>
+          </a:p>
+          <a:p>
+            <a:pPr algn="ctr">
+              <a:lnSpc>
+                <a:spcPct val="90000"/>
+              </a:lnSpc>
+              <a:spcAft>
+                <a:spcPts val="600"/>
+              </a:spcAft>
+            </a:pPr>
+            <a:endParaRPr lang="en-CA" sz="2400" dirty="0">
+              <a:solidFill>
+                <a:srgbClr val="0070C0"/>
+              </a:solidFill>
+            </a:endParaRPr>
+          </a:p>
+          <a:p>
+            <a:pPr algn="ctr">
+              <a:lnSpc>
+                <a:spcPct val="90000"/>
+              </a:lnSpc>
+              <a:spcAft>
+                <a:spcPts val="600"/>
+              </a:spcAft>
+            </a:pPr>
+            <a:r>
+              <a:rPr lang="en-CA" sz="2400" dirty="0">
+                <a:solidFill>
+                  <a:srgbClr val="0070C0"/>
+                </a:solidFill>
+              </a:rPr>
+              <a:t>10 Projects</a:t>
+            </a:r>
+          </a:p>
+        </p:txBody>
+      </p:sp>
+      <p:sp>
+        <p:nvSpPr>
+          <p:cNvPr id="27" name="TextBox 26">
+            <a:extLst>
+              <a:ext uri="{FF2B5EF4-FFF2-40B4-BE49-F238E27FC236}">
+                <a16:creationId xmlns:a16="http://schemas.microsoft.com/office/drawing/2014/main" id="{F1363CDE-4F25-4A8C-B007-A2FB1CEB9F79}"/>
+              </a:ext>
+            </a:extLst>
+          </p:cNvPr>
+          <p:cNvSpPr txBox="1"/>
+          <p:nvPr/>
+        </p:nvSpPr>
+        <p:spPr>
+          <a:xfrm>
+            <a:off x="1460959" y="1146517"/>
+            <a:ext cx="1638077" cy="338554"/>
+          </a:xfrm>
+          <a:prstGeom prst="rect">
+            <a:avLst/>
+          </a:prstGeom>
+          <a:noFill/>
+        </p:spPr>
+        <p:txBody>
+          <a:bodyPr wrap="none" rtlCol="0">
+            <a:spAutoFit/>
+          </a:bodyPr>
+          <a:lstStyle/>
+          <a:p>
+            <a:pPr algn="ctr" defTabSz="914400"/>
+            <a:r>
+              <a:rPr lang="en-CA" sz="1600" dirty="0">
+                <a:solidFill>
+                  <a:srgbClr val="0070C0"/>
+                </a:solidFill>
+                <a:latin typeface="Calibri" panose="020F0502020204030204"/>
+              </a:rPr>
+              <a:t>aka.ms/wsbook3 </a:t>
+            </a:r>
+          </a:p>
+        </p:txBody>
+      </p:sp>
+      <p:sp>
+        <p:nvSpPr>
+          <p:cNvPr id="28" name="TextBox 27">
+            <a:extLst>
+              <a:ext uri="{FF2B5EF4-FFF2-40B4-BE49-F238E27FC236}">
+                <a16:creationId xmlns:a16="http://schemas.microsoft.com/office/drawing/2014/main" id="{A322DE73-F5CB-43C7-BC32-3F221BC3F8AA}"/>
+              </a:ext>
+            </a:extLst>
+          </p:cNvPr>
+          <p:cNvSpPr txBox="1"/>
+          <p:nvPr/>
+        </p:nvSpPr>
+        <p:spPr>
+          <a:xfrm>
+            <a:off x="7585147" y="1167013"/>
+            <a:ext cx="1638077" cy="338554"/>
+          </a:xfrm>
+          <a:prstGeom prst="rect">
+            <a:avLst/>
+          </a:prstGeom>
+          <a:noFill/>
+        </p:spPr>
+        <p:txBody>
+          <a:bodyPr wrap="none" rtlCol="0">
+            <a:spAutoFit/>
+          </a:bodyPr>
+          <a:lstStyle/>
+          <a:p>
+            <a:pPr algn="ctr" defTabSz="914400"/>
+            <a:r>
+              <a:rPr lang="en-CA" sz="1600" dirty="0">
+                <a:solidFill>
+                  <a:srgbClr val="0070C0"/>
+                </a:solidFill>
+                <a:latin typeface="Calibri" panose="020F0502020204030204"/>
+              </a:rPr>
+              <a:t>aka.ms/wsbook4 </a:t>
+            </a:r>
+          </a:p>
+        </p:txBody>
+      </p:sp>
+      <p:sp>
+        <p:nvSpPr>
+          <p:cNvPr id="29" name="TextBox 28">
+            <a:extLst>
+              <a:ext uri="{FF2B5EF4-FFF2-40B4-BE49-F238E27FC236}">
+                <a16:creationId xmlns:a16="http://schemas.microsoft.com/office/drawing/2014/main" id="{18552696-1FEF-48D1-96B9-8E335DCE8976}"/>
+              </a:ext>
+            </a:extLst>
+          </p:cNvPr>
+          <p:cNvSpPr txBox="1"/>
+          <p:nvPr/>
+        </p:nvSpPr>
+        <p:spPr>
+          <a:xfrm>
+            <a:off x="5775835" y="4366877"/>
+            <a:ext cx="2007601" cy="627864"/>
+          </a:xfrm>
+          <a:prstGeom prst="rect">
+            <a:avLst/>
+          </a:prstGeom>
+          <a:solidFill>
+            <a:schemeClr val="tx1"/>
+          </a:solidFill>
+        </p:spPr>
+        <p:txBody>
+          <a:bodyPr wrap="none" lIns="182880" tIns="146304" rIns="182880" bIns="146304" rtlCol="0">
+            <a:spAutoFit/>
+          </a:bodyPr>
+          <a:lstStyle/>
+          <a:p>
+            <a:pPr algn="ctr">
+              <a:lnSpc>
+                <a:spcPct val="90000"/>
+              </a:lnSpc>
+              <a:spcAft>
+                <a:spcPts val="600"/>
+              </a:spcAft>
+            </a:pPr>
+            <a:r>
+              <a:rPr lang="en-CA" sz="2400" dirty="0">
+                <a:solidFill>
+                  <a:srgbClr val="0070C0"/>
+                </a:solidFill>
+              </a:rPr>
+              <a:t>1.75h/WEEK</a:t>
+            </a:r>
+          </a:p>
+        </p:txBody>
+      </p:sp>
+    </p:spTree>
+    <p:extLst>
+      <p:ext uri="{BB962C8B-B14F-4D97-AF65-F5344CB8AC3E}">
+        <p14:creationId xmlns:p14="http://schemas.microsoft.com/office/powerpoint/2010/main" val="529136016"/>
+      </p:ext>
+    </p:extLst>
+  </p:cSld>
+  <p:clrMapOvr>
+    <a:masterClrMapping/>
+  </p:clrMapOvr>
+  <p:timing>
+    <p:tnLst>
+      <p:par>
+        <p:cTn id="1" dur="indefinite" restart="never" nodeType="tmRoot">
+          <p:childTnLst>
+            <p:seq concurrent="1" nextAc="seek">
+              <p:cTn id="2" dur="indefinite" nodeType="mainSeq">
+                <p:childTnLst>
+                  <p:par>
+                    <p:cTn id="3" fill="hold">
+                      <p:stCondLst>
+                        <p:cond delay="indefinite"/>
+                      </p:stCondLst>
+                      <p:childTnLst>
+                        <p:par>
+                          <p:cTn id="4" fill="hold">
+                            <p:stCondLst>
+                              <p:cond delay="0"/>
+                            </p:stCondLst>
+                            <p:childTnLst>
+                              <p:par>
+                                <p:cTn id="5" presetID="10" presetClass="entr" presetSubtype="0" fill="hold" grpId="0" nodeType="clickEffect">
+                                  <p:stCondLst>
+                                    <p:cond delay="0"/>
+                                  </p:stCondLst>
+                                  <p:childTnLst>
+                                    <p:set>
+                                      <p:cBhvr>
+                                        <p:cTn id="6" dur="1" fill="hold">
+                                          <p:stCondLst>
+                                            <p:cond delay="0"/>
+                                          </p:stCondLst>
+                                        </p:cTn>
+                                        <p:tgtEl>
+                                          <p:spTgt spid="25"/>
+                                        </p:tgtEl>
+                                        <p:attrNameLst>
+                                          <p:attrName>style.visibility</p:attrName>
+                                        </p:attrNameLst>
+                                      </p:cBhvr>
+                                      <p:to>
+                                        <p:strVal val="visible"/>
+                                      </p:to>
+                                    </p:set>
+                                    <p:animEffect transition="in" filter="fade">
+                                      <p:cBhvr>
+                                        <p:cTn id="7" dur="500"/>
+                                        <p:tgtEl>
+                                          <p:spTgt spid="25"/>
+                                        </p:tgtEl>
+                                      </p:cBhvr>
+                                    </p:animEffect>
+                                  </p:childTnLst>
+                                </p:cTn>
+                              </p:par>
+                            </p:childTnLst>
+                          </p:cTn>
+                        </p:par>
+                      </p:childTnLst>
+                    </p:cTn>
+                  </p:par>
+                  <p:par>
+                    <p:cTn id="8" fill="hold">
+                      <p:stCondLst>
+                        <p:cond delay="indefinite"/>
+                      </p:stCondLst>
+                      <p:childTnLst>
+                        <p:par>
+                          <p:cTn id="9" fill="hold">
+                            <p:stCondLst>
+                              <p:cond delay="0"/>
+                            </p:stCondLst>
+                            <p:childTnLst>
+                              <p:par>
+                                <p:cTn id="10" presetID="10" presetClass="entr" presetSubtype="0" fill="hold" grpId="0" nodeType="clickEffect">
+                                  <p:stCondLst>
+                                    <p:cond delay="0"/>
+                                  </p:stCondLst>
+                                  <p:childTnLst>
+                                    <p:set>
+                                      <p:cBhvr>
+                                        <p:cTn id="11" dur="1" fill="hold">
+                                          <p:stCondLst>
+                                            <p:cond delay="0"/>
+                                          </p:stCondLst>
+                                        </p:cTn>
+                                        <p:tgtEl>
+                                          <p:spTgt spid="26"/>
+                                        </p:tgtEl>
+                                        <p:attrNameLst>
+                                          <p:attrName>style.visibility</p:attrName>
+                                        </p:attrNameLst>
+                                      </p:cBhvr>
+                                      <p:to>
+                                        <p:strVal val="visible"/>
+                                      </p:to>
+                                    </p:set>
+                                    <p:animEffect transition="in" filter="fade">
+                                      <p:cBhvr>
+                                        <p:cTn id="12" dur="500"/>
+                                        <p:tgtEl>
+                                          <p:spTgt spid="26"/>
+                                        </p:tgtEl>
+                                      </p:cBhvr>
+                                    </p:animEffect>
+                                  </p:childTnLst>
+                                </p:cTn>
+                              </p:par>
+                            </p:childTnLst>
+                          </p:cTn>
+                        </p:par>
+                      </p:childTnLst>
+                    </p:cTn>
+                  </p:par>
+                  <p:par>
+                    <p:cTn id="13" fill="hold">
+                      <p:stCondLst>
+                        <p:cond delay="indefinite"/>
+                      </p:stCondLst>
+                      <p:childTnLst>
+                        <p:par>
+                          <p:cTn id="14" fill="hold">
+                            <p:stCondLst>
+                              <p:cond delay="0"/>
+                            </p:stCondLst>
+                            <p:childTnLst>
+                              <p:par>
+                                <p:cTn id="15" presetID="10" presetClass="entr" presetSubtype="0" fill="hold" grpId="0" nodeType="clickEffect">
+                                  <p:stCondLst>
+                                    <p:cond delay="0"/>
+                                  </p:stCondLst>
+                                  <p:childTnLst>
+                                    <p:set>
+                                      <p:cBhvr>
+                                        <p:cTn id="16" dur="1" fill="hold">
+                                          <p:stCondLst>
+                                            <p:cond delay="0"/>
+                                          </p:stCondLst>
+                                        </p:cTn>
+                                        <p:tgtEl>
+                                          <p:spTgt spid="29"/>
+                                        </p:tgtEl>
+                                        <p:attrNameLst>
+                                          <p:attrName>style.visibility</p:attrName>
+                                        </p:attrNameLst>
+                                      </p:cBhvr>
+                                      <p:to>
+                                        <p:strVal val="visible"/>
+                                      </p:to>
+                                    </p:set>
+                                    <p:animEffect transition="in" filter="fade">
+                                      <p:cBhvr>
+                                        <p:cTn id="17" dur="500"/>
+                                        <p:tgtEl>
+                                          <p:spTgt spid="29"/>
+                                        </p:tgtEl>
+                                      </p:cBhvr>
+                                    </p:animEffect>
+                                  </p:childTnLst>
+                                </p:cTn>
+                              </p:par>
+                            </p:childTnLst>
+                          </p:cTn>
+                        </p:par>
+                      </p:childTnLst>
+                    </p:cTn>
+                  </p:par>
+                </p:childTnLst>
+              </p:cTn>
+              <p:prevCondLst>
+                <p:cond evt="onPrev" delay="0">
+                  <p:tgtEl>
+                    <p:sldTgt/>
+                  </p:tgtEl>
+                </p:cond>
+              </p:prevCondLst>
+              <p:nextCondLst>
+                <p:cond evt="onNext" delay="0">
+                  <p:tgtEl>
+                    <p:sldTgt/>
+                  </p:tgtEl>
+                </p:cond>
+              </p:nextCondLst>
+            </p:seq>
+          </p:childTnLst>
+        </p:cTn>
+      </p:par>
+    </p:tnLst>
+    <p:bldLst>
+      <p:bldP spid="25" grpId="0"/>
+      <p:bldP spid="26" grpId="0"/>
+      <p:bldP spid="29" grpId="0" animBg="1"/>
+    </p:bldLst>
+  </p:timing>
 </p:sld>
 </file>
 

</xml_diff>

<commit_message>
Update the feature flag article for a first review by the Rangers.
</commit_message>
<xml_diff>
--- a/src/Stories/Story illustrations.pptx
+++ b/src/Stories/Story illustrations.pptx
@@ -5,7 +5,7 @@
     <p:sldMasterId id="2147483648" r:id="rId1"/>
   </p:sldMasterIdLst>
   <p:notesMasterIdLst>
-    <p:notesMasterId r:id="rId9"/>
+    <p:notesMasterId r:id="rId10"/>
   </p:notesMasterIdLst>
   <p:sldIdLst>
     <p:sldId id="256" r:id="rId2"/>
@@ -15,6 +15,7 @@
     <p:sldId id="261" r:id="rId6"/>
     <p:sldId id="263" r:id="rId7"/>
     <p:sldId id="262" r:id="rId8"/>
+    <p:sldId id="264" r:id="rId9"/>
   </p:sldIdLst>
   <p:sldSz cx="12192000" cy="6858000"/>
   <p:notesSz cx="6858000" cy="9144000"/>
@@ -261,7 +262,7 @@
           <a:p>
             <a:fld id="{BC8E98BD-6AE1-4307-B1DC-BAE68787EC38}" type="datetimeFigureOut">
               <a:rPr lang="en-CA" smtClean="0"/>
-              <a:t>2017-12-03</a:t>
+              <a:t>2017-12-15</a:t>
             </a:fld>
             <a:endParaRPr lang="en-CA"/>
           </a:p>
@@ -1133,6 +1134,90 @@
 </p:notes>
 </file>
 
+<file path=ppt/notesSlides/notesSlide8.xml><?xml version="1.0" encoding="utf-8"?>
+<p:notes xmlns:a="http://schemas.openxmlformats.org/drawingml/2006/main" xmlns:r="http://schemas.openxmlformats.org/officeDocument/2006/relationships" xmlns:p="http://schemas.openxmlformats.org/presentationml/2006/main">
+  <p:cSld>
+    <p:spTree>
+      <p:nvGrpSpPr>
+        <p:cNvPr id="1" name=""/>
+        <p:cNvGrpSpPr/>
+        <p:nvPr/>
+      </p:nvGrpSpPr>
+      <p:grpSpPr>
+        <a:xfrm>
+          <a:off x="0" y="0"/>
+          <a:ext cx="0" cy="0"/>
+          <a:chOff x="0" y="0"/>
+          <a:chExt cx="0" cy="0"/>
+        </a:xfrm>
+      </p:grpSpPr>
+      <p:sp>
+        <p:nvSpPr>
+          <p:cNvPr id="2" name="Slide Image Placeholder 1"/>
+          <p:cNvSpPr>
+            <a:spLocks noGrp="1" noRot="1" noChangeAspect="1"/>
+          </p:cNvSpPr>
+          <p:nvPr>
+            <p:ph type="sldImg"/>
+          </p:nvPr>
+        </p:nvSpPr>
+        <p:spPr/>
+      </p:sp>
+      <p:sp>
+        <p:nvSpPr>
+          <p:cNvPr id="3" name="Notes Placeholder 2"/>
+          <p:cNvSpPr>
+            <a:spLocks noGrp="1"/>
+          </p:cNvSpPr>
+          <p:nvPr>
+            <p:ph type="body" idx="1"/>
+          </p:nvPr>
+        </p:nvSpPr>
+        <p:spPr/>
+        <p:txBody>
+          <a:bodyPr/>
+          <a:lstStyle/>
+          <a:p>
+            <a:endParaRPr lang="en-CA"/>
+          </a:p>
+        </p:txBody>
+      </p:sp>
+      <p:sp>
+        <p:nvSpPr>
+          <p:cNvPr id="4" name="Slide Number Placeholder 3"/>
+          <p:cNvSpPr>
+            <a:spLocks noGrp="1"/>
+          </p:cNvSpPr>
+          <p:nvPr>
+            <p:ph type="sldNum" sz="quarter" idx="10"/>
+          </p:nvPr>
+        </p:nvSpPr>
+        <p:spPr/>
+        <p:txBody>
+          <a:bodyPr/>
+          <a:lstStyle/>
+          <a:p>
+            <a:fld id="{F6A75A2C-6036-4CC3-919B-29E2F0BD9283}" type="slidenum">
+              <a:rPr lang="en-CA" smtClean="0"/>
+              <a:t>8</a:t>
+            </a:fld>
+            <a:endParaRPr lang="en-CA"/>
+          </a:p>
+        </p:txBody>
+      </p:sp>
+    </p:spTree>
+    <p:extLst>
+      <p:ext uri="{BB962C8B-B14F-4D97-AF65-F5344CB8AC3E}">
+        <p14:creationId xmlns:p14="http://schemas.microsoft.com/office/powerpoint/2010/main" val="4083062271"/>
+      </p:ext>
+    </p:extLst>
+  </p:cSld>
+  <p:clrMapOvr>
+    <a:masterClrMapping/>
+  </p:clrMapOvr>
+</p:notes>
+</file>
+
 <file path=ppt/slideLayouts/slideLayout1.xml><?xml version="1.0" encoding="utf-8"?>
 <p:sldLayout xmlns:a="http://schemas.openxmlformats.org/drawingml/2006/main" xmlns:r="http://schemas.openxmlformats.org/officeDocument/2006/relationships" xmlns:p="http://schemas.openxmlformats.org/presentationml/2006/main" type="titleOnly" preserve="1">
   <p:cSld name="Title Only">
@@ -1207,7 +1292,7 @@
           <a:p>
             <a:fld id="{91095A8E-9C53-4015-AAB0-2CFFE67F5AFD}" type="datetimeFigureOut">
               <a:rPr lang="en-CA" smtClean="0"/>
-              <a:t>2017-12-03</a:t>
+              <a:t>2017-12-15</a:t>
             </a:fld>
             <a:endParaRPr lang="en-CA"/>
           </a:p>
@@ -1420,7 +1505,7 @@
           <a:p>
             <a:fld id="{91095A8E-9C53-4015-AAB0-2CFFE67F5AFD}" type="datetimeFigureOut">
               <a:rPr lang="en-CA" smtClean="0"/>
-              <a:t>2017-12-03</a:t>
+              <a:t>2017-12-15</a:t>
             </a:fld>
             <a:endParaRPr lang="en-CA"/>
           </a:p>
@@ -10168,6 +10253,114 @@
 </p:sld>
 </file>
 
+<file path=ppt/slides/slide8.xml><?xml version="1.0" encoding="utf-8"?>
+<p:sld xmlns:a="http://schemas.openxmlformats.org/drawingml/2006/main" xmlns:r="http://schemas.openxmlformats.org/officeDocument/2006/relationships" xmlns:p="http://schemas.openxmlformats.org/presentationml/2006/main">
+  <p:cSld>
+    <p:spTree>
+      <p:nvGrpSpPr>
+        <p:cNvPr id="1" name=""/>
+        <p:cNvGrpSpPr/>
+        <p:nvPr/>
+      </p:nvGrpSpPr>
+      <p:grpSpPr>
+        <a:xfrm>
+          <a:off x="0" y="0"/>
+          <a:ext cx="0" cy="0"/>
+          <a:chOff x="0" y="0"/>
+          <a:chExt cx="0" cy="0"/>
+        </a:xfrm>
+      </p:grpSpPr>
+      <p:pic>
+        <p:nvPicPr>
+          <p:cNvPr id="4" name="Graphic 3" descr="Screwdriver">
+            <a:extLst>
+              <a:ext uri="{FF2B5EF4-FFF2-40B4-BE49-F238E27FC236}">
+                <a16:creationId xmlns:a16="http://schemas.microsoft.com/office/drawing/2014/main" id="{88C14D97-3510-4679-BB97-3897836D9376}"/>
+              </a:ext>
+            </a:extLst>
+          </p:cNvPr>
+          <p:cNvPicPr>
+            <a:picLocks noChangeAspect="1"/>
+          </p:cNvPicPr>
+          <p:nvPr/>
+        </p:nvPicPr>
+        <p:blipFill>
+          <a:blip r:embed="rId3">
+            <a:extLst>
+              <a:ext uri="{28A0092B-C50C-407E-A947-70E740481C1C}">
+                <a14:useLocalDpi xmlns:a14="http://schemas.microsoft.com/office/drawing/2010/main" val="0"/>
+              </a:ext>
+              <a:ext uri="{96DAC541-7B7A-43D3-8B79-37D633B846F1}">
+                <asvg:svgBlip xmlns:asvg="http://schemas.microsoft.com/office/drawing/2016/SVG/main" r:embed="rId4"/>
+              </a:ext>
+            </a:extLst>
+          </a:blip>
+          <a:stretch>
+            <a:fillRect/>
+          </a:stretch>
+        </p:blipFill>
+        <p:spPr>
+          <a:xfrm>
+            <a:off x="4844218" y="2805736"/>
+            <a:ext cx="623264" cy="623264"/>
+          </a:xfrm>
+          <a:prstGeom prst="rect">
+            <a:avLst/>
+          </a:prstGeom>
+        </p:spPr>
+      </p:pic>
+      <p:pic>
+        <p:nvPicPr>
+          <p:cNvPr id="6" name="Graphic 5" descr="Box trolley">
+            <a:extLst>
+              <a:ext uri="{FF2B5EF4-FFF2-40B4-BE49-F238E27FC236}">
+                <a16:creationId xmlns:a16="http://schemas.microsoft.com/office/drawing/2014/main" id="{6A77EFB1-76CC-45AE-B553-4C50FC541276}"/>
+              </a:ext>
+            </a:extLst>
+          </p:cNvPr>
+          <p:cNvPicPr>
+            <a:picLocks noChangeAspect="1"/>
+          </p:cNvPicPr>
+          <p:nvPr/>
+        </p:nvPicPr>
+        <p:blipFill>
+          <a:blip r:embed="rId5">
+            <a:extLst>
+              <a:ext uri="{28A0092B-C50C-407E-A947-70E740481C1C}">
+                <a14:useLocalDpi xmlns:a14="http://schemas.microsoft.com/office/drawing/2010/main" val="0"/>
+              </a:ext>
+              <a:ext uri="{96DAC541-7B7A-43D3-8B79-37D633B846F1}">
+                <asvg:svgBlip xmlns:asvg="http://schemas.microsoft.com/office/drawing/2016/SVG/main" r:embed="rId6"/>
+              </a:ext>
+            </a:extLst>
+          </a:blip>
+          <a:stretch>
+            <a:fillRect/>
+          </a:stretch>
+        </p:blipFill>
+        <p:spPr>
+          <a:xfrm>
+            <a:off x="3299197" y="2599734"/>
+            <a:ext cx="914400" cy="914400"/>
+          </a:xfrm>
+          <a:prstGeom prst="rect">
+            <a:avLst/>
+          </a:prstGeom>
+        </p:spPr>
+      </p:pic>
+    </p:spTree>
+    <p:extLst>
+      <p:ext uri="{BB962C8B-B14F-4D97-AF65-F5344CB8AC3E}">
+        <p14:creationId xmlns:p14="http://schemas.microsoft.com/office/powerpoint/2010/main" val="108001032"/>
+      </p:ext>
+    </p:extLst>
+  </p:cSld>
+  <p:clrMapOvr>
+    <a:masterClrMapping/>
+  </p:clrMapOvr>
+</p:sld>
+</file>
+
 <file path=ppt/theme/theme1.xml><?xml version="1.0" encoding="utf-8"?>
 <a:theme xmlns:a="http://schemas.openxmlformats.org/drawingml/2006/main" name="Office Theme">
   <a:themeElements>

</xml_diff>

<commit_message>
Feature flags or rings? (#54)
* First DRAFT

* Revise DRAFT 1 to reference our oss community projects and MIcrosoft's DevOps transition, both of which are great references for progressive exposure.

* Mknor tweaks before bedtime :)

* Update the feature flag article for a first review by the Rangers.

* Add a mention for the quasi-continuous delivery mode and gradual roll-out for diversity, as suggested by Shmulik.

* Move fb example to the end. Intentionally avoiding names of commercial products and company names in the story.

* GitHub is case sensistive. Fix screwdriver png file reference.

* Tweak.

* Add link to Buck's FF video.

* Add "both" in this paragraph: "We use the ??? to progressively expose a new release in production"

* Tweak the end.
</commit_message>
<xml_diff>
--- a/src/Stories/Story illustrations.pptx
+++ b/src/Stories/Story illustrations.pptx
@@ -5,7 +5,7 @@
     <p:sldMasterId id="2147483648" r:id="rId1"/>
   </p:sldMasterIdLst>
   <p:notesMasterIdLst>
-    <p:notesMasterId r:id="rId8"/>
+    <p:notesMasterId r:id="rId10"/>
   </p:notesMasterIdLst>
   <p:sldIdLst>
     <p:sldId id="256" r:id="rId2"/>
@@ -13,7 +13,9 @@
     <p:sldId id="259" r:id="rId4"/>
     <p:sldId id="260" r:id="rId5"/>
     <p:sldId id="261" r:id="rId6"/>
-    <p:sldId id="262" r:id="rId7"/>
+    <p:sldId id="263" r:id="rId7"/>
+    <p:sldId id="262" r:id="rId8"/>
+    <p:sldId id="264" r:id="rId9"/>
   </p:sldIdLst>
   <p:sldSz cx="12192000" cy="6858000"/>
   <p:notesSz cx="6858000" cy="9144000"/>
@@ -260,7 +262,7 @@
           <a:p>
             <a:fld id="{BC8E98BD-6AE1-4307-B1DC-BAE68787EC38}" type="datetimeFigureOut">
               <a:rPr lang="en-CA" smtClean="0"/>
-              <a:t>2017-07-20</a:t>
+              <a:t>2017-12-15</a:t>
             </a:fld>
             <a:endParaRPr lang="en-CA"/>
           </a:p>
@@ -1038,7 +1040,175 @@
     </p:spTree>
     <p:extLst>
       <p:ext uri="{BB962C8B-B14F-4D97-AF65-F5344CB8AC3E}">
+        <p14:creationId xmlns:p14="http://schemas.microsoft.com/office/powerpoint/2010/main" val="552526778"/>
+      </p:ext>
+    </p:extLst>
+  </p:cSld>
+  <p:clrMapOvr>
+    <a:masterClrMapping/>
+  </p:clrMapOvr>
+</p:notes>
+</file>
+
+<file path=ppt/notesSlides/notesSlide7.xml><?xml version="1.0" encoding="utf-8"?>
+<p:notes xmlns:a="http://schemas.openxmlformats.org/drawingml/2006/main" xmlns:r="http://schemas.openxmlformats.org/officeDocument/2006/relationships" xmlns:p="http://schemas.openxmlformats.org/presentationml/2006/main">
+  <p:cSld>
+    <p:spTree>
+      <p:nvGrpSpPr>
+        <p:cNvPr id="1" name=""/>
+        <p:cNvGrpSpPr/>
+        <p:nvPr/>
+      </p:nvGrpSpPr>
+      <p:grpSpPr>
+        <a:xfrm>
+          <a:off x="0" y="0"/>
+          <a:ext cx="0" cy="0"/>
+          <a:chOff x="0" y="0"/>
+          <a:chExt cx="0" cy="0"/>
+        </a:xfrm>
+      </p:grpSpPr>
+      <p:sp>
+        <p:nvSpPr>
+          <p:cNvPr id="2" name="Slide Image Placeholder 1"/>
+          <p:cNvSpPr>
+            <a:spLocks noGrp="1" noRot="1" noChangeAspect="1"/>
+          </p:cNvSpPr>
+          <p:nvPr>
+            <p:ph type="sldImg"/>
+          </p:nvPr>
+        </p:nvSpPr>
+        <p:spPr/>
+      </p:sp>
+      <p:sp>
+        <p:nvSpPr>
+          <p:cNvPr id="3" name="Notes Placeholder 2"/>
+          <p:cNvSpPr>
+            <a:spLocks noGrp="1"/>
+          </p:cNvSpPr>
+          <p:nvPr>
+            <p:ph type="body" idx="1"/>
+          </p:nvPr>
+        </p:nvSpPr>
+        <p:spPr/>
+        <p:txBody>
+          <a:bodyPr/>
+          <a:lstStyle/>
+          <a:p>
+            <a:endParaRPr lang="en-CA"/>
+          </a:p>
+        </p:txBody>
+      </p:sp>
+      <p:sp>
+        <p:nvSpPr>
+          <p:cNvPr id="4" name="Slide Number Placeholder 3"/>
+          <p:cNvSpPr>
+            <a:spLocks noGrp="1"/>
+          </p:cNvSpPr>
+          <p:nvPr>
+            <p:ph type="sldNum" sz="quarter" idx="10"/>
+          </p:nvPr>
+        </p:nvSpPr>
+        <p:spPr/>
+        <p:txBody>
+          <a:bodyPr/>
+          <a:lstStyle/>
+          <a:p>
+            <a:fld id="{F6A75A2C-6036-4CC3-919B-29E2F0BD9283}" type="slidenum">
+              <a:rPr lang="en-CA" smtClean="0"/>
+              <a:t>7</a:t>
+            </a:fld>
+            <a:endParaRPr lang="en-CA"/>
+          </a:p>
+        </p:txBody>
+      </p:sp>
+    </p:spTree>
+    <p:extLst>
+      <p:ext uri="{BB962C8B-B14F-4D97-AF65-F5344CB8AC3E}">
         <p14:creationId xmlns:p14="http://schemas.microsoft.com/office/powerpoint/2010/main" val="2185946530"/>
+      </p:ext>
+    </p:extLst>
+  </p:cSld>
+  <p:clrMapOvr>
+    <a:masterClrMapping/>
+  </p:clrMapOvr>
+</p:notes>
+</file>
+
+<file path=ppt/notesSlides/notesSlide8.xml><?xml version="1.0" encoding="utf-8"?>
+<p:notes xmlns:a="http://schemas.openxmlformats.org/drawingml/2006/main" xmlns:r="http://schemas.openxmlformats.org/officeDocument/2006/relationships" xmlns:p="http://schemas.openxmlformats.org/presentationml/2006/main">
+  <p:cSld>
+    <p:spTree>
+      <p:nvGrpSpPr>
+        <p:cNvPr id="1" name=""/>
+        <p:cNvGrpSpPr/>
+        <p:nvPr/>
+      </p:nvGrpSpPr>
+      <p:grpSpPr>
+        <a:xfrm>
+          <a:off x="0" y="0"/>
+          <a:ext cx="0" cy="0"/>
+          <a:chOff x="0" y="0"/>
+          <a:chExt cx="0" cy="0"/>
+        </a:xfrm>
+      </p:grpSpPr>
+      <p:sp>
+        <p:nvSpPr>
+          <p:cNvPr id="2" name="Slide Image Placeholder 1"/>
+          <p:cNvSpPr>
+            <a:spLocks noGrp="1" noRot="1" noChangeAspect="1"/>
+          </p:cNvSpPr>
+          <p:nvPr>
+            <p:ph type="sldImg"/>
+          </p:nvPr>
+        </p:nvSpPr>
+        <p:spPr/>
+      </p:sp>
+      <p:sp>
+        <p:nvSpPr>
+          <p:cNvPr id="3" name="Notes Placeholder 2"/>
+          <p:cNvSpPr>
+            <a:spLocks noGrp="1"/>
+          </p:cNvSpPr>
+          <p:nvPr>
+            <p:ph type="body" idx="1"/>
+          </p:nvPr>
+        </p:nvSpPr>
+        <p:spPr/>
+        <p:txBody>
+          <a:bodyPr/>
+          <a:lstStyle/>
+          <a:p>
+            <a:endParaRPr lang="en-CA"/>
+          </a:p>
+        </p:txBody>
+      </p:sp>
+      <p:sp>
+        <p:nvSpPr>
+          <p:cNvPr id="4" name="Slide Number Placeholder 3"/>
+          <p:cNvSpPr>
+            <a:spLocks noGrp="1"/>
+          </p:cNvSpPr>
+          <p:nvPr>
+            <p:ph type="sldNum" sz="quarter" idx="10"/>
+          </p:nvPr>
+        </p:nvSpPr>
+        <p:spPr/>
+        <p:txBody>
+          <a:bodyPr/>
+          <a:lstStyle/>
+          <a:p>
+            <a:fld id="{F6A75A2C-6036-4CC3-919B-29E2F0BD9283}" type="slidenum">
+              <a:rPr lang="en-CA" smtClean="0"/>
+              <a:t>8</a:t>
+            </a:fld>
+            <a:endParaRPr lang="en-CA"/>
+          </a:p>
+        </p:txBody>
+      </p:sp>
+    </p:spTree>
+    <p:extLst>
+      <p:ext uri="{BB962C8B-B14F-4D97-AF65-F5344CB8AC3E}">
+        <p14:creationId xmlns:p14="http://schemas.microsoft.com/office/powerpoint/2010/main" val="4083062271"/>
       </p:ext>
     </p:extLst>
   </p:cSld>
@@ -1122,7 +1292,7 @@
           <a:p>
             <a:fld id="{91095A8E-9C53-4015-AAB0-2CFFE67F5AFD}" type="datetimeFigureOut">
               <a:rPr lang="en-CA" smtClean="0"/>
-              <a:t>2017-07-20</a:t>
+              <a:t>2017-12-15</a:t>
             </a:fld>
             <a:endParaRPr lang="en-CA"/>
           </a:p>
@@ -1335,7 +1505,7 @@
           <a:p>
             <a:fld id="{91095A8E-9C53-4015-AAB0-2CFFE67F5AFD}" type="datetimeFigureOut">
               <a:rPr lang="en-CA" smtClean="0"/>
-              <a:t>2017-07-20</a:t>
+              <a:t>2017-12-15</a:t>
             </a:fld>
             <a:endParaRPr lang="en-CA"/>
           </a:p>
@@ -5754,8 +5924,8 @@
         </p:nvSpPr>
         <p:spPr>
           <a:xfrm flipH="1">
-            <a:off x="1983928" y="2665272"/>
-            <a:ext cx="8743432" cy="2153072"/>
+            <a:off x="1983927" y="2665271"/>
+            <a:ext cx="8482805" cy="2164225"/>
           </a:xfrm>
           <a:prstGeom prst="rtTriangle">
             <a:avLst/>
@@ -5969,6 +6139,11 @@
               <a:gd name="adj" fmla="val 13510"/>
             </a:avLst>
           </a:prstGeom>
+          <a:ln>
+            <a:solidFill>
+              <a:srgbClr val="002060"/>
+            </a:solidFill>
+          </a:ln>
         </p:spPr>
         <p:style>
           <a:lnRef idx="2">
@@ -6602,6 +6777,11 @@
           <a:prstGeom prst="rightBrace">
             <a:avLst/>
           </a:prstGeom>
+          <a:ln>
+            <a:solidFill>
+              <a:srgbClr val="002060"/>
+            </a:solidFill>
+          </a:ln>
         </p:spPr>
         <p:style>
           <a:lnRef idx="1">
@@ -6651,6 +6831,11 @@
           <a:prstGeom prst="rightBrace">
             <a:avLst/>
           </a:prstGeom>
+          <a:ln>
+            <a:solidFill>
+              <a:srgbClr val="002060"/>
+            </a:solidFill>
+          </a:ln>
         </p:spPr>
         <p:style>
           <a:lnRef idx="1">
@@ -7211,6 +7396,9 @@
           <a:prstGeom prst="roundRect">
             <a:avLst/>
           </a:prstGeom>
+          <a:solidFill>
+            <a:schemeClr val="accent5"/>
+          </a:solidFill>
           <a:ln>
             <a:noFill/>
           </a:ln>
@@ -7393,7 +7581,7 @@
           <a:noFill/>
           <a:ln>
             <a:solidFill>
-              <a:srgbClr val="C00000"/>
+              <a:srgbClr val="006600"/>
             </a:solidFill>
           </a:ln>
         </p:spPr>
@@ -7459,7 +7647,7 @@
             <a:r>
               <a:rPr lang="en-US" dirty="0">
                 <a:solidFill>
-                  <a:srgbClr val="4472C4"/>
+                  <a:srgbClr val="006600"/>
                 </a:solidFill>
                 <a:latin typeface="Calibri" panose="020F0502020204030204"/>
               </a:rPr>
@@ -7467,7 +7655,7 @@
             </a:r>
             <a:endParaRPr lang="en-CA" dirty="0">
               <a:solidFill>
-                <a:srgbClr val="4472C4"/>
+                <a:srgbClr val="006600"/>
               </a:solidFill>
               <a:latin typeface="Calibri" panose="020F0502020204030204"/>
             </a:endParaRPr>
@@ -7494,6 +7682,11 @@
           <a:prstGeom prst="rightBrace">
             <a:avLst/>
           </a:prstGeom>
+          <a:ln>
+            <a:solidFill>
+              <a:srgbClr val="002060"/>
+            </a:solidFill>
+          </a:ln>
         </p:spPr>
         <p:style>
           <a:lnRef idx="1">
@@ -7555,7 +7748,7 @@
             <a:r>
               <a:rPr lang="en-US" dirty="0">
                 <a:solidFill>
-                  <a:srgbClr val="4472C4"/>
+                  <a:srgbClr val="C00000"/>
                 </a:solidFill>
                 <a:latin typeface="Calibri" panose="020F0502020204030204"/>
               </a:rPr>
@@ -7563,7 +7756,7 @@
             </a:r>
             <a:endParaRPr lang="en-CA" dirty="0">
               <a:solidFill>
-                <a:srgbClr val="4472C4"/>
+                <a:srgbClr val="C00000"/>
               </a:solidFill>
               <a:latin typeface="Calibri" panose="020F0502020204030204"/>
             </a:endParaRPr>
@@ -7584,14 +7777,14 @@
         </p:nvSpPr>
         <p:spPr>
           <a:xfrm>
-            <a:off x="258447" y="4831196"/>
+            <a:off x="246843" y="4831610"/>
             <a:ext cx="3008979" cy="1415807"/>
           </a:xfrm>
           <a:prstGeom prst="rect">
             <a:avLst/>
           </a:prstGeom>
           <a:solidFill>
-            <a:schemeClr val="bg2"/>
+            <a:schemeClr val="bg1"/>
           </a:solidFill>
           <a:ln>
             <a:noFill/>
@@ -7641,7 +7834,7 @@
         </p:nvSpPr>
         <p:spPr>
           <a:xfrm>
-            <a:off x="988306" y="4888636"/>
+            <a:off x="-210136" y="3142865"/>
             <a:ext cx="1562745" cy="374793"/>
           </a:xfrm>
           <a:prstGeom prst="rect">
@@ -7674,6 +7867,123 @@
           </a:p>
         </p:txBody>
       </p:sp>
+      <p:sp>
+        <p:nvSpPr>
+          <p:cNvPr id="7" name="TextBox 6">
+            <a:extLst>
+              <a:ext uri="{FF2B5EF4-FFF2-40B4-BE49-F238E27FC236}">
+                <a16:creationId xmlns:a16="http://schemas.microsoft.com/office/drawing/2014/main" id="{6E97B7D6-5A4F-4478-BD1A-AE69C04A5151}"/>
+              </a:ext>
+            </a:extLst>
+          </p:cNvPr>
+          <p:cNvSpPr txBox="1"/>
+          <p:nvPr/>
+        </p:nvSpPr>
+        <p:spPr>
+          <a:xfrm>
+            <a:off x="4748255" y="2436723"/>
+            <a:ext cx="490840" cy="369332"/>
+          </a:xfrm>
+          <a:prstGeom prst="rect">
+            <a:avLst/>
+          </a:prstGeom>
+          <a:noFill/>
+        </p:spPr>
+        <p:txBody>
+          <a:bodyPr wrap="none" rtlCol="0">
+            <a:spAutoFit/>
+          </a:bodyPr>
+          <a:lstStyle/>
+          <a:p>
+            <a:r>
+              <a:rPr lang="en-CA" dirty="0">
+                <a:latin typeface="Segoe UI" panose="020B0502040204020203" pitchFamily="34" charset="0"/>
+                <a:cs typeface="Segoe UI" panose="020B0502040204020203" pitchFamily="34" charset="0"/>
+              </a:rPr>
+              <a:t>❶</a:t>
+            </a:r>
+            <a:endParaRPr lang="en-CA" dirty="0"/>
+          </a:p>
+        </p:txBody>
+      </p:sp>
+      <p:sp>
+        <p:nvSpPr>
+          <p:cNvPr id="44" name="TextBox 43">
+            <a:extLst>
+              <a:ext uri="{FF2B5EF4-FFF2-40B4-BE49-F238E27FC236}">
+                <a16:creationId xmlns:a16="http://schemas.microsoft.com/office/drawing/2014/main" id="{856D0A99-06F7-431E-A6D2-52772DE64495}"/>
+              </a:ext>
+            </a:extLst>
+          </p:cNvPr>
+          <p:cNvSpPr txBox="1"/>
+          <p:nvPr/>
+        </p:nvSpPr>
+        <p:spPr>
+          <a:xfrm>
+            <a:off x="6797592" y="2436723"/>
+            <a:ext cx="490840" cy="369332"/>
+          </a:xfrm>
+          <a:prstGeom prst="rect">
+            <a:avLst/>
+          </a:prstGeom>
+          <a:noFill/>
+        </p:spPr>
+        <p:txBody>
+          <a:bodyPr wrap="none" rtlCol="0">
+            <a:spAutoFit/>
+          </a:bodyPr>
+          <a:lstStyle/>
+          <a:p>
+            <a:r>
+              <a:rPr lang="en-CA" dirty="0">
+                <a:latin typeface="Segoe UI" panose="020B0502040204020203" pitchFamily="34" charset="0"/>
+                <a:cs typeface="Segoe UI" panose="020B0502040204020203" pitchFamily="34" charset="0"/>
+              </a:rPr>
+              <a:t>❷</a:t>
+            </a:r>
+            <a:endParaRPr lang="en-CA" dirty="0"/>
+          </a:p>
+        </p:txBody>
+      </p:sp>
+      <p:sp>
+        <p:nvSpPr>
+          <p:cNvPr id="45" name="TextBox 44">
+            <a:extLst>
+              <a:ext uri="{FF2B5EF4-FFF2-40B4-BE49-F238E27FC236}">
+                <a16:creationId xmlns:a16="http://schemas.microsoft.com/office/drawing/2014/main" id="{82B606B7-0B8D-495A-B7A0-4D8F706A37B1}"/>
+              </a:ext>
+            </a:extLst>
+          </p:cNvPr>
+          <p:cNvSpPr txBox="1"/>
+          <p:nvPr/>
+        </p:nvSpPr>
+        <p:spPr>
+          <a:xfrm>
+            <a:off x="8832278" y="2429599"/>
+            <a:ext cx="490840" cy="369332"/>
+          </a:xfrm>
+          <a:prstGeom prst="rect">
+            <a:avLst/>
+          </a:prstGeom>
+          <a:noFill/>
+        </p:spPr>
+        <p:txBody>
+          <a:bodyPr wrap="none" rtlCol="0">
+            <a:spAutoFit/>
+          </a:bodyPr>
+          <a:lstStyle/>
+          <a:p>
+            <a:r>
+              <a:rPr lang="en-CA" dirty="0">
+                <a:latin typeface="Segoe UI" panose="020B0502040204020203" pitchFamily="34" charset="0"/>
+                <a:cs typeface="Segoe UI" panose="020B0502040204020203" pitchFamily="34" charset="0"/>
+              </a:rPr>
+              <a:t>❸</a:t>
+            </a:r>
+            <a:endParaRPr lang="en-CA" dirty="0"/>
+          </a:p>
+        </p:txBody>
+      </p:sp>
     </p:spTree>
     <p:extLst>
       <p:ext uri="{BB962C8B-B14F-4D97-AF65-F5344CB8AC3E}">
@@ -7688,6 +7998,760 @@
 </file>
 
 <file path=ppt/slides/slide6.xml><?xml version="1.0" encoding="utf-8"?>
+<p:sld xmlns:a="http://schemas.openxmlformats.org/drawingml/2006/main" xmlns:r="http://schemas.openxmlformats.org/officeDocument/2006/relationships" xmlns:p="http://schemas.openxmlformats.org/presentationml/2006/main">
+  <p:cSld>
+    <p:spTree>
+      <p:nvGrpSpPr>
+        <p:cNvPr id="1" name=""/>
+        <p:cNvGrpSpPr/>
+        <p:nvPr/>
+      </p:nvGrpSpPr>
+      <p:grpSpPr>
+        <a:xfrm>
+          <a:off x="0" y="0"/>
+          <a:ext cx="0" cy="0"/>
+          <a:chOff x="0" y="0"/>
+          <a:chExt cx="0" cy="0"/>
+        </a:xfrm>
+      </p:grpSpPr>
+      <p:sp>
+        <p:nvSpPr>
+          <p:cNvPr id="2" name="Title 1">
+            <a:extLst>
+              <a:ext uri="{FF2B5EF4-FFF2-40B4-BE49-F238E27FC236}">
+                <a16:creationId xmlns:a16="http://schemas.microsoft.com/office/drawing/2014/main" id="{CFC20DA0-C7FF-4F8E-9183-A6D68E7048A6}"/>
+              </a:ext>
+            </a:extLst>
+          </p:cNvPr>
+          <p:cNvSpPr>
+            <a:spLocks noGrp="1"/>
+          </p:cNvSpPr>
+          <p:nvPr>
+            <p:ph type="title"/>
+          </p:nvPr>
+        </p:nvSpPr>
+        <p:spPr/>
+        <p:txBody>
+          <a:bodyPr/>
+          <a:lstStyle/>
+          <a:p>
+            <a:endParaRPr lang="en-CA"/>
+          </a:p>
+        </p:txBody>
+      </p:sp>
+      <p:sp>
+        <p:nvSpPr>
+          <p:cNvPr id="3" name="Rectangle: Rounded Corners 2">
+            <a:extLst>
+              <a:ext uri="{FF2B5EF4-FFF2-40B4-BE49-F238E27FC236}">
+                <a16:creationId xmlns:a16="http://schemas.microsoft.com/office/drawing/2014/main" id="{86B03D57-8ABE-4148-B92C-EAA67BFDF5C8}"/>
+              </a:ext>
+            </a:extLst>
+          </p:cNvPr>
+          <p:cNvSpPr/>
+          <p:nvPr/>
+        </p:nvSpPr>
+        <p:spPr>
+          <a:xfrm>
+            <a:off x="136347" y="895350"/>
+            <a:ext cx="909176" cy="1285875"/>
+          </a:xfrm>
+          <a:prstGeom prst="roundRect">
+            <a:avLst/>
+          </a:prstGeom>
+          <a:solidFill>
+            <a:schemeClr val="accent5"/>
+          </a:solidFill>
+        </p:spPr>
+        <p:style>
+          <a:lnRef idx="3">
+            <a:schemeClr val="lt1"/>
+          </a:lnRef>
+          <a:fillRef idx="1">
+            <a:schemeClr val="accent5"/>
+          </a:fillRef>
+          <a:effectRef idx="1">
+            <a:schemeClr val="accent5"/>
+          </a:effectRef>
+          <a:fontRef idx="minor">
+            <a:schemeClr val="lt1"/>
+          </a:fontRef>
+        </p:style>
+        <p:txBody>
+          <a:bodyPr rtlCol="0" anchor="ctr"/>
+          <a:lstStyle/>
+          <a:p>
+            <a:pPr algn="ctr"/>
+            <a:endParaRPr lang="en-CA"/>
+          </a:p>
+        </p:txBody>
+      </p:sp>
+      <p:sp>
+        <p:nvSpPr>
+          <p:cNvPr id="4" name="TextBox 3">
+            <a:extLst>
+              <a:ext uri="{FF2B5EF4-FFF2-40B4-BE49-F238E27FC236}">
+                <a16:creationId xmlns:a16="http://schemas.microsoft.com/office/drawing/2014/main" id="{F9FB9AFF-87ED-4AAD-8F1B-4313B91048B6}"/>
+              </a:ext>
+            </a:extLst>
+          </p:cNvPr>
+          <p:cNvSpPr txBox="1"/>
+          <p:nvPr/>
+        </p:nvSpPr>
+        <p:spPr>
+          <a:xfrm>
+            <a:off x="3047747" y="1215122"/>
+            <a:ext cx="1060890" cy="646331"/>
+          </a:xfrm>
+          <a:prstGeom prst="rect">
+            <a:avLst/>
+          </a:prstGeom>
+          <a:noFill/>
+        </p:spPr>
+        <p:txBody>
+          <a:bodyPr wrap="square" rtlCol="0">
+            <a:spAutoFit/>
+          </a:bodyPr>
+          <a:lstStyle/>
+          <a:p>
+            <a:r>
+              <a:rPr lang="en-US" dirty="0"/>
+              <a:t>if ( </a:t>
+            </a:r>
+            <a:r>
+              <a:rPr lang="en-US" dirty="0">
+                <a:solidFill>
+                  <a:srgbClr val="0070C0"/>
+                </a:solidFill>
+              </a:rPr>
+              <a:t>flag</a:t>
+            </a:r>
+            <a:r>
+              <a:rPr lang="en-US" dirty="0"/>
+              <a:t> )</a:t>
+            </a:r>
+          </a:p>
+          <a:p>
+            <a:r>
+              <a:rPr lang="en-US" dirty="0"/>
+              <a:t>e</a:t>
+            </a:r>
+            <a:r>
+              <a:rPr lang="en-CA" dirty="0" err="1"/>
+              <a:t>lse</a:t>
+            </a:r>
+            <a:endParaRPr lang="en-CA" dirty="0"/>
+          </a:p>
+        </p:txBody>
+      </p:sp>
+      <p:sp>
+        <p:nvSpPr>
+          <p:cNvPr id="5" name="TextBox 4">
+            <a:extLst>
+              <a:ext uri="{FF2B5EF4-FFF2-40B4-BE49-F238E27FC236}">
+                <a16:creationId xmlns:a16="http://schemas.microsoft.com/office/drawing/2014/main" id="{67D71AD6-8159-44FA-A6B2-6F946FC63462}"/>
+              </a:ext>
+            </a:extLst>
+          </p:cNvPr>
+          <p:cNvSpPr txBox="1"/>
+          <p:nvPr/>
+        </p:nvSpPr>
+        <p:spPr>
+          <a:xfrm>
+            <a:off x="170510" y="1034534"/>
+            <a:ext cx="533823" cy="307777"/>
+          </a:xfrm>
+          <a:prstGeom prst="rect">
+            <a:avLst/>
+          </a:prstGeom>
+          <a:noFill/>
+        </p:spPr>
+        <p:txBody>
+          <a:bodyPr wrap="square" rtlCol="0">
+            <a:spAutoFit/>
+          </a:bodyPr>
+          <a:lstStyle/>
+          <a:p>
+            <a:r>
+              <a:rPr lang="en-CA" sz="1400" dirty="0">
+                <a:solidFill>
+                  <a:schemeClr val="bg1"/>
+                </a:solidFill>
+                <a:sym typeface="Webdings" panose="05030102010509060703" pitchFamily="18" charset="2"/>
+              </a:rPr>
+              <a:t>ON</a:t>
+            </a:r>
+            <a:endParaRPr lang="en-CA" sz="1400" dirty="0">
+              <a:solidFill>
+                <a:schemeClr val="bg1"/>
+              </a:solidFill>
+            </a:endParaRPr>
+          </a:p>
+        </p:txBody>
+      </p:sp>
+      <p:sp>
+        <p:nvSpPr>
+          <p:cNvPr id="6" name="TextBox 5">
+            <a:extLst>
+              <a:ext uri="{FF2B5EF4-FFF2-40B4-BE49-F238E27FC236}">
+                <a16:creationId xmlns:a16="http://schemas.microsoft.com/office/drawing/2014/main" id="{ED48178D-FA0B-4235-AF72-B4DA06329EFF}"/>
+              </a:ext>
+            </a:extLst>
+          </p:cNvPr>
+          <p:cNvSpPr txBox="1"/>
+          <p:nvPr/>
+        </p:nvSpPr>
+        <p:spPr>
+          <a:xfrm>
+            <a:off x="136347" y="1712842"/>
+            <a:ext cx="621586" cy="307777"/>
+          </a:xfrm>
+          <a:prstGeom prst="rect">
+            <a:avLst/>
+          </a:prstGeom>
+          <a:noFill/>
+        </p:spPr>
+        <p:txBody>
+          <a:bodyPr wrap="square" rtlCol="0">
+            <a:spAutoFit/>
+          </a:bodyPr>
+          <a:lstStyle/>
+          <a:p>
+            <a:r>
+              <a:rPr lang="en-CA" sz="1400" dirty="0">
+                <a:solidFill>
+                  <a:schemeClr val="bg1"/>
+                </a:solidFill>
+                <a:sym typeface="Webdings" panose="05030102010509060703" pitchFamily="18" charset="2"/>
+              </a:rPr>
+              <a:t>OFF</a:t>
+            </a:r>
+            <a:endParaRPr lang="en-CA" sz="1400" dirty="0">
+              <a:solidFill>
+                <a:schemeClr val="bg1"/>
+              </a:solidFill>
+            </a:endParaRPr>
+          </a:p>
+        </p:txBody>
+      </p:sp>
+      <p:sp>
+        <p:nvSpPr>
+          <p:cNvPr id="7" name="Flowchart: Alternate Process 6">
+            <a:extLst>
+              <a:ext uri="{FF2B5EF4-FFF2-40B4-BE49-F238E27FC236}">
+                <a16:creationId xmlns:a16="http://schemas.microsoft.com/office/drawing/2014/main" id="{E2C38331-84EC-4E76-8089-103FFC438866}"/>
+              </a:ext>
+            </a:extLst>
+          </p:cNvPr>
+          <p:cNvSpPr/>
+          <p:nvPr/>
+        </p:nvSpPr>
+        <p:spPr>
+          <a:xfrm>
+            <a:off x="704334" y="1187425"/>
+            <a:ext cx="155626" cy="713788"/>
+          </a:xfrm>
+          <a:prstGeom prst="flowChartAlternateProcess">
+            <a:avLst/>
+          </a:prstGeom>
+        </p:spPr>
+        <p:style>
+          <a:lnRef idx="2">
+            <a:schemeClr val="dk1"/>
+          </a:lnRef>
+          <a:fillRef idx="1">
+            <a:schemeClr val="lt1"/>
+          </a:fillRef>
+          <a:effectRef idx="0">
+            <a:schemeClr val="dk1"/>
+          </a:effectRef>
+          <a:fontRef idx="minor">
+            <a:schemeClr val="dk1"/>
+          </a:fontRef>
+        </p:style>
+        <p:txBody>
+          <a:bodyPr rtlCol="0" anchor="ctr"/>
+          <a:lstStyle/>
+          <a:p>
+            <a:pPr algn="ctr"/>
+            <a:endParaRPr lang="en-CA"/>
+          </a:p>
+        </p:txBody>
+      </p:sp>
+      <p:sp>
+        <p:nvSpPr>
+          <p:cNvPr id="8" name="Flowchart: Connector 7">
+            <a:extLst>
+              <a:ext uri="{FF2B5EF4-FFF2-40B4-BE49-F238E27FC236}">
+                <a16:creationId xmlns:a16="http://schemas.microsoft.com/office/drawing/2014/main" id="{FCB29C08-9CAA-44D6-B23B-008E776B0476}"/>
+              </a:ext>
+            </a:extLst>
+          </p:cNvPr>
+          <p:cNvSpPr/>
+          <p:nvPr/>
+        </p:nvSpPr>
+        <p:spPr>
+          <a:xfrm>
+            <a:off x="653266" y="1068334"/>
+            <a:ext cx="257761" cy="279336"/>
+          </a:xfrm>
+          <a:prstGeom prst="flowChartConnector">
+            <a:avLst/>
+          </a:prstGeom>
+        </p:spPr>
+        <p:style>
+          <a:lnRef idx="0">
+            <a:schemeClr val="accent6"/>
+          </a:lnRef>
+          <a:fillRef idx="3">
+            <a:schemeClr val="accent6"/>
+          </a:fillRef>
+          <a:effectRef idx="3">
+            <a:schemeClr val="accent6"/>
+          </a:effectRef>
+          <a:fontRef idx="minor">
+            <a:schemeClr val="lt1"/>
+          </a:fontRef>
+        </p:style>
+        <p:txBody>
+          <a:bodyPr rtlCol="0" anchor="ctr"/>
+          <a:lstStyle/>
+          <a:p>
+            <a:pPr algn="ctr"/>
+            <a:endParaRPr lang="en-CA"/>
+          </a:p>
+        </p:txBody>
+      </p:sp>
+      <p:sp>
+        <p:nvSpPr>
+          <p:cNvPr id="10" name="TextBox 9">
+            <a:extLst>
+              <a:ext uri="{FF2B5EF4-FFF2-40B4-BE49-F238E27FC236}">
+                <a16:creationId xmlns:a16="http://schemas.microsoft.com/office/drawing/2014/main" id="{9316A817-EC36-4FA7-9666-C058A55435F2}"/>
+              </a:ext>
+            </a:extLst>
+          </p:cNvPr>
+          <p:cNvSpPr txBox="1"/>
+          <p:nvPr/>
+        </p:nvSpPr>
+        <p:spPr>
+          <a:xfrm>
+            <a:off x="398735" y="2215882"/>
+            <a:ext cx="2724150" cy="307777"/>
+          </a:xfrm>
+          <a:prstGeom prst="rect">
+            <a:avLst/>
+          </a:prstGeom>
+          <a:noFill/>
+        </p:spPr>
+        <p:txBody>
+          <a:bodyPr wrap="square" rtlCol="0">
+            <a:spAutoFit/>
+          </a:bodyPr>
+          <a:lstStyle/>
+          <a:p>
+            <a:r>
+              <a:rPr lang="en-US" sz="1400" dirty="0">
+                <a:solidFill>
+                  <a:schemeClr val="bg2">
+                    <a:lumMod val="50000"/>
+                  </a:schemeClr>
+                </a:solidFill>
+              </a:rPr>
+              <a:t>Feature Flag management service</a:t>
+            </a:r>
+            <a:endParaRPr lang="en-CA" sz="1400" dirty="0">
+              <a:solidFill>
+                <a:schemeClr val="bg2">
+                  <a:lumMod val="50000"/>
+                </a:schemeClr>
+              </a:solidFill>
+            </a:endParaRPr>
+          </a:p>
+        </p:txBody>
+      </p:sp>
+      <p:pic>
+        <p:nvPicPr>
+          <p:cNvPr id="11" name="Graphic 10" descr="Printer">
+            <a:extLst>
+              <a:ext uri="{FF2B5EF4-FFF2-40B4-BE49-F238E27FC236}">
+                <a16:creationId xmlns:a16="http://schemas.microsoft.com/office/drawing/2014/main" id="{B5253B32-4E10-4D72-B78D-AA77A585E6AF}"/>
+              </a:ext>
+            </a:extLst>
+          </p:cNvPr>
+          <p:cNvPicPr>
+            <a:picLocks noChangeAspect="1"/>
+          </p:cNvPicPr>
+          <p:nvPr/>
+        </p:nvPicPr>
+        <p:blipFill>
+          <a:blip r:embed="rId3">
+            <a:extLst>
+              <a:ext uri="{28A0092B-C50C-407E-A947-70E740481C1C}">
+                <a14:useLocalDpi xmlns:a14="http://schemas.microsoft.com/office/drawing/2010/main" val="0"/>
+              </a:ext>
+              <a:ext uri="{96DAC541-7B7A-43D3-8B79-37D633B846F1}">
+                <asvg:svgBlip xmlns:asvg="http://schemas.microsoft.com/office/drawing/2016/SVG/main" r:embed="rId4"/>
+              </a:ext>
+            </a:extLst>
+          </a:blip>
+          <a:stretch>
+            <a:fillRect/>
+          </a:stretch>
+        </p:blipFill>
+        <p:spPr>
+          <a:xfrm>
+            <a:off x="4488806" y="1871443"/>
+            <a:ext cx="689587" cy="689587"/>
+          </a:xfrm>
+          <a:prstGeom prst="rect">
+            <a:avLst/>
+          </a:prstGeom>
+        </p:spPr>
+      </p:pic>
+      <p:pic>
+        <p:nvPicPr>
+          <p:cNvPr id="12" name="Graphic 11" descr="Open envelope">
+            <a:extLst>
+              <a:ext uri="{FF2B5EF4-FFF2-40B4-BE49-F238E27FC236}">
+                <a16:creationId xmlns:a16="http://schemas.microsoft.com/office/drawing/2014/main" id="{655E0095-79EC-4C7A-86F1-1F0AAA325ECE}"/>
+              </a:ext>
+            </a:extLst>
+          </p:cNvPr>
+          <p:cNvPicPr>
+            <a:picLocks noChangeAspect="1"/>
+          </p:cNvPicPr>
+          <p:nvPr/>
+        </p:nvPicPr>
+        <p:blipFill>
+          <a:blip r:embed="rId5">
+            <a:extLst>
+              <a:ext uri="{28A0092B-C50C-407E-A947-70E740481C1C}">
+                <a14:useLocalDpi xmlns:a14="http://schemas.microsoft.com/office/drawing/2010/main" val="0"/>
+              </a:ext>
+              <a:ext uri="{96DAC541-7B7A-43D3-8B79-37D633B846F1}">
+                <asvg:svgBlip xmlns:asvg="http://schemas.microsoft.com/office/drawing/2016/SVG/main" r:embed="rId6"/>
+              </a:ext>
+            </a:extLst>
+          </a:blip>
+          <a:stretch>
+            <a:fillRect/>
+          </a:stretch>
+        </p:blipFill>
+        <p:spPr>
+          <a:xfrm>
+            <a:off x="4488806" y="1092064"/>
+            <a:ext cx="607200" cy="607200"/>
+          </a:xfrm>
+          <a:prstGeom prst="rect">
+            <a:avLst/>
+          </a:prstGeom>
+        </p:spPr>
+      </p:pic>
+      <p:cxnSp>
+        <p:nvCxnSpPr>
+          <p:cNvPr id="13" name="Straight Arrow Connector 12">
+            <a:extLst>
+              <a:ext uri="{FF2B5EF4-FFF2-40B4-BE49-F238E27FC236}">
+                <a16:creationId xmlns:a16="http://schemas.microsoft.com/office/drawing/2014/main" id="{25ECD128-3EE8-46DF-BDCE-7BF301E4F3C3}"/>
+              </a:ext>
+            </a:extLst>
+          </p:cNvPr>
+          <p:cNvCxnSpPr>
+            <a:cxnSpLocks/>
+            <a:endCxn id="12" idx="1"/>
+          </p:cNvCxnSpPr>
+          <p:nvPr/>
+        </p:nvCxnSpPr>
+        <p:spPr>
+          <a:xfrm>
+            <a:off x="4034024" y="1395664"/>
+            <a:ext cx="454782" cy="0"/>
+          </a:xfrm>
+          <a:prstGeom prst="straightConnector1">
+            <a:avLst/>
+          </a:prstGeom>
+          <a:ln>
+            <a:tailEnd type="triangle" w="lg" len="sm"/>
+          </a:ln>
+        </p:spPr>
+        <p:style>
+          <a:lnRef idx="1">
+            <a:schemeClr val="accent1"/>
+          </a:lnRef>
+          <a:fillRef idx="0">
+            <a:schemeClr val="accent1"/>
+          </a:fillRef>
+          <a:effectRef idx="0">
+            <a:schemeClr val="accent1"/>
+          </a:effectRef>
+          <a:fontRef idx="minor">
+            <a:schemeClr val="tx1"/>
+          </a:fontRef>
+        </p:style>
+      </p:cxnSp>
+      <p:cxnSp>
+        <p:nvCxnSpPr>
+          <p:cNvPr id="14" name="Straight Arrow Connector 13">
+            <a:extLst>
+              <a:ext uri="{FF2B5EF4-FFF2-40B4-BE49-F238E27FC236}">
+                <a16:creationId xmlns:a16="http://schemas.microsoft.com/office/drawing/2014/main" id="{7B75FAD8-14AA-4DE6-A5CF-683E948C703E}"/>
+              </a:ext>
+            </a:extLst>
+          </p:cNvPr>
+          <p:cNvCxnSpPr>
+            <a:cxnSpLocks/>
+            <a:endCxn id="11" idx="1"/>
+          </p:cNvCxnSpPr>
+          <p:nvPr/>
+        </p:nvCxnSpPr>
+        <p:spPr>
+          <a:xfrm>
+            <a:off x="3578192" y="1748385"/>
+            <a:ext cx="910614" cy="467852"/>
+          </a:xfrm>
+          <a:prstGeom prst="straightConnector1">
+            <a:avLst/>
+          </a:prstGeom>
+          <a:ln>
+            <a:tailEnd type="triangle" w="lg" len="sm"/>
+          </a:ln>
+        </p:spPr>
+        <p:style>
+          <a:lnRef idx="1">
+            <a:schemeClr val="accent1"/>
+          </a:lnRef>
+          <a:fillRef idx="0">
+            <a:schemeClr val="accent1"/>
+          </a:fillRef>
+          <a:effectRef idx="0">
+            <a:schemeClr val="accent1"/>
+          </a:effectRef>
+          <a:fontRef idx="minor">
+            <a:schemeClr val="tx1"/>
+          </a:fontRef>
+        </p:style>
+      </p:cxnSp>
+      <p:cxnSp>
+        <p:nvCxnSpPr>
+          <p:cNvPr id="20" name="Connector: Elbow 19">
+            <a:extLst>
+              <a:ext uri="{FF2B5EF4-FFF2-40B4-BE49-F238E27FC236}">
+                <a16:creationId xmlns:a16="http://schemas.microsoft.com/office/drawing/2014/main" id="{209749A7-3B3D-4F9B-98A7-DC37F9AB27F3}"/>
+              </a:ext>
+            </a:extLst>
+          </p:cNvPr>
+          <p:cNvCxnSpPr>
+            <a:endCxn id="4" idx="0"/>
+          </p:cNvCxnSpPr>
+          <p:nvPr/>
+        </p:nvCxnSpPr>
+        <p:spPr>
+          <a:xfrm>
+            <a:off x="1031875" y="1034534"/>
+            <a:ext cx="2546317" cy="180588"/>
+          </a:xfrm>
+          <a:prstGeom prst="bentConnector2">
+            <a:avLst/>
+          </a:prstGeom>
+          <a:ln>
+            <a:tailEnd type="triangle" w="lg" len="sm"/>
+          </a:ln>
+        </p:spPr>
+        <p:style>
+          <a:lnRef idx="1">
+            <a:schemeClr val="accent1"/>
+          </a:lnRef>
+          <a:fillRef idx="0">
+            <a:schemeClr val="accent1"/>
+          </a:fillRef>
+          <a:effectRef idx="0">
+            <a:schemeClr val="accent1"/>
+          </a:effectRef>
+          <a:fontRef idx="minor">
+            <a:schemeClr val="tx1"/>
+          </a:fontRef>
+        </p:style>
+      </p:cxnSp>
+      <p:sp>
+        <p:nvSpPr>
+          <p:cNvPr id="21" name="TextBox 20">
+            <a:extLst>
+              <a:ext uri="{FF2B5EF4-FFF2-40B4-BE49-F238E27FC236}">
+                <a16:creationId xmlns:a16="http://schemas.microsoft.com/office/drawing/2014/main" id="{5D648B46-7138-4FD9-8AD6-DF08C0FA0143}"/>
+              </a:ext>
+            </a:extLst>
+          </p:cNvPr>
+          <p:cNvSpPr txBox="1"/>
+          <p:nvPr/>
+        </p:nvSpPr>
+        <p:spPr>
+          <a:xfrm>
+            <a:off x="1073357" y="1065113"/>
+            <a:ext cx="1679222" cy="738664"/>
+          </a:xfrm>
+          <a:prstGeom prst="rect">
+            <a:avLst/>
+          </a:prstGeom>
+          <a:noFill/>
+        </p:spPr>
+        <p:txBody>
+          <a:bodyPr wrap="square" rtlCol="0">
+            <a:spAutoFit/>
+          </a:bodyPr>
+          <a:lstStyle/>
+          <a:p>
+            <a:r>
+              <a:rPr lang="en-US" sz="1400" dirty="0">
+                <a:solidFill>
+                  <a:schemeClr val="bg2">
+                    <a:lumMod val="50000"/>
+                  </a:schemeClr>
+                </a:solidFill>
+              </a:rPr>
+              <a:t>     Run-time query to determine flag value</a:t>
+            </a:r>
+            <a:endParaRPr lang="en-CA" sz="1400" dirty="0">
+              <a:solidFill>
+                <a:schemeClr val="bg2">
+                  <a:lumMod val="50000"/>
+                </a:schemeClr>
+              </a:solidFill>
+            </a:endParaRPr>
+          </a:p>
+        </p:txBody>
+      </p:sp>
+      <p:sp>
+        <p:nvSpPr>
+          <p:cNvPr id="24" name="TextBox 23">
+            <a:extLst>
+              <a:ext uri="{FF2B5EF4-FFF2-40B4-BE49-F238E27FC236}">
+                <a16:creationId xmlns:a16="http://schemas.microsoft.com/office/drawing/2014/main" id="{C4AED73A-43E4-4669-BD2C-5396B889EA3A}"/>
+              </a:ext>
+            </a:extLst>
+          </p:cNvPr>
+          <p:cNvSpPr txBox="1"/>
+          <p:nvPr/>
+        </p:nvSpPr>
+        <p:spPr>
+          <a:xfrm>
+            <a:off x="26426" y="2191698"/>
+            <a:ext cx="490840" cy="369332"/>
+          </a:xfrm>
+          <a:prstGeom prst="rect">
+            <a:avLst/>
+          </a:prstGeom>
+          <a:noFill/>
+        </p:spPr>
+        <p:txBody>
+          <a:bodyPr wrap="none" rtlCol="0">
+            <a:spAutoFit/>
+          </a:bodyPr>
+          <a:lstStyle/>
+          <a:p>
+            <a:r>
+              <a:rPr lang="en-CA" dirty="0">
+                <a:latin typeface="Segoe UI" panose="020B0502040204020203" pitchFamily="34" charset="0"/>
+                <a:cs typeface="Segoe UI" panose="020B0502040204020203" pitchFamily="34" charset="0"/>
+              </a:rPr>
+              <a:t>❶</a:t>
+            </a:r>
+            <a:endParaRPr lang="en-CA" dirty="0"/>
+          </a:p>
+        </p:txBody>
+      </p:sp>
+      <p:sp>
+        <p:nvSpPr>
+          <p:cNvPr id="25" name="TextBox 24">
+            <a:extLst>
+              <a:ext uri="{FF2B5EF4-FFF2-40B4-BE49-F238E27FC236}">
+                <a16:creationId xmlns:a16="http://schemas.microsoft.com/office/drawing/2014/main" id="{24481FE0-636B-49A4-8627-0FC466387E28}"/>
+              </a:ext>
+            </a:extLst>
+          </p:cNvPr>
+          <p:cNvSpPr txBox="1"/>
+          <p:nvPr/>
+        </p:nvSpPr>
+        <p:spPr>
+          <a:xfrm>
+            <a:off x="967478" y="1030456"/>
+            <a:ext cx="490840" cy="369332"/>
+          </a:xfrm>
+          <a:prstGeom prst="rect">
+            <a:avLst/>
+          </a:prstGeom>
+          <a:noFill/>
+        </p:spPr>
+        <p:txBody>
+          <a:bodyPr wrap="none" rtlCol="0">
+            <a:spAutoFit/>
+          </a:bodyPr>
+          <a:lstStyle/>
+          <a:p>
+            <a:r>
+              <a:rPr lang="en-CA" dirty="0">
+                <a:latin typeface="Segoe UI" panose="020B0502040204020203" pitchFamily="34" charset="0"/>
+                <a:cs typeface="Segoe UI" panose="020B0502040204020203" pitchFamily="34" charset="0"/>
+              </a:rPr>
+              <a:t>❷</a:t>
+            </a:r>
+            <a:endParaRPr lang="en-CA" dirty="0"/>
+          </a:p>
+        </p:txBody>
+      </p:sp>
+      <p:sp>
+        <p:nvSpPr>
+          <p:cNvPr id="26" name="TextBox 25">
+            <a:extLst>
+              <a:ext uri="{FF2B5EF4-FFF2-40B4-BE49-F238E27FC236}">
+                <a16:creationId xmlns:a16="http://schemas.microsoft.com/office/drawing/2014/main" id="{13439D88-869E-4D1F-BE31-4DB1853104B6}"/>
+              </a:ext>
+            </a:extLst>
+          </p:cNvPr>
+          <p:cNvSpPr txBox="1"/>
+          <p:nvPr/>
+        </p:nvSpPr>
+        <p:spPr>
+          <a:xfrm>
+            <a:off x="3675466" y="1514598"/>
+            <a:ext cx="490840" cy="369332"/>
+          </a:xfrm>
+          <a:prstGeom prst="rect">
+            <a:avLst/>
+          </a:prstGeom>
+          <a:noFill/>
+        </p:spPr>
+        <p:txBody>
+          <a:bodyPr wrap="none" rtlCol="0">
+            <a:spAutoFit/>
+          </a:bodyPr>
+          <a:lstStyle/>
+          <a:p>
+            <a:r>
+              <a:rPr lang="en-CA" dirty="0">
+                <a:latin typeface="Segoe UI" panose="020B0502040204020203" pitchFamily="34" charset="0"/>
+                <a:cs typeface="Segoe UI" panose="020B0502040204020203" pitchFamily="34" charset="0"/>
+              </a:rPr>
+              <a:t>❸</a:t>
+            </a:r>
+            <a:endParaRPr lang="en-CA" dirty="0"/>
+          </a:p>
+        </p:txBody>
+      </p:sp>
+    </p:spTree>
+    <p:extLst>
+      <p:ext uri="{BB962C8B-B14F-4D97-AF65-F5344CB8AC3E}">
+        <p14:creationId xmlns:p14="http://schemas.microsoft.com/office/powerpoint/2010/main" val="1177520213"/>
+      </p:ext>
+    </p:extLst>
+  </p:cSld>
+  <p:clrMapOvr>
+    <a:masterClrMapping/>
+  </p:clrMapOvr>
+</p:sld>
+</file>
+
+<file path=ppt/slides/slide7.xml><?xml version="1.0" encoding="utf-8"?>
 <p:sld xmlns:a="http://schemas.openxmlformats.org/drawingml/2006/main" xmlns:r="http://schemas.openxmlformats.org/officeDocument/2006/relationships" xmlns:p="http://schemas.openxmlformats.org/presentationml/2006/main">
   <p:cSld>
     <p:spTree>
@@ -9189,6 +10253,114 @@
 </p:sld>
 </file>
 
+<file path=ppt/slides/slide8.xml><?xml version="1.0" encoding="utf-8"?>
+<p:sld xmlns:a="http://schemas.openxmlformats.org/drawingml/2006/main" xmlns:r="http://schemas.openxmlformats.org/officeDocument/2006/relationships" xmlns:p="http://schemas.openxmlformats.org/presentationml/2006/main">
+  <p:cSld>
+    <p:spTree>
+      <p:nvGrpSpPr>
+        <p:cNvPr id="1" name=""/>
+        <p:cNvGrpSpPr/>
+        <p:nvPr/>
+      </p:nvGrpSpPr>
+      <p:grpSpPr>
+        <a:xfrm>
+          <a:off x="0" y="0"/>
+          <a:ext cx="0" cy="0"/>
+          <a:chOff x="0" y="0"/>
+          <a:chExt cx="0" cy="0"/>
+        </a:xfrm>
+      </p:grpSpPr>
+      <p:pic>
+        <p:nvPicPr>
+          <p:cNvPr id="4" name="Graphic 3" descr="Screwdriver">
+            <a:extLst>
+              <a:ext uri="{FF2B5EF4-FFF2-40B4-BE49-F238E27FC236}">
+                <a16:creationId xmlns:a16="http://schemas.microsoft.com/office/drawing/2014/main" id="{88C14D97-3510-4679-BB97-3897836D9376}"/>
+              </a:ext>
+            </a:extLst>
+          </p:cNvPr>
+          <p:cNvPicPr>
+            <a:picLocks noChangeAspect="1"/>
+          </p:cNvPicPr>
+          <p:nvPr/>
+        </p:nvPicPr>
+        <p:blipFill>
+          <a:blip r:embed="rId3">
+            <a:extLst>
+              <a:ext uri="{28A0092B-C50C-407E-A947-70E740481C1C}">
+                <a14:useLocalDpi xmlns:a14="http://schemas.microsoft.com/office/drawing/2010/main" val="0"/>
+              </a:ext>
+              <a:ext uri="{96DAC541-7B7A-43D3-8B79-37D633B846F1}">
+                <asvg:svgBlip xmlns:asvg="http://schemas.microsoft.com/office/drawing/2016/SVG/main" r:embed="rId4"/>
+              </a:ext>
+            </a:extLst>
+          </a:blip>
+          <a:stretch>
+            <a:fillRect/>
+          </a:stretch>
+        </p:blipFill>
+        <p:spPr>
+          <a:xfrm>
+            <a:off x="4844218" y="2805736"/>
+            <a:ext cx="623264" cy="623264"/>
+          </a:xfrm>
+          <a:prstGeom prst="rect">
+            <a:avLst/>
+          </a:prstGeom>
+        </p:spPr>
+      </p:pic>
+      <p:pic>
+        <p:nvPicPr>
+          <p:cNvPr id="6" name="Graphic 5" descr="Box trolley">
+            <a:extLst>
+              <a:ext uri="{FF2B5EF4-FFF2-40B4-BE49-F238E27FC236}">
+                <a16:creationId xmlns:a16="http://schemas.microsoft.com/office/drawing/2014/main" id="{6A77EFB1-76CC-45AE-B553-4C50FC541276}"/>
+              </a:ext>
+            </a:extLst>
+          </p:cNvPr>
+          <p:cNvPicPr>
+            <a:picLocks noChangeAspect="1"/>
+          </p:cNvPicPr>
+          <p:nvPr/>
+        </p:nvPicPr>
+        <p:blipFill>
+          <a:blip r:embed="rId5">
+            <a:extLst>
+              <a:ext uri="{28A0092B-C50C-407E-A947-70E740481C1C}">
+                <a14:useLocalDpi xmlns:a14="http://schemas.microsoft.com/office/drawing/2010/main" val="0"/>
+              </a:ext>
+              <a:ext uri="{96DAC541-7B7A-43D3-8B79-37D633B846F1}">
+                <asvg:svgBlip xmlns:asvg="http://schemas.microsoft.com/office/drawing/2016/SVG/main" r:embed="rId6"/>
+              </a:ext>
+            </a:extLst>
+          </a:blip>
+          <a:stretch>
+            <a:fillRect/>
+          </a:stretch>
+        </p:blipFill>
+        <p:spPr>
+          <a:xfrm>
+            <a:off x="3299197" y="2599734"/>
+            <a:ext cx="914400" cy="914400"/>
+          </a:xfrm>
+          <a:prstGeom prst="rect">
+            <a:avLst/>
+          </a:prstGeom>
+        </p:spPr>
+      </p:pic>
+    </p:spTree>
+    <p:extLst>
+      <p:ext uri="{BB962C8B-B14F-4D97-AF65-F5344CB8AC3E}">
+        <p14:creationId xmlns:p14="http://schemas.microsoft.com/office/powerpoint/2010/main" val="108001032"/>
+      </p:ext>
+    </p:extLst>
+  </p:cSld>
+  <p:clrMapOvr>
+    <a:masterClrMapping/>
+  </p:clrMapOvr>
+</p:sld>
+</file>
+
 <file path=ppt/theme/theme1.xml><?xml version="1.0" encoding="utf-8"?>
 <a:theme xmlns:a="http://schemas.openxmlformats.org/drawingml/2006/main" name="Office Theme">
   <a:themeElements>

</xml_diff>